<commit_message>
Changes: edited changes to ppt
</commit_message>
<xml_diff>
--- a/CodeSmell.pptx
+++ b/CodeSmell.pptx
@@ -4,28 +4,32 @@
   <p:sldMasterIdLst>
     <p:sldMasterId id="2147483648" r:id="rId1"/>
   </p:sldMasterIdLst>
+  <p:notesMasterIdLst>
+    <p:notesMasterId r:id="rId24"/>
+  </p:notesMasterIdLst>
   <p:sldIdLst>
     <p:sldId id="256" r:id="rId2"/>
-    <p:sldId id="257" r:id="rId3"/>
-    <p:sldId id="277" r:id="rId4"/>
-    <p:sldId id="276" r:id="rId5"/>
-    <p:sldId id="280" r:id="rId6"/>
-    <p:sldId id="278" r:id="rId7"/>
-    <p:sldId id="281" r:id="rId8"/>
-    <p:sldId id="258" r:id="rId9"/>
-    <p:sldId id="282" r:id="rId10"/>
-    <p:sldId id="259" r:id="rId11"/>
-    <p:sldId id="260" r:id="rId12"/>
-    <p:sldId id="261" r:id="rId13"/>
-    <p:sldId id="265" r:id="rId14"/>
-    <p:sldId id="283" r:id="rId15"/>
-    <p:sldId id="272" r:id="rId16"/>
+    <p:sldId id="277" r:id="rId3"/>
+    <p:sldId id="257" r:id="rId4"/>
+    <p:sldId id="290" r:id="rId5"/>
+    <p:sldId id="276" r:id="rId6"/>
+    <p:sldId id="280" r:id="rId7"/>
+    <p:sldId id="278" r:id="rId8"/>
+    <p:sldId id="281" r:id="rId9"/>
+    <p:sldId id="258" r:id="rId10"/>
+    <p:sldId id="282" r:id="rId11"/>
+    <p:sldId id="259" r:id="rId12"/>
+    <p:sldId id="260" r:id="rId13"/>
+    <p:sldId id="261" r:id="rId14"/>
+    <p:sldId id="265" r:id="rId15"/>
+    <p:sldId id="283" r:id="rId16"/>
     <p:sldId id="285" r:id="rId17"/>
     <p:sldId id="284" r:id="rId18"/>
     <p:sldId id="286" r:id="rId19"/>
     <p:sldId id="287" r:id="rId20"/>
     <p:sldId id="288" r:id="rId21"/>
-    <p:sldId id="289" r:id="rId22"/>
+    <p:sldId id="291" r:id="rId22"/>
+    <p:sldId id="289" r:id="rId23"/>
   </p:sldIdLst>
   <p:sldSz cx="12192000" cy="6858000"/>
   <p:notesSz cx="6858000" cy="9144000"/>
@@ -130,6 +134,356 @@
     </p:ext>
   </p:extLst>
 </p:presentation>
+</file>
+
+<file path=ppt/notesMasters/notesMaster1.xml><?xml version="1.0" encoding="utf-8"?>
+<p:notesMaster xmlns:a="http://schemas.openxmlformats.org/drawingml/2006/main" xmlns:r="http://schemas.openxmlformats.org/officeDocument/2006/relationships" xmlns:p="http://schemas.openxmlformats.org/presentationml/2006/main">
+  <p:cSld>
+    <p:bg>
+      <p:bgRef idx="1001">
+        <a:schemeClr val="bg1"/>
+      </p:bgRef>
+    </p:bg>
+    <p:spTree>
+      <p:nvGrpSpPr>
+        <p:cNvPr id="1" name=""/>
+        <p:cNvGrpSpPr/>
+        <p:nvPr/>
+      </p:nvGrpSpPr>
+      <p:grpSpPr>
+        <a:xfrm>
+          <a:off x="0" y="0"/>
+          <a:ext cx="0" cy="0"/>
+          <a:chOff x="0" y="0"/>
+          <a:chExt cx="0" cy="0"/>
+        </a:xfrm>
+      </p:grpSpPr>
+      <p:sp>
+        <p:nvSpPr>
+          <p:cNvPr id="2" name="Header Placeholder 1"/>
+          <p:cNvSpPr>
+            <a:spLocks noGrp="1"/>
+          </p:cNvSpPr>
+          <p:nvPr>
+            <p:ph type="hdr" sz="quarter"/>
+          </p:nvPr>
+        </p:nvSpPr>
+        <p:spPr>
+          <a:xfrm>
+            <a:off x="0" y="0"/>
+            <a:ext cx="2971800" cy="458788"/>
+          </a:xfrm>
+          <a:prstGeom prst="rect">
+            <a:avLst/>
+          </a:prstGeom>
+        </p:spPr>
+        <p:txBody>
+          <a:bodyPr vert="horz" lIns="91440" tIns="45720" rIns="91440" bIns="45720" rtlCol="0"/>
+          <a:lstStyle>
+            <a:lvl1pPr algn="l">
+              <a:defRPr sz="1200"/>
+            </a:lvl1pPr>
+          </a:lstStyle>
+          <a:p>
+            <a:endParaRPr lang="en-IN"/>
+          </a:p>
+        </p:txBody>
+      </p:sp>
+      <p:sp>
+        <p:nvSpPr>
+          <p:cNvPr id="3" name="Date Placeholder 2"/>
+          <p:cNvSpPr>
+            <a:spLocks noGrp="1"/>
+          </p:cNvSpPr>
+          <p:nvPr>
+            <p:ph type="dt" idx="1"/>
+          </p:nvPr>
+        </p:nvSpPr>
+        <p:spPr>
+          <a:xfrm>
+            <a:off x="3884613" y="0"/>
+            <a:ext cx="2971800" cy="458788"/>
+          </a:xfrm>
+          <a:prstGeom prst="rect">
+            <a:avLst/>
+          </a:prstGeom>
+        </p:spPr>
+        <p:txBody>
+          <a:bodyPr vert="horz" lIns="91440" tIns="45720" rIns="91440" bIns="45720" rtlCol="0"/>
+          <a:lstStyle>
+            <a:lvl1pPr algn="r">
+              <a:defRPr sz="1200"/>
+            </a:lvl1pPr>
+          </a:lstStyle>
+          <a:p>
+            <a:fld id="{3477A0F4-F4B0-47AB-8AD3-20B19DF9E985}" type="datetimeFigureOut">
+              <a:rPr lang="en-IN" smtClean="0"/>
+              <a:t>03-04-2025</a:t>
+            </a:fld>
+            <a:endParaRPr lang="en-IN"/>
+          </a:p>
+        </p:txBody>
+      </p:sp>
+      <p:sp>
+        <p:nvSpPr>
+          <p:cNvPr id="4" name="Slide Image Placeholder 3"/>
+          <p:cNvSpPr>
+            <a:spLocks noGrp="1" noRot="1" noChangeAspect="1"/>
+          </p:cNvSpPr>
+          <p:nvPr>
+            <p:ph type="sldImg" idx="2"/>
+          </p:nvPr>
+        </p:nvSpPr>
+        <p:spPr>
+          <a:xfrm>
+            <a:off x="685800" y="1143000"/>
+            <a:ext cx="5486400" cy="3086100"/>
+          </a:xfrm>
+          <a:prstGeom prst="rect">
+            <a:avLst/>
+          </a:prstGeom>
+          <a:noFill/>
+          <a:ln w="12700">
+            <a:solidFill>
+              <a:prstClr val="black"/>
+            </a:solidFill>
+          </a:ln>
+        </p:spPr>
+        <p:txBody>
+          <a:bodyPr vert="horz" lIns="91440" tIns="45720" rIns="91440" bIns="45720" rtlCol="0" anchor="ctr"/>
+          <a:lstStyle/>
+          <a:p>
+            <a:endParaRPr lang="en-IN"/>
+          </a:p>
+        </p:txBody>
+      </p:sp>
+      <p:sp>
+        <p:nvSpPr>
+          <p:cNvPr id="5" name="Notes Placeholder 4"/>
+          <p:cNvSpPr>
+            <a:spLocks noGrp="1"/>
+          </p:cNvSpPr>
+          <p:nvPr>
+            <p:ph type="body" sz="quarter" idx="3"/>
+          </p:nvPr>
+        </p:nvSpPr>
+        <p:spPr>
+          <a:xfrm>
+            <a:off x="685800" y="4400550"/>
+            <a:ext cx="5486400" cy="3600450"/>
+          </a:xfrm>
+          <a:prstGeom prst="rect">
+            <a:avLst/>
+          </a:prstGeom>
+        </p:spPr>
+        <p:txBody>
+          <a:bodyPr vert="horz" lIns="91440" tIns="45720" rIns="91440" bIns="45720" rtlCol="0"/>
+          <a:lstStyle/>
+          <a:p>
+            <a:pPr lvl="0"/>
+            <a:r>
+              <a:rPr lang="en-US"/>
+              <a:t>Click to edit Master text styles</a:t>
+            </a:r>
+          </a:p>
+          <a:p>
+            <a:pPr lvl="1"/>
+            <a:r>
+              <a:rPr lang="en-US"/>
+              <a:t>Second level</a:t>
+            </a:r>
+          </a:p>
+          <a:p>
+            <a:pPr lvl="2"/>
+            <a:r>
+              <a:rPr lang="en-US"/>
+              <a:t>Third level</a:t>
+            </a:r>
+          </a:p>
+          <a:p>
+            <a:pPr lvl="3"/>
+            <a:r>
+              <a:rPr lang="en-US"/>
+              <a:t>Fourth level</a:t>
+            </a:r>
+          </a:p>
+          <a:p>
+            <a:pPr lvl="4"/>
+            <a:r>
+              <a:rPr lang="en-US"/>
+              <a:t>Fifth level</a:t>
+            </a:r>
+            <a:endParaRPr lang="en-IN"/>
+          </a:p>
+        </p:txBody>
+      </p:sp>
+      <p:sp>
+        <p:nvSpPr>
+          <p:cNvPr id="6" name="Footer Placeholder 5"/>
+          <p:cNvSpPr>
+            <a:spLocks noGrp="1"/>
+          </p:cNvSpPr>
+          <p:nvPr>
+            <p:ph type="ftr" sz="quarter" idx="4"/>
+          </p:nvPr>
+        </p:nvSpPr>
+        <p:spPr>
+          <a:xfrm>
+            <a:off x="0" y="8685213"/>
+            <a:ext cx="2971800" cy="458787"/>
+          </a:xfrm>
+          <a:prstGeom prst="rect">
+            <a:avLst/>
+          </a:prstGeom>
+        </p:spPr>
+        <p:txBody>
+          <a:bodyPr vert="horz" lIns="91440" tIns="45720" rIns="91440" bIns="45720" rtlCol="0" anchor="b"/>
+          <a:lstStyle>
+            <a:lvl1pPr algn="l">
+              <a:defRPr sz="1200"/>
+            </a:lvl1pPr>
+          </a:lstStyle>
+          <a:p>
+            <a:endParaRPr lang="en-IN"/>
+          </a:p>
+        </p:txBody>
+      </p:sp>
+      <p:sp>
+        <p:nvSpPr>
+          <p:cNvPr id="7" name="Slide Number Placeholder 6"/>
+          <p:cNvSpPr>
+            <a:spLocks noGrp="1"/>
+          </p:cNvSpPr>
+          <p:nvPr>
+            <p:ph type="sldNum" sz="quarter" idx="5"/>
+          </p:nvPr>
+        </p:nvSpPr>
+        <p:spPr>
+          <a:xfrm>
+            <a:off x="3884613" y="8685213"/>
+            <a:ext cx="2971800" cy="458787"/>
+          </a:xfrm>
+          <a:prstGeom prst="rect">
+            <a:avLst/>
+          </a:prstGeom>
+        </p:spPr>
+        <p:txBody>
+          <a:bodyPr vert="horz" lIns="91440" tIns="45720" rIns="91440" bIns="45720" rtlCol="0" anchor="b"/>
+          <a:lstStyle>
+            <a:lvl1pPr algn="r">
+              <a:defRPr sz="1200"/>
+            </a:lvl1pPr>
+          </a:lstStyle>
+          <a:p>
+            <a:fld id="{A3387A9E-CDEE-4DA9-AC6A-4A043175EF53}" type="slidenum">
+              <a:rPr lang="en-IN" smtClean="0"/>
+              <a:t>‹#›</a:t>
+            </a:fld>
+            <a:endParaRPr lang="en-IN"/>
+          </a:p>
+        </p:txBody>
+      </p:sp>
+    </p:spTree>
+    <p:extLst>
+      <p:ext uri="{BB962C8B-B14F-4D97-AF65-F5344CB8AC3E}">
+        <p14:creationId xmlns:p14="http://schemas.microsoft.com/office/powerpoint/2010/main" val="1070115834"/>
+      </p:ext>
+    </p:extLst>
+  </p:cSld>
+  <p:clrMap bg1="lt1" tx1="dk1" bg2="lt2" tx2="dk2" accent1="accent1" accent2="accent2" accent3="accent3" accent4="accent4" accent5="accent5" accent6="accent6" hlink="hlink" folHlink="folHlink"/>
+  <p:notesStyle>
+    <a:lvl1pPr marL="0" algn="l" defTabSz="914400" rtl="0" eaLnBrk="1" latinLnBrk="0" hangingPunct="1">
+      <a:defRPr sz="1200" kern="1200">
+        <a:solidFill>
+          <a:schemeClr val="tx1"/>
+        </a:solidFill>
+        <a:latin typeface="+mn-lt"/>
+        <a:ea typeface="+mn-ea"/>
+        <a:cs typeface="+mn-cs"/>
+      </a:defRPr>
+    </a:lvl1pPr>
+    <a:lvl2pPr marL="457200" algn="l" defTabSz="914400" rtl="0" eaLnBrk="1" latinLnBrk="0" hangingPunct="1">
+      <a:defRPr sz="1200" kern="1200">
+        <a:solidFill>
+          <a:schemeClr val="tx1"/>
+        </a:solidFill>
+        <a:latin typeface="+mn-lt"/>
+        <a:ea typeface="+mn-ea"/>
+        <a:cs typeface="+mn-cs"/>
+      </a:defRPr>
+    </a:lvl2pPr>
+    <a:lvl3pPr marL="914400" algn="l" defTabSz="914400" rtl="0" eaLnBrk="1" latinLnBrk="0" hangingPunct="1">
+      <a:defRPr sz="1200" kern="1200">
+        <a:solidFill>
+          <a:schemeClr val="tx1"/>
+        </a:solidFill>
+        <a:latin typeface="+mn-lt"/>
+        <a:ea typeface="+mn-ea"/>
+        <a:cs typeface="+mn-cs"/>
+      </a:defRPr>
+    </a:lvl3pPr>
+    <a:lvl4pPr marL="1371600" algn="l" defTabSz="914400" rtl="0" eaLnBrk="1" latinLnBrk="0" hangingPunct="1">
+      <a:defRPr sz="1200" kern="1200">
+        <a:solidFill>
+          <a:schemeClr val="tx1"/>
+        </a:solidFill>
+        <a:latin typeface="+mn-lt"/>
+        <a:ea typeface="+mn-ea"/>
+        <a:cs typeface="+mn-cs"/>
+      </a:defRPr>
+    </a:lvl4pPr>
+    <a:lvl5pPr marL="1828800" algn="l" defTabSz="914400" rtl="0" eaLnBrk="1" latinLnBrk="0" hangingPunct="1">
+      <a:defRPr sz="1200" kern="1200">
+        <a:solidFill>
+          <a:schemeClr val="tx1"/>
+        </a:solidFill>
+        <a:latin typeface="+mn-lt"/>
+        <a:ea typeface="+mn-ea"/>
+        <a:cs typeface="+mn-cs"/>
+      </a:defRPr>
+    </a:lvl5pPr>
+    <a:lvl6pPr marL="2286000" algn="l" defTabSz="914400" rtl="0" eaLnBrk="1" latinLnBrk="0" hangingPunct="1">
+      <a:defRPr sz="1200" kern="1200">
+        <a:solidFill>
+          <a:schemeClr val="tx1"/>
+        </a:solidFill>
+        <a:latin typeface="+mn-lt"/>
+        <a:ea typeface="+mn-ea"/>
+        <a:cs typeface="+mn-cs"/>
+      </a:defRPr>
+    </a:lvl6pPr>
+    <a:lvl7pPr marL="2743200" algn="l" defTabSz="914400" rtl="0" eaLnBrk="1" latinLnBrk="0" hangingPunct="1">
+      <a:defRPr sz="1200" kern="1200">
+        <a:solidFill>
+          <a:schemeClr val="tx1"/>
+        </a:solidFill>
+        <a:latin typeface="+mn-lt"/>
+        <a:ea typeface="+mn-ea"/>
+        <a:cs typeface="+mn-cs"/>
+      </a:defRPr>
+    </a:lvl7pPr>
+    <a:lvl8pPr marL="3200400" algn="l" defTabSz="914400" rtl="0" eaLnBrk="1" latinLnBrk="0" hangingPunct="1">
+      <a:defRPr sz="1200" kern="1200">
+        <a:solidFill>
+          <a:schemeClr val="tx1"/>
+        </a:solidFill>
+        <a:latin typeface="+mn-lt"/>
+        <a:ea typeface="+mn-ea"/>
+        <a:cs typeface="+mn-cs"/>
+      </a:defRPr>
+    </a:lvl8pPr>
+    <a:lvl9pPr marL="3657600" algn="l" defTabSz="914400" rtl="0" eaLnBrk="1" latinLnBrk="0" hangingPunct="1">
+      <a:defRPr sz="1200" kern="1200">
+        <a:solidFill>
+          <a:schemeClr val="tx1"/>
+        </a:solidFill>
+        <a:latin typeface="+mn-lt"/>
+        <a:ea typeface="+mn-ea"/>
+        <a:cs typeface="+mn-cs"/>
+      </a:defRPr>
+    </a:lvl9pPr>
+  </p:notesStyle>
+</p:notesMaster>
 </file>
 
 <file path=ppt/slideLayouts/slideLayout1.xml><?xml version="1.0" encoding="utf-8"?>
@@ -852,10 +1206,9 @@
           <a:bodyPr/>
           <a:lstStyle/>
           <a:p>
-            <a:fld id="{B61BEF0D-F0BB-DE4B-95CE-6DB70DBA9567}" type="datetimeFigureOut">
-              <a:rPr lang="en-US" dirty="0"/>
-              <a:pPr/>
-              <a:t>4/1/2025</a:t>
+            <a:fld id="{F5216777-8CF8-44EF-918D-95D52E42AA54}" type="datetime1">
+              <a:rPr lang="en-US" smtClean="0"/>
+              <a:t>4/3/2025</a:t>
             </a:fld>
             <a:endParaRPr lang="en-US" dirty="0"/>
           </a:p>
@@ -1100,10 +1453,9 @@
           <a:bodyPr/>
           <a:lstStyle/>
           <a:p>
-            <a:fld id="{B61BEF0D-F0BB-DE4B-95CE-6DB70DBA9567}" type="datetimeFigureOut">
-              <a:rPr lang="en-US" dirty="0"/>
-              <a:pPr/>
-              <a:t>4/1/2025</a:t>
+            <a:fld id="{C9D32BD1-F3ED-4813-85AF-BECC294657EF}" type="datetime1">
+              <a:rPr lang="en-US" smtClean="0"/>
+              <a:t>4/3/2025</a:t>
             </a:fld>
             <a:endParaRPr lang="en-US" dirty="0"/>
           </a:p>
@@ -1411,10 +1763,9 @@
           <a:bodyPr/>
           <a:lstStyle/>
           <a:p>
-            <a:fld id="{B61BEF0D-F0BB-DE4B-95CE-6DB70DBA9567}" type="datetimeFigureOut">
-              <a:rPr lang="en-US" dirty="0"/>
-              <a:pPr/>
-              <a:t>4/1/2025</a:t>
+            <a:fld id="{9FAB4F2F-5C14-4288-BED3-014E7FC07CA5}" type="datetime1">
+              <a:rPr lang="en-US" smtClean="0"/>
+              <a:t>4/3/2025</a:t>
             </a:fld>
             <a:endParaRPr lang="en-US" dirty="0"/>
           </a:p>
@@ -1749,10 +2100,9 @@
           <a:bodyPr/>
           <a:lstStyle/>
           <a:p>
-            <a:fld id="{B61BEF0D-F0BB-DE4B-95CE-6DB70DBA9567}" type="datetimeFigureOut">
-              <a:rPr lang="en-US" dirty="0"/>
-              <a:pPr/>
-              <a:t>4/1/2025</a:t>
+            <a:fld id="{AFE3FA00-20E5-4A4C-BAA8-07B798C3E2BD}" type="datetime1">
+              <a:rPr lang="en-US" smtClean="0"/>
+              <a:t>4/3/2025</a:t>
             </a:fld>
             <a:endParaRPr lang="en-US" dirty="0"/>
           </a:p>
@@ -2060,10 +2410,9 @@
           <a:bodyPr/>
           <a:lstStyle/>
           <a:p>
-            <a:fld id="{B61BEF0D-F0BB-DE4B-95CE-6DB70DBA9567}" type="datetimeFigureOut">
-              <a:rPr lang="en-US" dirty="0"/>
-              <a:pPr/>
-              <a:t>4/1/2025</a:t>
+            <a:fld id="{6F4CE6E6-2F32-4A83-9A37-70D1242ECAB6}" type="datetime1">
+              <a:rPr lang="en-US" smtClean="0"/>
+              <a:t>4/3/2025</a:t>
             </a:fld>
             <a:endParaRPr lang="en-US" dirty="0"/>
           </a:p>
@@ -2450,10 +2799,9 @@
           <a:bodyPr/>
           <a:lstStyle/>
           <a:p>
-            <a:fld id="{B61BEF0D-F0BB-DE4B-95CE-6DB70DBA9567}" type="datetimeFigureOut">
-              <a:rPr lang="en-US" dirty="0"/>
-              <a:pPr/>
-              <a:t>4/1/2025</a:t>
+            <a:fld id="{6715C4D8-B5D6-4776-97F7-E88E156E5654}" type="datetime1">
+              <a:rPr lang="en-US" smtClean="0"/>
+              <a:t>4/3/2025</a:t>
             </a:fld>
             <a:endParaRPr lang="en-US" dirty="0"/>
           </a:p>
@@ -2617,9 +2965,9 @@
           <a:bodyPr/>
           <a:lstStyle/>
           <a:p>
-            <a:fld id="{55C6B4A9-1611-4792-9094-5F34BCA07E0B}" type="datetimeFigureOut">
-              <a:rPr lang="en-US" dirty="0"/>
-              <a:t>4/1/2025</a:t>
+            <a:fld id="{F41EEF30-2CB4-4570-B5B0-E499B56D6D14}" type="datetime1">
+              <a:rPr lang="en-US" smtClean="0"/>
+              <a:t>4/3/2025</a:t>
             </a:fld>
             <a:endParaRPr lang="en-US" dirty="0"/>
           </a:p>
@@ -2792,10 +3140,9 @@
           <a:bodyPr/>
           <a:lstStyle/>
           <a:p>
-            <a:fld id="{B61BEF0D-F0BB-DE4B-95CE-6DB70DBA9567}" type="datetimeFigureOut">
-              <a:rPr lang="en-US" dirty="0"/>
-              <a:pPr/>
-              <a:t>4/1/2025</a:t>
+            <a:fld id="{AA065F5D-77F6-475F-B01F-10D1CD8DB549}" type="datetime1">
+              <a:rPr lang="en-US" smtClean="0"/>
+              <a:t>4/3/2025</a:t>
             </a:fld>
             <a:endParaRPr lang="en-US" dirty="0"/>
           </a:p>
@@ -2965,10 +3312,9 @@
           <a:bodyPr/>
           <a:lstStyle/>
           <a:p>
-            <a:fld id="{B61BEF0D-F0BB-DE4B-95CE-6DB70DBA9567}" type="datetimeFigureOut">
-              <a:rPr lang="en-US" dirty="0"/>
-              <a:pPr/>
-              <a:t>4/1/2025</a:t>
+            <a:fld id="{1F33A9EA-982D-4C95-BE30-80266B31B5C1}" type="datetime1">
+              <a:rPr lang="en-US" smtClean="0"/>
+              <a:t>4/3/2025</a:t>
             </a:fld>
             <a:endParaRPr lang="en-US" dirty="0"/>
           </a:p>
@@ -3209,10 +3555,9 @@
           <a:bodyPr/>
           <a:lstStyle/>
           <a:p>
-            <a:fld id="{B61BEF0D-F0BB-DE4B-95CE-6DB70DBA9567}" type="datetimeFigureOut">
-              <a:rPr lang="en-US" dirty="0"/>
-              <a:pPr/>
-              <a:t>4/1/2025</a:t>
+            <a:fld id="{A0A73C04-3D1F-411B-A909-DDCC763A5C00}" type="datetime1">
+              <a:rPr lang="en-US" smtClean="0"/>
+              <a:t>4/3/2025</a:t>
             </a:fld>
             <a:endParaRPr lang="en-US" dirty="0"/>
           </a:p>
@@ -3438,9 +3783,9 @@
           <a:bodyPr/>
           <a:lstStyle/>
           <a:p>
-            <a:fld id="{EB712588-04B1-427B-82EE-E8DB90309F08}" type="datetimeFigureOut">
-              <a:rPr lang="en-US" dirty="0"/>
-              <a:t>4/1/2025</a:t>
+            <a:fld id="{8928AD85-DA1C-41FB-B7AD-144E0E16F6B6}" type="datetime1">
+              <a:rPr lang="en-US" smtClean="0"/>
+              <a:t>4/3/2025</a:t>
             </a:fld>
             <a:endParaRPr lang="en-US" dirty="0"/>
           </a:p>
@@ -3807,10 +4152,9 @@
           <a:bodyPr/>
           <a:lstStyle/>
           <a:p>
-            <a:fld id="{B61BEF0D-F0BB-DE4B-95CE-6DB70DBA9567}" type="datetimeFigureOut">
-              <a:rPr lang="en-US" dirty="0"/>
-              <a:pPr/>
-              <a:t>4/1/2025</a:t>
+            <a:fld id="{0B3D44CA-F9BF-49FB-8D37-754D687697D5}" type="datetime1">
+              <a:rPr lang="en-US" smtClean="0"/>
+              <a:t>4/3/2025</a:t>
             </a:fld>
             <a:endParaRPr lang="en-US" dirty="0"/>
           </a:p>
@@ -3927,10 +4271,9 @@
           <a:bodyPr/>
           <a:lstStyle/>
           <a:p>
-            <a:fld id="{B61BEF0D-F0BB-DE4B-95CE-6DB70DBA9567}" type="datetimeFigureOut">
-              <a:rPr lang="en-US" dirty="0"/>
-              <a:pPr/>
-              <a:t>4/1/2025</a:t>
+            <a:fld id="{1C523E35-C864-4A29-ACE9-100F432E4952}" type="datetime1">
+              <a:rPr lang="en-US" smtClean="0"/>
+              <a:t>4/3/2025</a:t>
             </a:fld>
             <a:endParaRPr lang="en-US" dirty="0"/>
           </a:p>
@@ -4019,10 +4362,9 @@
           <a:bodyPr/>
           <a:lstStyle/>
           <a:p>
-            <a:fld id="{B61BEF0D-F0BB-DE4B-95CE-6DB70DBA9567}" type="datetimeFigureOut">
-              <a:rPr lang="en-US" dirty="0"/>
-              <a:pPr/>
-              <a:t>4/1/2025</a:t>
+            <a:fld id="{D7DFBF09-6E3C-4688-9606-0E9C6F3613BA}" type="datetime1">
+              <a:rPr lang="en-US" smtClean="0"/>
+              <a:t>4/3/2025</a:t>
             </a:fld>
             <a:endParaRPr lang="en-US" dirty="0"/>
           </a:p>
@@ -4271,9 +4613,9 @@
           <a:bodyPr/>
           <a:lstStyle/>
           <a:p>
-            <a:fld id="{42A54C80-263E-416B-A8E0-580EDEADCBDC}" type="datetimeFigureOut">
-              <a:rPr lang="en-US" dirty="0"/>
-              <a:t>4/1/2025</a:t>
+            <a:fld id="{7C045EC9-A980-4184-A543-9D019DCCC163}" type="datetime1">
+              <a:rPr lang="en-US" smtClean="0"/>
+              <a:t>4/3/2025</a:t>
             </a:fld>
             <a:endParaRPr lang="en-US" dirty="0"/>
           </a:p>
@@ -4529,10 +4871,9 @@
           <a:bodyPr/>
           <a:lstStyle/>
           <a:p>
-            <a:fld id="{B61BEF0D-F0BB-DE4B-95CE-6DB70DBA9567}" type="datetimeFigureOut">
-              <a:rPr lang="en-US" dirty="0"/>
-              <a:pPr/>
-              <a:t>4/1/2025</a:t>
+            <a:fld id="{901550FA-0534-4AA0-BC1C-F5B34A59CB62}" type="datetime1">
+              <a:rPr lang="en-US" smtClean="0"/>
+              <a:t>4/3/2025</a:t>
             </a:fld>
             <a:endParaRPr lang="en-US" dirty="0"/>
           </a:p>
@@ -5269,10 +5610,9 @@
             </a:lvl1pPr>
           </a:lstStyle>
           <a:p>
-            <a:fld id="{B61BEF0D-F0BB-DE4B-95CE-6DB70DBA9567}" type="datetimeFigureOut">
-              <a:rPr lang="en-US" dirty="0"/>
-              <a:pPr/>
-              <a:t>4/1/2025</a:t>
+            <a:fld id="{3034F704-DBC3-4027-A48D-1AF54B5EC8CB}" type="datetime1">
+              <a:rPr lang="en-US" smtClean="0"/>
+              <a:t>4/3/2025</a:t>
             </a:fld>
             <a:endParaRPr lang="en-US" dirty="0"/>
           </a:p>
@@ -5376,6 +5716,7 @@
     <p:sldLayoutId id="2147483667" r:id="rId15"/>
     <p:sldLayoutId id="2147483659" r:id="rId16"/>
   </p:sldLayoutIdLst>
+  <p:hf hdr="0" ftr="0" dt="0"/>
   <p:txStyles>
     <p:titleStyle>
       <a:lvl1pPr algn="l" defTabSz="457200" rtl="0" eaLnBrk="1" latinLnBrk="0" hangingPunct="1">
@@ -5850,6 +6191,36 @@
           </a:p>
         </p:txBody>
       </p:sp>
+      <p:sp>
+        <p:nvSpPr>
+          <p:cNvPr id="4" name="Slide Number Placeholder 3">
+            <a:extLst>
+              <a:ext uri="{FF2B5EF4-FFF2-40B4-BE49-F238E27FC236}">
+                <a16:creationId xmlns:a16="http://schemas.microsoft.com/office/drawing/2014/main" id="{5424A006-3C54-D088-0B29-55DA11CF879C}"/>
+              </a:ext>
+            </a:extLst>
+          </p:cNvPr>
+          <p:cNvSpPr>
+            <a:spLocks noGrp="1"/>
+          </p:cNvSpPr>
+          <p:nvPr>
+            <p:ph type="sldNum" sz="quarter" idx="12"/>
+          </p:nvPr>
+        </p:nvSpPr>
+        <p:spPr/>
+        <p:txBody>
+          <a:bodyPr/>
+          <a:lstStyle/>
+          <a:p>
+            <a:fld id="{D57F1E4F-1CFF-5643-939E-217C01CDF565}" type="slidenum">
+              <a:rPr lang="en-US" smtClean="0"/>
+              <a:pPr/>
+              <a:t>1</a:t>
+            </a:fld>
+            <a:endParaRPr lang="en-US" dirty="0"/>
+          </a:p>
+        </p:txBody>
+      </p:sp>
     </p:spTree>
     <p:extLst>
       <p:ext uri="{BB962C8B-B14F-4D97-AF65-F5344CB8AC3E}">
@@ -5868,7 +6239,13 @@
   <p:cSld>
     <p:spTree>
       <p:nvGrpSpPr>
-        <p:cNvPr id="1" name=""/>
+        <p:cNvPr id="1" name="">
+          <a:extLst>
+            <a:ext uri="{FF2B5EF4-FFF2-40B4-BE49-F238E27FC236}">
+              <a16:creationId xmlns:a16="http://schemas.microsoft.com/office/drawing/2014/main" id="{210B94F8-BF55-5CA6-32BE-94BD832DA418}"/>
+            </a:ext>
+          </a:extLst>
+        </p:cNvPr>
         <p:cNvGrpSpPr/>
         <p:nvPr/>
       </p:nvGrpSpPr>
@@ -5882,7 +6259,13 @@
       </p:grpSpPr>
       <p:sp>
         <p:nvSpPr>
-          <p:cNvPr id="2" name="Title 1"/>
+          <p:cNvPr id="2" name="Title 1">
+            <a:extLst>
+              <a:ext uri="{FF2B5EF4-FFF2-40B4-BE49-F238E27FC236}">
+                <a16:creationId xmlns:a16="http://schemas.microsoft.com/office/drawing/2014/main" id="{42672787-B530-95A5-FC5D-F557C0462F50}"/>
+              </a:ext>
+            </a:extLst>
+          </p:cNvPr>
           <p:cNvSpPr>
             <a:spLocks noGrp="1"/>
           </p:cNvSpPr>
@@ -5892,17 +6275,19 @@
         </p:nvSpPr>
         <p:spPr>
           <a:xfrm>
-            <a:off x="677334" y="383177"/>
-            <a:ext cx="8596668" cy="775063"/>
+            <a:off x="677334" y="609600"/>
+            <a:ext cx="8596668" cy="635726"/>
           </a:xfrm>
         </p:spPr>
         <p:txBody>
-          <a:bodyPr/>
-          <a:lstStyle/>
-          <a:p>
-            <a:r>
-              <a:rPr lang="en-US" dirty="0"/>
-              <a:t>Base Paper Dataset</a:t>
+          <a:bodyPr>
+            <a:noAutofit/>
+          </a:bodyPr>
+          <a:lstStyle/>
+          <a:p>
+            <a:r>
+              <a:rPr lang="en-US" dirty="0"/>
+              <a:t>Base Paper Description</a:t>
             </a:r>
             <a:endParaRPr lang="en-IN" dirty="0"/>
           </a:p>
@@ -5910,7 +6295,13 @@
       </p:sp>
       <p:sp>
         <p:nvSpPr>
-          <p:cNvPr id="3" name="Content Placeholder 2"/>
+          <p:cNvPr id="3" name="Content Placeholder 2">
+            <a:extLst>
+              <a:ext uri="{FF2B5EF4-FFF2-40B4-BE49-F238E27FC236}">
+                <a16:creationId xmlns:a16="http://schemas.microsoft.com/office/drawing/2014/main" id="{87BC5DBE-EB6D-8304-529B-38B03D5D8FBA}"/>
+              </a:ext>
+            </a:extLst>
+          </p:cNvPr>
           <p:cNvSpPr>
             <a:spLocks noGrp="1"/>
           </p:cNvSpPr>
@@ -5921,18 +6312,79 @@
         <p:spPr>
           <a:xfrm>
             <a:off x="677334" y="1384663"/>
-            <a:ext cx="8596668" cy="4656699"/>
+            <a:ext cx="9330266" cy="5005977"/>
           </a:xfrm>
         </p:spPr>
         <p:txBody>
           <a:bodyPr>
-            <a:normAutofit/>
+            <a:normAutofit fontScale="92500" lnSpcReduction="20000"/>
           </a:bodyPr>
           <a:lstStyle/>
           <a:p>
             <a:r>
-              <a:rPr lang="en-US" dirty="0"/>
-              <a:t>The ‘</a:t>
+              <a:rPr lang="en-US" b="1" dirty="0"/>
+              <a:t>Name - </a:t>
+            </a:r>
+            <a:r>
+              <a:rPr lang="en-US" dirty="0"/>
+              <a:t>Improving Code Smell Detection by Reducing Dimensionality Using Ensemble Feature Selection and Machine Learning</a:t>
+            </a:r>
+          </a:p>
+          <a:p>
+            <a:r>
+              <a:rPr lang="en-US" b="1" dirty="0"/>
+              <a:t>Link - </a:t>
+            </a:r>
+            <a:r>
+              <a:rPr lang="en-US" dirty="0">
+                <a:hlinkClick r:id="rId2"/>
+              </a:rPr>
+              <a:t>https://link.springer.com/article/10.1007/s42979-024-03013-x</a:t>
+            </a:r>
+            <a:endParaRPr lang="en-US" dirty="0"/>
+          </a:p>
+          <a:p>
+            <a:r>
+              <a:rPr lang="en-US" b="1" dirty="0"/>
+              <a:t>Journal</a:t>
+            </a:r>
+            <a:r>
+              <a:rPr lang="en-US" dirty="0"/>
+              <a:t> - SN Computer Science</a:t>
+            </a:r>
+          </a:p>
+          <a:p>
+            <a:r>
+              <a:rPr lang="en-US" b="1" dirty="0"/>
+              <a:t>Year</a:t>
+            </a:r>
+            <a:r>
+              <a:rPr lang="en-US" dirty="0"/>
+              <a:t> – 2024</a:t>
+            </a:r>
+          </a:p>
+          <a:p>
+            <a:r>
+              <a:rPr lang="en-US" b="1" dirty="0"/>
+              <a:t>Abstract -</a:t>
+            </a:r>
+            <a:r>
+              <a:rPr lang="en-US" dirty="0"/>
+              <a:t> It proposes a new </a:t>
+            </a:r>
+            <a:r>
+              <a:rPr lang="en-US" b="1" dirty="0"/>
+              <a:t>ensemble feature selection </a:t>
+            </a:r>
+            <a:r>
+              <a:rPr lang="en-US" dirty="0"/>
+              <a:t>technique that performs dimensionality reduction and selects optimal features for the machine learning classifiers. </a:t>
+            </a:r>
+          </a:p>
+          <a:p>
+            <a:r>
+              <a:rPr lang="en-US" dirty="0"/>
+              <a:t>Dataset - This paper dataset ‘</a:t>
             </a:r>
             <a:r>
               <a:rPr lang="en-US" dirty="0" err="1"/>
@@ -5940,45 +6392,80 @@
             </a:r>
             <a:r>
               <a:rPr lang="en-US" dirty="0"/>
-              <a:t> Corpus’ is just a collection of Java files.</a:t>
-            </a:r>
-          </a:p>
-          <a:p>
-            <a:r>
-              <a:rPr lang="en-US" dirty="0"/>
-              <a:t>This dataset consists of 112 Java systems with a total of 754 versions of these systems, 61 source code metrics that are calculated at the class level and 82 source code metrics that are calculated at the method level.</a:t>
-            </a:r>
-          </a:p>
-        </p:txBody>
-      </p:sp>
-      <p:pic>
-        <p:nvPicPr>
-          <p:cNvPr id="4" name="Content Placeholder 3"/>
-          <p:cNvPicPr>
-            <a:picLocks noChangeAspect="1"/>
-          </p:cNvPicPr>
-          <p:nvPr/>
-        </p:nvPicPr>
-        <p:blipFill>
-          <a:blip r:embed="rId2"/>
-          <a:stretch>
-            <a:fillRect/>
-          </a:stretch>
-        </p:blipFill>
-        <p:spPr>
-          <a:xfrm>
-            <a:off x="759142" y="2909357"/>
-            <a:ext cx="8984298" cy="2333204"/>
-          </a:xfrm>
-          <a:prstGeom prst="rect">
-            <a:avLst/>
-          </a:prstGeom>
-        </p:spPr>
-      </p:pic>
+              <a:t> Corpus’ (</a:t>
+            </a:r>
+            <a:r>
+              <a:rPr lang="en-US" dirty="0">
+                <a:hlinkClick r:id="rId3"/>
+              </a:rPr>
+              <a:t>http://qualitascorpus.com/download/</a:t>
+            </a:r>
+            <a:r>
+              <a:rPr lang="en-US" dirty="0"/>
+              <a:t>).</a:t>
+            </a:r>
+          </a:p>
+          <a:p>
+            <a:r>
+              <a:rPr lang="en-US" dirty="0"/>
+              <a:t>State-of-the-art Fisher’s Score and Sequential Forward feature selection techniques are sequentially ensemble in order to perform optimal dimensionality reduction. </a:t>
+            </a:r>
+          </a:p>
+          <a:p>
+            <a:r>
+              <a:rPr lang="en-US" dirty="0"/>
+              <a:t>Detect a total of six code smells from the dataset namely God Class (GC), Refused Bequest (RB), Shotgun Surgery (SS), Feature Envy (FE), Long Method (LM) and Long Parameter List (LPL). </a:t>
+            </a:r>
+          </a:p>
+          <a:p>
+            <a:r>
+              <a:rPr lang="en-US" dirty="0"/>
+              <a:t>The 6 considered ML classifiers are J48, Random forest, Naive Bayes, kNN, SVM, and Decision Tree. </a:t>
+            </a:r>
+          </a:p>
+          <a:p>
+            <a:r>
+              <a:rPr lang="en-US" dirty="0"/>
+              <a:t>The performance of various classifiers is evaluated using five performance measures namely Precision, Recall, F-Measure, Accuracy, and Area Under the ROC-AUC curve.</a:t>
+            </a:r>
+            <a:endParaRPr lang="en-IN" dirty="0"/>
+          </a:p>
+        </p:txBody>
+      </p:sp>
+      <p:sp>
+        <p:nvSpPr>
+          <p:cNvPr id="4" name="Slide Number Placeholder 3">
+            <a:extLst>
+              <a:ext uri="{FF2B5EF4-FFF2-40B4-BE49-F238E27FC236}">
+                <a16:creationId xmlns:a16="http://schemas.microsoft.com/office/drawing/2014/main" id="{0670B763-EEE6-C4E0-6235-EA8E51F679A6}"/>
+              </a:ext>
+            </a:extLst>
+          </p:cNvPr>
+          <p:cNvSpPr>
+            <a:spLocks noGrp="1"/>
+          </p:cNvSpPr>
+          <p:nvPr>
+            <p:ph type="sldNum" sz="quarter" idx="12"/>
+          </p:nvPr>
+        </p:nvSpPr>
+        <p:spPr/>
+        <p:txBody>
+          <a:bodyPr/>
+          <a:lstStyle/>
+          <a:p>
+            <a:fld id="{D57F1E4F-1CFF-5643-939E-217C01CDF565}" type="slidenum">
+              <a:rPr lang="en-US" smtClean="0"/>
+              <a:pPr/>
+              <a:t>10</a:t>
+            </a:fld>
+            <a:endParaRPr lang="en-US" dirty="0"/>
+          </a:p>
+        </p:txBody>
+      </p:sp>
     </p:spTree>
     <p:extLst>
       <p:ext uri="{BB962C8B-B14F-4D97-AF65-F5344CB8AC3E}">
-        <p14:creationId xmlns:p14="http://schemas.microsoft.com/office/powerpoint/2010/main" val="3756047915"/>
+        <p14:creationId xmlns:p14="http://schemas.microsoft.com/office/powerpoint/2010/main" val="2382418076"/>
       </p:ext>
     </p:extLst>
   </p:cSld>
@@ -6017,6 +6504,161 @@
         </p:nvSpPr>
         <p:spPr>
           <a:xfrm>
+            <a:off x="677334" y="383177"/>
+            <a:ext cx="8596668" cy="775063"/>
+          </a:xfrm>
+        </p:spPr>
+        <p:txBody>
+          <a:bodyPr/>
+          <a:lstStyle/>
+          <a:p>
+            <a:r>
+              <a:rPr lang="en-US" dirty="0"/>
+              <a:t>Base Paper Dataset</a:t>
+            </a:r>
+            <a:endParaRPr lang="en-IN" dirty="0"/>
+          </a:p>
+        </p:txBody>
+      </p:sp>
+      <p:sp>
+        <p:nvSpPr>
+          <p:cNvPr id="3" name="Content Placeholder 2"/>
+          <p:cNvSpPr>
+            <a:spLocks noGrp="1"/>
+          </p:cNvSpPr>
+          <p:nvPr>
+            <p:ph idx="1"/>
+          </p:nvPr>
+        </p:nvSpPr>
+        <p:spPr>
+          <a:xfrm>
+            <a:off x="677334" y="1384663"/>
+            <a:ext cx="8596668" cy="4656699"/>
+          </a:xfrm>
+        </p:spPr>
+        <p:txBody>
+          <a:bodyPr>
+            <a:normAutofit/>
+          </a:bodyPr>
+          <a:lstStyle/>
+          <a:p>
+            <a:r>
+              <a:rPr lang="en-US" dirty="0"/>
+              <a:t>The ‘</a:t>
+            </a:r>
+            <a:r>
+              <a:rPr lang="en-US" dirty="0" err="1"/>
+              <a:t>Qualitas</a:t>
+            </a:r>
+            <a:r>
+              <a:rPr lang="en-US" dirty="0"/>
+              <a:t> Corpus’ is just a collection of Java files.</a:t>
+            </a:r>
+          </a:p>
+          <a:p>
+            <a:r>
+              <a:rPr lang="en-US" dirty="0"/>
+              <a:t>This dataset consists of 112 Java systems with a total of 754 versions of these systems, 61 source code metrics that are calculated at the class level and 82 source code metrics that are calculated at the method level.</a:t>
+            </a:r>
+          </a:p>
+        </p:txBody>
+      </p:sp>
+      <p:pic>
+        <p:nvPicPr>
+          <p:cNvPr id="4" name="Content Placeholder 3"/>
+          <p:cNvPicPr>
+            <a:picLocks noChangeAspect="1"/>
+          </p:cNvPicPr>
+          <p:nvPr/>
+        </p:nvPicPr>
+        <p:blipFill>
+          <a:blip r:embed="rId2"/>
+          <a:stretch>
+            <a:fillRect/>
+          </a:stretch>
+        </p:blipFill>
+        <p:spPr>
+          <a:xfrm>
+            <a:off x="759142" y="2909357"/>
+            <a:ext cx="8984298" cy="2333204"/>
+          </a:xfrm>
+          <a:prstGeom prst="rect">
+            <a:avLst/>
+          </a:prstGeom>
+        </p:spPr>
+      </p:pic>
+      <p:sp>
+        <p:nvSpPr>
+          <p:cNvPr id="5" name="Slide Number Placeholder 4">
+            <a:extLst>
+              <a:ext uri="{FF2B5EF4-FFF2-40B4-BE49-F238E27FC236}">
+                <a16:creationId xmlns:a16="http://schemas.microsoft.com/office/drawing/2014/main" id="{86DF5BAE-D583-8BBF-24CE-B4EFFF43AC8E}"/>
+              </a:ext>
+            </a:extLst>
+          </p:cNvPr>
+          <p:cNvSpPr>
+            <a:spLocks noGrp="1"/>
+          </p:cNvSpPr>
+          <p:nvPr>
+            <p:ph type="sldNum" sz="quarter" idx="12"/>
+          </p:nvPr>
+        </p:nvSpPr>
+        <p:spPr/>
+        <p:txBody>
+          <a:bodyPr/>
+          <a:lstStyle/>
+          <a:p>
+            <a:fld id="{D57F1E4F-1CFF-5643-939E-217C01CDF565}" type="slidenum">
+              <a:rPr lang="en-US" smtClean="0"/>
+              <a:pPr/>
+              <a:t>11</a:t>
+            </a:fld>
+            <a:endParaRPr lang="en-US" dirty="0"/>
+          </a:p>
+        </p:txBody>
+      </p:sp>
+    </p:spTree>
+    <p:extLst>
+      <p:ext uri="{BB962C8B-B14F-4D97-AF65-F5344CB8AC3E}">
+        <p14:creationId xmlns:p14="http://schemas.microsoft.com/office/powerpoint/2010/main" val="3756047915"/>
+      </p:ext>
+    </p:extLst>
+  </p:cSld>
+  <p:clrMapOvr>
+    <a:masterClrMapping/>
+  </p:clrMapOvr>
+</p:sld>
+</file>
+
+<file path=ppt/slides/slide12.xml><?xml version="1.0" encoding="utf-8"?>
+<p:sld xmlns:a="http://schemas.openxmlformats.org/drawingml/2006/main" xmlns:r="http://schemas.openxmlformats.org/officeDocument/2006/relationships" xmlns:p="http://schemas.openxmlformats.org/presentationml/2006/main">
+  <p:cSld>
+    <p:spTree>
+      <p:nvGrpSpPr>
+        <p:cNvPr id="1" name=""/>
+        <p:cNvGrpSpPr/>
+        <p:nvPr/>
+      </p:nvGrpSpPr>
+      <p:grpSpPr>
+        <a:xfrm>
+          <a:off x="0" y="0"/>
+          <a:ext cx="0" cy="0"/>
+          <a:chOff x="0" y="0"/>
+          <a:chExt cx="0" cy="0"/>
+        </a:xfrm>
+      </p:grpSpPr>
+      <p:sp>
+        <p:nvSpPr>
+          <p:cNvPr id="2" name="Title 1"/>
+          <p:cNvSpPr>
+            <a:spLocks noGrp="1"/>
+          </p:cNvSpPr>
+          <p:nvPr>
+            <p:ph type="title"/>
+          </p:nvPr>
+        </p:nvSpPr>
+        <p:spPr>
+          <a:xfrm>
             <a:off x="677334" y="487679"/>
             <a:ext cx="8596668" cy="687977"/>
           </a:xfrm>
@@ -6087,6 +6729,36 @@
               <a:rPr lang="en-US" dirty="0"/>
             </a:br>
             <a:endParaRPr lang="en-IN" b="1" dirty="0"/>
+          </a:p>
+        </p:txBody>
+      </p:sp>
+      <p:sp>
+        <p:nvSpPr>
+          <p:cNvPr id="4" name="Slide Number Placeholder 3">
+            <a:extLst>
+              <a:ext uri="{FF2B5EF4-FFF2-40B4-BE49-F238E27FC236}">
+                <a16:creationId xmlns:a16="http://schemas.microsoft.com/office/drawing/2014/main" id="{F2EA3AF7-FE6D-3982-9846-DC957C8B1D7F}"/>
+              </a:ext>
+            </a:extLst>
+          </p:cNvPr>
+          <p:cNvSpPr>
+            <a:spLocks noGrp="1"/>
+          </p:cNvSpPr>
+          <p:nvPr>
+            <p:ph type="sldNum" sz="quarter" idx="12"/>
+          </p:nvPr>
+        </p:nvSpPr>
+        <p:spPr/>
+        <p:txBody>
+          <a:bodyPr/>
+          <a:lstStyle/>
+          <a:p>
+            <a:fld id="{D57F1E4F-1CFF-5643-939E-217C01CDF565}" type="slidenum">
+              <a:rPr lang="en-US" smtClean="0"/>
+              <a:pPr/>
+              <a:t>12</a:t>
+            </a:fld>
+            <a:endParaRPr lang="en-US" dirty="0"/>
           </a:p>
         </p:txBody>
       </p:sp>
@@ -6103,7 +6775,7 @@
 </p:sld>
 </file>
 
-<file path=ppt/slides/slide12.xml><?xml version="1.0" encoding="utf-8"?>
+<file path=ppt/slides/slide13.xml><?xml version="1.0" encoding="utf-8"?>
 <p:sld xmlns:a="http://schemas.openxmlformats.org/drawingml/2006/main" xmlns:r="http://schemas.openxmlformats.org/officeDocument/2006/relationships" xmlns:p="http://schemas.openxmlformats.org/presentationml/2006/main">
   <p:cSld>
     <p:spTree>
@@ -6324,6 +6996,36 @@
           </a:prstGeom>
         </p:spPr>
       </p:pic>
+      <p:sp>
+        <p:nvSpPr>
+          <p:cNvPr id="5" name="Slide Number Placeholder 4">
+            <a:extLst>
+              <a:ext uri="{FF2B5EF4-FFF2-40B4-BE49-F238E27FC236}">
+                <a16:creationId xmlns:a16="http://schemas.microsoft.com/office/drawing/2014/main" id="{5E380720-D079-A5A7-E807-8B0CD168767D}"/>
+              </a:ext>
+            </a:extLst>
+          </p:cNvPr>
+          <p:cNvSpPr>
+            <a:spLocks noGrp="1"/>
+          </p:cNvSpPr>
+          <p:nvPr>
+            <p:ph type="sldNum" sz="quarter" idx="12"/>
+          </p:nvPr>
+        </p:nvSpPr>
+        <p:spPr/>
+        <p:txBody>
+          <a:bodyPr/>
+          <a:lstStyle/>
+          <a:p>
+            <a:fld id="{D57F1E4F-1CFF-5643-939E-217C01CDF565}" type="slidenum">
+              <a:rPr lang="en-US" smtClean="0"/>
+              <a:pPr/>
+              <a:t>13</a:t>
+            </a:fld>
+            <a:endParaRPr lang="en-US" dirty="0"/>
+          </a:p>
+        </p:txBody>
+      </p:sp>
     </p:spTree>
     <p:extLst>
       <p:ext uri="{BB962C8B-B14F-4D97-AF65-F5344CB8AC3E}">
@@ -6337,7 +7039,7 @@
 </p:sld>
 </file>
 
-<file path=ppt/slides/slide13.xml><?xml version="1.0" encoding="utf-8"?>
+<file path=ppt/slides/slide14.xml><?xml version="1.0" encoding="utf-8"?>
 <p:sld xmlns:a="http://schemas.openxmlformats.org/drawingml/2006/main" xmlns:r="http://schemas.openxmlformats.org/officeDocument/2006/relationships" xmlns:p="http://schemas.openxmlformats.org/presentationml/2006/main">
   <p:cSld>
     <p:spTree>
@@ -6451,6 +7153,36 @@
           </a:prstGeom>
         </p:spPr>
       </p:pic>
+      <p:sp>
+        <p:nvSpPr>
+          <p:cNvPr id="5" name="Slide Number Placeholder 4">
+            <a:extLst>
+              <a:ext uri="{FF2B5EF4-FFF2-40B4-BE49-F238E27FC236}">
+                <a16:creationId xmlns:a16="http://schemas.microsoft.com/office/drawing/2014/main" id="{4BFC5433-67A0-1097-FA71-445237C24331}"/>
+              </a:ext>
+            </a:extLst>
+          </p:cNvPr>
+          <p:cNvSpPr>
+            <a:spLocks noGrp="1"/>
+          </p:cNvSpPr>
+          <p:nvPr>
+            <p:ph type="sldNum" sz="quarter" idx="12"/>
+          </p:nvPr>
+        </p:nvSpPr>
+        <p:spPr/>
+        <p:txBody>
+          <a:bodyPr/>
+          <a:lstStyle/>
+          <a:p>
+            <a:fld id="{D57F1E4F-1CFF-5643-939E-217C01CDF565}" type="slidenum">
+              <a:rPr lang="en-US" smtClean="0"/>
+              <a:pPr/>
+              <a:t>14</a:t>
+            </a:fld>
+            <a:endParaRPr lang="en-US" dirty="0"/>
+          </a:p>
+        </p:txBody>
+      </p:sp>
     </p:spTree>
     <p:extLst>
       <p:ext uri="{BB962C8B-B14F-4D97-AF65-F5344CB8AC3E}">
@@ -6464,7 +7196,7 @@
 </p:sld>
 </file>
 
-<file path=ppt/slides/slide14.xml><?xml version="1.0" encoding="utf-8"?>
+<file path=ppt/slides/slide15.xml><?xml version="1.0" encoding="utf-8"?>
 <p:sld xmlns:a="http://schemas.openxmlformats.org/drawingml/2006/main" xmlns:r="http://schemas.openxmlformats.org/officeDocument/2006/relationships" xmlns:p="http://schemas.openxmlformats.org/presentationml/2006/main">
   <p:cSld>
     <p:spTree>
@@ -6600,203 +7332,40 @@
           </a:p>
         </p:txBody>
       </p:sp>
+      <p:sp>
+        <p:nvSpPr>
+          <p:cNvPr id="4" name="Slide Number Placeholder 3">
+            <a:extLst>
+              <a:ext uri="{FF2B5EF4-FFF2-40B4-BE49-F238E27FC236}">
+                <a16:creationId xmlns:a16="http://schemas.microsoft.com/office/drawing/2014/main" id="{64C9A553-CA73-E8D8-C2F2-898507189E32}"/>
+              </a:ext>
+            </a:extLst>
+          </p:cNvPr>
+          <p:cNvSpPr>
+            <a:spLocks noGrp="1"/>
+          </p:cNvSpPr>
+          <p:nvPr>
+            <p:ph type="sldNum" sz="quarter" idx="12"/>
+          </p:nvPr>
+        </p:nvSpPr>
+        <p:spPr/>
+        <p:txBody>
+          <a:bodyPr/>
+          <a:lstStyle/>
+          <a:p>
+            <a:fld id="{D57F1E4F-1CFF-5643-939E-217C01CDF565}" type="slidenum">
+              <a:rPr lang="en-US" smtClean="0"/>
+              <a:pPr/>
+              <a:t>15</a:t>
+            </a:fld>
+            <a:endParaRPr lang="en-US" dirty="0"/>
+          </a:p>
+        </p:txBody>
+      </p:sp>
     </p:spTree>
     <p:extLst>
       <p:ext uri="{BB962C8B-B14F-4D97-AF65-F5344CB8AC3E}">
         <p14:creationId xmlns:p14="http://schemas.microsoft.com/office/powerpoint/2010/main" val="1959993630"/>
-      </p:ext>
-    </p:extLst>
-  </p:cSld>
-  <p:clrMapOvr>
-    <a:masterClrMapping/>
-  </p:clrMapOvr>
-</p:sld>
-</file>
-
-<file path=ppt/slides/slide15.xml><?xml version="1.0" encoding="utf-8"?>
-<p:sld xmlns:a="http://schemas.openxmlformats.org/drawingml/2006/main" xmlns:r="http://schemas.openxmlformats.org/officeDocument/2006/relationships" xmlns:p="http://schemas.openxmlformats.org/presentationml/2006/main">
-  <p:cSld>
-    <p:spTree>
-      <p:nvGrpSpPr>
-        <p:cNvPr id="1" name=""/>
-        <p:cNvGrpSpPr/>
-        <p:nvPr/>
-      </p:nvGrpSpPr>
-      <p:grpSpPr>
-        <a:xfrm>
-          <a:off x="0" y="0"/>
-          <a:ext cx="0" cy="0"/>
-          <a:chOff x="0" y="0"/>
-          <a:chExt cx="0" cy="0"/>
-        </a:xfrm>
-      </p:grpSpPr>
-      <p:sp>
-        <p:nvSpPr>
-          <p:cNvPr id="2" name="Title 1"/>
-          <p:cNvSpPr>
-            <a:spLocks noGrp="1"/>
-          </p:cNvSpPr>
-          <p:nvPr>
-            <p:ph type="title"/>
-          </p:nvPr>
-        </p:nvSpPr>
-        <p:spPr>
-          <a:xfrm>
-            <a:off x="677334" y="609600"/>
-            <a:ext cx="8596668" cy="748937"/>
-          </a:xfrm>
-        </p:spPr>
-        <p:txBody>
-          <a:bodyPr/>
-          <a:lstStyle/>
-          <a:p>
-            <a:r>
-              <a:rPr lang="en-US" dirty="0"/>
-              <a:t>Our Work (as of now)</a:t>
-            </a:r>
-            <a:endParaRPr lang="en-IN" dirty="0"/>
-          </a:p>
-        </p:txBody>
-      </p:sp>
-      <p:sp>
-        <p:nvSpPr>
-          <p:cNvPr id="3" name="Content Placeholder 2"/>
-          <p:cNvSpPr>
-            <a:spLocks noGrp="1"/>
-          </p:cNvSpPr>
-          <p:nvPr>
-            <p:ph idx="1"/>
-          </p:nvPr>
-        </p:nvSpPr>
-        <p:spPr>
-          <a:xfrm>
-            <a:off x="677334" y="1358537"/>
-            <a:ext cx="8596668" cy="5225143"/>
-          </a:xfrm>
-        </p:spPr>
-        <p:txBody>
-          <a:bodyPr>
-            <a:normAutofit lnSpcReduction="10000"/>
-          </a:bodyPr>
-          <a:lstStyle/>
-          <a:p>
-            <a:r>
-              <a:rPr lang="en-US" dirty="0"/>
-              <a:t>As we have seen ‘</a:t>
-            </a:r>
-            <a:r>
-              <a:rPr lang="en-US" dirty="0" err="1"/>
-              <a:t>Qualitas</a:t>
-            </a:r>
-            <a:r>
-              <a:rPr lang="en-US" dirty="0"/>
-              <a:t> Corpus’ is not available to us, we had to use another dataset. We initially tried with MLCQ Dataset (around 2000 samples) for Data Class (</a:t>
-            </a:r>
-            <a:r>
-              <a:rPr lang="en-US" dirty="0">
-                <a:hlinkClick r:id="rId2"/>
-              </a:rPr>
-              <a:t>https://github.com/milica-skipina/ML-code-smell-detection</a:t>
-            </a:r>
-            <a:r>
-              <a:rPr lang="en-US" dirty="0"/>
-              <a:t>) which contains pre labelled data.</a:t>
-            </a:r>
-          </a:p>
-          <a:p>
-            <a:r>
-              <a:rPr lang="en-US" dirty="0"/>
-              <a:t>However, as this MLCQ   is unbalanced (only 200 True) we were getting bad results on training and testing it on unseen data. This is because the SMOTE/ROS (any variant) generated large amount of synthetic data which did not match with real world code metrics.</a:t>
-            </a:r>
-          </a:p>
-          <a:p>
-            <a:r>
-              <a:rPr lang="en-US" dirty="0"/>
-              <a:t>We proceeded to </a:t>
-            </a:r>
-            <a:r>
-              <a:rPr lang="en-US" b="1" dirty="0"/>
-              <a:t>generate our own data </a:t>
-            </a:r>
-            <a:r>
-              <a:rPr lang="en-US" dirty="0"/>
-              <a:t>set by scraping Java codes (with more than 100 stars from GitHub) and manually labelling them. This results in about 500 True out of 1200. (which is balanced)</a:t>
-            </a:r>
-          </a:p>
-          <a:p>
-            <a:r>
-              <a:rPr lang="en-US" dirty="0"/>
-              <a:t>We used </a:t>
-            </a:r>
-            <a:r>
-              <a:rPr lang="en-US" b="1" dirty="0"/>
-              <a:t>Median imputation </a:t>
-            </a:r>
-            <a:r>
-              <a:rPr lang="en-US" dirty="0"/>
-              <a:t>instead of Mean as it is less sensitive to extreme values(outliers) when compared to Mean.</a:t>
-            </a:r>
-          </a:p>
-          <a:p>
-            <a:r>
-              <a:rPr lang="en-US" dirty="0"/>
-              <a:t>We also used </a:t>
-            </a:r>
-            <a:r>
-              <a:rPr lang="en-US" b="1" dirty="0"/>
-              <a:t>Robust Scaler </a:t>
-            </a:r>
-            <a:r>
-              <a:rPr lang="en-US" dirty="0"/>
-              <a:t>as it is </a:t>
-            </a:r>
-            <a:r>
-              <a:rPr lang="en-US" b="0" i="0" dirty="0">
-                <a:solidFill>
-                  <a:srgbClr val="001D35"/>
-                </a:solidFill>
-                <a:effectLst/>
-                <a:latin typeface="Google Sans"/>
-              </a:rPr>
-              <a:t>better than Min Max Scaler. The formula is:</a:t>
-            </a:r>
-            <a:r>
-              <a:rPr lang="en-IN" dirty="0">
-                <a:solidFill>
-                  <a:srgbClr val="001D35"/>
-                </a:solidFill>
-                <a:latin typeface="Google Sans"/>
-              </a:rPr>
-              <a:t> </a:t>
-            </a:r>
-            <a:r>
-              <a:rPr lang="en-US" dirty="0"/>
-              <a:t>x′=(x−median(x))/IQR(x)</a:t>
-            </a:r>
-          </a:p>
-          <a:p>
-            <a:r>
-              <a:rPr lang="en-US" dirty="0"/>
-              <a:t>As our Dataset is sufficiently balanced, we </a:t>
-            </a:r>
-            <a:r>
-              <a:rPr lang="en-US" b="1" dirty="0"/>
-              <a:t>removed SMOTE/ROSE </a:t>
-            </a:r>
-            <a:r>
-              <a:rPr lang="en-US" dirty="0"/>
-              <a:t>oversampling technique as it would only lead to useless synthetic data and overfitting.</a:t>
-            </a:r>
-          </a:p>
-          <a:p>
-            <a:endParaRPr lang="en-US" dirty="0"/>
-          </a:p>
-        </p:txBody>
-      </p:sp>
-    </p:spTree>
-    <p:extLst>
-      <p:ext uri="{BB962C8B-B14F-4D97-AF65-F5344CB8AC3E}">
-        <p14:creationId xmlns:p14="http://schemas.microsoft.com/office/powerpoint/2010/main" val="1604643517"/>
       </p:ext>
     </p:extLst>
   </p:cSld>
@@ -7000,6 +7569,36 @@
             </a:r>
           </a:p>
           <a:p>
+            <a:endParaRPr lang="en-US" dirty="0"/>
+          </a:p>
+        </p:txBody>
+      </p:sp>
+      <p:sp>
+        <p:nvSpPr>
+          <p:cNvPr id="4" name="Slide Number Placeholder 3">
+            <a:extLst>
+              <a:ext uri="{FF2B5EF4-FFF2-40B4-BE49-F238E27FC236}">
+                <a16:creationId xmlns:a16="http://schemas.microsoft.com/office/drawing/2014/main" id="{D6ACF151-BBCB-61AD-9C30-3CC5397150D7}"/>
+              </a:ext>
+            </a:extLst>
+          </p:cNvPr>
+          <p:cNvSpPr>
+            <a:spLocks noGrp="1"/>
+          </p:cNvSpPr>
+          <p:nvPr>
+            <p:ph type="sldNum" sz="quarter" idx="12"/>
+          </p:nvPr>
+        </p:nvSpPr>
+        <p:spPr/>
+        <p:txBody>
+          <a:bodyPr/>
+          <a:lstStyle/>
+          <a:p>
+            <a:fld id="{D57F1E4F-1CFF-5643-939E-217C01CDF565}" type="slidenum">
+              <a:rPr lang="en-US" smtClean="0"/>
+              <a:pPr/>
+              <a:t>16</a:t>
+            </a:fld>
             <a:endParaRPr lang="en-US" dirty="0"/>
           </a:p>
         </p:txBody>
@@ -7426,7 +8025,7 @@
           <a:p>
             <a:r>
               <a:rPr lang="en-US" dirty="0"/>
-              <a:t>We are getting metrics the metrics from </a:t>
+              <a:t>We are getting the metrics from </a:t>
             </a:r>
             <a:r>
               <a:rPr lang="en-US" b="1" dirty="0"/>
@@ -7478,15 +8077,7 @@
           <a:p>
             <a:r>
               <a:rPr lang="en-US" dirty="0"/>
-              <a:t>As the base paper does not use Data Class Code Smell, direct </a:t>
-            </a:r>
-            <a:r>
-              <a:rPr lang="en-US" dirty="0" err="1"/>
-              <a:t>comparision</a:t>
-            </a:r>
-            <a:r>
-              <a:rPr lang="en-US" dirty="0"/>
-              <a:t> may not be very useful, but still, we are getting similar results for a new type of Code Smell</a:t>
+              <a:t>As the base paper does not use Data Class Code Smell, direct comparison may not be very useful, but still, we are getting similar results for a new type of Code Smell</a:t>
             </a:r>
           </a:p>
           <a:p>
@@ -7538,6 +8129,36 @@
               <a:rPr lang="en-US" dirty="0"/>
               <a:t>: 0.9471</a:t>
             </a:r>
+          </a:p>
+        </p:txBody>
+      </p:sp>
+      <p:sp>
+        <p:nvSpPr>
+          <p:cNvPr id="4" name="Slide Number Placeholder 3">
+            <a:extLst>
+              <a:ext uri="{FF2B5EF4-FFF2-40B4-BE49-F238E27FC236}">
+                <a16:creationId xmlns:a16="http://schemas.microsoft.com/office/drawing/2014/main" id="{8498B10D-6952-B8D5-F929-B5555ED66D78}"/>
+              </a:ext>
+            </a:extLst>
+          </p:cNvPr>
+          <p:cNvSpPr>
+            <a:spLocks noGrp="1"/>
+          </p:cNvSpPr>
+          <p:nvPr>
+            <p:ph type="sldNum" sz="quarter" idx="12"/>
+          </p:nvPr>
+        </p:nvSpPr>
+        <p:spPr/>
+        <p:txBody>
+          <a:bodyPr/>
+          <a:lstStyle/>
+          <a:p>
+            <a:fld id="{D57F1E4F-1CFF-5643-939E-217C01CDF565}" type="slidenum">
+              <a:rPr lang="en-US" smtClean="0"/>
+              <a:pPr/>
+              <a:t>17</a:t>
+            </a:fld>
+            <a:endParaRPr lang="en-US" dirty="0"/>
           </a:p>
         </p:txBody>
       </p:sp>
@@ -7811,6 +8432,36 @@
           </a:prstGeom>
         </p:spPr>
       </p:pic>
+      <p:sp>
+        <p:nvSpPr>
+          <p:cNvPr id="4" name="Slide Number Placeholder 3">
+            <a:extLst>
+              <a:ext uri="{FF2B5EF4-FFF2-40B4-BE49-F238E27FC236}">
+                <a16:creationId xmlns:a16="http://schemas.microsoft.com/office/drawing/2014/main" id="{DF993C56-535A-6064-D59C-A232DB281587}"/>
+              </a:ext>
+            </a:extLst>
+          </p:cNvPr>
+          <p:cNvSpPr>
+            <a:spLocks noGrp="1"/>
+          </p:cNvSpPr>
+          <p:nvPr>
+            <p:ph type="sldNum" sz="quarter" idx="12"/>
+          </p:nvPr>
+        </p:nvSpPr>
+        <p:spPr/>
+        <p:txBody>
+          <a:bodyPr/>
+          <a:lstStyle/>
+          <a:p>
+            <a:fld id="{D57F1E4F-1CFF-5643-939E-217C01CDF565}" type="slidenum">
+              <a:rPr lang="en-US" smtClean="0"/>
+              <a:pPr/>
+              <a:t>18</a:t>
+            </a:fld>
+            <a:endParaRPr lang="en-US" dirty="0"/>
+          </a:p>
+        </p:txBody>
+      </p:sp>
     </p:spTree>
     <p:extLst>
       <p:ext uri="{BB962C8B-B14F-4D97-AF65-F5344CB8AC3E}">
@@ -7926,15 +8577,7 @@
             </a:r>
             <a:r>
               <a:rPr lang="en-US" dirty="0"/>
-              <a:t> of the class, in the file. (</a:t>
-            </a:r>
-            <a:r>
-              <a:rPr lang="en-US" dirty="0" err="1"/>
-              <a:t>localisation</a:t>
-            </a:r>
-            <a:r>
-              <a:rPr lang="en-US" dirty="0"/>
-              <a:t>)</a:t>
+              <a:t> of the class, in the file. (localization)</a:t>
             </a:r>
           </a:p>
           <a:p>
@@ -7992,6 +8635,36 @@
           </a:prstGeom>
         </p:spPr>
       </p:pic>
+      <p:sp>
+        <p:nvSpPr>
+          <p:cNvPr id="4" name="Slide Number Placeholder 3">
+            <a:extLst>
+              <a:ext uri="{FF2B5EF4-FFF2-40B4-BE49-F238E27FC236}">
+                <a16:creationId xmlns:a16="http://schemas.microsoft.com/office/drawing/2014/main" id="{95413048-0C58-5CB3-197D-C5BAD7300087}"/>
+              </a:ext>
+            </a:extLst>
+          </p:cNvPr>
+          <p:cNvSpPr>
+            <a:spLocks noGrp="1"/>
+          </p:cNvSpPr>
+          <p:nvPr>
+            <p:ph type="sldNum" sz="quarter" idx="12"/>
+          </p:nvPr>
+        </p:nvSpPr>
+        <p:spPr/>
+        <p:txBody>
+          <a:bodyPr/>
+          <a:lstStyle/>
+          <a:p>
+            <a:fld id="{D57F1E4F-1CFF-5643-939E-217C01CDF565}" type="slidenum">
+              <a:rPr lang="en-US" smtClean="0"/>
+              <a:pPr/>
+              <a:t>19</a:t>
+            </a:fld>
+            <a:endParaRPr lang="en-US" dirty="0"/>
+          </a:p>
+        </p:txBody>
+      </p:sp>
     </p:spTree>
     <p:extLst>
       <p:ext uri="{BB962C8B-B14F-4D97-AF65-F5344CB8AC3E}">
@@ -8010,7 +8683,13 @@
   <p:cSld>
     <p:spTree>
       <p:nvGrpSpPr>
-        <p:cNvPr id="1" name=""/>
+        <p:cNvPr id="1" name="">
+          <a:extLst>
+            <a:ext uri="{FF2B5EF4-FFF2-40B4-BE49-F238E27FC236}">
+              <a16:creationId xmlns:a16="http://schemas.microsoft.com/office/drawing/2014/main" id="{0B7D26F7-9470-21EE-B505-AC83688B6FDB}"/>
+            </a:ext>
+          </a:extLst>
+        </p:cNvPr>
         <p:cNvGrpSpPr/>
         <p:nvPr/>
       </p:nvGrpSpPr>
@@ -8024,7 +8703,13 @@
       </p:grpSpPr>
       <p:sp>
         <p:nvSpPr>
-          <p:cNvPr id="2" name="Title 1"/>
+          <p:cNvPr id="2" name="Title 1">
+            <a:extLst>
+              <a:ext uri="{FF2B5EF4-FFF2-40B4-BE49-F238E27FC236}">
+                <a16:creationId xmlns:a16="http://schemas.microsoft.com/office/drawing/2014/main" id="{80C8C6DA-8BCA-99C9-268E-4BC6089CF838}"/>
+              </a:ext>
+            </a:extLst>
+          </p:cNvPr>
           <p:cNvSpPr>
             <a:spLocks noGrp="1"/>
           </p:cNvSpPr>
@@ -8046,128 +8731,757 @@
           <a:p>
             <a:r>
               <a:rPr lang="en-US" dirty="0"/>
-              <a:t>Overview</a:t>
+              <a:t>Index</a:t>
             </a:r>
             <a:endParaRPr lang="en-IN" dirty="0"/>
           </a:p>
         </p:txBody>
       </p:sp>
-      <p:sp>
-        <p:nvSpPr>
-          <p:cNvPr id="3" name="Content Placeholder 2"/>
-          <p:cNvSpPr>
-            <a:spLocks noGrp="1"/>
-          </p:cNvSpPr>
-          <p:nvPr>
-            <p:ph idx="1"/>
-          </p:nvPr>
-        </p:nvSpPr>
-        <p:spPr>
-          <a:xfrm>
-            <a:off x="677334" y="1470764"/>
-            <a:ext cx="8596668" cy="3916471"/>
-          </a:xfrm>
-        </p:spPr>
+      <p:graphicFrame>
+        <p:nvGraphicFramePr>
+          <p:cNvPr id="8" name="Table 7">
+            <a:extLst>
+              <a:ext uri="{FF2B5EF4-FFF2-40B4-BE49-F238E27FC236}">
+                <a16:creationId xmlns:a16="http://schemas.microsoft.com/office/drawing/2014/main" id="{37414ACF-234C-4687-846C-26A5321214AE}"/>
+              </a:ext>
+            </a:extLst>
+          </p:cNvPr>
+          <p:cNvGraphicFramePr>
+            <a:graphicFrameLocks noGrp="1"/>
+          </p:cNvGraphicFramePr>
+          <p:nvPr>
+            <p:extLst>
+              <p:ext uri="{D42A27DB-BD31-4B8C-83A1-F6EECF244321}">
+                <p14:modId xmlns:p14="http://schemas.microsoft.com/office/powerpoint/2010/main" val="4028718500"/>
+              </p:ext>
+            </p:extLst>
+          </p:nvPr>
+        </p:nvGraphicFramePr>
+        <p:xfrm>
+          <a:off x="677334" y="1236617"/>
+          <a:ext cx="7727364" cy="5191760"/>
+        </p:xfrm>
+        <a:graphic>
+          <a:graphicData uri="http://schemas.openxmlformats.org/drawingml/2006/table">
+            <a:tbl>
+              <a:tblPr firstRow="1" bandRow="1">
+                <a:tableStyleId>{5C22544A-7EE6-4342-B048-85BDC9FD1C3A}</a:tableStyleId>
+              </a:tblPr>
+              <a:tblGrid>
+                <a:gridCol w="1414113">
+                  <a:extLst>
+                    <a:ext uri="{9D8B030D-6E8A-4147-A177-3AD203B41FA5}">
+                      <a16:colId xmlns:a16="http://schemas.microsoft.com/office/drawing/2014/main" val="2824826579"/>
+                    </a:ext>
+                  </a:extLst>
+                </a:gridCol>
+                <a:gridCol w="4343604">
+                  <a:extLst>
+                    <a:ext uri="{9D8B030D-6E8A-4147-A177-3AD203B41FA5}">
+                      <a16:colId xmlns:a16="http://schemas.microsoft.com/office/drawing/2014/main" val="520572402"/>
+                    </a:ext>
+                  </a:extLst>
+                </a:gridCol>
+                <a:gridCol w="1969647">
+                  <a:extLst>
+                    <a:ext uri="{9D8B030D-6E8A-4147-A177-3AD203B41FA5}">
+                      <a16:colId xmlns:a16="http://schemas.microsoft.com/office/drawing/2014/main" val="1387385755"/>
+                    </a:ext>
+                  </a:extLst>
+                </a:gridCol>
+              </a:tblGrid>
+              <a:tr h="370840">
+                <a:tc>
+                  <a:txBody>
+                    <a:bodyPr/>
+                    <a:lstStyle/>
+                    <a:p>
+                      <a:r>
+                        <a:rPr lang="en-IN" dirty="0"/>
+                        <a:t>Serial No.</a:t>
+                      </a:r>
+                    </a:p>
+                  </a:txBody>
+                  <a:tcPr/>
+                </a:tc>
+                <a:tc>
+                  <a:txBody>
+                    <a:bodyPr/>
+                    <a:lstStyle/>
+                    <a:p>
+                      <a:r>
+                        <a:rPr lang="en-IN" dirty="0"/>
+                        <a:t>Topic</a:t>
+                      </a:r>
+                    </a:p>
+                  </a:txBody>
+                  <a:tcPr/>
+                </a:tc>
+                <a:tc>
+                  <a:txBody>
+                    <a:bodyPr/>
+                    <a:lstStyle/>
+                    <a:p>
+                      <a:r>
+                        <a:rPr lang="en-IN" dirty="0"/>
+                        <a:t>Page No.</a:t>
+                      </a:r>
+                    </a:p>
+                  </a:txBody>
+                  <a:tcPr/>
+                </a:tc>
+                <a:extLst>
+                  <a:ext uri="{0D108BD9-81ED-4DB2-BD59-A6C34878D82A}">
+                    <a16:rowId xmlns:a16="http://schemas.microsoft.com/office/drawing/2014/main" val="476490804"/>
+                  </a:ext>
+                </a:extLst>
+              </a:tr>
+              <a:tr h="370840">
+                <a:tc>
+                  <a:txBody>
+                    <a:bodyPr/>
+                    <a:lstStyle/>
+                    <a:p>
+                      <a:r>
+                        <a:rPr lang="en-US" sz="1400" b="0" i="0" kern="1200" dirty="0">
+                          <a:solidFill>
+                            <a:schemeClr val="dk1"/>
+                          </a:solidFill>
+                          <a:effectLst/>
+                          <a:latin typeface="+mn-lt"/>
+                          <a:ea typeface="+mn-ea"/>
+                          <a:cs typeface="+mn-cs"/>
+                        </a:rPr>
+                        <a:t>1.</a:t>
+                      </a:r>
+                      <a:endParaRPr lang="en-IN" sz="1400" b="0" dirty="0"/>
+                    </a:p>
+                  </a:txBody>
+                  <a:tcPr/>
+                </a:tc>
+                <a:tc>
+                  <a:txBody>
+                    <a:bodyPr/>
+                    <a:lstStyle/>
+                    <a:p>
+                      <a:r>
+                        <a:rPr lang="en-IN" sz="1400" b="0" dirty="0"/>
+                        <a:t>Overview</a:t>
+                      </a:r>
+                    </a:p>
+                  </a:txBody>
+                  <a:tcPr/>
+                </a:tc>
+                <a:tc>
+                  <a:txBody>
+                    <a:bodyPr/>
+                    <a:lstStyle/>
+                    <a:p>
+                      <a:r>
+                        <a:rPr lang="en-IN" sz="1400" b="0" dirty="0"/>
+                        <a:t>3</a:t>
+                      </a:r>
+                    </a:p>
+                  </a:txBody>
+                  <a:tcPr/>
+                </a:tc>
+                <a:extLst>
+                  <a:ext uri="{0D108BD9-81ED-4DB2-BD59-A6C34878D82A}">
+                    <a16:rowId xmlns:a16="http://schemas.microsoft.com/office/drawing/2014/main" val="2369134195"/>
+                  </a:ext>
+                </a:extLst>
+              </a:tr>
+              <a:tr h="370840">
+                <a:tc>
+                  <a:txBody>
+                    <a:bodyPr/>
+                    <a:lstStyle/>
+                    <a:p>
+                      <a:r>
+                        <a:rPr lang="en-US" sz="1400" b="0" dirty="0"/>
+                        <a:t>2.</a:t>
+                      </a:r>
+                      <a:endParaRPr lang="en-IN" sz="1400" b="0" dirty="0"/>
+                    </a:p>
+                  </a:txBody>
+                  <a:tcPr/>
+                </a:tc>
+                <a:tc>
+                  <a:txBody>
+                    <a:bodyPr/>
+                    <a:lstStyle/>
+                    <a:p>
+                      <a:r>
+                        <a:rPr lang="en-IN" sz="1400" b="0" dirty="0"/>
+                        <a:t>Problem Statement</a:t>
+                      </a:r>
+                    </a:p>
+                  </a:txBody>
+                  <a:tcPr/>
+                </a:tc>
+                <a:tc>
+                  <a:txBody>
+                    <a:bodyPr/>
+                    <a:lstStyle/>
+                    <a:p>
+                      <a:r>
+                        <a:rPr lang="en-IN" sz="1400" b="0" dirty="0"/>
+                        <a:t>4</a:t>
+                      </a:r>
+                    </a:p>
+                  </a:txBody>
+                  <a:tcPr/>
+                </a:tc>
+                <a:extLst>
+                  <a:ext uri="{0D108BD9-81ED-4DB2-BD59-A6C34878D82A}">
+                    <a16:rowId xmlns:a16="http://schemas.microsoft.com/office/drawing/2014/main" val="1311166528"/>
+                  </a:ext>
+                </a:extLst>
+              </a:tr>
+              <a:tr h="370840">
+                <a:tc>
+                  <a:txBody>
+                    <a:bodyPr/>
+                    <a:lstStyle/>
+                    <a:p>
+                      <a:r>
+                        <a:rPr lang="en-IN" sz="1400" b="0" dirty="0"/>
+                        <a:t>3.</a:t>
+                      </a:r>
+                    </a:p>
+                  </a:txBody>
+                  <a:tcPr/>
+                </a:tc>
+                <a:tc>
+                  <a:txBody>
+                    <a:bodyPr/>
+                    <a:lstStyle/>
+                    <a:p>
+                      <a:r>
+                        <a:rPr lang="en-IN" sz="1400" b="0" dirty="0"/>
+                        <a:t>Previous Work</a:t>
+                      </a:r>
+                    </a:p>
+                  </a:txBody>
+                  <a:tcPr/>
+                </a:tc>
+                <a:tc>
+                  <a:txBody>
+                    <a:bodyPr/>
+                    <a:lstStyle/>
+                    <a:p>
+                      <a:r>
+                        <a:rPr lang="en-IN" sz="1400" b="0" dirty="0"/>
+                        <a:t>5</a:t>
+                      </a:r>
+                    </a:p>
+                  </a:txBody>
+                  <a:tcPr/>
+                </a:tc>
+                <a:extLst>
+                  <a:ext uri="{0D108BD9-81ED-4DB2-BD59-A6C34878D82A}">
+                    <a16:rowId xmlns:a16="http://schemas.microsoft.com/office/drawing/2014/main" val="3750429733"/>
+                  </a:ext>
+                </a:extLst>
+              </a:tr>
+              <a:tr h="370840">
+                <a:tc>
+                  <a:txBody>
+                    <a:bodyPr/>
+                    <a:lstStyle/>
+                    <a:p>
+                      <a:r>
+                        <a:rPr lang="en-IN" sz="1400" b="0" dirty="0"/>
+                        <a:t>4.</a:t>
+                      </a:r>
+                    </a:p>
+                  </a:txBody>
+                  <a:tcPr/>
+                </a:tc>
+                <a:tc>
+                  <a:txBody>
+                    <a:bodyPr/>
+                    <a:lstStyle/>
+                    <a:p>
+                      <a:r>
+                        <a:rPr lang="en-IN" sz="1400" b="0" dirty="0"/>
+                        <a:t>Analysis</a:t>
+                      </a:r>
+                    </a:p>
+                  </a:txBody>
+                  <a:tcPr/>
+                </a:tc>
+                <a:tc>
+                  <a:txBody>
+                    <a:bodyPr/>
+                    <a:lstStyle/>
+                    <a:p>
+                      <a:r>
+                        <a:rPr lang="en-IN" sz="1400" b="0" dirty="0"/>
+                        <a:t>6</a:t>
+                      </a:r>
+                    </a:p>
+                  </a:txBody>
+                  <a:tcPr/>
+                </a:tc>
+                <a:extLst>
+                  <a:ext uri="{0D108BD9-81ED-4DB2-BD59-A6C34878D82A}">
+                    <a16:rowId xmlns:a16="http://schemas.microsoft.com/office/drawing/2014/main" val="3852845993"/>
+                  </a:ext>
+                </a:extLst>
+              </a:tr>
+              <a:tr h="370840">
+                <a:tc>
+                  <a:txBody>
+                    <a:bodyPr/>
+                    <a:lstStyle/>
+                    <a:p>
+                      <a:r>
+                        <a:rPr lang="en-IN" sz="1400" b="0" dirty="0"/>
+                        <a:t>5.</a:t>
+                      </a:r>
+                    </a:p>
+                  </a:txBody>
+                  <a:tcPr/>
+                </a:tc>
+                <a:tc>
+                  <a:txBody>
+                    <a:bodyPr/>
+                    <a:lstStyle/>
+                    <a:p>
+                      <a:r>
+                        <a:rPr lang="en-IN" sz="1400" b="0" dirty="0"/>
+                        <a:t>Base Paper Description</a:t>
+                      </a:r>
+                    </a:p>
+                  </a:txBody>
+                  <a:tcPr/>
+                </a:tc>
+                <a:tc>
+                  <a:txBody>
+                    <a:bodyPr/>
+                    <a:lstStyle/>
+                    <a:p>
+                      <a:r>
+                        <a:rPr lang="en-IN" sz="1400" b="0" dirty="0"/>
+                        <a:t>9</a:t>
+                      </a:r>
+                    </a:p>
+                  </a:txBody>
+                  <a:tcPr/>
+                </a:tc>
+                <a:extLst>
+                  <a:ext uri="{0D108BD9-81ED-4DB2-BD59-A6C34878D82A}">
+                    <a16:rowId xmlns:a16="http://schemas.microsoft.com/office/drawing/2014/main" val="2658021608"/>
+                  </a:ext>
+                </a:extLst>
+              </a:tr>
+              <a:tr h="370840">
+                <a:tc>
+                  <a:txBody>
+                    <a:bodyPr/>
+                    <a:lstStyle/>
+                    <a:p>
+                      <a:r>
+                        <a:rPr lang="en-IN" sz="1400" b="0" dirty="0"/>
+                        <a:t>6.</a:t>
+                      </a:r>
+                    </a:p>
+                  </a:txBody>
+                  <a:tcPr/>
+                </a:tc>
+                <a:tc>
+                  <a:txBody>
+                    <a:bodyPr/>
+                    <a:lstStyle/>
+                    <a:p>
+                      <a:r>
+                        <a:rPr lang="en-IN" sz="1400" b="0" dirty="0"/>
+                        <a:t>Base Paper Dataset</a:t>
+                      </a:r>
+                    </a:p>
+                  </a:txBody>
+                  <a:tcPr/>
+                </a:tc>
+                <a:tc>
+                  <a:txBody>
+                    <a:bodyPr/>
+                    <a:lstStyle/>
+                    <a:p>
+                      <a:r>
+                        <a:rPr lang="en-IN" sz="1400" b="0" dirty="0"/>
+                        <a:t>11</a:t>
+                      </a:r>
+                    </a:p>
+                  </a:txBody>
+                  <a:tcPr/>
+                </a:tc>
+                <a:extLst>
+                  <a:ext uri="{0D108BD9-81ED-4DB2-BD59-A6C34878D82A}">
+                    <a16:rowId xmlns:a16="http://schemas.microsoft.com/office/drawing/2014/main" val="3506558147"/>
+                  </a:ext>
+                </a:extLst>
+              </a:tr>
+              <a:tr h="370840">
+                <a:tc>
+                  <a:txBody>
+                    <a:bodyPr/>
+                    <a:lstStyle/>
+                    <a:p>
+                      <a:r>
+                        <a:rPr lang="en-IN" sz="1400" b="0" dirty="0"/>
+                        <a:t>7.</a:t>
+                      </a:r>
+                    </a:p>
+                  </a:txBody>
+                  <a:tcPr/>
+                </a:tc>
+                <a:tc>
+                  <a:txBody>
+                    <a:bodyPr/>
+                    <a:lstStyle/>
+                    <a:p>
+                      <a:r>
+                        <a:rPr lang="en-IN" sz="1400" b="0" dirty="0"/>
+                        <a:t>Base Paper Preprocessing</a:t>
+                      </a:r>
+                    </a:p>
+                  </a:txBody>
+                  <a:tcPr/>
+                </a:tc>
+                <a:tc>
+                  <a:txBody>
+                    <a:bodyPr/>
+                    <a:lstStyle/>
+                    <a:p>
+                      <a:r>
+                        <a:rPr lang="en-IN" sz="1400" b="0" dirty="0"/>
+                        <a:t>12</a:t>
+                      </a:r>
+                    </a:p>
+                  </a:txBody>
+                  <a:tcPr/>
+                </a:tc>
+                <a:extLst>
+                  <a:ext uri="{0D108BD9-81ED-4DB2-BD59-A6C34878D82A}">
+                    <a16:rowId xmlns:a16="http://schemas.microsoft.com/office/drawing/2014/main" val="1675974392"/>
+                  </a:ext>
+                </a:extLst>
+              </a:tr>
+              <a:tr h="370840">
+                <a:tc>
+                  <a:txBody>
+                    <a:bodyPr/>
+                    <a:lstStyle/>
+                    <a:p>
+                      <a:r>
+                        <a:rPr lang="en-IN" sz="1400" b="0" dirty="0"/>
+                        <a:t>8.</a:t>
+                      </a:r>
+                    </a:p>
+                  </a:txBody>
+                  <a:tcPr/>
+                </a:tc>
+                <a:tc>
+                  <a:txBody>
+                    <a:bodyPr/>
+                    <a:lstStyle/>
+                    <a:p>
+                      <a:r>
+                        <a:rPr lang="en-IN" sz="1400" b="0" dirty="0"/>
+                        <a:t>Base Paper Ensemble Feature Selection</a:t>
+                      </a:r>
+                    </a:p>
+                  </a:txBody>
+                  <a:tcPr/>
+                </a:tc>
+                <a:tc>
+                  <a:txBody>
+                    <a:bodyPr/>
+                    <a:lstStyle/>
+                    <a:p>
+                      <a:r>
+                        <a:rPr lang="en-IN" sz="1400" b="0" dirty="0"/>
+                        <a:t>13</a:t>
+                      </a:r>
+                    </a:p>
+                  </a:txBody>
+                  <a:tcPr/>
+                </a:tc>
+                <a:extLst>
+                  <a:ext uri="{0D108BD9-81ED-4DB2-BD59-A6C34878D82A}">
+                    <a16:rowId xmlns:a16="http://schemas.microsoft.com/office/drawing/2014/main" val="3703784324"/>
+                  </a:ext>
+                </a:extLst>
+              </a:tr>
+              <a:tr h="370840">
+                <a:tc>
+                  <a:txBody>
+                    <a:bodyPr/>
+                    <a:lstStyle/>
+                    <a:p>
+                      <a:r>
+                        <a:rPr lang="en-IN" sz="1400" b="0" dirty="0"/>
+                        <a:t>9.</a:t>
+                      </a:r>
+                    </a:p>
+                  </a:txBody>
+                  <a:tcPr/>
+                </a:tc>
+                <a:tc>
+                  <a:txBody>
+                    <a:bodyPr/>
+                    <a:lstStyle/>
+                    <a:p>
+                      <a:r>
+                        <a:rPr lang="en-IN" sz="1400" b="0" dirty="0"/>
+                        <a:t>Base Paper Classification &amp; Evaluation</a:t>
+                      </a:r>
+                    </a:p>
+                  </a:txBody>
+                  <a:tcPr/>
+                </a:tc>
+                <a:tc>
+                  <a:txBody>
+                    <a:bodyPr/>
+                    <a:lstStyle/>
+                    <a:p>
+                      <a:r>
+                        <a:rPr lang="en-IN" sz="1400" b="0" dirty="0"/>
+                        <a:t>14</a:t>
+                      </a:r>
+                    </a:p>
+                  </a:txBody>
+                  <a:tcPr/>
+                </a:tc>
+                <a:extLst>
+                  <a:ext uri="{0D108BD9-81ED-4DB2-BD59-A6C34878D82A}">
+                    <a16:rowId xmlns:a16="http://schemas.microsoft.com/office/drawing/2014/main" val="3994175541"/>
+                  </a:ext>
+                </a:extLst>
+              </a:tr>
+              <a:tr h="370840">
+                <a:tc>
+                  <a:txBody>
+                    <a:bodyPr/>
+                    <a:lstStyle/>
+                    <a:p>
+                      <a:r>
+                        <a:rPr lang="en-IN" sz="1400" b="0" dirty="0"/>
+                        <a:t>10.</a:t>
+                      </a:r>
+                    </a:p>
+                  </a:txBody>
+                  <a:tcPr/>
+                </a:tc>
+                <a:tc>
+                  <a:txBody>
+                    <a:bodyPr/>
+                    <a:lstStyle/>
+                    <a:p>
+                      <a:r>
+                        <a:rPr lang="en-IN" sz="1400" b="0" dirty="0"/>
+                        <a:t>Base Paper Limitations</a:t>
+                      </a:r>
+                    </a:p>
+                  </a:txBody>
+                  <a:tcPr/>
+                </a:tc>
+                <a:tc>
+                  <a:txBody>
+                    <a:bodyPr/>
+                    <a:lstStyle/>
+                    <a:p>
+                      <a:r>
+                        <a:rPr lang="en-IN" sz="1400" b="0" dirty="0"/>
+                        <a:t>15</a:t>
+                      </a:r>
+                    </a:p>
+                  </a:txBody>
+                  <a:tcPr/>
+                </a:tc>
+                <a:extLst>
+                  <a:ext uri="{0D108BD9-81ED-4DB2-BD59-A6C34878D82A}">
+                    <a16:rowId xmlns:a16="http://schemas.microsoft.com/office/drawing/2014/main" val="74374052"/>
+                  </a:ext>
+                </a:extLst>
+              </a:tr>
+              <a:tr h="370840">
+                <a:tc>
+                  <a:txBody>
+                    <a:bodyPr/>
+                    <a:lstStyle/>
+                    <a:p>
+                      <a:r>
+                        <a:rPr lang="en-IN" sz="1400" b="0" dirty="0"/>
+                        <a:t>11.</a:t>
+                      </a:r>
+                    </a:p>
+                  </a:txBody>
+                  <a:tcPr/>
+                </a:tc>
+                <a:tc>
+                  <a:txBody>
+                    <a:bodyPr/>
+                    <a:lstStyle/>
+                    <a:p>
+                      <a:r>
+                        <a:rPr lang="en-IN" sz="1400" b="0" dirty="0"/>
+                        <a:t>Our Work (as of Now)</a:t>
+                      </a:r>
+                    </a:p>
+                  </a:txBody>
+                  <a:tcPr/>
+                </a:tc>
+                <a:tc>
+                  <a:txBody>
+                    <a:bodyPr/>
+                    <a:lstStyle/>
+                    <a:p>
+                      <a:r>
+                        <a:rPr lang="en-IN" sz="1400" b="0" dirty="0"/>
+                        <a:t>16</a:t>
+                      </a:r>
+                    </a:p>
+                  </a:txBody>
+                  <a:tcPr/>
+                </a:tc>
+                <a:extLst>
+                  <a:ext uri="{0D108BD9-81ED-4DB2-BD59-A6C34878D82A}">
+                    <a16:rowId xmlns:a16="http://schemas.microsoft.com/office/drawing/2014/main" val="3917241332"/>
+                  </a:ext>
+                </a:extLst>
+              </a:tr>
+              <a:tr h="370840">
+                <a:tc>
+                  <a:txBody>
+                    <a:bodyPr/>
+                    <a:lstStyle/>
+                    <a:p>
+                      <a:r>
+                        <a:rPr lang="en-IN" sz="1400" b="0" dirty="0"/>
+                        <a:t>12.</a:t>
+                      </a:r>
+                    </a:p>
+                  </a:txBody>
+                  <a:tcPr/>
+                </a:tc>
+                <a:tc>
+                  <a:txBody>
+                    <a:bodyPr/>
+                    <a:lstStyle/>
+                    <a:p>
+                      <a:r>
+                        <a:rPr lang="en-IN" sz="1400" b="0" dirty="0"/>
+                        <a:t>Future Work (few Ideas)</a:t>
+                      </a:r>
+                    </a:p>
+                  </a:txBody>
+                  <a:tcPr/>
+                </a:tc>
+                <a:tc>
+                  <a:txBody>
+                    <a:bodyPr/>
+                    <a:lstStyle/>
+                    <a:p>
+                      <a:r>
+                        <a:rPr lang="en-IN" sz="1400" b="0" dirty="0"/>
+                        <a:t>20</a:t>
+                      </a:r>
+                    </a:p>
+                  </a:txBody>
+                  <a:tcPr/>
+                </a:tc>
+                <a:extLst>
+                  <a:ext uri="{0D108BD9-81ED-4DB2-BD59-A6C34878D82A}">
+                    <a16:rowId xmlns:a16="http://schemas.microsoft.com/office/drawing/2014/main" val="1515861170"/>
+                  </a:ext>
+                </a:extLst>
+              </a:tr>
+              <a:tr h="370840">
+                <a:tc>
+                  <a:txBody>
+                    <a:bodyPr/>
+                    <a:lstStyle/>
+                    <a:p>
+                      <a:r>
+                        <a:rPr lang="en-IN" sz="1400" b="0" dirty="0"/>
+                        <a:t>13.</a:t>
+                      </a:r>
+                    </a:p>
+                  </a:txBody>
+                  <a:tcPr/>
+                </a:tc>
+                <a:tc>
+                  <a:txBody>
+                    <a:bodyPr/>
+                    <a:lstStyle/>
+                    <a:p>
+                      <a:r>
+                        <a:rPr lang="en-IN" sz="1400" b="0" dirty="0"/>
+                        <a:t>References</a:t>
+                      </a:r>
+                    </a:p>
+                  </a:txBody>
+                  <a:tcPr/>
+                </a:tc>
+                <a:tc>
+                  <a:txBody>
+                    <a:bodyPr/>
+                    <a:lstStyle/>
+                    <a:p>
+                      <a:r>
+                        <a:rPr lang="en-IN" sz="1400" b="0" dirty="0"/>
+                        <a:t>21</a:t>
+                      </a:r>
+                    </a:p>
+                  </a:txBody>
+                  <a:tcPr/>
+                </a:tc>
+                <a:extLst>
+                  <a:ext uri="{0D108BD9-81ED-4DB2-BD59-A6C34878D82A}">
+                    <a16:rowId xmlns:a16="http://schemas.microsoft.com/office/drawing/2014/main" val="2551049372"/>
+                  </a:ext>
+                </a:extLst>
+              </a:tr>
+            </a:tbl>
+          </a:graphicData>
+        </a:graphic>
+      </p:graphicFrame>
+      <p:sp>
+        <p:nvSpPr>
+          <p:cNvPr id="4" name="Slide Number Placeholder 3">
+            <a:extLst>
+              <a:ext uri="{FF2B5EF4-FFF2-40B4-BE49-F238E27FC236}">
+                <a16:creationId xmlns:a16="http://schemas.microsoft.com/office/drawing/2014/main" id="{138DE578-2980-CDAA-E876-1DE5FF5C8E17}"/>
+              </a:ext>
+            </a:extLst>
+          </p:cNvPr>
+          <p:cNvSpPr>
+            <a:spLocks noGrp="1"/>
+          </p:cNvSpPr>
+          <p:nvPr>
+            <p:ph type="sldNum" sz="quarter" idx="12"/>
+          </p:nvPr>
+        </p:nvSpPr>
+        <p:spPr/>
         <p:txBody>
           <a:bodyPr/>
           <a:lstStyle/>
           <a:p>
-            <a:r>
-              <a:rPr lang="en-US" b="1" dirty="0"/>
-              <a:t>Definition</a:t>
-            </a:r>
-            <a:r>
-              <a:rPr lang="en-US" dirty="0"/>
-              <a:t> - </a:t>
-            </a:r>
-            <a:r>
-              <a:rPr lang="en-US" i="1" dirty="0"/>
-              <a:t>A code smell is a symptom in the code that indicates a deeper problem, usually related to poor design, maintainability, or readability.</a:t>
-            </a:r>
-          </a:p>
-          <a:p>
-            <a:r>
-              <a:rPr lang="en-US" b="1" dirty="0"/>
-              <a:t>Difference with Bugs</a:t>
-            </a:r>
-            <a:r>
-              <a:rPr lang="en-US" dirty="0"/>
-              <a:t> - While code smells don't necessarily cause immediate bugs, they often make the code harder to understand, modify, or extend.</a:t>
-            </a:r>
-            <a:endParaRPr lang="en-IN" dirty="0"/>
-          </a:p>
-          <a:p>
-            <a:r>
-              <a:rPr lang="en-US" b="1" dirty="0"/>
-              <a:t>Common Types – </a:t>
-            </a:r>
+            <a:fld id="{D57F1E4F-1CFF-5643-939E-217C01CDF565}" type="slidenum">
+              <a:rPr lang="en-US" smtClean="0"/>
+              <a:pPr/>
+              <a:t>2</a:t>
+            </a:fld>
             <a:endParaRPr lang="en-US" dirty="0"/>
-          </a:p>
-          <a:p>
-            <a:pPr lvl="1"/>
-            <a:r>
-              <a:rPr lang="en-IN" dirty="0"/>
-              <a:t>Long Method - </a:t>
-            </a:r>
-            <a:r>
-              <a:rPr lang="en-US" i="1" dirty="0"/>
-              <a:t>A method that is too lengthy and tries to do too much.</a:t>
-            </a:r>
-          </a:p>
-          <a:p>
-            <a:pPr lvl="1"/>
-            <a:r>
-              <a:rPr lang="en-IN" dirty="0"/>
-              <a:t>Large Class - </a:t>
-            </a:r>
-            <a:r>
-              <a:rPr lang="en-US" i="1" dirty="0"/>
-              <a:t>A class with too many responsibilities.</a:t>
-            </a:r>
-          </a:p>
-          <a:p>
-            <a:pPr lvl="1"/>
-            <a:r>
-              <a:rPr lang="en-IN" dirty="0"/>
-              <a:t>Duplicate Code - </a:t>
-            </a:r>
-            <a:r>
-              <a:rPr lang="en-US" i="1" dirty="0"/>
-              <a:t>Identical or very similar code appears in multiple places.</a:t>
-            </a:r>
-          </a:p>
-          <a:p>
-            <a:pPr lvl="1"/>
-            <a:r>
-              <a:rPr lang="en-IN" dirty="0"/>
-              <a:t>Data Class</a:t>
-            </a:r>
-            <a:r>
-              <a:rPr lang="en-US" i="1" dirty="0"/>
-              <a:t> – A class that primarily contains fields (data).</a:t>
-            </a:r>
-          </a:p>
-          <a:p>
-            <a:r>
-              <a:rPr lang="en-US" b="1" i="1" dirty="0"/>
-              <a:t>Why</a:t>
-            </a:r>
-            <a:r>
-              <a:rPr lang="en-US" i="1" dirty="0"/>
-              <a:t> - </a:t>
-            </a:r>
-            <a:r>
-              <a:rPr lang="en-IN" dirty="0"/>
-              <a:t>Improved Maintainability, Team Productivity, Easier Debugging, etc</a:t>
-            </a:r>
-            <a:endParaRPr lang="en-US" i="1" dirty="0"/>
           </a:p>
         </p:txBody>
       </p:sp>
     </p:spTree>
     <p:extLst>
       <p:ext uri="{BB962C8B-B14F-4D97-AF65-F5344CB8AC3E}">
-        <p14:creationId xmlns:p14="http://schemas.microsoft.com/office/powerpoint/2010/main" val="834077349"/>
+        <p14:creationId xmlns:p14="http://schemas.microsoft.com/office/powerpoint/2010/main" val="983542430"/>
       </p:ext>
     </p:extLst>
   </p:cSld>
@@ -8344,6 +9658,36 @@
           </a:p>
         </p:txBody>
       </p:sp>
+      <p:sp>
+        <p:nvSpPr>
+          <p:cNvPr id="4" name="Slide Number Placeholder 3">
+            <a:extLst>
+              <a:ext uri="{FF2B5EF4-FFF2-40B4-BE49-F238E27FC236}">
+                <a16:creationId xmlns:a16="http://schemas.microsoft.com/office/drawing/2014/main" id="{14534024-3FD6-9C57-E285-43F50E911E09}"/>
+              </a:ext>
+            </a:extLst>
+          </p:cNvPr>
+          <p:cNvSpPr>
+            <a:spLocks noGrp="1"/>
+          </p:cNvSpPr>
+          <p:nvPr>
+            <p:ph type="sldNum" sz="quarter" idx="12"/>
+          </p:nvPr>
+        </p:nvSpPr>
+        <p:spPr/>
+        <p:txBody>
+          <a:bodyPr/>
+          <a:lstStyle/>
+          <a:p>
+            <a:fld id="{D57F1E4F-1CFF-5643-939E-217C01CDF565}" type="slidenum">
+              <a:rPr lang="en-US" smtClean="0"/>
+              <a:pPr/>
+              <a:t>20</a:t>
+            </a:fld>
+            <a:endParaRPr lang="en-US" dirty="0"/>
+          </a:p>
+        </p:txBody>
+      </p:sp>
     </p:spTree>
     <p:extLst>
       <p:ext uri="{BB962C8B-B14F-4D97-AF65-F5344CB8AC3E}">
@@ -8358,6 +9702,285 @@
 </file>
 
 <file path=ppt/slides/slide21.xml><?xml version="1.0" encoding="utf-8"?>
+<p:sld xmlns:a="http://schemas.openxmlformats.org/drawingml/2006/main" xmlns:r="http://schemas.openxmlformats.org/officeDocument/2006/relationships" xmlns:p="http://schemas.openxmlformats.org/presentationml/2006/main">
+  <p:cSld>
+    <p:spTree>
+      <p:nvGrpSpPr>
+        <p:cNvPr id="1" name="">
+          <a:extLst>
+            <a:ext uri="{FF2B5EF4-FFF2-40B4-BE49-F238E27FC236}">
+              <a16:creationId xmlns:a16="http://schemas.microsoft.com/office/drawing/2014/main" id="{6EA3DA57-48DE-F7A6-37AE-375FEBB3A663}"/>
+            </a:ext>
+          </a:extLst>
+        </p:cNvPr>
+        <p:cNvGrpSpPr/>
+        <p:nvPr/>
+      </p:nvGrpSpPr>
+      <p:grpSpPr>
+        <a:xfrm>
+          <a:off x="0" y="0"/>
+          <a:ext cx="0" cy="0"/>
+          <a:chOff x="0" y="0"/>
+          <a:chExt cx="0" cy="0"/>
+        </a:xfrm>
+      </p:grpSpPr>
+      <p:sp>
+        <p:nvSpPr>
+          <p:cNvPr id="2" name="Title 1">
+            <a:extLst>
+              <a:ext uri="{FF2B5EF4-FFF2-40B4-BE49-F238E27FC236}">
+                <a16:creationId xmlns:a16="http://schemas.microsoft.com/office/drawing/2014/main" id="{BDE68A12-2B8D-86E8-368E-61A41884B43A}"/>
+              </a:ext>
+            </a:extLst>
+          </p:cNvPr>
+          <p:cNvSpPr>
+            <a:spLocks noGrp="1"/>
+          </p:cNvSpPr>
+          <p:nvPr>
+            <p:ph type="title"/>
+          </p:nvPr>
+        </p:nvSpPr>
+        <p:spPr>
+          <a:xfrm>
+            <a:off x="677334" y="609600"/>
+            <a:ext cx="8596668" cy="748937"/>
+          </a:xfrm>
+        </p:spPr>
+        <p:txBody>
+          <a:bodyPr/>
+          <a:lstStyle/>
+          <a:p>
+            <a:r>
+              <a:rPr lang="en-US" dirty="0"/>
+              <a:t>References</a:t>
+            </a:r>
+            <a:endParaRPr lang="en-IN" dirty="0"/>
+          </a:p>
+        </p:txBody>
+      </p:sp>
+      <p:sp>
+        <p:nvSpPr>
+          <p:cNvPr id="3" name="Content Placeholder 2">
+            <a:extLst>
+              <a:ext uri="{FF2B5EF4-FFF2-40B4-BE49-F238E27FC236}">
+                <a16:creationId xmlns:a16="http://schemas.microsoft.com/office/drawing/2014/main" id="{598A6F27-8A0D-9FC2-E63B-7B9111663B30}"/>
+              </a:ext>
+            </a:extLst>
+          </p:cNvPr>
+          <p:cNvSpPr>
+            <a:spLocks noGrp="1"/>
+          </p:cNvSpPr>
+          <p:nvPr>
+            <p:ph idx="1"/>
+          </p:nvPr>
+        </p:nvSpPr>
+        <p:spPr>
+          <a:xfrm>
+            <a:off x="677334" y="1270988"/>
+            <a:ext cx="8912143" cy="5225143"/>
+          </a:xfrm>
+        </p:spPr>
+        <p:txBody>
+          <a:bodyPr>
+            <a:normAutofit/>
+          </a:bodyPr>
+          <a:lstStyle/>
+          <a:p>
+            <a:r>
+              <a:rPr lang="en-US" dirty="0"/>
+              <a:t>Improving Code Smell Detection by Reducing Dimensionality Using Ensemble Feature Selection and Machine Learning (</a:t>
+            </a:r>
+            <a:r>
+              <a:rPr lang="en-US" sz="1800" kern="1200" dirty="0">
+                <a:solidFill>
+                  <a:srgbClr val="404040"/>
+                </a:solidFill>
+                <a:effectLst/>
+                <a:latin typeface="Trebuchet MS" panose="020B0603020202020204" pitchFamily="34" charset="0"/>
+                <a:ea typeface="+mn-ea"/>
+                <a:cs typeface="+mn-cs"/>
+                <a:hlinkClick r:id="rId2"/>
+              </a:rPr>
+              <a:t>https://link.springer.com/article/10.1007/s42979-024-03013-x</a:t>
+            </a:r>
+            <a:r>
+              <a:rPr lang="en-US" dirty="0"/>
+              <a:t>)</a:t>
+            </a:r>
+          </a:p>
+          <a:p>
+            <a:r>
+              <a:rPr lang="en-US" dirty="0"/>
+              <a:t>MLCQ Dataset (</a:t>
+            </a:r>
+            <a:r>
+              <a:rPr lang="en-US" sz="1800" kern="1200" dirty="0">
+                <a:solidFill>
+                  <a:srgbClr val="404040"/>
+                </a:solidFill>
+                <a:effectLst/>
+                <a:latin typeface="Trebuchet MS" panose="020B0603020202020204" pitchFamily="34" charset="0"/>
+                <a:ea typeface="+mn-ea"/>
+                <a:cs typeface="+mn-cs"/>
+                <a:hlinkClick r:id="rId3"/>
+              </a:rPr>
+              <a:t>https://github.com/milica-skipina/ML-code-smell-detection</a:t>
+            </a:r>
+            <a:r>
+              <a:rPr lang="en-US" dirty="0"/>
+              <a:t>)</a:t>
+            </a:r>
+          </a:p>
+          <a:p>
+            <a:r>
+              <a:rPr lang="en-US" dirty="0"/>
+              <a:t>Java CK Tool (</a:t>
+            </a:r>
+            <a:r>
+              <a:rPr lang="en-US" sz="1800" kern="1200" dirty="0">
+                <a:solidFill>
+                  <a:srgbClr val="404040"/>
+                </a:solidFill>
+                <a:effectLst/>
+                <a:latin typeface="Trebuchet MS" panose="020B0603020202020204" pitchFamily="34" charset="0"/>
+                <a:ea typeface="+mn-ea"/>
+                <a:cs typeface="+mn-cs"/>
+                <a:hlinkClick r:id="rId4"/>
+              </a:rPr>
+              <a:t>https://github.com/mauricioaniche/ck</a:t>
+            </a:r>
+            <a:r>
+              <a:rPr lang="en-US" dirty="0"/>
+              <a:t>)</a:t>
+            </a:r>
+          </a:p>
+          <a:p>
+            <a:r>
+              <a:rPr lang="en-US" dirty="0"/>
+              <a:t>VS Code Extensions (</a:t>
+            </a:r>
+            <a:r>
+              <a:rPr lang="en-US" dirty="0">
+                <a:hlinkClick r:id="rId5"/>
+              </a:rPr>
+              <a:t>https://code.visualstudio.com/api</a:t>
+            </a:r>
+            <a:r>
+              <a:rPr lang="en-US" dirty="0"/>
+              <a:t>)</a:t>
+            </a:r>
+          </a:p>
+          <a:p>
+            <a:r>
+              <a:rPr lang="en-US" dirty="0" err="1"/>
+              <a:t>Qualitas</a:t>
+            </a:r>
+            <a:r>
+              <a:rPr lang="en-US" dirty="0"/>
+              <a:t> Corpus (</a:t>
+            </a:r>
+            <a:r>
+              <a:rPr lang="en-US" dirty="0">
+                <a:hlinkClick r:id="rId6"/>
+              </a:rPr>
+              <a:t>http://qualitascorpus.com/download/</a:t>
+            </a:r>
+            <a:r>
+              <a:rPr lang="en-US" dirty="0"/>
+              <a:t>)</a:t>
+            </a:r>
+          </a:p>
+          <a:p>
+            <a:pPr marL="0" indent="0">
+              <a:buNone/>
+            </a:pPr>
+            <a:endParaRPr lang="en-US" dirty="0"/>
+          </a:p>
+          <a:p>
+            <a:pPr marL="0" indent="0">
+              <a:buNone/>
+            </a:pPr>
+            <a:endParaRPr lang="en-US" dirty="0"/>
+          </a:p>
+          <a:p>
+            <a:pPr marL="0" indent="0">
+              <a:buNone/>
+            </a:pPr>
+            <a:endParaRPr lang="en-US" dirty="0"/>
+          </a:p>
+          <a:p>
+            <a:pPr marL="0" indent="0">
+              <a:buNone/>
+            </a:pPr>
+            <a:endParaRPr lang="en-US" dirty="0"/>
+          </a:p>
+          <a:p>
+            <a:endParaRPr lang="en-US" dirty="0"/>
+          </a:p>
+          <a:p>
+            <a:pPr marL="0" indent="0">
+              <a:buNone/>
+            </a:pPr>
+            <a:endParaRPr lang="en-US" dirty="0"/>
+          </a:p>
+          <a:p>
+            <a:pPr marL="0" indent="0">
+              <a:buNone/>
+            </a:pPr>
+            <a:endParaRPr lang="en-US" dirty="0"/>
+          </a:p>
+          <a:p>
+            <a:pPr marL="0" indent="0">
+              <a:buNone/>
+            </a:pPr>
+            <a:endParaRPr lang="en-US" dirty="0"/>
+          </a:p>
+        </p:txBody>
+      </p:sp>
+      <p:sp>
+        <p:nvSpPr>
+          <p:cNvPr id="4" name="Slide Number Placeholder 3">
+            <a:extLst>
+              <a:ext uri="{FF2B5EF4-FFF2-40B4-BE49-F238E27FC236}">
+                <a16:creationId xmlns:a16="http://schemas.microsoft.com/office/drawing/2014/main" id="{EFA53EE6-6B9B-7616-7795-8DC3012F8D16}"/>
+              </a:ext>
+            </a:extLst>
+          </p:cNvPr>
+          <p:cNvSpPr>
+            <a:spLocks noGrp="1"/>
+          </p:cNvSpPr>
+          <p:nvPr>
+            <p:ph type="sldNum" sz="quarter" idx="12"/>
+          </p:nvPr>
+        </p:nvSpPr>
+        <p:spPr/>
+        <p:txBody>
+          <a:bodyPr/>
+          <a:lstStyle/>
+          <a:p>
+            <a:fld id="{D57F1E4F-1CFF-5643-939E-217C01CDF565}" type="slidenum">
+              <a:rPr lang="en-US" smtClean="0"/>
+              <a:pPr/>
+              <a:t>21</a:t>
+            </a:fld>
+            <a:endParaRPr lang="en-US" dirty="0"/>
+          </a:p>
+        </p:txBody>
+      </p:sp>
+    </p:spTree>
+    <p:extLst>
+      <p:ext uri="{BB962C8B-B14F-4D97-AF65-F5344CB8AC3E}">
+        <p14:creationId xmlns:p14="http://schemas.microsoft.com/office/powerpoint/2010/main" val="1251649838"/>
+      </p:ext>
+    </p:extLst>
+  </p:cSld>
+  <p:clrMapOvr>
+    <a:masterClrMapping/>
+  </p:clrMapOvr>
+</p:sld>
+</file>
+
+<file path=ppt/slides/slide22.xml><?xml version="1.0" encoding="utf-8"?>
 <p:sld xmlns:a="http://schemas.openxmlformats.org/drawingml/2006/main" xmlns:r="http://schemas.openxmlformats.org/officeDocument/2006/relationships" xmlns:p="http://schemas.openxmlformats.org/presentationml/2006/main">
   <p:cSld>
     <p:spTree>
@@ -8418,6 +10041,36 @@
           </a:p>
         </p:txBody>
       </p:sp>
+      <p:sp>
+        <p:nvSpPr>
+          <p:cNvPr id="2" name="Slide Number Placeholder 1">
+            <a:extLst>
+              <a:ext uri="{FF2B5EF4-FFF2-40B4-BE49-F238E27FC236}">
+                <a16:creationId xmlns:a16="http://schemas.microsoft.com/office/drawing/2014/main" id="{6A549DAD-1672-0716-C923-6FD6F4CDE9AB}"/>
+              </a:ext>
+            </a:extLst>
+          </p:cNvPr>
+          <p:cNvSpPr>
+            <a:spLocks noGrp="1"/>
+          </p:cNvSpPr>
+          <p:nvPr>
+            <p:ph type="sldNum" sz="quarter" idx="12"/>
+          </p:nvPr>
+        </p:nvSpPr>
+        <p:spPr/>
+        <p:txBody>
+          <a:bodyPr/>
+          <a:lstStyle/>
+          <a:p>
+            <a:fld id="{D57F1E4F-1CFF-5643-939E-217C01CDF565}" type="slidenum">
+              <a:rPr lang="en-US" smtClean="0"/>
+              <a:pPr/>
+              <a:t>22</a:t>
+            </a:fld>
+            <a:endParaRPr lang="en-US" dirty="0"/>
+          </a:p>
+        </p:txBody>
+      </p:sp>
     </p:spTree>
     <p:extLst>
       <p:ext uri="{BB962C8B-B14F-4D97-AF65-F5344CB8AC3E}">
@@ -8436,10 +10089,212 @@
   <p:cSld>
     <p:spTree>
       <p:nvGrpSpPr>
+        <p:cNvPr id="1" name=""/>
+        <p:cNvGrpSpPr/>
+        <p:nvPr/>
+      </p:nvGrpSpPr>
+      <p:grpSpPr>
+        <a:xfrm>
+          <a:off x="0" y="0"/>
+          <a:ext cx="0" cy="0"/>
+          <a:chOff x="0" y="0"/>
+          <a:chExt cx="0" cy="0"/>
+        </a:xfrm>
+      </p:grpSpPr>
+      <p:sp>
+        <p:nvSpPr>
+          <p:cNvPr id="2" name="Title 1"/>
+          <p:cNvSpPr>
+            <a:spLocks noGrp="1"/>
+          </p:cNvSpPr>
+          <p:nvPr>
+            <p:ph type="title"/>
+          </p:nvPr>
+        </p:nvSpPr>
+        <p:spPr>
+          <a:xfrm>
+            <a:off x="677334" y="609600"/>
+            <a:ext cx="8596668" cy="627017"/>
+          </a:xfrm>
+        </p:spPr>
+        <p:txBody>
+          <a:bodyPr>
+            <a:normAutofit fontScale="90000"/>
+          </a:bodyPr>
+          <a:lstStyle/>
+          <a:p>
+            <a:r>
+              <a:rPr lang="en-US" dirty="0"/>
+              <a:t>Overview</a:t>
+            </a:r>
+            <a:endParaRPr lang="en-IN" dirty="0"/>
+          </a:p>
+        </p:txBody>
+      </p:sp>
+      <p:sp>
+        <p:nvSpPr>
+          <p:cNvPr id="3" name="Content Placeholder 2"/>
+          <p:cNvSpPr>
+            <a:spLocks noGrp="1"/>
+          </p:cNvSpPr>
+          <p:nvPr>
+            <p:ph idx="1"/>
+          </p:nvPr>
+        </p:nvSpPr>
+        <p:spPr>
+          <a:xfrm>
+            <a:off x="677334" y="1470764"/>
+            <a:ext cx="8596668" cy="3916471"/>
+          </a:xfrm>
+        </p:spPr>
+        <p:txBody>
+          <a:bodyPr/>
+          <a:lstStyle/>
+          <a:p>
+            <a:r>
+              <a:rPr lang="en-US" b="1" dirty="0"/>
+              <a:t>Definition</a:t>
+            </a:r>
+            <a:r>
+              <a:rPr lang="en-US" dirty="0"/>
+              <a:t> - </a:t>
+            </a:r>
+            <a:r>
+              <a:rPr lang="en-US" i="1" dirty="0"/>
+              <a:t>A code smell is a symptom in the code that indicates a deeper problem, usually related to poor design, maintainability, or readability.</a:t>
+            </a:r>
+          </a:p>
+          <a:p>
+            <a:r>
+              <a:rPr lang="en-US" b="1" dirty="0"/>
+              <a:t>Difference with Bugs</a:t>
+            </a:r>
+            <a:r>
+              <a:rPr lang="en-US" dirty="0"/>
+              <a:t> - While code smells don't necessarily cause immediate bugs, they often make the code harder to understand, modify, or extend.</a:t>
+            </a:r>
+            <a:endParaRPr lang="en-IN" dirty="0"/>
+          </a:p>
+          <a:p>
+            <a:r>
+              <a:rPr lang="en-US" b="1" dirty="0"/>
+              <a:t>Common Types – </a:t>
+            </a:r>
+            <a:endParaRPr lang="en-US" dirty="0"/>
+          </a:p>
+          <a:p>
+            <a:pPr lvl="1"/>
+            <a:r>
+              <a:rPr lang="en-IN" dirty="0"/>
+              <a:t>Long Method - </a:t>
+            </a:r>
+            <a:r>
+              <a:rPr lang="en-US" i="1" dirty="0"/>
+              <a:t>A method that is too lengthy and tries to do too much.</a:t>
+            </a:r>
+          </a:p>
+          <a:p>
+            <a:pPr lvl="1"/>
+            <a:r>
+              <a:rPr lang="en-IN" dirty="0"/>
+              <a:t>Large Class - </a:t>
+            </a:r>
+            <a:r>
+              <a:rPr lang="en-US" i="1" dirty="0"/>
+              <a:t>A class with too many responsibilities.</a:t>
+            </a:r>
+          </a:p>
+          <a:p>
+            <a:pPr lvl="1"/>
+            <a:r>
+              <a:rPr lang="en-IN" dirty="0"/>
+              <a:t>Duplicate Code - </a:t>
+            </a:r>
+            <a:r>
+              <a:rPr lang="en-US" i="1" dirty="0"/>
+              <a:t>Identical or very similar code appears in multiple places.</a:t>
+            </a:r>
+          </a:p>
+          <a:p>
+            <a:pPr lvl="1"/>
+            <a:r>
+              <a:rPr lang="en-IN" dirty="0"/>
+              <a:t>Data Class</a:t>
+            </a:r>
+            <a:r>
+              <a:rPr lang="en-US" i="1" dirty="0"/>
+              <a:t> – A class that primarily contains fields (data).</a:t>
+            </a:r>
+          </a:p>
+          <a:p>
+            <a:r>
+              <a:rPr lang="en-US" b="1" i="1" dirty="0"/>
+              <a:t>Why</a:t>
+            </a:r>
+            <a:r>
+              <a:rPr lang="en-US" i="1" dirty="0"/>
+              <a:t> - </a:t>
+            </a:r>
+            <a:r>
+              <a:rPr lang="en-IN" dirty="0"/>
+              <a:t>Improved Maintainability, Team Productivity, Easier Debugging, etc</a:t>
+            </a:r>
+            <a:endParaRPr lang="en-US" i="1" dirty="0"/>
+          </a:p>
+        </p:txBody>
+      </p:sp>
+      <p:sp>
+        <p:nvSpPr>
+          <p:cNvPr id="4" name="Slide Number Placeholder 3">
+            <a:extLst>
+              <a:ext uri="{FF2B5EF4-FFF2-40B4-BE49-F238E27FC236}">
+                <a16:creationId xmlns:a16="http://schemas.microsoft.com/office/drawing/2014/main" id="{0ADE1130-C867-B094-7288-45615ABF7071}"/>
+              </a:ext>
+            </a:extLst>
+          </p:cNvPr>
+          <p:cNvSpPr>
+            <a:spLocks noGrp="1"/>
+          </p:cNvSpPr>
+          <p:nvPr>
+            <p:ph type="sldNum" sz="quarter" idx="12"/>
+          </p:nvPr>
+        </p:nvSpPr>
+        <p:spPr/>
+        <p:txBody>
+          <a:bodyPr/>
+          <a:lstStyle/>
+          <a:p>
+            <a:fld id="{D57F1E4F-1CFF-5643-939E-217C01CDF565}" type="slidenum">
+              <a:rPr lang="en-US" smtClean="0"/>
+              <a:pPr/>
+              <a:t>3</a:t>
+            </a:fld>
+            <a:endParaRPr lang="en-US" dirty="0"/>
+          </a:p>
+        </p:txBody>
+      </p:sp>
+    </p:spTree>
+    <p:extLst>
+      <p:ext uri="{BB962C8B-B14F-4D97-AF65-F5344CB8AC3E}">
+        <p14:creationId xmlns:p14="http://schemas.microsoft.com/office/powerpoint/2010/main" val="834077349"/>
+      </p:ext>
+    </p:extLst>
+  </p:cSld>
+  <p:clrMapOvr>
+    <a:masterClrMapping/>
+  </p:clrMapOvr>
+</p:sld>
+</file>
+
+<file path=ppt/slides/slide4.xml><?xml version="1.0" encoding="utf-8"?>
+<p:sld xmlns:a="http://schemas.openxmlformats.org/drawingml/2006/main" xmlns:r="http://schemas.openxmlformats.org/officeDocument/2006/relationships" xmlns:p="http://schemas.openxmlformats.org/presentationml/2006/main">
+  <p:cSld>
+    <p:spTree>
+      <p:nvGrpSpPr>
         <p:cNvPr id="1" name="">
           <a:extLst>
             <a:ext uri="{FF2B5EF4-FFF2-40B4-BE49-F238E27FC236}">
-              <a16:creationId xmlns:a16="http://schemas.microsoft.com/office/drawing/2014/main" id="{0B7D26F7-9470-21EE-B505-AC83688B6FDB}"/>
+              <a16:creationId xmlns:a16="http://schemas.microsoft.com/office/drawing/2014/main" id="{DAA3B00F-A3D8-BDBF-B658-13759A4780AB}"/>
             </a:ext>
           </a:extLst>
         </p:cNvPr>
@@ -8459,7 +10314,7 @@
           <p:cNvPr id="2" name="Title 1">
             <a:extLst>
               <a:ext uri="{FF2B5EF4-FFF2-40B4-BE49-F238E27FC236}">
-                <a16:creationId xmlns:a16="http://schemas.microsoft.com/office/drawing/2014/main" id="{80C8C6DA-8BCA-99C9-268E-4BC6089CF838}"/>
+                <a16:creationId xmlns:a16="http://schemas.microsoft.com/office/drawing/2014/main" id="{AC60A686-865D-A420-59EC-4A312E5CB0DA}"/>
               </a:ext>
             </a:extLst>
           </p:cNvPr>
@@ -8495,7 +10350,7 @@
           <p:cNvPr id="3" name="Content Placeholder 2">
             <a:extLst>
               <a:ext uri="{FF2B5EF4-FFF2-40B4-BE49-F238E27FC236}">
-                <a16:creationId xmlns:a16="http://schemas.microsoft.com/office/drawing/2014/main" id="{439F3BBD-F613-B627-5FCC-844A5848918F}"/>
+                <a16:creationId xmlns:a16="http://schemas.microsoft.com/office/drawing/2014/main" id="{3ECFB9F9-DD75-2F2B-B6C2-D586861CBDC1}"/>
               </a:ext>
             </a:extLst>
           </p:cNvPr>
@@ -8542,20 +10397,14 @@
           <p:cNvPr id="8" name="Table 7">
             <a:extLst>
               <a:ext uri="{FF2B5EF4-FFF2-40B4-BE49-F238E27FC236}">
-                <a16:creationId xmlns:a16="http://schemas.microsoft.com/office/drawing/2014/main" id="{37414ACF-234C-4687-846C-26A5321214AE}"/>
+                <a16:creationId xmlns:a16="http://schemas.microsoft.com/office/drawing/2014/main" id="{4B084F21-59DF-9BD4-7E3E-691504BC0F42}"/>
               </a:ext>
             </a:extLst>
           </p:cNvPr>
           <p:cNvGraphicFramePr>
             <a:graphicFrameLocks noGrp="1"/>
           </p:cNvGraphicFramePr>
-          <p:nvPr>
-            <p:extLst>
-              <p:ext uri="{D42A27DB-BD31-4B8C-83A1-F6EECF244321}">
-                <p14:modId xmlns:p14="http://schemas.microsoft.com/office/powerpoint/2010/main" val="3953175678"/>
-              </p:ext>
-            </p:extLst>
-          </p:nvPr>
+          <p:nvPr/>
         </p:nvGraphicFramePr>
         <p:xfrm>
           <a:off x="677334" y="2758439"/>
@@ -8909,10 +10758,40 @@
           </a:graphicData>
         </a:graphic>
       </p:graphicFrame>
+      <p:sp>
+        <p:nvSpPr>
+          <p:cNvPr id="4" name="Slide Number Placeholder 3">
+            <a:extLst>
+              <a:ext uri="{FF2B5EF4-FFF2-40B4-BE49-F238E27FC236}">
+                <a16:creationId xmlns:a16="http://schemas.microsoft.com/office/drawing/2014/main" id="{31F1810A-F17B-789F-C6E3-3F2326748FA7}"/>
+              </a:ext>
+            </a:extLst>
+          </p:cNvPr>
+          <p:cNvSpPr>
+            <a:spLocks noGrp="1"/>
+          </p:cNvSpPr>
+          <p:nvPr>
+            <p:ph type="sldNum" sz="quarter" idx="12"/>
+          </p:nvPr>
+        </p:nvSpPr>
+        <p:spPr/>
+        <p:txBody>
+          <a:bodyPr/>
+          <a:lstStyle/>
+          <a:p>
+            <a:fld id="{D57F1E4F-1CFF-5643-939E-217C01CDF565}" type="slidenum">
+              <a:rPr lang="en-US" smtClean="0"/>
+              <a:pPr/>
+              <a:t>4</a:t>
+            </a:fld>
+            <a:endParaRPr lang="en-US" dirty="0"/>
+          </a:p>
+        </p:txBody>
+      </p:sp>
     </p:spTree>
     <p:extLst>
       <p:ext uri="{BB962C8B-B14F-4D97-AF65-F5344CB8AC3E}">
-        <p14:creationId xmlns:p14="http://schemas.microsoft.com/office/powerpoint/2010/main" val="983542430"/>
+        <p14:creationId xmlns:p14="http://schemas.microsoft.com/office/powerpoint/2010/main" val="3928714483"/>
       </p:ext>
     </p:extLst>
   </p:cSld>
@@ -8922,7 +10801,7 @@
 </p:sld>
 </file>
 
-<file path=ppt/slides/slide4.xml><?xml version="1.0" encoding="utf-8"?>
+<file path=ppt/slides/slide5.xml><?xml version="1.0" encoding="utf-8"?>
 <p:sld xmlns:a="http://schemas.openxmlformats.org/drawingml/2006/main" xmlns:r="http://schemas.openxmlformats.org/officeDocument/2006/relationships" xmlns:p="http://schemas.openxmlformats.org/presentationml/2006/main">
   <p:cSld>
     <p:spTree>
@@ -9695,6 +11574,36 @@
           </a:graphicData>
         </a:graphic>
       </p:graphicFrame>
+      <p:sp>
+        <p:nvSpPr>
+          <p:cNvPr id="3" name="Slide Number Placeholder 2">
+            <a:extLst>
+              <a:ext uri="{FF2B5EF4-FFF2-40B4-BE49-F238E27FC236}">
+                <a16:creationId xmlns:a16="http://schemas.microsoft.com/office/drawing/2014/main" id="{7BC9E07A-B7E1-47C8-660D-4363F7E8BFCE}"/>
+              </a:ext>
+            </a:extLst>
+          </p:cNvPr>
+          <p:cNvSpPr>
+            <a:spLocks noGrp="1"/>
+          </p:cNvSpPr>
+          <p:nvPr>
+            <p:ph type="sldNum" sz="quarter" idx="12"/>
+          </p:nvPr>
+        </p:nvSpPr>
+        <p:spPr/>
+        <p:txBody>
+          <a:bodyPr/>
+          <a:lstStyle/>
+          <a:p>
+            <a:fld id="{D57F1E4F-1CFF-5643-939E-217C01CDF565}" type="slidenum">
+              <a:rPr lang="en-US" smtClean="0"/>
+              <a:pPr/>
+              <a:t>5</a:t>
+            </a:fld>
+            <a:endParaRPr lang="en-US" dirty="0"/>
+          </a:p>
+        </p:txBody>
+      </p:sp>
     </p:spTree>
     <p:extLst>
       <p:ext uri="{BB962C8B-B14F-4D97-AF65-F5344CB8AC3E}">
@@ -9708,7 +11617,7 @@
 </p:sld>
 </file>
 
-<file path=ppt/slides/slide5.xml><?xml version="1.0" encoding="utf-8"?>
+<file path=ppt/slides/slide6.xml><?xml version="1.0" encoding="utf-8"?>
 <p:sld xmlns:a="http://schemas.openxmlformats.org/drawingml/2006/main" xmlns:r="http://schemas.openxmlformats.org/officeDocument/2006/relationships" xmlns:p="http://schemas.openxmlformats.org/presentationml/2006/main">
   <p:cSld>
     <p:spTree>
@@ -9818,14 +11727,14 @@
             <a:pPr lvl="1"/>
             <a:r>
               <a:rPr lang="en-US" dirty="0"/>
-              <a:t>Even if the dataset is present there is very much unbalanced dataset, as number of 1 (with code smell) is ~ 20% of total. This results in high accuracy on training data but low on testing data. </a:t>
+              <a:t>Even if the dataset is present, it is very much unbalanced dataset, as number of samples with code smell is ~ 20% of total. This results in high accuracy on training data but low on testing data. </a:t>
             </a:r>
           </a:p>
           <a:p>
             <a:pPr lvl="1"/>
             <a:r>
               <a:rPr lang="en-US" dirty="0"/>
-              <a:t>Also, even if the codes are available, they have to be manually labeled, which is not only, time taken but also, subject to bias as certain code in one project may be called smelly but the same would be called not smelly in some other project.</a:t>
+              <a:t>Also, even if the codes are available, they have to be manually labeled, which is not only, time taking but also, subject to bias as certain code in one project may be called smelly but the same would be called not smelly in some other project.</a:t>
             </a:r>
           </a:p>
           <a:p>
@@ -9838,7 +11747,7 @@
             <a:pPr lvl="1"/>
             <a:r>
               <a:rPr lang="en-US" dirty="0"/>
-              <a:t>Code semantic meanings on context, depends in training data</a:t>
+              <a:t>Code semantic meanings on context, depends on training data</a:t>
             </a:r>
           </a:p>
           <a:p>
@@ -9865,6 +11774,36 @@
               <a:rPr lang="en-IN" dirty="0"/>
               <a:t>difficult to change settings and fine tune based on user preference.</a:t>
             </a:r>
+          </a:p>
+        </p:txBody>
+      </p:sp>
+      <p:sp>
+        <p:nvSpPr>
+          <p:cNvPr id="4" name="Slide Number Placeholder 3">
+            <a:extLst>
+              <a:ext uri="{FF2B5EF4-FFF2-40B4-BE49-F238E27FC236}">
+                <a16:creationId xmlns:a16="http://schemas.microsoft.com/office/drawing/2014/main" id="{39B13807-B88F-861E-D990-57519CE5E888}"/>
+              </a:ext>
+            </a:extLst>
+          </p:cNvPr>
+          <p:cNvSpPr>
+            <a:spLocks noGrp="1"/>
+          </p:cNvSpPr>
+          <p:nvPr>
+            <p:ph type="sldNum" sz="quarter" idx="12"/>
+          </p:nvPr>
+        </p:nvSpPr>
+        <p:spPr/>
+        <p:txBody>
+          <a:bodyPr/>
+          <a:lstStyle/>
+          <a:p>
+            <a:fld id="{D57F1E4F-1CFF-5643-939E-217C01CDF565}" type="slidenum">
+              <a:rPr lang="en-US" smtClean="0"/>
+              <a:pPr/>
+              <a:t>6</a:t>
+            </a:fld>
+            <a:endParaRPr lang="en-US" dirty="0"/>
           </a:p>
         </p:txBody>
       </p:sp>
@@ -9881,7 +11820,7 @@
 </p:sld>
 </file>
 
-<file path=ppt/slides/slide6.xml><?xml version="1.0" encoding="utf-8"?>
+<file path=ppt/slides/slide7.xml><?xml version="1.0" encoding="utf-8"?>
 <p:sld xmlns:a="http://schemas.openxmlformats.org/drawingml/2006/main" xmlns:r="http://schemas.openxmlformats.org/officeDocument/2006/relationships" xmlns:p="http://schemas.openxmlformats.org/presentationml/2006/main">
   <p:cSld>
     <p:spTree>
@@ -10016,6 +11955,36 @@
           </a:p>
         </p:txBody>
       </p:sp>
+      <p:sp>
+        <p:nvSpPr>
+          <p:cNvPr id="4" name="Slide Number Placeholder 3">
+            <a:extLst>
+              <a:ext uri="{FF2B5EF4-FFF2-40B4-BE49-F238E27FC236}">
+                <a16:creationId xmlns:a16="http://schemas.microsoft.com/office/drawing/2014/main" id="{42D35B33-F8F1-B839-61AD-6D6A33D7066B}"/>
+              </a:ext>
+            </a:extLst>
+          </p:cNvPr>
+          <p:cNvSpPr>
+            <a:spLocks noGrp="1"/>
+          </p:cNvSpPr>
+          <p:nvPr>
+            <p:ph type="sldNum" sz="quarter" idx="12"/>
+          </p:nvPr>
+        </p:nvSpPr>
+        <p:spPr/>
+        <p:txBody>
+          <a:bodyPr/>
+          <a:lstStyle/>
+          <a:p>
+            <a:fld id="{D57F1E4F-1CFF-5643-939E-217C01CDF565}" type="slidenum">
+              <a:rPr lang="en-US" smtClean="0"/>
+              <a:pPr/>
+              <a:t>7</a:t>
+            </a:fld>
+            <a:endParaRPr lang="en-US" dirty="0"/>
+          </a:p>
+        </p:txBody>
+      </p:sp>
     </p:spTree>
     <p:extLst>
       <p:ext uri="{BB962C8B-B14F-4D97-AF65-F5344CB8AC3E}">
@@ -10029,7 +11998,7 @@
 </p:sld>
 </file>
 
-<file path=ppt/slides/slide7.xml><?xml version="1.0" encoding="utf-8"?>
+<file path=ppt/slides/slide8.xml><?xml version="1.0" encoding="utf-8"?>
 <p:sld xmlns:a="http://schemas.openxmlformats.org/drawingml/2006/main" xmlns:r="http://schemas.openxmlformats.org/officeDocument/2006/relationships" xmlns:p="http://schemas.openxmlformats.org/presentationml/2006/main">
   <p:cSld>
     <p:spTree>
@@ -10157,6 +12126,36 @@
           </a:p>
         </p:txBody>
       </p:sp>
+      <p:sp>
+        <p:nvSpPr>
+          <p:cNvPr id="4" name="Slide Number Placeholder 3">
+            <a:extLst>
+              <a:ext uri="{FF2B5EF4-FFF2-40B4-BE49-F238E27FC236}">
+                <a16:creationId xmlns:a16="http://schemas.microsoft.com/office/drawing/2014/main" id="{75B26837-2BFC-DF5D-4A62-5E0B39337F6C}"/>
+              </a:ext>
+            </a:extLst>
+          </p:cNvPr>
+          <p:cNvSpPr>
+            <a:spLocks noGrp="1"/>
+          </p:cNvSpPr>
+          <p:nvPr>
+            <p:ph type="sldNum" sz="quarter" idx="12"/>
+          </p:nvPr>
+        </p:nvSpPr>
+        <p:spPr/>
+        <p:txBody>
+          <a:bodyPr/>
+          <a:lstStyle/>
+          <a:p>
+            <a:fld id="{D57F1E4F-1CFF-5643-939E-217C01CDF565}" type="slidenum">
+              <a:rPr lang="en-US" smtClean="0"/>
+              <a:pPr/>
+              <a:t>8</a:t>
+            </a:fld>
+            <a:endParaRPr lang="en-US" dirty="0"/>
+          </a:p>
+        </p:txBody>
+      </p:sp>
     </p:spTree>
     <p:extLst>
       <p:ext uri="{BB962C8B-B14F-4D97-AF65-F5344CB8AC3E}">
@@ -10170,7 +12169,7 @@
 </p:sld>
 </file>
 
-<file path=ppt/slides/slide8.xml><?xml version="1.0" encoding="utf-8"?>
+<file path=ppt/slides/slide9.xml><?xml version="1.0" encoding="utf-8"?>
 <p:sld xmlns:a="http://schemas.openxmlformats.org/drawingml/2006/main" xmlns:r="http://schemas.openxmlformats.org/officeDocument/2006/relationships" xmlns:p="http://schemas.openxmlformats.org/presentationml/2006/main">
   <p:cSld>
     <p:spTree>
@@ -10340,211 +12339,40 @@
           </a:p>
         </p:txBody>
       </p:sp>
+      <p:sp>
+        <p:nvSpPr>
+          <p:cNvPr id="4" name="Slide Number Placeholder 3">
+            <a:extLst>
+              <a:ext uri="{FF2B5EF4-FFF2-40B4-BE49-F238E27FC236}">
+                <a16:creationId xmlns:a16="http://schemas.microsoft.com/office/drawing/2014/main" id="{E316377E-6CA0-7948-553D-07A825B6F9B0}"/>
+              </a:ext>
+            </a:extLst>
+          </p:cNvPr>
+          <p:cNvSpPr>
+            <a:spLocks noGrp="1"/>
+          </p:cNvSpPr>
+          <p:nvPr>
+            <p:ph type="sldNum" sz="quarter" idx="12"/>
+          </p:nvPr>
+        </p:nvSpPr>
+        <p:spPr/>
+        <p:txBody>
+          <a:bodyPr/>
+          <a:lstStyle/>
+          <a:p>
+            <a:fld id="{D57F1E4F-1CFF-5643-939E-217C01CDF565}" type="slidenum">
+              <a:rPr lang="en-US" smtClean="0"/>
+              <a:pPr/>
+              <a:t>9</a:t>
+            </a:fld>
+            <a:endParaRPr lang="en-US" dirty="0"/>
+          </a:p>
+        </p:txBody>
+      </p:sp>
     </p:spTree>
     <p:extLst>
       <p:ext uri="{BB962C8B-B14F-4D97-AF65-F5344CB8AC3E}">
         <p14:creationId xmlns:p14="http://schemas.microsoft.com/office/powerpoint/2010/main" val="3409852229"/>
-      </p:ext>
-    </p:extLst>
-  </p:cSld>
-  <p:clrMapOvr>
-    <a:masterClrMapping/>
-  </p:clrMapOvr>
-</p:sld>
-</file>
-
-<file path=ppt/slides/slide9.xml><?xml version="1.0" encoding="utf-8"?>
-<p:sld xmlns:a="http://schemas.openxmlformats.org/drawingml/2006/main" xmlns:r="http://schemas.openxmlformats.org/officeDocument/2006/relationships" xmlns:p="http://schemas.openxmlformats.org/presentationml/2006/main">
-  <p:cSld>
-    <p:spTree>
-      <p:nvGrpSpPr>
-        <p:cNvPr id="1" name="">
-          <a:extLst>
-            <a:ext uri="{FF2B5EF4-FFF2-40B4-BE49-F238E27FC236}">
-              <a16:creationId xmlns:a16="http://schemas.microsoft.com/office/drawing/2014/main" id="{210B94F8-BF55-5CA6-32BE-94BD832DA418}"/>
-            </a:ext>
-          </a:extLst>
-        </p:cNvPr>
-        <p:cNvGrpSpPr/>
-        <p:nvPr/>
-      </p:nvGrpSpPr>
-      <p:grpSpPr>
-        <a:xfrm>
-          <a:off x="0" y="0"/>
-          <a:ext cx="0" cy="0"/>
-          <a:chOff x="0" y="0"/>
-          <a:chExt cx="0" cy="0"/>
-        </a:xfrm>
-      </p:grpSpPr>
-      <p:sp>
-        <p:nvSpPr>
-          <p:cNvPr id="2" name="Title 1">
-            <a:extLst>
-              <a:ext uri="{FF2B5EF4-FFF2-40B4-BE49-F238E27FC236}">
-                <a16:creationId xmlns:a16="http://schemas.microsoft.com/office/drawing/2014/main" id="{42672787-B530-95A5-FC5D-F557C0462F50}"/>
-              </a:ext>
-            </a:extLst>
-          </p:cNvPr>
-          <p:cNvSpPr>
-            <a:spLocks noGrp="1"/>
-          </p:cNvSpPr>
-          <p:nvPr>
-            <p:ph type="title"/>
-          </p:nvPr>
-        </p:nvSpPr>
-        <p:spPr>
-          <a:xfrm>
-            <a:off x="677334" y="609600"/>
-            <a:ext cx="8596668" cy="635726"/>
-          </a:xfrm>
-        </p:spPr>
-        <p:txBody>
-          <a:bodyPr>
-            <a:noAutofit/>
-          </a:bodyPr>
-          <a:lstStyle/>
-          <a:p>
-            <a:r>
-              <a:rPr lang="en-US" dirty="0"/>
-              <a:t>Base Paper Description</a:t>
-            </a:r>
-            <a:endParaRPr lang="en-IN" dirty="0"/>
-          </a:p>
-        </p:txBody>
-      </p:sp>
-      <p:sp>
-        <p:nvSpPr>
-          <p:cNvPr id="3" name="Content Placeholder 2">
-            <a:extLst>
-              <a:ext uri="{FF2B5EF4-FFF2-40B4-BE49-F238E27FC236}">
-                <a16:creationId xmlns:a16="http://schemas.microsoft.com/office/drawing/2014/main" id="{87BC5DBE-EB6D-8304-529B-38B03D5D8FBA}"/>
-              </a:ext>
-            </a:extLst>
-          </p:cNvPr>
-          <p:cNvSpPr>
-            <a:spLocks noGrp="1"/>
-          </p:cNvSpPr>
-          <p:nvPr>
-            <p:ph idx="1"/>
-          </p:nvPr>
-        </p:nvSpPr>
-        <p:spPr>
-          <a:xfrm>
-            <a:off x="677334" y="1384663"/>
-            <a:ext cx="9330266" cy="5005977"/>
-          </a:xfrm>
-        </p:spPr>
-        <p:txBody>
-          <a:bodyPr>
-            <a:normAutofit fontScale="92500" lnSpcReduction="20000"/>
-          </a:bodyPr>
-          <a:lstStyle/>
-          <a:p>
-            <a:r>
-              <a:rPr lang="en-US" b="1" dirty="0"/>
-              <a:t>Name - </a:t>
-            </a:r>
-            <a:r>
-              <a:rPr lang="en-US" dirty="0"/>
-              <a:t>Improving Code Smell Detection by Reducing Dimensionality Using Ensemble Feature Selection and Machine Learning</a:t>
-            </a:r>
-          </a:p>
-          <a:p>
-            <a:r>
-              <a:rPr lang="en-US" b="1" dirty="0"/>
-              <a:t>Link - </a:t>
-            </a:r>
-            <a:r>
-              <a:rPr lang="en-US" dirty="0">
-                <a:hlinkClick r:id="rId2"/>
-              </a:rPr>
-              <a:t>https://link.springer.com/article/10.1007/s42979-024-03013-x</a:t>
-            </a:r>
-            <a:endParaRPr lang="en-US" dirty="0"/>
-          </a:p>
-          <a:p>
-            <a:r>
-              <a:rPr lang="en-US" b="1" dirty="0"/>
-              <a:t>Journal</a:t>
-            </a:r>
-            <a:r>
-              <a:rPr lang="en-US" dirty="0"/>
-              <a:t> - SN Computer Science</a:t>
-            </a:r>
-          </a:p>
-          <a:p>
-            <a:r>
-              <a:rPr lang="en-US" b="1" dirty="0"/>
-              <a:t>Year</a:t>
-            </a:r>
-            <a:r>
-              <a:rPr lang="en-US" dirty="0"/>
-              <a:t> – 2024</a:t>
-            </a:r>
-          </a:p>
-          <a:p>
-            <a:r>
-              <a:rPr lang="en-US" b="1" dirty="0"/>
-              <a:t>Abstract -</a:t>
-            </a:r>
-            <a:r>
-              <a:rPr lang="en-US" dirty="0"/>
-              <a:t> It proposes a new </a:t>
-            </a:r>
-            <a:r>
-              <a:rPr lang="en-US" b="1" dirty="0"/>
-              <a:t>ensemble feature selection </a:t>
-            </a:r>
-            <a:r>
-              <a:rPr lang="en-US" dirty="0"/>
-              <a:t>technique that performs dimensionality reduction and selects optimal features for the machine learning classifiers. </a:t>
-            </a:r>
-          </a:p>
-          <a:p>
-            <a:r>
-              <a:rPr lang="en-US" dirty="0"/>
-              <a:t>Dataset - This paper dataset ‘</a:t>
-            </a:r>
-            <a:r>
-              <a:rPr lang="en-US" dirty="0" err="1"/>
-              <a:t>Qualitas</a:t>
-            </a:r>
-            <a:r>
-              <a:rPr lang="en-US" dirty="0"/>
-              <a:t> Corpus’ (http://qualitascorpus.com/download/).</a:t>
-            </a:r>
-          </a:p>
-          <a:p>
-            <a:r>
-              <a:rPr lang="en-US" dirty="0"/>
-              <a:t>State-of-the-art Fisher’s Score and Sequential Forward feature selection techniques are sequentially ensemble in order to perform optimal dimensionality reduction. </a:t>
-            </a:r>
-          </a:p>
-          <a:p>
-            <a:r>
-              <a:rPr lang="en-US" dirty="0"/>
-              <a:t>Detect a total of six code smells from the dataset namely God Class (GC), Refused Bequest (RB), Shotgun Surgery (SS), Feature Envy (FE), Long Method (LM) and Long Parameter List (LPL). </a:t>
-            </a:r>
-          </a:p>
-          <a:p>
-            <a:r>
-              <a:rPr lang="en-US" dirty="0"/>
-              <a:t>The 6 considered ML classifiers are J48, Random forest, Naive Bayes, kNN, SVM, and Decision Tree. </a:t>
-            </a:r>
-          </a:p>
-          <a:p>
-            <a:r>
-              <a:rPr lang="en-US" dirty="0"/>
-              <a:t>The performance of various classifiers is evaluated using five performance measures namely Precision, Recall, F-Measure, Accuracy, and Area Under the ROC-AUC curve.</a:t>
-            </a:r>
-            <a:endParaRPr lang="en-IN" dirty="0"/>
-          </a:p>
-        </p:txBody>
-      </p:sp>
-    </p:spTree>
-    <p:extLst>
-      <p:ext uri="{BB962C8B-B14F-4D97-AF65-F5344CB8AC3E}">
-        <p14:creationId xmlns:p14="http://schemas.microsoft.com/office/powerpoint/2010/main" val="2382418076"/>
       </p:ext>
     </p:extLst>
   </p:cSld>
@@ -10809,4 +12637,299 @@
     </a:ext>
   </a:extLst>
 </a:theme>
+</file>
+
+<file path=ppt/theme/theme2.xml><?xml version="1.0" encoding="utf-8"?>
+<a:theme xmlns:a="http://schemas.openxmlformats.org/drawingml/2006/main" name="Office Theme">
+  <a:themeElements>
+    <a:clrScheme name="Office">
+      <a:dk1>
+        <a:sysClr val="windowText" lastClr="000000"/>
+      </a:dk1>
+      <a:lt1>
+        <a:sysClr val="window" lastClr="FFFFFF"/>
+      </a:lt1>
+      <a:dk2>
+        <a:srgbClr val="44546A"/>
+      </a:dk2>
+      <a:lt2>
+        <a:srgbClr val="E7E6E6"/>
+      </a:lt2>
+      <a:accent1>
+        <a:srgbClr val="4472C4"/>
+      </a:accent1>
+      <a:accent2>
+        <a:srgbClr val="ED7D31"/>
+      </a:accent2>
+      <a:accent3>
+        <a:srgbClr val="A5A5A5"/>
+      </a:accent3>
+      <a:accent4>
+        <a:srgbClr val="FFC000"/>
+      </a:accent4>
+      <a:accent5>
+        <a:srgbClr val="5B9BD5"/>
+      </a:accent5>
+      <a:accent6>
+        <a:srgbClr val="70AD47"/>
+      </a:accent6>
+      <a:hlink>
+        <a:srgbClr val="0563C1"/>
+      </a:hlink>
+      <a:folHlink>
+        <a:srgbClr val="954F72"/>
+      </a:folHlink>
+    </a:clrScheme>
+    <a:fontScheme name="Office">
+      <a:majorFont>
+        <a:latin typeface="Calibri Light" panose="020F0302020204030204"/>
+        <a:ea typeface=""/>
+        <a:cs typeface=""/>
+        <a:font script="Jpan" typeface="游ゴシック Light"/>
+        <a:font script="Hang" typeface="맑은 고딕"/>
+        <a:font script="Hans" typeface="等线 Light"/>
+        <a:font script="Hant" typeface="新細明體"/>
+        <a:font script="Arab" typeface="Times New Roman"/>
+        <a:font script="Hebr" typeface="Times New Roman"/>
+        <a:font script="Thai" typeface="Angsana New"/>
+        <a:font script="Ethi" typeface="Nyala"/>
+        <a:font script="Beng" typeface="Vrinda"/>
+        <a:font script="Gujr" typeface="Shruti"/>
+        <a:font script="Khmr" typeface="MoolBoran"/>
+        <a:font script="Knda" typeface="Tunga"/>
+        <a:font script="Guru" typeface="Raavi"/>
+        <a:font script="Cans" typeface="Euphemia"/>
+        <a:font script="Cher" typeface="Plantagenet Cherokee"/>
+        <a:font script="Yiii" typeface="Microsoft Yi Baiti"/>
+        <a:font script="Tibt" typeface="Microsoft Himalaya"/>
+        <a:font script="Thaa" typeface="MV Boli"/>
+        <a:font script="Deva" typeface="Mangal"/>
+        <a:font script="Telu" typeface="Gautami"/>
+        <a:font script="Taml" typeface="Latha"/>
+        <a:font script="Syrc" typeface="Estrangelo Edessa"/>
+        <a:font script="Orya" typeface="Kalinga"/>
+        <a:font script="Mlym" typeface="Kartika"/>
+        <a:font script="Laoo" typeface="DokChampa"/>
+        <a:font script="Sinh" typeface="Iskoola Pota"/>
+        <a:font script="Mong" typeface="Mongolian Baiti"/>
+        <a:font script="Viet" typeface="Times New Roman"/>
+        <a:font script="Uigh" typeface="Microsoft Uighur"/>
+        <a:font script="Geor" typeface="Sylfaen"/>
+        <a:font script="Armn" typeface="Arial"/>
+        <a:font script="Bugi" typeface="Leelawadee UI"/>
+        <a:font script="Bopo" typeface="Microsoft JhengHei"/>
+        <a:font script="Java" typeface="Javanese Text"/>
+        <a:font script="Lisu" typeface="Segoe UI"/>
+        <a:font script="Mymr" typeface="Myanmar Text"/>
+        <a:font script="Nkoo" typeface="Ebrima"/>
+        <a:font script="Olck" typeface="Nirmala UI"/>
+        <a:font script="Osma" typeface="Ebrima"/>
+        <a:font script="Phag" typeface="Phagspa"/>
+        <a:font script="Syrn" typeface="Estrangelo Edessa"/>
+        <a:font script="Syrj" typeface="Estrangelo Edessa"/>
+        <a:font script="Syre" typeface="Estrangelo Edessa"/>
+        <a:font script="Sora" typeface="Nirmala UI"/>
+        <a:font script="Tale" typeface="Microsoft Tai Le"/>
+        <a:font script="Talu" typeface="Microsoft New Tai Lue"/>
+        <a:font script="Tfng" typeface="Ebrima"/>
+      </a:majorFont>
+      <a:minorFont>
+        <a:latin typeface="Calibri" panose="020F0502020204030204"/>
+        <a:ea typeface=""/>
+        <a:cs typeface=""/>
+        <a:font script="Jpan" typeface="游ゴシック"/>
+        <a:font script="Hang" typeface="맑은 고딕"/>
+        <a:font script="Hans" typeface="等线"/>
+        <a:font script="Hant" typeface="新細明體"/>
+        <a:font script="Arab" typeface="Arial"/>
+        <a:font script="Hebr" typeface="Arial"/>
+        <a:font script="Thai" typeface="Cordia New"/>
+        <a:font script="Ethi" typeface="Nyala"/>
+        <a:font script="Beng" typeface="Vrinda"/>
+        <a:font script="Gujr" typeface="Shruti"/>
+        <a:font script="Khmr" typeface="DaunPenh"/>
+        <a:font script="Knda" typeface="Tunga"/>
+        <a:font script="Guru" typeface="Raavi"/>
+        <a:font script="Cans" typeface="Euphemia"/>
+        <a:font script="Cher" typeface="Plantagenet Cherokee"/>
+        <a:font script="Yiii" typeface="Microsoft Yi Baiti"/>
+        <a:font script="Tibt" typeface="Microsoft Himalaya"/>
+        <a:font script="Thaa" typeface="MV Boli"/>
+        <a:font script="Deva" typeface="Mangal"/>
+        <a:font script="Telu" typeface="Gautami"/>
+        <a:font script="Taml" typeface="Latha"/>
+        <a:font script="Syrc" typeface="Estrangelo Edessa"/>
+        <a:font script="Orya" typeface="Kalinga"/>
+        <a:font script="Mlym" typeface="Kartika"/>
+        <a:font script="Laoo" typeface="DokChampa"/>
+        <a:font script="Sinh" typeface="Iskoola Pota"/>
+        <a:font script="Mong" typeface="Mongolian Baiti"/>
+        <a:font script="Viet" typeface="Arial"/>
+        <a:font script="Uigh" typeface="Microsoft Uighur"/>
+        <a:font script="Geor" typeface="Sylfaen"/>
+        <a:font script="Armn" typeface="Arial"/>
+        <a:font script="Bugi" typeface="Leelawadee UI"/>
+        <a:font script="Bopo" typeface="Microsoft JhengHei"/>
+        <a:font script="Java" typeface="Javanese Text"/>
+        <a:font script="Lisu" typeface="Segoe UI"/>
+        <a:font script="Mymr" typeface="Myanmar Text"/>
+        <a:font script="Nkoo" typeface="Ebrima"/>
+        <a:font script="Olck" typeface="Nirmala UI"/>
+        <a:font script="Osma" typeface="Ebrima"/>
+        <a:font script="Phag" typeface="Phagspa"/>
+        <a:font script="Syrn" typeface="Estrangelo Edessa"/>
+        <a:font script="Syrj" typeface="Estrangelo Edessa"/>
+        <a:font script="Syre" typeface="Estrangelo Edessa"/>
+        <a:font script="Sora" typeface="Nirmala UI"/>
+        <a:font script="Tale" typeface="Microsoft Tai Le"/>
+        <a:font script="Talu" typeface="Microsoft New Tai Lue"/>
+        <a:font script="Tfng" typeface="Ebrima"/>
+      </a:minorFont>
+    </a:fontScheme>
+    <a:fmtScheme name="Office">
+      <a:fillStyleLst>
+        <a:solidFill>
+          <a:schemeClr val="phClr"/>
+        </a:solidFill>
+        <a:gradFill rotWithShape="1">
+          <a:gsLst>
+            <a:gs pos="0">
+              <a:schemeClr val="phClr">
+                <a:lumMod val="110000"/>
+                <a:satMod val="105000"/>
+                <a:tint val="67000"/>
+              </a:schemeClr>
+            </a:gs>
+            <a:gs pos="50000">
+              <a:schemeClr val="phClr">
+                <a:lumMod val="105000"/>
+                <a:satMod val="103000"/>
+                <a:tint val="73000"/>
+              </a:schemeClr>
+            </a:gs>
+            <a:gs pos="100000">
+              <a:schemeClr val="phClr">
+                <a:lumMod val="105000"/>
+                <a:satMod val="109000"/>
+                <a:tint val="81000"/>
+              </a:schemeClr>
+            </a:gs>
+          </a:gsLst>
+          <a:lin ang="5400000" scaled="0"/>
+        </a:gradFill>
+        <a:gradFill rotWithShape="1">
+          <a:gsLst>
+            <a:gs pos="0">
+              <a:schemeClr val="phClr">
+                <a:satMod val="103000"/>
+                <a:lumMod val="102000"/>
+                <a:tint val="94000"/>
+              </a:schemeClr>
+            </a:gs>
+            <a:gs pos="50000">
+              <a:schemeClr val="phClr">
+                <a:satMod val="110000"/>
+                <a:lumMod val="100000"/>
+                <a:shade val="100000"/>
+              </a:schemeClr>
+            </a:gs>
+            <a:gs pos="100000">
+              <a:schemeClr val="phClr">
+                <a:lumMod val="99000"/>
+                <a:satMod val="120000"/>
+                <a:shade val="78000"/>
+              </a:schemeClr>
+            </a:gs>
+          </a:gsLst>
+          <a:lin ang="5400000" scaled="0"/>
+        </a:gradFill>
+      </a:fillStyleLst>
+      <a:lnStyleLst>
+        <a:ln w="6350" cap="flat" cmpd="sng" algn="ctr">
+          <a:solidFill>
+            <a:schemeClr val="phClr"/>
+          </a:solidFill>
+          <a:prstDash val="solid"/>
+          <a:miter lim="800000"/>
+        </a:ln>
+        <a:ln w="12700" cap="flat" cmpd="sng" algn="ctr">
+          <a:solidFill>
+            <a:schemeClr val="phClr"/>
+          </a:solidFill>
+          <a:prstDash val="solid"/>
+          <a:miter lim="800000"/>
+        </a:ln>
+        <a:ln w="19050" cap="flat" cmpd="sng" algn="ctr">
+          <a:solidFill>
+            <a:schemeClr val="phClr"/>
+          </a:solidFill>
+          <a:prstDash val="solid"/>
+          <a:miter lim="800000"/>
+        </a:ln>
+      </a:lnStyleLst>
+      <a:effectStyleLst>
+        <a:effectStyle>
+          <a:effectLst/>
+        </a:effectStyle>
+        <a:effectStyle>
+          <a:effectLst/>
+        </a:effectStyle>
+        <a:effectStyle>
+          <a:effectLst>
+            <a:outerShdw blurRad="57150" dist="19050" dir="5400000" algn="ctr" rotWithShape="0">
+              <a:srgbClr val="000000">
+                <a:alpha val="63000"/>
+              </a:srgbClr>
+            </a:outerShdw>
+          </a:effectLst>
+        </a:effectStyle>
+      </a:effectStyleLst>
+      <a:bgFillStyleLst>
+        <a:solidFill>
+          <a:schemeClr val="phClr"/>
+        </a:solidFill>
+        <a:solidFill>
+          <a:schemeClr val="phClr">
+            <a:tint val="95000"/>
+            <a:satMod val="170000"/>
+          </a:schemeClr>
+        </a:solidFill>
+        <a:gradFill rotWithShape="1">
+          <a:gsLst>
+            <a:gs pos="0">
+              <a:schemeClr val="phClr">
+                <a:tint val="93000"/>
+                <a:satMod val="150000"/>
+                <a:shade val="98000"/>
+                <a:lumMod val="102000"/>
+              </a:schemeClr>
+            </a:gs>
+            <a:gs pos="50000">
+              <a:schemeClr val="phClr">
+                <a:tint val="98000"/>
+                <a:satMod val="130000"/>
+                <a:shade val="90000"/>
+                <a:lumMod val="103000"/>
+              </a:schemeClr>
+            </a:gs>
+            <a:gs pos="100000">
+              <a:schemeClr val="phClr">
+                <a:shade val="63000"/>
+                <a:satMod val="120000"/>
+              </a:schemeClr>
+            </a:gs>
+          </a:gsLst>
+          <a:lin ang="5400000" scaled="0"/>
+        </a:gradFill>
+      </a:bgFillStyleLst>
+    </a:fmtScheme>
+  </a:themeElements>
+  <a:objectDefaults/>
+  <a:extraClrSchemeLst/>
+  <a:extLst>
+    <a:ext uri="{05A4C25C-085E-4340-85A3-A5531E510DB2}">
+      <thm15:themeFamily xmlns:thm15="http://schemas.microsoft.com/office/thememl/2012/main" name="Office Theme" id="{62F939B6-93AF-4DB8-9C6B-D6C7DFDC589F}" vid="{4A3C46E8-61CC-4603-A589-7422A47A8E4A}"/>
+    </a:ext>
+  </a:extLst>
+</a:theme>
 </file>
</xml_diff>

<commit_message>
Change: added 6 codesmells
</commit_message>
<xml_diff>
--- a/CodeSmell.pptx
+++ b/CodeSmell.pptx
@@ -16,15 +16,15 @@
     <p:sldId id="280" r:id="rId7"/>
     <p:sldId id="278" r:id="rId8"/>
     <p:sldId id="281" r:id="rId9"/>
-    <p:sldId id="258" r:id="rId10"/>
-    <p:sldId id="282" r:id="rId11"/>
-    <p:sldId id="259" r:id="rId12"/>
-    <p:sldId id="260" r:id="rId13"/>
-    <p:sldId id="261" r:id="rId14"/>
-    <p:sldId id="265" r:id="rId15"/>
-    <p:sldId id="283" r:id="rId16"/>
-    <p:sldId id="285" r:id="rId17"/>
-    <p:sldId id="284" r:id="rId18"/>
+    <p:sldId id="282" r:id="rId10"/>
+    <p:sldId id="259" r:id="rId11"/>
+    <p:sldId id="260" r:id="rId12"/>
+    <p:sldId id="261" r:id="rId13"/>
+    <p:sldId id="265" r:id="rId14"/>
+    <p:sldId id="283" r:id="rId15"/>
+    <p:sldId id="285" r:id="rId16"/>
+    <p:sldId id="284" r:id="rId17"/>
+    <p:sldId id="292" r:id="rId18"/>
     <p:sldId id="286" r:id="rId19"/>
     <p:sldId id="287" r:id="rId20"/>
     <p:sldId id="288" r:id="rId21"/>
@@ -218,7 +218,7 @@
           <a:p>
             <a:fld id="{3477A0F4-F4B0-47AB-8AD3-20B19DF9E985}" type="datetimeFigureOut">
               <a:rPr lang="en-IN" smtClean="0"/>
-              <a:t>03-04-2025</a:t>
+              <a:t>05-04-2025</a:t>
             </a:fld>
             <a:endParaRPr lang="en-IN"/>
           </a:p>
@@ -1208,7 +1208,7 @@
           <a:p>
             <a:fld id="{F5216777-8CF8-44EF-918D-95D52E42AA54}" type="datetime1">
               <a:rPr lang="en-US" smtClean="0"/>
-              <a:t>4/3/2025</a:t>
+              <a:t>4/5/2025</a:t>
             </a:fld>
             <a:endParaRPr lang="en-US" dirty="0"/>
           </a:p>
@@ -1455,7 +1455,7 @@
           <a:p>
             <a:fld id="{C9D32BD1-F3ED-4813-85AF-BECC294657EF}" type="datetime1">
               <a:rPr lang="en-US" smtClean="0"/>
-              <a:t>4/3/2025</a:t>
+              <a:t>4/5/2025</a:t>
             </a:fld>
             <a:endParaRPr lang="en-US" dirty="0"/>
           </a:p>
@@ -1765,7 +1765,7 @@
           <a:p>
             <a:fld id="{9FAB4F2F-5C14-4288-BED3-014E7FC07CA5}" type="datetime1">
               <a:rPr lang="en-US" smtClean="0"/>
-              <a:t>4/3/2025</a:t>
+              <a:t>4/5/2025</a:t>
             </a:fld>
             <a:endParaRPr lang="en-US" dirty="0"/>
           </a:p>
@@ -2102,7 +2102,7 @@
           <a:p>
             <a:fld id="{AFE3FA00-20E5-4A4C-BAA8-07B798C3E2BD}" type="datetime1">
               <a:rPr lang="en-US" smtClean="0"/>
-              <a:t>4/3/2025</a:t>
+              <a:t>4/5/2025</a:t>
             </a:fld>
             <a:endParaRPr lang="en-US" dirty="0"/>
           </a:p>
@@ -2412,7 +2412,7 @@
           <a:p>
             <a:fld id="{6F4CE6E6-2F32-4A83-9A37-70D1242ECAB6}" type="datetime1">
               <a:rPr lang="en-US" smtClean="0"/>
-              <a:t>4/3/2025</a:t>
+              <a:t>4/5/2025</a:t>
             </a:fld>
             <a:endParaRPr lang="en-US" dirty="0"/>
           </a:p>
@@ -2801,7 +2801,7 @@
           <a:p>
             <a:fld id="{6715C4D8-B5D6-4776-97F7-E88E156E5654}" type="datetime1">
               <a:rPr lang="en-US" smtClean="0"/>
-              <a:t>4/3/2025</a:t>
+              <a:t>4/5/2025</a:t>
             </a:fld>
             <a:endParaRPr lang="en-US" dirty="0"/>
           </a:p>
@@ -2967,7 +2967,7 @@
           <a:p>
             <a:fld id="{F41EEF30-2CB4-4570-B5B0-E499B56D6D14}" type="datetime1">
               <a:rPr lang="en-US" smtClean="0"/>
-              <a:t>4/3/2025</a:t>
+              <a:t>4/5/2025</a:t>
             </a:fld>
             <a:endParaRPr lang="en-US" dirty="0"/>
           </a:p>
@@ -3142,7 +3142,7 @@
           <a:p>
             <a:fld id="{AA065F5D-77F6-475F-B01F-10D1CD8DB549}" type="datetime1">
               <a:rPr lang="en-US" smtClean="0"/>
-              <a:t>4/3/2025</a:t>
+              <a:t>4/5/2025</a:t>
             </a:fld>
             <a:endParaRPr lang="en-US" dirty="0"/>
           </a:p>
@@ -3314,7 +3314,7 @@
           <a:p>
             <a:fld id="{1F33A9EA-982D-4C95-BE30-80266B31B5C1}" type="datetime1">
               <a:rPr lang="en-US" smtClean="0"/>
-              <a:t>4/3/2025</a:t>
+              <a:t>4/5/2025</a:t>
             </a:fld>
             <a:endParaRPr lang="en-US" dirty="0"/>
           </a:p>
@@ -3557,7 +3557,7 @@
           <a:p>
             <a:fld id="{A0A73C04-3D1F-411B-A909-DDCC763A5C00}" type="datetime1">
               <a:rPr lang="en-US" smtClean="0"/>
-              <a:t>4/3/2025</a:t>
+              <a:t>4/5/2025</a:t>
             </a:fld>
             <a:endParaRPr lang="en-US" dirty="0"/>
           </a:p>
@@ -3785,7 +3785,7 @@
           <a:p>
             <a:fld id="{8928AD85-DA1C-41FB-B7AD-144E0E16F6B6}" type="datetime1">
               <a:rPr lang="en-US" smtClean="0"/>
-              <a:t>4/3/2025</a:t>
+              <a:t>4/5/2025</a:t>
             </a:fld>
             <a:endParaRPr lang="en-US" dirty="0"/>
           </a:p>
@@ -4154,7 +4154,7 @@
           <a:p>
             <a:fld id="{0B3D44CA-F9BF-49FB-8D37-754D687697D5}" type="datetime1">
               <a:rPr lang="en-US" smtClean="0"/>
-              <a:t>4/3/2025</a:t>
+              <a:t>4/5/2025</a:t>
             </a:fld>
             <a:endParaRPr lang="en-US" dirty="0"/>
           </a:p>
@@ -4273,7 +4273,7 @@
           <a:p>
             <a:fld id="{1C523E35-C864-4A29-ACE9-100F432E4952}" type="datetime1">
               <a:rPr lang="en-US" smtClean="0"/>
-              <a:t>4/3/2025</a:t>
+              <a:t>4/5/2025</a:t>
             </a:fld>
             <a:endParaRPr lang="en-US" dirty="0"/>
           </a:p>
@@ -4364,7 +4364,7 @@
           <a:p>
             <a:fld id="{D7DFBF09-6E3C-4688-9606-0E9C6F3613BA}" type="datetime1">
               <a:rPr lang="en-US" smtClean="0"/>
-              <a:t>4/3/2025</a:t>
+              <a:t>4/5/2025</a:t>
             </a:fld>
             <a:endParaRPr lang="en-US" dirty="0"/>
           </a:p>
@@ -4615,7 +4615,7 @@
           <a:p>
             <a:fld id="{7C045EC9-A980-4184-A543-9D019DCCC163}" type="datetime1">
               <a:rPr lang="en-US" smtClean="0"/>
-              <a:t>4/3/2025</a:t>
+              <a:t>4/5/2025</a:t>
             </a:fld>
             <a:endParaRPr lang="en-US" dirty="0"/>
           </a:p>
@@ -4873,7 +4873,7 @@
           <a:p>
             <a:fld id="{901550FA-0534-4AA0-BC1C-F5B34A59CB62}" type="datetime1">
               <a:rPr lang="en-US" smtClean="0"/>
-              <a:t>4/3/2025</a:t>
+              <a:t>4/5/2025</a:t>
             </a:fld>
             <a:endParaRPr lang="en-US" dirty="0"/>
           </a:p>
@@ -5612,7 +5612,7 @@
           <a:p>
             <a:fld id="{3034F704-DBC3-4027-A48D-1AF54B5EC8CB}" type="datetime1">
               <a:rPr lang="en-US" smtClean="0"/>
-              <a:t>4/3/2025</a:t>
+              <a:t>4/5/2025</a:t>
             </a:fld>
             <a:endParaRPr lang="en-US" dirty="0"/>
           </a:p>
@@ -6239,13 +6239,7 @@
   <p:cSld>
     <p:spTree>
       <p:nvGrpSpPr>
-        <p:cNvPr id="1" name="">
-          <a:extLst>
-            <a:ext uri="{FF2B5EF4-FFF2-40B4-BE49-F238E27FC236}">
-              <a16:creationId xmlns:a16="http://schemas.microsoft.com/office/drawing/2014/main" id="{210B94F8-BF55-5CA6-32BE-94BD832DA418}"/>
-            </a:ext>
-          </a:extLst>
-        </p:cNvPr>
+        <p:cNvPr id="1" name=""/>
         <p:cNvGrpSpPr/>
         <p:nvPr/>
       </p:nvGrpSpPr>
@@ -6259,13 +6253,7 @@
       </p:grpSpPr>
       <p:sp>
         <p:nvSpPr>
-          <p:cNvPr id="2" name="Title 1">
-            <a:extLst>
-              <a:ext uri="{FF2B5EF4-FFF2-40B4-BE49-F238E27FC236}">
-                <a16:creationId xmlns:a16="http://schemas.microsoft.com/office/drawing/2014/main" id="{42672787-B530-95A5-FC5D-F557C0462F50}"/>
-              </a:ext>
-            </a:extLst>
-          </p:cNvPr>
+          <p:cNvPr id="2" name="Title 1"/>
           <p:cNvSpPr>
             <a:spLocks noGrp="1"/>
           </p:cNvSpPr>
@@ -6275,19 +6263,17 @@
         </p:nvSpPr>
         <p:spPr>
           <a:xfrm>
-            <a:off x="677334" y="609600"/>
-            <a:ext cx="8596668" cy="635726"/>
+            <a:off x="677334" y="383177"/>
+            <a:ext cx="8596668" cy="775063"/>
           </a:xfrm>
         </p:spPr>
         <p:txBody>
-          <a:bodyPr>
-            <a:noAutofit/>
-          </a:bodyPr>
+          <a:bodyPr/>
           <a:lstStyle/>
           <a:p>
             <a:r>
               <a:rPr lang="en-US" dirty="0"/>
-              <a:t>Base Paper Description</a:t>
+              <a:t>Base Paper Dataset</a:t>
             </a:r>
             <a:endParaRPr lang="en-IN" dirty="0"/>
           </a:p>
@@ -6295,13 +6281,7 @@
       </p:sp>
       <p:sp>
         <p:nvSpPr>
-          <p:cNvPr id="3" name="Content Placeholder 2">
-            <a:extLst>
-              <a:ext uri="{FF2B5EF4-FFF2-40B4-BE49-F238E27FC236}">
-                <a16:creationId xmlns:a16="http://schemas.microsoft.com/office/drawing/2014/main" id="{87BC5DBE-EB6D-8304-529B-38B03D5D8FBA}"/>
-              </a:ext>
-            </a:extLst>
-          </p:cNvPr>
+          <p:cNvPr id="3" name="Content Placeholder 2"/>
           <p:cNvSpPr>
             <a:spLocks noGrp="1"/>
           </p:cNvSpPr>
@@ -6312,79 +6292,18 @@
         <p:spPr>
           <a:xfrm>
             <a:off x="677334" y="1384663"/>
-            <a:ext cx="9330266" cy="5005977"/>
+            <a:ext cx="8596668" cy="4656699"/>
           </a:xfrm>
         </p:spPr>
         <p:txBody>
           <a:bodyPr>
-            <a:normAutofit fontScale="92500" lnSpcReduction="20000"/>
+            <a:normAutofit/>
           </a:bodyPr>
           <a:lstStyle/>
           <a:p>
             <a:r>
-              <a:rPr lang="en-US" b="1" dirty="0"/>
-              <a:t>Name - </a:t>
-            </a:r>
-            <a:r>
-              <a:rPr lang="en-US" dirty="0"/>
-              <a:t>Improving Code Smell Detection by Reducing Dimensionality Using Ensemble Feature Selection and Machine Learning</a:t>
-            </a:r>
-          </a:p>
-          <a:p>
-            <a:r>
-              <a:rPr lang="en-US" b="1" dirty="0"/>
-              <a:t>Link - </a:t>
-            </a:r>
-            <a:r>
-              <a:rPr lang="en-US" dirty="0">
-                <a:hlinkClick r:id="rId2"/>
-              </a:rPr>
-              <a:t>https://link.springer.com/article/10.1007/s42979-024-03013-x</a:t>
-            </a:r>
-            <a:endParaRPr lang="en-US" dirty="0"/>
-          </a:p>
-          <a:p>
-            <a:r>
-              <a:rPr lang="en-US" b="1" dirty="0"/>
-              <a:t>Journal</a:t>
-            </a:r>
-            <a:r>
-              <a:rPr lang="en-US" dirty="0"/>
-              <a:t> - SN Computer Science</a:t>
-            </a:r>
-          </a:p>
-          <a:p>
-            <a:r>
-              <a:rPr lang="en-US" b="1" dirty="0"/>
-              <a:t>Year</a:t>
-            </a:r>
-            <a:r>
-              <a:rPr lang="en-US" dirty="0"/>
-              <a:t> – 2024</a:t>
-            </a:r>
-          </a:p>
-          <a:p>
-            <a:r>
-              <a:rPr lang="en-US" b="1" dirty="0"/>
-              <a:t>Abstract -</a:t>
-            </a:r>
-            <a:r>
-              <a:rPr lang="en-US" dirty="0"/>
-              <a:t> It proposes a new </a:t>
-            </a:r>
-            <a:r>
-              <a:rPr lang="en-US" b="1" dirty="0"/>
-              <a:t>ensemble feature selection </a:t>
-            </a:r>
-            <a:r>
-              <a:rPr lang="en-US" dirty="0"/>
-              <a:t>technique that performs dimensionality reduction and selects optimal features for the machine learning classifiers. </a:t>
-            </a:r>
-          </a:p>
-          <a:p>
-            <a:r>
-              <a:rPr lang="en-US" dirty="0"/>
-              <a:t>Dataset - This paper dataset ‘</a:t>
+              <a:rPr lang="en-US" dirty="0"/>
+              <a:t>The ‘</a:t>
             </a:r>
             <a:r>
               <a:rPr lang="en-US" dirty="0" err="1"/>
@@ -6392,52 +6311,47 @@
             </a:r>
             <a:r>
               <a:rPr lang="en-US" dirty="0"/>
-              <a:t> Corpus’ (</a:t>
-            </a:r>
-            <a:r>
-              <a:rPr lang="en-US" dirty="0">
-                <a:hlinkClick r:id="rId3"/>
-              </a:rPr>
-              <a:t>http://qualitascorpus.com/download/</a:t>
-            </a:r>
-            <a:r>
-              <a:rPr lang="en-US" dirty="0"/>
-              <a:t>).</a:t>
-            </a:r>
-          </a:p>
-          <a:p>
-            <a:r>
-              <a:rPr lang="en-US" dirty="0"/>
-              <a:t>State-of-the-art Fisher’s Score and Sequential Forward feature selection techniques are sequentially ensemble in order to perform optimal dimensionality reduction. </a:t>
-            </a:r>
-          </a:p>
-          <a:p>
-            <a:r>
-              <a:rPr lang="en-US" dirty="0"/>
-              <a:t>Detect a total of six code smells from the dataset namely God Class (GC), Refused Bequest (RB), Shotgun Surgery (SS), Feature Envy (FE), Long Method (LM) and Long Parameter List (LPL). </a:t>
-            </a:r>
-          </a:p>
-          <a:p>
-            <a:r>
-              <a:rPr lang="en-US" dirty="0"/>
-              <a:t>The 6 considered ML classifiers are J48, Random forest, Naive Bayes, kNN, SVM, and Decision Tree. </a:t>
-            </a:r>
-          </a:p>
-          <a:p>
-            <a:r>
-              <a:rPr lang="en-US" dirty="0"/>
-              <a:t>The performance of various classifiers is evaluated using five performance measures namely Precision, Recall, F-Measure, Accuracy, and Area Under the ROC-AUC curve.</a:t>
-            </a:r>
-            <a:endParaRPr lang="en-IN" dirty="0"/>
-          </a:p>
-        </p:txBody>
-      </p:sp>
-      <p:sp>
-        <p:nvSpPr>
-          <p:cNvPr id="4" name="Slide Number Placeholder 3">
+              <a:t> Corpus’ is just a collection of Java files.</a:t>
+            </a:r>
+          </a:p>
+          <a:p>
+            <a:r>
+              <a:rPr lang="en-US" dirty="0"/>
+              <a:t>This dataset consists of 112 Java systems with a total of 754 versions of these systems, 61 source code metrics that are calculated at the class level and 82 source code metrics that are calculated at the method level.</a:t>
+            </a:r>
+          </a:p>
+        </p:txBody>
+      </p:sp>
+      <p:pic>
+        <p:nvPicPr>
+          <p:cNvPr id="4" name="Content Placeholder 3"/>
+          <p:cNvPicPr>
+            <a:picLocks noChangeAspect="1"/>
+          </p:cNvPicPr>
+          <p:nvPr/>
+        </p:nvPicPr>
+        <p:blipFill>
+          <a:blip r:embed="rId2"/>
+          <a:stretch>
+            <a:fillRect/>
+          </a:stretch>
+        </p:blipFill>
+        <p:spPr>
+          <a:xfrm>
+            <a:off x="759142" y="2909357"/>
+            <a:ext cx="8984298" cy="2333204"/>
+          </a:xfrm>
+          <a:prstGeom prst="rect">
+            <a:avLst/>
+          </a:prstGeom>
+        </p:spPr>
+      </p:pic>
+      <p:sp>
+        <p:nvSpPr>
+          <p:cNvPr id="5" name="Slide Number Placeholder 4">
             <a:extLst>
               <a:ext uri="{FF2B5EF4-FFF2-40B4-BE49-F238E27FC236}">
-                <a16:creationId xmlns:a16="http://schemas.microsoft.com/office/drawing/2014/main" id="{0670B763-EEE6-C4E0-6235-EA8E51F679A6}"/>
+                <a16:creationId xmlns:a16="http://schemas.microsoft.com/office/drawing/2014/main" id="{86DF5BAE-D583-8BBF-24CE-B4EFFF43AC8E}"/>
               </a:ext>
             </a:extLst>
           </p:cNvPr>
@@ -6465,7 +6379,7 @@
     </p:spTree>
     <p:extLst>
       <p:ext uri="{BB962C8B-B14F-4D97-AF65-F5344CB8AC3E}">
-        <p14:creationId xmlns:p14="http://schemas.microsoft.com/office/powerpoint/2010/main" val="2382418076"/>
+        <p14:creationId xmlns:p14="http://schemas.microsoft.com/office/powerpoint/2010/main" val="3756047915"/>
       </p:ext>
     </p:extLst>
   </p:cSld>
@@ -6504,161 +6418,6 @@
         </p:nvSpPr>
         <p:spPr>
           <a:xfrm>
-            <a:off x="677334" y="383177"/>
-            <a:ext cx="8596668" cy="775063"/>
-          </a:xfrm>
-        </p:spPr>
-        <p:txBody>
-          <a:bodyPr/>
-          <a:lstStyle/>
-          <a:p>
-            <a:r>
-              <a:rPr lang="en-US" dirty="0"/>
-              <a:t>Base Paper Dataset</a:t>
-            </a:r>
-            <a:endParaRPr lang="en-IN" dirty="0"/>
-          </a:p>
-        </p:txBody>
-      </p:sp>
-      <p:sp>
-        <p:nvSpPr>
-          <p:cNvPr id="3" name="Content Placeholder 2"/>
-          <p:cNvSpPr>
-            <a:spLocks noGrp="1"/>
-          </p:cNvSpPr>
-          <p:nvPr>
-            <p:ph idx="1"/>
-          </p:nvPr>
-        </p:nvSpPr>
-        <p:spPr>
-          <a:xfrm>
-            <a:off x="677334" y="1384663"/>
-            <a:ext cx="8596668" cy="4656699"/>
-          </a:xfrm>
-        </p:spPr>
-        <p:txBody>
-          <a:bodyPr>
-            <a:normAutofit/>
-          </a:bodyPr>
-          <a:lstStyle/>
-          <a:p>
-            <a:r>
-              <a:rPr lang="en-US" dirty="0"/>
-              <a:t>The ‘</a:t>
-            </a:r>
-            <a:r>
-              <a:rPr lang="en-US" dirty="0" err="1"/>
-              <a:t>Qualitas</a:t>
-            </a:r>
-            <a:r>
-              <a:rPr lang="en-US" dirty="0"/>
-              <a:t> Corpus’ is just a collection of Java files.</a:t>
-            </a:r>
-          </a:p>
-          <a:p>
-            <a:r>
-              <a:rPr lang="en-US" dirty="0"/>
-              <a:t>This dataset consists of 112 Java systems with a total of 754 versions of these systems, 61 source code metrics that are calculated at the class level and 82 source code metrics that are calculated at the method level.</a:t>
-            </a:r>
-          </a:p>
-        </p:txBody>
-      </p:sp>
-      <p:pic>
-        <p:nvPicPr>
-          <p:cNvPr id="4" name="Content Placeholder 3"/>
-          <p:cNvPicPr>
-            <a:picLocks noChangeAspect="1"/>
-          </p:cNvPicPr>
-          <p:nvPr/>
-        </p:nvPicPr>
-        <p:blipFill>
-          <a:blip r:embed="rId2"/>
-          <a:stretch>
-            <a:fillRect/>
-          </a:stretch>
-        </p:blipFill>
-        <p:spPr>
-          <a:xfrm>
-            <a:off x="759142" y="2909357"/>
-            <a:ext cx="8984298" cy="2333204"/>
-          </a:xfrm>
-          <a:prstGeom prst="rect">
-            <a:avLst/>
-          </a:prstGeom>
-        </p:spPr>
-      </p:pic>
-      <p:sp>
-        <p:nvSpPr>
-          <p:cNvPr id="5" name="Slide Number Placeholder 4">
-            <a:extLst>
-              <a:ext uri="{FF2B5EF4-FFF2-40B4-BE49-F238E27FC236}">
-                <a16:creationId xmlns:a16="http://schemas.microsoft.com/office/drawing/2014/main" id="{86DF5BAE-D583-8BBF-24CE-B4EFFF43AC8E}"/>
-              </a:ext>
-            </a:extLst>
-          </p:cNvPr>
-          <p:cNvSpPr>
-            <a:spLocks noGrp="1"/>
-          </p:cNvSpPr>
-          <p:nvPr>
-            <p:ph type="sldNum" sz="quarter" idx="12"/>
-          </p:nvPr>
-        </p:nvSpPr>
-        <p:spPr/>
-        <p:txBody>
-          <a:bodyPr/>
-          <a:lstStyle/>
-          <a:p>
-            <a:fld id="{D57F1E4F-1CFF-5643-939E-217C01CDF565}" type="slidenum">
-              <a:rPr lang="en-US" smtClean="0"/>
-              <a:pPr/>
-              <a:t>11</a:t>
-            </a:fld>
-            <a:endParaRPr lang="en-US" dirty="0"/>
-          </a:p>
-        </p:txBody>
-      </p:sp>
-    </p:spTree>
-    <p:extLst>
-      <p:ext uri="{BB962C8B-B14F-4D97-AF65-F5344CB8AC3E}">
-        <p14:creationId xmlns:p14="http://schemas.microsoft.com/office/powerpoint/2010/main" val="3756047915"/>
-      </p:ext>
-    </p:extLst>
-  </p:cSld>
-  <p:clrMapOvr>
-    <a:masterClrMapping/>
-  </p:clrMapOvr>
-</p:sld>
-</file>
-
-<file path=ppt/slides/slide12.xml><?xml version="1.0" encoding="utf-8"?>
-<p:sld xmlns:a="http://schemas.openxmlformats.org/drawingml/2006/main" xmlns:r="http://schemas.openxmlformats.org/officeDocument/2006/relationships" xmlns:p="http://schemas.openxmlformats.org/presentationml/2006/main">
-  <p:cSld>
-    <p:spTree>
-      <p:nvGrpSpPr>
-        <p:cNvPr id="1" name=""/>
-        <p:cNvGrpSpPr/>
-        <p:nvPr/>
-      </p:nvGrpSpPr>
-      <p:grpSpPr>
-        <a:xfrm>
-          <a:off x="0" y="0"/>
-          <a:ext cx="0" cy="0"/>
-          <a:chOff x="0" y="0"/>
-          <a:chExt cx="0" cy="0"/>
-        </a:xfrm>
-      </p:grpSpPr>
-      <p:sp>
-        <p:nvSpPr>
-          <p:cNvPr id="2" name="Title 1"/>
-          <p:cNvSpPr>
-            <a:spLocks noGrp="1"/>
-          </p:cNvSpPr>
-          <p:nvPr>
-            <p:ph type="title"/>
-          </p:nvPr>
-        </p:nvSpPr>
-        <p:spPr>
-          <a:xfrm>
             <a:off x="677334" y="487679"/>
             <a:ext cx="8596668" cy="687977"/>
           </a:xfrm>
@@ -6756,7 +6515,7 @@
             <a:fld id="{D57F1E4F-1CFF-5643-939E-217C01CDF565}" type="slidenum">
               <a:rPr lang="en-US" smtClean="0"/>
               <a:pPr/>
-              <a:t>12</a:t>
+              <a:t>11</a:t>
             </a:fld>
             <a:endParaRPr lang="en-US" dirty="0"/>
           </a:p>
@@ -6775,7 +6534,7 @@
 </p:sld>
 </file>
 
-<file path=ppt/slides/slide13.xml><?xml version="1.0" encoding="utf-8"?>
+<file path=ppt/slides/slide12.xml><?xml version="1.0" encoding="utf-8"?>
 <p:sld xmlns:a="http://schemas.openxmlformats.org/drawingml/2006/main" xmlns:r="http://schemas.openxmlformats.org/officeDocument/2006/relationships" xmlns:p="http://schemas.openxmlformats.org/presentationml/2006/main">
   <p:cSld>
     <p:spTree>
@@ -7020,7 +6779,7 @@
             <a:fld id="{D57F1E4F-1CFF-5643-939E-217C01CDF565}" type="slidenum">
               <a:rPr lang="en-US" smtClean="0"/>
               <a:pPr/>
-              <a:t>13</a:t>
+              <a:t>12</a:t>
             </a:fld>
             <a:endParaRPr lang="en-US" dirty="0"/>
           </a:p>
@@ -7039,7 +6798,7 @@
 </p:sld>
 </file>
 
-<file path=ppt/slides/slide14.xml><?xml version="1.0" encoding="utf-8"?>
+<file path=ppt/slides/slide13.xml><?xml version="1.0" encoding="utf-8"?>
 <p:sld xmlns:a="http://schemas.openxmlformats.org/drawingml/2006/main" xmlns:r="http://schemas.openxmlformats.org/officeDocument/2006/relationships" xmlns:p="http://schemas.openxmlformats.org/presentationml/2006/main">
   <p:cSld>
     <p:spTree>
@@ -7177,7 +6936,7 @@
             <a:fld id="{D57F1E4F-1CFF-5643-939E-217C01CDF565}" type="slidenum">
               <a:rPr lang="en-US" smtClean="0"/>
               <a:pPr/>
-              <a:t>14</a:t>
+              <a:t>13</a:t>
             </a:fld>
             <a:endParaRPr lang="en-US" dirty="0"/>
           </a:p>
@@ -7196,7 +6955,7 @@
 </p:sld>
 </file>
 
-<file path=ppt/slides/slide15.xml><?xml version="1.0" encoding="utf-8"?>
+<file path=ppt/slides/slide14.xml><?xml version="1.0" encoding="utf-8"?>
 <p:sld xmlns:a="http://schemas.openxmlformats.org/drawingml/2006/main" xmlns:r="http://schemas.openxmlformats.org/officeDocument/2006/relationships" xmlns:p="http://schemas.openxmlformats.org/presentationml/2006/main">
   <p:cSld>
     <p:spTree>
@@ -7356,7 +7115,7 @@
             <a:fld id="{D57F1E4F-1CFF-5643-939E-217C01CDF565}" type="slidenum">
               <a:rPr lang="en-US" smtClean="0"/>
               <a:pPr/>
-              <a:t>15</a:t>
+              <a:t>14</a:t>
             </a:fld>
             <a:endParaRPr lang="en-US" dirty="0"/>
           </a:p>
@@ -7375,7 +7134,7 @@
 </p:sld>
 </file>
 
-<file path=ppt/slides/slide16.xml><?xml version="1.0" encoding="utf-8"?>
+<file path=ppt/slides/slide15.xml><?xml version="1.0" encoding="utf-8"?>
 <p:sld xmlns:a="http://schemas.openxmlformats.org/drawingml/2006/main" xmlns:r="http://schemas.openxmlformats.org/officeDocument/2006/relationships" xmlns:p="http://schemas.openxmlformats.org/presentationml/2006/main">
   <p:cSld>
     <p:spTree>
@@ -7597,7 +7356,7 @@
             <a:fld id="{D57F1E4F-1CFF-5643-939E-217C01CDF565}" type="slidenum">
               <a:rPr lang="en-US" smtClean="0"/>
               <a:pPr/>
-              <a:t>16</a:t>
+              <a:t>15</a:t>
             </a:fld>
             <a:endParaRPr lang="en-US" dirty="0"/>
           </a:p>
@@ -7616,7 +7375,7 @@
 </p:sld>
 </file>
 
-<file path=ppt/slides/slide17.xml><?xml version="1.0" encoding="utf-8"?>
+<file path=ppt/slides/slide16.xml><?xml version="1.0" encoding="utf-8"?>
 <p:sld xmlns:a="http://schemas.openxmlformats.org/drawingml/2006/main" xmlns:r="http://schemas.openxmlformats.org/officeDocument/2006/relationships" xmlns:p="http://schemas.openxmlformats.org/presentationml/2006/main">
   <p:cSld>
     <p:spTree>
@@ -7697,7 +7456,7 @@
         </p:spPr>
         <p:txBody>
           <a:bodyPr>
-            <a:normAutofit fontScale="92500"/>
+            <a:normAutofit/>
           </a:bodyPr>
           <a:lstStyle/>
           <a:p>
@@ -7711,231 +7470,15 @@
             </a:r>
             <a:r>
               <a:rPr lang="en-US" dirty="0"/>
-              <a:t>in our work too. After </a:t>
+              <a:t>in our work too. First, we use </a:t>
             </a:r>
             <a:r>
               <a:rPr lang="en-US" b="1" dirty="0"/>
-              <a:t>Fisher selection </a:t>
-            </a:r>
-            <a:r>
-              <a:rPr lang="en-US" dirty="0"/>
-              <a:t>we are getting 29/49 features </a:t>
-            </a:r>
-            <a:r>
-              <a:rPr lang="en-US" sz="700" dirty="0"/>
-              <a:t>(['</a:t>
-            </a:r>
-            <a:r>
-              <a:rPr lang="en-US" sz="700" dirty="0" err="1"/>
-              <a:t>cbo</a:t>
-            </a:r>
-            <a:r>
-              <a:rPr lang="en-US" sz="700" dirty="0"/>
-              <a:t>', '</a:t>
-            </a:r>
-            <a:r>
-              <a:rPr lang="en-US" sz="700" dirty="0" err="1"/>
-              <a:t>cboModified</a:t>
-            </a:r>
-            <a:r>
-              <a:rPr lang="en-US" sz="700" dirty="0"/>
-              <a:t>', '</a:t>
-            </a:r>
-            <a:r>
-              <a:rPr lang="en-US" sz="700" dirty="0" err="1"/>
-              <a:t>fanin</a:t>
-            </a:r>
-            <a:r>
-              <a:rPr lang="en-US" sz="700" dirty="0"/>
-              <a:t>', 'fanout', '</a:t>
-            </a:r>
-            <a:r>
-              <a:rPr lang="en-US" sz="700" dirty="0" err="1"/>
-              <a:t>wmc</a:t>
-            </a:r>
-            <a:r>
-              <a:rPr lang="en-US" sz="700" dirty="0"/>
-              <a:t>', '</a:t>
-            </a:r>
-            <a:r>
-              <a:rPr lang="en-US" sz="700" dirty="0" err="1"/>
-              <a:t>rfc</a:t>
-            </a:r>
-            <a:r>
-              <a:rPr lang="en-US" sz="700" dirty="0"/>
-              <a:t>', '</a:t>
-            </a:r>
-            <a:r>
-              <a:rPr lang="en-US" sz="700" dirty="0" err="1"/>
-              <a:t>lcom</a:t>
-            </a:r>
-            <a:r>
-              <a:rPr lang="en-US" sz="700" dirty="0"/>
-              <a:t>*', '</a:t>
-            </a:r>
-            <a:r>
-              <a:rPr lang="en-US" sz="700" dirty="0" err="1"/>
-              <a:t>totalMethodsQty</a:t>
-            </a:r>
-            <a:r>
-              <a:rPr lang="en-US" sz="700" dirty="0"/>
-              <a:t>', '</a:t>
-            </a:r>
-            <a:r>
-              <a:rPr lang="en-US" sz="700" dirty="0" err="1"/>
-              <a:t>publicMethodsQty</a:t>
-            </a:r>
-            <a:r>
-              <a:rPr lang="en-US" sz="700" dirty="0"/>
-              <a:t>', '</a:t>
-            </a:r>
-            <a:r>
-              <a:rPr lang="en-US" sz="700" dirty="0" err="1"/>
-              <a:t>privateMethodsQty</a:t>
-            </a:r>
-            <a:r>
-              <a:rPr lang="en-US" sz="700" dirty="0"/>
-              <a:t>', '</a:t>
-            </a:r>
-            <a:r>
-              <a:rPr lang="en-US" sz="700" dirty="0" err="1"/>
-              <a:t>protectedMethodsQty</a:t>
-            </a:r>
-            <a:r>
-              <a:rPr lang="en-US" sz="700" dirty="0"/>
-              <a:t>', '</a:t>
-            </a:r>
-            <a:r>
-              <a:rPr lang="en-US" sz="700" dirty="0" err="1"/>
-              <a:t>visibleMethodsQty</a:t>
-            </a:r>
-            <a:r>
-              <a:rPr lang="en-US" sz="700" dirty="0"/>
-              <a:t>', '</a:t>
-            </a:r>
-            <a:r>
-              <a:rPr lang="en-US" sz="700" dirty="0" err="1"/>
-              <a:t>totalFieldsQty</a:t>
-            </a:r>
-            <a:r>
-              <a:rPr lang="en-US" sz="700" dirty="0"/>
-              <a:t>', '</a:t>
-            </a:r>
-            <a:r>
-              <a:rPr lang="en-US" sz="700" dirty="0" err="1"/>
-              <a:t>protectedFieldsQty</a:t>
-            </a:r>
-            <a:r>
-              <a:rPr lang="en-US" sz="700" dirty="0"/>
-              <a:t>', '</a:t>
-            </a:r>
-            <a:r>
-              <a:rPr lang="en-US" sz="700" dirty="0" err="1"/>
-              <a:t>nosi</a:t>
-            </a:r>
-            <a:r>
-              <a:rPr lang="en-US" sz="700" dirty="0"/>
-              <a:t>', 'loc', '</a:t>
-            </a:r>
-            <a:r>
-              <a:rPr lang="en-US" sz="700" dirty="0" err="1"/>
-              <a:t>returnQty</a:t>
-            </a:r>
-            <a:r>
-              <a:rPr lang="en-US" sz="700" dirty="0"/>
-              <a:t>', '</a:t>
-            </a:r>
-            <a:r>
-              <a:rPr lang="en-US" sz="700" dirty="0" err="1"/>
-              <a:t>loopQty</a:t>
-            </a:r>
-            <a:r>
-              <a:rPr lang="en-US" sz="700" dirty="0"/>
-              <a:t>', '</a:t>
-            </a:r>
-            <a:r>
-              <a:rPr lang="en-US" sz="700" dirty="0" err="1"/>
-              <a:t>comparisonsQty</a:t>
-            </a:r>
-            <a:r>
-              <a:rPr lang="en-US" sz="700" dirty="0"/>
-              <a:t>', '</a:t>
-            </a:r>
-            <a:r>
-              <a:rPr lang="en-US" sz="700" dirty="0" err="1"/>
-              <a:t>tryCatchQty</a:t>
-            </a:r>
-            <a:r>
-              <a:rPr lang="en-US" sz="700" dirty="0"/>
-              <a:t>', '</a:t>
-            </a:r>
-            <a:r>
-              <a:rPr lang="en-US" sz="700" dirty="0" err="1"/>
-              <a:t>stringLiteralsQty</a:t>
-            </a:r>
-            <a:r>
-              <a:rPr lang="en-US" sz="700" dirty="0"/>
-              <a:t>', '</a:t>
-            </a:r>
-            <a:r>
-              <a:rPr lang="en-US" sz="700" dirty="0" err="1"/>
-              <a:t>numbersQty</a:t>
-            </a:r>
-            <a:r>
-              <a:rPr lang="en-US" sz="700" dirty="0"/>
-              <a:t>', '</a:t>
-            </a:r>
-            <a:r>
-              <a:rPr lang="en-US" sz="700" dirty="0" err="1"/>
-              <a:t>assignmentsQty</a:t>
-            </a:r>
-            <a:r>
-              <a:rPr lang="en-US" sz="700" dirty="0"/>
-              <a:t>', '</a:t>
-            </a:r>
-            <a:r>
-              <a:rPr lang="en-US" sz="700" dirty="0" err="1"/>
-              <a:t>mathOperationsQty</a:t>
-            </a:r>
-            <a:r>
-              <a:rPr lang="en-US" sz="700" dirty="0"/>
-              <a:t>', '</a:t>
-            </a:r>
-            <a:r>
-              <a:rPr lang="en-US" sz="700" dirty="0" err="1"/>
-              <a:t>variablesQty</a:t>
-            </a:r>
-            <a:r>
-              <a:rPr lang="en-US" sz="700" dirty="0"/>
-              <a:t>', '</a:t>
-            </a:r>
-            <a:r>
-              <a:rPr lang="en-US" sz="700" dirty="0" err="1"/>
-              <a:t>maxNestedBlocksQty</a:t>
-            </a:r>
-            <a:r>
-              <a:rPr lang="en-US" sz="700" dirty="0"/>
-              <a:t>', '</a:t>
-            </a:r>
-            <a:r>
-              <a:rPr lang="en-US" sz="700" dirty="0" err="1"/>
-              <a:t>innerClassesQty</a:t>
-            </a:r>
-            <a:r>
-              <a:rPr lang="en-US" sz="700" dirty="0"/>
-              <a:t>', '</a:t>
-            </a:r>
-            <a:r>
-              <a:rPr lang="en-US" sz="700" dirty="0" err="1"/>
-              <a:t>uniqueWordsQty</a:t>
-            </a:r>
-            <a:r>
-              <a:rPr lang="en-US" sz="700" dirty="0"/>
-              <a:t>', 'modifiers’]) </a:t>
-            </a:r>
-            <a:r>
-              <a:rPr lang="en-US" dirty="0"/>
-              <a:t>and after </a:t>
+              <a:t>Fisher Score </a:t>
+            </a:r>
+            <a:r>
+              <a:rPr lang="en-US" dirty="0"/>
+              <a:t>and then we further use </a:t>
             </a:r>
             <a:r>
               <a:rPr lang="en-US" b="1" dirty="0"/>
@@ -7943,84 +7486,25 @@
             </a:r>
             <a:r>
               <a:rPr lang="en-US" dirty="0"/>
-              <a:t> we are getting 10/49 features </a:t>
-            </a:r>
-            <a:r>
-              <a:rPr lang="en-US" sz="700" dirty="0"/>
-              <a:t>(['</a:t>
-            </a:r>
-            <a:r>
-              <a:rPr lang="en-US" sz="700" dirty="0" err="1"/>
-              <a:t>cboModified</a:t>
-            </a:r>
-            <a:r>
-              <a:rPr lang="en-US" sz="700" dirty="0"/>
-              <a:t>', '</a:t>
-            </a:r>
-            <a:r>
-              <a:rPr lang="en-US" sz="700" dirty="0" err="1"/>
-              <a:t>rfc</a:t>
-            </a:r>
-            <a:r>
-              <a:rPr lang="en-US" sz="700" dirty="0"/>
-              <a:t>', '</a:t>
-            </a:r>
-            <a:r>
-              <a:rPr lang="en-US" sz="700" dirty="0" err="1"/>
-              <a:t>protectedMethodsQty</a:t>
-            </a:r>
-            <a:r>
-              <a:rPr lang="en-US" sz="700" dirty="0"/>
-              <a:t>', '</a:t>
-            </a:r>
-            <a:r>
-              <a:rPr lang="en-US" sz="700" dirty="0" err="1"/>
-              <a:t>protectedFieldsQty</a:t>
-            </a:r>
-            <a:r>
-              <a:rPr lang="en-US" sz="700" dirty="0"/>
-              <a:t>', 'loc', '</a:t>
-            </a:r>
-            <a:r>
-              <a:rPr lang="en-US" sz="700" dirty="0" err="1"/>
-              <a:t>loopQty</a:t>
-            </a:r>
-            <a:r>
-              <a:rPr lang="en-US" sz="700" dirty="0"/>
-              <a:t>', '</a:t>
-            </a:r>
-            <a:r>
-              <a:rPr lang="en-US" sz="700" dirty="0" err="1"/>
-              <a:t>tryCatchQty</a:t>
-            </a:r>
-            <a:r>
-              <a:rPr lang="en-US" sz="700" dirty="0"/>
-              <a:t>', '</a:t>
-            </a:r>
-            <a:r>
-              <a:rPr lang="en-US" sz="700" dirty="0" err="1"/>
-              <a:t>assignmentsQty</a:t>
-            </a:r>
-            <a:r>
-              <a:rPr lang="en-US" sz="700" dirty="0"/>
-              <a:t>', '</a:t>
-            </a:r>
-            <a:r>
-              <a:rPr lang="en-US" sz="700" dirty="0" err="1"/>
-              <a:t>maxNestedBlocksQty</a:t>
-            </a:r>
-            <a:r>
-              <a:rPr lang="en-US" sz="700" dirty="0"/>
-              <a:t>', '</a:t>
-            </a:r>
-            <a:r>
-              <a:rPr lang="en-US" sz="700" dirty="0" err="1"/>
-              <a:t>innerClassesQty</a:t>
-            </a:r>
-            <a:r>
-              <a:rPr lang="en-US" sz="700" dirty="0"/>
-              <a:t>’])</a:t>
-            </a:r>
+              <a:t> to get the best features. In </a:t>
+            </a:r>
+            <a:r>
+              <a:rPr lang="en-US" dirty="0" err="1"/>
+              <a:t>sfs_model</a:t>
+            </a:r>
+            <a:r>
+              <a:rPr lang="en-US" dirty="0"/>
+              <a:t> we use </a:t>
+            </a:r>
+            <a:r>
+              <a:rPr lang="en-US" b="1" dirty="0"/>
+              <a:t>Logistic Regression</a:t>
+            </a:r>
+            <a:r>
+              <a:rPr lang="en-US" dirty="0"/>
+              <a:t>.</a:t>
+            </a:r>
+            <a:endParaRPr lang="en-US" sz="700" dirty="0"/>
           </a:p>
           <a:p>
             <a:r>
@@ -8077,57 +7561,7 @@
           <a:p>
             <a:r>
               <a:rPr lang="en-US" dirty="0"/>
-              <a:t>As the base paper does not use Data Class Code Smell, direct comparison may not be very useful, but still, we are getting similar results for a new type of Code Smell</a:t>
-            </a:r>
-          </a:p>
-          <a:p>
-            <a:r>
-              <a:rPr lang="en-US" dirty="0"/>
-              <a:t>Here are the results –</a:t>
-            </a:r>
-          </a:p>
-          <a:p>
-            <a:pPr lvl="1"/>
-            <a:r>
-              <a:rPr lang="en-US" b="1" dirty="0"/>
-              <a:t>Accuracy</a:t>
-            </a:r>
-            <a:r>
-              <a:rPr lang="en-US" dirty="0"/>
-              <a:t>: 0.9822 (almost equal to base paper and our is balanced dataset)</a:t>
-            </a:r>
-          </a:p>
-          <a:p>
-            <a:pPr lvl="1"/>
-            <a:r>
-              <a:rPr lang="en-US" b="1" dirty="0"/>
-              <a:t>F1-Score</a:t>
-            </a:r>
-            <a:r>
-              <a:rPr lang="en-US" dirty="0"/>
-              <a:t>: 0.9629 (better than base paper)</a:t>
-            </a:r>
-          </a:p>
-          <a:p>
-            <a:pPr lvl="1"/>
-            <a:r>
-              <a:rPr lang="en-US" b="1" dirty="0"/>
-              <a:t>Precision</a:t>
-            </a:r>
-            <a:r>
-              <a:rPr lang="en-US" dirty="0"/>
-              <a:t>: 0.9792</a:t>
-            </a:r>
-          </a:p>
-          <a:p>
-            <a:pPr lvl="1"/>
-            <a:r>
-              <a:rPr lang="en-US" b="1" dirty="0"/>
-              <a:t>Recall</a:t>
-            </a:r>
-            <a:r>
-              <a:rPr lang="en-US" dirty="0"/>
-              <a:t>: 0.9471</a:t>
+              <a:t>We are getting better results than Base paper, especially in AUC and F1-Score which represents than it is not overfitting and or dataset is balanced</a:t>
             </a:r>
           </a:p>
         </p:txBody>
@@ -8156,7 +7590,7 @@
             <a:fld id="{D57F1E4F-1CFF-5643-939E-217C01CDF565}" type="slidenum">
               <a:rPr lang="en-US" smtClean="0"/>
               <a:pPr/>
-              <a:t>17</a:t>
+              <a:t>16</a:t>
             </a:fld>
             <a:endParaRPr lang="en-US" dirty="0"/>
           </a:p>
@@ -8166,6 +7600,1014 @@
     <p:extLst>
       <p:ext uri="{BB962C8B-B14F-4D97-AF65-F5344CB8AC3E}">
         <p14:creationId xmlns:p14="http://schemas.microsoft.com/office/powerpoint/2010/main" val="3938514977"/>
+      </p:ext>
+    </p:extLst>
+  </p:cSld>
+  <p:clrMapOvr>
+    <a:masterClrMapping/>
+  </p:clrMapOvr>
+</p:sld>
+</file>
+
+<file path=ppt/slides/slide17.xml><?xml version="1.0" encoding="utf-8"?>
+<p:sld xmlns:a="http://schemas.openxmlformats.org/drawingml/2006/main" xmlns:r="http://schemas.openxmlformats.org/officeDocument/2006/relationships" xmlns:p="http://schemas.openxmlformats.org/presentationml/2006/main">
+  <p:cSld>
+    <p:spTree>
+      <p:nvGrpSpPr>
+        <p:cNvPr id="1" name="">
+          <a:extLst>
+            <a:ext uri="{FF2B5EF4-FFF2-40B4-BE49-F238E27FC236}">
+              <a16:creationId xmlns:a16="http://schemas.microsoft.com/office/drawing/2014/main" id="{DDC70A7A-25AD-FA8B-8BD2-703B049C11C4}"/>
+            </a:ext>
+          </a:extLst>
+        </p:cNvPr>
+        <p:cNvGrpSpPr/>
+        <p:nvPr/>
+      </p:nvGrpSpPr>
+      <p:grpSpPr>
+        <a:xfrm>
+          <a:off x="0" y="0"/>
+          <a:ext cx="0" cy="0"/>
+          <a:chOff x="0" y="0"/>
+          <a:chExt cx="0" cy="0"/>
+        </a:xfrm>
+      </p:grpSpPr>
+      <p:sp>
+        <p:nvSpPr>
+          <p:cNvPr id="2" name="Title 1">
+            <a:extLst>
+              <a:ext uri="{FF2B5EF4-FFF2-40B4-BE49-F238E27FC236}">
+                <a16:creationId xmlns:a16="http://schemas.microsoft.com/office/drawing/2014/main" id="{6562A318-8D3A-A044-52CE-417BB2A82EDE}"/>
+              </a:ext>
+            </a:extLst>
+          </p:cNvPr>
+          <p:cNvSpPr>
+            <a:spLocks noGrp="1"/>
+          </p:cNvSpPr>
+          <p:nvPr>
+            <p:ph type="title"/>
+          </p:nvPr>
+        </p:nvSpPr>
+        <p:spPr>
+          <a:xfrm>
+            <a:off x="677334" y="609600"/>
+            <a:ext cx="8596668" cy="748937"/>
+          </a:xfrm>
+        </p:spPr>
+        <p:txBody>
+          <a:bodyPr/>
+          <a:lstStyle/>
+          <a:p>
+            <a:r>
+              <a:rPr lang="en-US" dirty="0"/>
+              <a:t>Our Work (as of now)</a:t>
+            </a:r>
+            <a:endParaRPr lang="en-IN" dirty="0"/>
+          </a:p>
+        </p:txBody>
+      </p:sp>
+      <p:sp>
+        <p:nvSpPr>
+          <p:cNvPr id="3" name="Content Placeholder 2">
+            <a:extLst>
+              <a:ext uri="{FF2B5EF4-FFF2-40B4-BE49-F238E27FC236}">
+                <a16:creationId xmlns:a16="http://schemas.microsoft.com/office/drawing/2014/main" id="{5EF3F644-EE4E-7E2F-7863-DBB1AAF700BB}"/>
+              </a:ext>
+            </a:extLst>
+          </p:cNvPr>
+          <p:cNvSpPr>
+            <a:spLocks noGrp="1"/>
+          </p:cNvSpPr>
+          <p:nvPr>
+            <p:ph idx="1"/>
+          </p:nvPr>
+        </p:nvSpPr>
+        <p:spPr>
+          <a:xfrm>
+            <a:off x="677334" y="1358537"/>
+            <a:ext cx="8596668" cy="5225143"/>
+          </a:xfrm>
+        </p:spPr>
+        <p:txBody>
+          <a:bodyPr>
+            <a:normAutofit/>
+          </a:bodyPr>
+          <a:lstStyle/>
+          <a:p>
+            <a:r>
+              <a:rPr lang="en-US" dirty="0"/>
+              <a:t>The results of Base paper</a:t>
+            </a:r>
+          </a:p>
+          <a:p>
+            <a:endParaRPr lang="en-US" dirty="0"/>
+          </a:p>
+          <a:p>
+            <a:endParaRPr lang="en-US" dirty="0"/>
+          </a:p>
+          <a:p>
+            <a:endParaRPr lang="en-US" dirty="0"/>
+          </a:p>
+          <a:p>
+            <a:endParaRPr lang="en-US" dirty="0"/>
+          </a:p>
+          <a:p>
+            <a:pPr marL="0" indent="0">
+              <a:buNone/>
+            </a:pPr>
+            <a:endParaRPr lang="en-US" dirty="0"/>
+          </a:p>
+          <a:p>
+            <a:r>
+              <a:rPr lang="en-US" dirty="0"/>
+              <a:t>Our Results –</a:t>
+            </a:r>
+          </a:p>
+          <a:p>
+            <a:endParaRPr lang="en-US" dirty="0"/>
+          </a:p>
+          <a:p>
+            <a:pPr marL="0" indent="0">
+              <a:buNone/>
+            </a:pPr>
+            <a:endParaRPr lang="en-US" dirty="0"/>
+          </a:p>
+          <a:p>
+            <a:endParaRPr lang="en-US" dirty="0"/>
+          </a:p>
+          <a:p>
+            <a:r>
+              <a:rPr lang="en-US" dirty="0"/>
+              <a:t>[give explanation from above]</a:t>
+            </a:r>
+          </a:p>
+        </p:txBody>
+      </p:sp>
+      <p:sp>
+        <p:nvSpPr>
+          <p:cNvPr id="4" name="Slide Number Placeholder 3">
+            <a:extLst>
+              <a:ext uri="{FF2B5EF4-FFF2-40B4-BE49-F238E27FC236}">
+                <a16:creationId xmlns:a16="http://schemas.microsoft.com/office/drawing/2014/main" id="{41DAEF17-F7E7-BE4B-96B1-C740115A817D}"/>
+              </a:ext>
+            </a:extLst>
+          </p:cNvPr>
+          <p:cNvSpPr>
+            <a:spLocks noGrp="1"/>
+          </p:cNvSpPr>
+          <p:nvPr>
+            <p:ph type="sldNum" sz="quarter" idx="12"/>
+          </p:nvPr>
+        </p:nvSpPr>
+        <p:spPr/>
+        <p:txBody>
+          <a:bodyPr/>
+          <a:lstStyle/>
+          <a:p>
+            <a:fld id="{D57F1E4F-1CFF-5643-939E-217C01CDF565}" type="slidenum">
+              <a:rPr lang="en-US" smtClean="0"/>
+              <a:pPr/>
+              <a:t>17</a:t>
+            </a:fld>
+            <a:endParaRPr lang="en-US" dirty="0"/>
+          </a:p>
+        </p:txBody>
+      </p:sp>
+      <p:pic>
+        <p:nvPicPr>
+          <p:cNvPr id="5" name="Picture 4">
+            <a:extLst>
+              <a:ext uri="{FF2B5EF4-FFF2-40B4-BE49-F238E27FC236}">
+                <a16:creationId xmlns:a16="http://schemas.microsoft.com/office/drawing/2014/main" id="{1C51B4F1-012C-D676-3C8B-5BFD0283F2B8}"/>
+              </a:ext>
+            </a:extLst>
+          </p:cNvPr>
+          <p:cNvPicPr>
+            <a:picLocks noChangeAspect="1"/>
+          </p:cNvPicPr>
+          <p:nvPr/>
+        </p:nvPicPr>
+        <p:blipFill>
+          <a:blip r:embed="rId2"/>
+          <a:stretch>
+            <a:fillRect/>
+          </a:stretch>
+        </p:blipFill>
+        <p:spPr>
+          <a:xfrm>
+            <a:off x="1026823" y="1741942"/>
+            <a:ext cx="5813815" cy="2059431"/>
+          </a:xfrm>
+          <a:prstGeom prst="rect">
+            <a:avLst/>
+          </a:prstGeom>
+        </p:spPr>
+      </p:pic>
+      <p:graphicFrame>
+        <p:nvGraphicFramePr>
+          <p:cNvPr id="6" name="Table 5">
+            <a:extLst>
+              <a:ext uri="{FF2B5EF4-FFF2-40B4-BE49-F238E27FC236}">
+                <a16:creationId xmlns:a16="http://schemas.microsoft.com/office/drawing/2014/main" id="{FA6BD519-3C63-B9F8-647E-063D18F6D07B}"/>
+              </a:ext>
+            </a:extLst>
+          </p:cNvPr>
+          <p:cNvGraphicFramePr>
+            <a:graphicFrameLocks noGrp="1"/>
+          </p:cNvGraphicFramePr>
+          <p:nvPr>
+            <p:extLst>
+              <p:ext uri="{D42A27DB-BD31-4B8C-83A1-F6EECF244321}">
+                <p14:modId xmlns:p14="http://schemas.microsoft.com/office/powerpoint/2010/main" val="2466273918"/>
+              </p:ext>
+            </p:extLst>
+          </p:nvPr>
+        </p:nvGraphicFramePr>
+        <p:xfrm>
+          <a:off x="1026823" y="4184778"/>
+          <a:ext cx="8661291" cy="1168072"/>
+        </p:xfrm>
+        <a:graphic>
+          <a:graphicData uri="http://schemas.openxmlformats.org/drawingml/2006/table">
+            <a:tbl>
+              <a:tblPr firstRow="1" bandRow="1">
+                <a:tableStyleId>{5C22544A-7EE6-4342-B048-85BDC9FD1C3A}</a:tableStyleId>
+              </a:tblPr>
+              <a:tblGrid>
+                <a:gridCol w="516255">
+                  <a:extLst>
+                    <a:ext uri="{9D8B030D-6E8A-4147-A177-3AD203B41FA5}">
+                      <a16:colId xmlns:a16="http://schemas.microsoft.com/office/drawing/2014/main" val="2824826579"/>
+                    </a:ext>
+                  </a:extLst>
+                </a:gridCol>
+                <a:gridCol w="456979">
+                  <a:extLst>
+                    <a:ext uri="{9D8B030D-6E8A-4147-A177-3AD203B41FA5}">
+                      <a16:colId xmlns:a16="http://schemas.microsoft.com/office/drawing/2014/main" val="3619868740"/>
+                    </a:ext>
+                  </a:extLst>
+                </a:gridCol>
+                <a:gridCol w="373492">
+                  <a:extLst>
+                    <a:ext uri="{9D8B030D-6E8A-4147-A177-3AD203B41FA5}">
+                      <a16:colId xmlns:a16="http://schemas.microsoft.com/office/drawing/2014/main" val="1529899458"/>
+                    </a:ext>
+                  </a:extLst>
+                </a:gridCol>
+                <a:gridCol w="476340">
+                  <a:extLst>
+                    <a:ext uri="{9D8B030D-6E8A-4147-A177-3AD203B41FA5}">
+                      <a16:colId xmlns:a16="http://schemas.microsoft.com/office/drawing/2014/main" val="520572402"/>
+                    </a:ext>
+                  </a:extLst>
+                </a:gridCol>
+                <a:gridCol w="644012">
+                  <a:extLst>
+                    <a:ext uri="{9D8B030D-6E8A-4147-A177-3AD203B41FA5}">
+                      <a16:colId xmlns:a16="http://schemas.microsoft.com/office/drawing/2014/main" val="2060422182"/>
+                    </a:ext>
+                  </a:extLst>
+                </a:gridCol>
+                <a:gridCol w="392853">
+                  <a:extLst>
+                    <a:ext uri="{9D8B030D-6E8A-4147-A177-3AD203B41FA5}">
+                      <a16:colId xmlns:a16="http://schemas.microsoft.com/office/drawing/2014/main" val="1179312162"/>
+                    </a:ext>
+                  </a:extLst>
+                </a:gridCol>
+                <a:gridCol w="440267">
+                  <a:extLst>
+                    <a:ext uri="{9D8B030D-6E8A-4147-A177-3AD203B41FA5}">
+                      <a16:colId xmlns:a16="http://schemas.microsoft.com/office/drawing/2014/main" val="1387385755"/>
+                    </a:ext>
+                  </a:extLst>
+                </a:gridCol>
+                <a:gridCol w="440266">
+                  <a:extLst>
+                    <a:ext uri="{9D8B030D-6E8A-4147-A177-3AD203B41FA5}">
+                      <a16:colId xmlns:a16="http://schemas.microsoft.com/office/drawing/2014/main" val="3843598340"/>
+                    </a:ext>
+                  </a:extLst>
+                </a:gridCol>
+                <a:gridCol w="440267">
+                  <a:extLst>
+                    <a:ext uri="{9D8B030D-6E8A-4147-A177-3AD203B41FA5}">
+                      <a16:colId xmlns:a16="http://schemas.microsoft.com/office/drawing/2014/main" val="1049901212"/>
+                    </a:ext>
+                  </a:extLst>
+                </a:gridCol>
+                <a:gridCol w="470747">
+                  <a:extLst>
+                    <a:ext uri="{9D8B030D-6E8A-4147-A177-3AD203B41FA5}">
+                      <a16:colId xmlns:a16="http://schemas.microsoft.com/office/drawing/2014/main" val="709897545"/>
+                    </a:ext>
+                  </a:extLst>
+                </a:gridCol>
+                <a:gridCol w="470746">
+                  <a:extLst>
+                    <a:ext uri="{9D8B030D-6E8A-4147-A177-3AD203B41FA5}">
+                      <a16:colId xmlns:a16="http://schemas.microsoft.com/office/drawing/2014/main" val="827671735"/>
+                    </a:ext>
+                  </a:extLst>
+                </a:gridCol>
+                <a:gridCol w="470747">
+                  <a:extLst>
+                    <a:ext uri="{9D8B030D-6E8A-4147-A177-3AD203B41FA5}">
+                      <a16:colId xmlns:a16="http://schemas.microsoft.com/office/drawing/2014/main" val="1122498397"/>
+                    </a:ext>
+                  </a:extLst>
+                </a:gridCol>
+                <a:gridCol w="501227">
+                  <a:extLst>
+                    <a:ext uri="{9D8B030D-6E8A-4147-A177-3AD203B41FA5}">
+                      <a16:colId xmlns:a16="http://schemas.microsoft.com/office/drawing/2014/main" val="2630067876"/>
+                    </a:ext>
+                  </a:extLst>
+                </a:gridCol>
+                <a:gridCol w="501226">
+                  <a:extLst>
+                    <a:ext uri="{9D8B030D-6E8A-4147-A177-3AD203B41FA5}">
+                      <a16:colId xmlns:a16="http://schemas.microsoft.com/office/drawing/2014/main" val="3579073359"/>
+                    </a:ext>
+                  </a:extLst>
+                </a:gridCol>
+                <a:gridCol w="501227">
+                  <a:extLst>
+                    <a:ext uri="{9D8B030D-6E8A-4147-A177-3AD203B41FA5}">
+                      <a16:colId xmlns:a16="http://schemas.microsoft.com/office/drawing/2014/main" val="4050411392"/>
+                    </a:ext>
+                  </a:extLst>
+                </a:gridCol>
+                <a:gridCol w="521547">
+                  <a:extLst>
+                    <a:ext uri="{9D8B030D-6E8A-4147-A177-3AD203B41FA5}">
+                      <a16:colId xmlns:a16="http://schemas.microsoft.com/office/drawing/2014/main" val="271538343"/>
+                    </a:ext>
+                  </a:extLst>
+                </a:gridCol>
+                <a:gridCol w="521546">
+                  <a:extLst>
+                    <a:ext uri="{9D8B030D-6E8A-4147-A177-3AD203B41FA5}">
+                      <a16:colId xmlns:a16="http://schemas.microsoft.com/office/drawing/2014/main" val="863609600"/>
+                    </a:ext>
+                  </a:extLst>
+                </a:gridCol>
+                <a:gridCol w="521547">
+                  <a:extLst>
+                    <a:ext uri="{9D8B030D-6E8A-4147-A177-3AD203B41FA5}">
+                      <a16:colId xmlns:a16="http://schemas.microsoft.com/office/drawing/2014/main" val="458629820"/>
+                    </a:ext>
+                  </a:extLst>
+                </a:gridCol>
+              </a:tblGrid>
+              <a:tr h="541092">
+                <a:tc gridSpan="3">
+                  <a:txBody>
+                    <a:bodyPr/>
+                    <a:lstStyle/>
+                    <a:p>
+                      <a:r>
+                        <a:rPr lang="en-IN" sz="1300" dirty="0"/>
+                        <a:t>God Class</a:t>
+                      </a:r>
+                    </a:p>
+                  </a:txBody>
+                  <a:tcPr/>
+                </a:tc>
+                <a:tc hMerge="1">
+                  <a:txBody>
+                    <a:bodyPr/>
+                    <a:lstStyle/>
+                    <a:p>
+                      <a:endParaRPr lang="en-IN"/>
+                    </a:p>
+                  </a:txBody>
+                  <a:tcPr/>
+                </a:tc>
+                <a:tc hMerge="1">
+                  <a:txBody>
+                    <a:bodyPr/>
+                    <a:lstStyle/>
+                    <a:p>
+                      <a:endParaRPr lang="en-IN"/>
+                    </a:p>
+                  </a:txBody>
+                  <a:tcPr/>
+                </a:tc>
+                <a:tc gridSpan="3">
+                  <a:txBody>
+                    <a:bodyPr/>
+                    <a:lstStyle/>
+                    <a:p>
+                      <a:r>
+                        <a:rPr lang="en-IN" sz="1300" dirty="0"/>
+                        <a:t>Refused bequest</a:t>
+                      </a:r>
+                    </a:p>
+                  </a:txBody>
+                  <a:tcPr/>
+                </a:tc>
+                <a:tc hMerge="1">
+                  <a:txBody>
+                    <a:bodyPr/>
+                    <a:lstStyle/>
+                    <a:p>
+                      <a:endParaRPr lang="en-IN"/>
+                    </a:p>
+                  </a:txBody>
+                  <a:tcPr/>
+                </a:tc>
+                <a:tc hMerge="1">
+                  <a:txBody>
+                    <a:bodyPr/>
+                    <a:lstStyle/>
+                    <a:p>
+                      <a:endParaRPr lang="en-IN"/>
+                    </a:p>
+                  </a:txBody>
+                  <a:tcPr/>
+                </a:tc>
+                <a:tc gridSpan="3">
+                  <a:txBody>
+                    <a:bodyPr/>
+                    <a:lstStyle/>
+                    <a:p>
+                      <a:r>
+                        <a:rPr lang="en-IN" sz="1300" dirty="0"/>
+                        <a:t>Shotgun Surgery</a:t>
+                      </a:r>
+                    </a:p>
+                  </a:txBody>
+                  <a:tcPr/>
+                </a:tc>
+                <a:tc hMerge="1">
+                  <a:txBody>
+                    <a:bodyPr/>
+                    <a:lstStyle/>
+                    <a:p>
+                      <a:endParaRPr lang="en-IN"/>
+                    </a:p>
+                  </a:txBody>
+                  <a:tcPr/>
+                </a:tc>
+                <a:tc hMerge="1">
+                  <a:txBody>
+                    <a:bodyPr/>
+                    <a:lstStyle/>
+                    <a:p>
+                      <a:endParaRPr lang="en-IN"/>
+                    </a:p>
+                  </a:txBody>
+                  <a:tcPr/>
+                </a:tc>
+                <a:tc gridSpan="3">
+                  <a:txBody>
+                    <a:bodyPr/>
+                    <a:lstStyle/>
+                    <a:p>
+                      <a:r>
+                        <a:rPr lang="en-IN" sz="1300" dirty="0"/>
+                        <a:t>Feature Envy</a:t>
+                      </a:r>
+                    </a:p>
+                  </a:txBody>
+                  <a:tcPr/>
+                </a:tc>
+                <a:tc hMerge="1">
+                  <a:txBody>
+                    <a:bodyPr/>
+                    <a:lstStyle/>
+                    <a:p>
+                      <a:endParaRPr lang="en-IN"/>
+                    </a:p>
+                  </a:txBody>
+                  <a:tcPr/>
+                </a:tc>
+                <a:tc hMerge="1">
+                  <a:txBody>
+                    <a:bodyPr/>
+                    <a:lstStyle/>
+                    <a:p>
+                      <a:endParaRPr lang="en-IN"/>
+                    </a:p>
+                  </a:txBody>
+                  <a:tcPr/>
+                </a:tc>
+                <a:tc gridSpan="3">
+                  <a:txBody>
+                    <a:bodyPr/>
+                    <a:lstStyle/>
+                    <a:p>
+                      <a:r>
+                        <a:rPr lang="en-IN" sz="1300" dirty="0"/>
+                        <a:t>Long Method</a:t>
+                      </a:r>
+                    </a:p>
+                  </a:txBody>
+                  <a:tcPr/>
+                </a:tc>
+                <a:tc hMerge="1">
+                  <a:txBody>
+                    <a:bodyPr/>
+                    <a:lstStyle/>
+                    <a:p>
+                      <a:endParaRPr lang="en-IN"/>
+                    </a:p>
+                  </a:txBody>
+                  <a:tcPr/>
+                </a:tc>
+                <a:tc hMerge="1">
+                  <a:txBody>
+                    <a:bodyPr/>
+                    <a:lstStyle/>
+                    <a:p>
+                      <a:endParaRPr lang="en-IN"/>
+                    </a:p>
+                  </a:txBody>
+                  <a:tcPr/>
+                </a:tc>
+                <a:tc gridSpan="3">
+                  <a:txBody>
+                    <a:bodyPr/>
+                    <a:lstStyle/>
+                    <a:p>
+                      <a:r>
+                        <a:rPr lang="en-IN" sz="1300" dirty="0"/>
+                        <a:t>Long Parameter</a:t>
+                      </a:r>
+                    </a:p>
+                  </a:txBody>
+                  <a:tcPr/>
+                </a:tc>
+                <a:tc hMerge="1">
+                  <a:txBody>
+                    <a:bodyPr/>
+                    <a:lstStyle/>
+                    <a:p>
+                      <a:endParaRPr lang="en-IN"/>
+                    </a:p>
+                  </a:txBody>
+                  <a:tcPr/>
+                </a:tc>
+                <a:tc hMerge="1">
+                  <a:txBody>
+                    <a:bodyPr/>
+                    <a:lstStyle/>
+                    <a:p>
+                      <a:endParaRPr lang="en-IN"/>
+                    </a:p>
+                  </a:txBody>
+                  <a:tcPr/>
+                </a:tc>
+                <a:extLst>
+                  <a:ext uri="{0D108BD9-81ED-4DB2-BD59-A6C34878D82A}">
+                    <a16:rowId xmlns:a16="http://schemas.microsoft.com/office/drawing/2014/main" val="476490804"/>
+                  </a:ext>
+                </a:extLst>
+              </a:tr>
+              <a:tr h="313490">
+                <a:tc>
+                  <a:txBody>
+                    <a:bodyPr/>
+                    <a:lstStyle/>
+                    <a:p>
+                      <a:r>
+                        <a:rPr lang="en-IN" sz="1050" b="0" dirty="0" err="1"/>
+                        <a:t>Acc</a:t>
+                      </a:r>
+                      <a:endParaRPr lang="en-IN" sz="1050" b="0" dirty="0"/>
+                    </a:p>
+                  </a:txBody>
+                  <a:tcPr/>
+                </a:tc>
+                <a:tc>
+                  <a:txBody>
+                    <a:bodyPr/>
+                    <a:lstStyle/>
+                    <a:p>
+                      <a:r>
+                        <a:rPr lang="en-IN" sz="1050" b="0" dirty="0"/>
+                        <a:t>AUC</a:t>
+                      </a:r>
+                    </a:p>
+                  </a:txBody>
+                  <a:tcPr/>
+                </a:tc>
+                <a:tc>
+                  <a:txBody>
+                    <a:bodyPr/>
+                    <a:lstStyle/>
+                    <a:p>
+                      <a:r>
+                        <a:rPr lang="en-IN" sz="1050" b="0" dirty="0"/>
+                        <a:t>F1</a:t>
+                      </a:r>
+                    </a:p>
+                  </a:txBody>
+                  <a:tcPr/>
+                </a:tc>
+                <a:tc>
+                  <a:txBody>
+                    <a:bodyPr/>
+                    <a:lstStyle/>
+                    <a:p>
+                      <a:r>
+                        <a:rPr lang="en-IN" sz="1050" b="0" dirty="0" err="1"/>
+                        <a:t>Acc</a:t>
+                      </a:r>
+                      <a:endParaRPr lang="en-IN" sz="1050" b="0" dirty="0"/>
+                    </a:p>
+                  </a:txBody>
+                  <a:tcPr/>
+                </a:tc>
+                <a:tc>
+                  <a:txBody>
+                    <a:bodyPr/>
+                    <a:lstStyle/>
+                    <a:p>
+                      <a:r>
+                        <a:rPr lang="en-IN" sz="1050" b="0" dirty="0"/>
+                        <a:t>AUC</a:t>
+                      </a:r>
+                    </a:p>
+                  </a:txBody>
+                  <a:tcPr/>
+                </a:tc>
+                <a:tc>
+                  <a:txBody>
+                    <a:bodyPr/>
+                    <a:lstStyle/>
+                    <a:p>
+                      <a:r>
+                        <a:rPr lang="en-IN" sz="1050" b="0" dirty="0"/>
+                        <a:t>F1</a:t>
+                      </a:r>
+                    </a:p>
+                  </a:txBody>
+                  <a:tcPr/>
+                </a:tc>
+                <a:tc>
+                  <a:txBody>
+                    <a:bodyPr/>
+                    <a:lstStyle/>
+                    <a:p>
+                      <a:r>
+                        <a:rPr lang="en-IN" sz="1050" b="0" dirty="0" err="1"/>
+                        <a:t>Acc</a:t>
+                      </a:r>
+                      <a:endParaRPr lang="en-IN" sz="1050" b="0" dirty="0"/>
+                    </a:p>
+                  </a:txBody>
+                  <a:tcPr/>
+                </a:tc>
+                <a:tc>
+                  <a:txBody>
+                    <a:bodyPr/>
+                    <a:lstStyle/>
+                    <a:p>
+                      <a:r>
+                        <a:rPr lang="en-IN" sz="1050" b="0" dirty="0"/>
+                        <a:t>AUC</a:t>
+                      </a:r>
+                    </a:p>
+                  </a:txBody>
+                  <a:tcPr/>
+                </a:tc>
+                <a:tc>
+                  <a:txBody>
+                    <a:bodyPr/>
+                    <a:lstStyle/>
+                    <a:p>
+                      <a:r>
+                        <a:rPr lang="en-IN" sz="1050" b="0" dirty="0"/>
+                        <a:t>F1</a:t>
+                      </a:r>
+                    </a:p>
+                  </a:txBody>
+                  <a:tcPr/>
+                </a:tc>
+                <a:tc>
+                  <a:txBody>
+                    <a:bodyPr/>
+                    <a:lstStyle/>
+                    <a:p>
+                      <a:r>
+                        <a:rPr lang="en-IN" sz="1050" b="0" dirty="0" err="1"/>
+                        <a:t>Acc</a:t>
+                      </a:r>
+                      <a:endParaRPr lang="en-IN" sz="1050" b="0" dirty="0"/>
+                    </a:p>
+                  </a:txBody>
+                  <a:tcPr/>
+                </a:tc>
+                <a:tc>
+                  <a:txBody>
+                    <a:bodyPr/>
+                    <a:lstStyle/>
+                    <a:p>
+                      <a:r>
+                        <a:rPr lang="en-IN" sz="1050" b="0" dirty="0"/>
+                        <a:t>AUC</a:t>
+                      </a:r>
+                    </a:p>
+                  </a:txBody>
+                  <a:tcPr/>
+                </a:tc>
+                <a:tc>
+                  <a:txBody>
+                    <a:bodyPr/>
+                    <a:lstStyle/>
+                    <a:p>
+                      <a:r>
+                        <a:rPr lang="en-IN" sz="1050" b="0" dirty="0"/>
+                        <a:t>F1</a:t>
+                      </a:r>
+                    </a:p>
+                  </a:txBody>
+                  <a:tcPr/>
+                </a:tc>
+                <a:tc>
+                  <a:txBody>
+                    <a:bodyPr/>
+                    <a:lstStyle/>
+                    <a:p>
+                      <a:r>
+                        <a:rPr lang="en-IN" sz="1050" b="0" dirty="0" err="1"/>
+                        <a:t>Acc</a:t>
+                      </a:r>
+                      <a:endParaRPr lang="en-IN" sz="1050" b="0" dirty="0"/>
+                    </a:p>
+                  </a:txBody>
+                  <a:tcPr/>
+                </a:tc>
+                <a:tc>
+                  <a:txBody>
+                    <a:bodyPr/>
+                    <a:lstStyle/>
+                    <a:p>
+                      <a:r>
+                        <a:rPr lang="en-IN" sz="1050" b="0" dirty="0"/>
+                        <a:t>AUC</a:t>
+                      </a:r>
+                    </a:p>
+                  </a:txBody>
+                  <a:tcPr/>
+                </a:tc>
+                <a:tc>
+                  <a:txBody>
+                    <a:bodyPr/>
+                    <a:lstStyle/>
+                    <a:p>
+                      <a:r>
+                        <a:rPr lang="en-IN" sz="1050" b="0" dirty="0"/>
+                        <a:t>F1</a:t>
+                      </a:r>
+                    </a:p>
+                  </a:txBody>
+                  <a:tcPr/>
+                </a:tc>
+                <a:tc>
+                  <a:txBody>
+                    <a:bodyPr/>
+                    <a:lstStyle/>
+                    <a:p>
+                      <a:r>
+                        <a:rPr lang="en-IN" sz="1050" b="0" dirty="0" err="1"/>
+                        <a:t>Acc</a:t>
+                      </a:r>
+                      <a:endParaRPr lang="en-IN" sz="1050" b="0" dirty="0"/>
+                    </a:p>
+                  </a:txBody>
+                  <a:tcPr/>
+                </a:tc>
+                <a:tc>
+                  <a:txBody>
+                    <a:bodyPr/>
+                    <a:lstStyle/>
+                    <a:p>
+                      <a:r>
+                        <a:rPr lang="en-IN" sz="1050" b="0" dirty="0"/>
+                        <a:t>AUC</a:t>
+                      </a:r>
+                    </a:p>
+                  </a:txBody>
+                  <a:tcPr/>
+                </a:tc>
+                <a:tc>
+                  <a:txBody>
+                    <a:bodyPr/>
+                    <a:lstStyle/>
+                    <a:p>
+                      <a:r>
+                        <a:rPr lang="en-IN" sz="1050" b="0" dirty="0"/>
+                        <a:t>F1</a:t>
+                      </a:r>
+                    </a:p>
+                  </a:txBody>
+                  <a:tcPr/>
+                </a:tc>
+                <a:extLst>
+                  <a:ext uri="{0D108BD9-81ED-4DB2-BD59-A6C34878D82A}">
+                    <a16:rowId xmlns:a16="http://schemas.microsoft.com/office/drawing/2014/main" val="2369134195"/>
+                  </a:ext>
+                </a:extLst>
+              </a:tr>
+              <a:tr h="313490">
+                <a:tc>
+                  <a:txBody>
+                    <a:bodyPr/>
+                    <a:lstStyle/>
+                    <a:p>
+                      <a:endParaRPr lang="en-IN" sz="1400" b="0" dirty="0"/>
+                    </a:p>
+                  </a:txBody>
+                  <a:tcPr/>
+                </a:tc>
+                <a:tc>
+                  <a:txBody>
+                    <a:bodyPr/>
+                    <a:lstStyle/>
+                    <a:p>
+                      <a:endParaRPr lang="en-IN" sz="1400" b="0" dirty="0"/>
+                    </a:p>
+                  </a:txBody>
+                  <a:tcPr/>
+                </a:tc>
+                <a:tc>
+                  <a:txBody>
+                    <a:bodyPr/>
+                    <a:lstStyle/>
+                    <a:p>
+                      <a:endParaRPr lang="en-IN" sz="1400" b="0" dirty="0"/>
+                    </a:p>
+                  </a:txBody>
+                  <a:tcPr/>
+                </a:tc>
+                <a:tc>
+                  <a:txBody>
+                    <a:bodyPr/>
+                    <a:lstStyle/>
+                    <a:p>
+                      <a:endParaRPr lang="en-IN" sz="1400" b="0" dirty="0"/>
+                    </a:p>
+                  </a:txBody>
+                  <a:tcPr/>
+                </a:tc>
+                <a:tc>
+                  <a:txBody>
+                    <a:bodyPr/>
+                    <a:lstStyle/>
+                    <a:p>
+                      <a:endParaRPr lang="en-IN" sz="1400" b="0" dirty="0"/>
+                    </a:p>
+                  </a:txBody>
+                  <a:tcPr/>
+                </a:tc>
+                <a:tc>
+                  <a:txBody>
+                    <a:bodyPr/>
+                    <a:lstStyle/>
+                    <a:p>
+                      <a:endParaRPr lang="en-IN" sz="1400" b="0" dirty="0"/>
+                    </a:p>
+                  </a:txBody>
+                  <a:tcPr/>
+                </a:tc>
+                <a:tc>
+                  <a:txBody>
+                    <a:bodyPr/>
+                    <a:lstStyle/>
+                    <a:p>
+                      <a:endParaRPr lang="en-IN" sz="1400" b="0" dirty="0"/>
+                    </a:p>
+                  </a:txBody>
+                  <a:tcPr/>
+                </a:tc>
+                <a:tc>
+                  <a:txBody>
+                    <a:bodyPr/>
+                    <a:lstStyle/>
+                    <a:p>
+                      <a:endParaRPr lang="en-IN" sz="1400" b="0" dirty="0"/>
+                    </a:p>
+                  </a:txBody>
+                  <a:tcPr/>
+                </a:tc>
+                <a:tc>
+                  <a:txBody>
+                    <a:bodyPr/>
+                    <a:lstStyle/>
+                    <a:p>
+                      <a:endParaRPr lang="en-IN" sz="1400" b="0" dirty="0"/>
+                    </a:p>
+                  </a:txBody>
+                  <a:tcPr/>
+                </a:tc>
+                <a:tc>
+                  <a:txBody>
+                    <a:bodyPr/>
+                    <a:lstStyle/>
+                    <a:p>
+                      <a:endParaRPr lang="en-IN" sz="1400" b="0" dirty="0"/>
+                    </a:p>
+                  </a:txBody>
+                  <a:tcPr/>
+                </a:tc>
+                <a:tc>
+                  <a:txBody>
+                    <a:bodyPr/>
+                    <a:lstStyle/>
+                    <a:p>
+                      <a:endParaRPr lang="en-IN" sz="1400" b="0" dirty="0"/>
+                    </a:p>
+                  </a:txBody>
+                  <a:tcPr/>
+                </a:tc>
+                <a:tc>
+                  <a:txBody>
+                    <a:bodyPr/>
+                    <a:lstStyle/>
+                    <a:p>
+                      <a:endParaRPr lang="en-IN" sz="1400" b="0" dirty="0"/>
+                    </a:p>
+                  </a:txBody>
+                  <a:tcPr/>
+                </a:tc>
+                <a:tc>
+                  <a:txBody>
+                    <a:bodyPr/>
+                    <a:lstStyle/>
+                    <a:p>
+                      <a:endParaRPr lang="en-IN" sz="1400" b="0" dirty="0"/>
+                    </a:p>
+                  </a:txBody>
+                  <a:tcPr/>
+                </a:tc>
+                <a:tc>
+                  <a:txBody>
+                    <a:bodyPr/>
+                    <a:lstStyle/>
+                    <a:p>
+                      <a:endParaRPr lang="en-IN" sz="1400" b="0" dirty="0"/>
+                    </a:p>
+                  </a:txBody>
+                  <a:tcPr/>
+                </a:tc>
+                <a:tc>
+                  <a:txBody>
+                    <a:bodyPr/>
+                    <a:lstStyle/>
+                    <a:p>
+                      <a:endParaRPr lang="en-IN" sz="1400" b="0" dirty="0"/>
+                    </a:p>
+                  </a:txBody>
+                  <a:tcPr/>
+                </a:tc>
+                <a:tc>
+                  <a:txBody>
+                    <a:bodyPr/>
+                    <a:lstStyle/>
+                    <a:p>
+                      <a:endParaRPr lang="en-IN" sz="1400" b="0" dirty="0"/>
+                    </a:p>
+                  </a:txBody>
+                  <a:tcPr/>
+                </a:tc>
+                <a:tc>
+                  <a:txBody>
+                    <a:bodyPr/>
+                    <a:lstStyle/>
+                    <a:p>
+                      <a:endParaRPr lang="en-IN" sz="1400" b="0" dirty="0"/>
+                    </a:p>
+                  </a:txBody>
+                  <a:tcPr/>
+                </a:tc>
+                <a:tc>
+                  <a:txBody>
+                    <a:bodyPr/>
+                    <a:lstStyle/>
+                    <a:p>
+                      <a:endParaRPr lang="en-IN" sz="1400" b="0" dirty="0"/>
+                    </a:p>
+                  </a:txBody>
+                  <a:tcPr/>
+                </a:tc>
+                <a:extLst>
+                  <a:ext uri="{0D108BD9-81ED-4DB2-BD59-A6C34878D82A}">
+                    <a16:rowId xmlns:a16="http://schemas.microsoft.com/office/drawing/2014/main" val="1811007431"/>
+                  </a:ext>
+                </a:extLst>
+              </a:tr>
+            </a:tbl>
+          </a:graphicData>
+        </a:graphic>
+      </p:graphicFrame>
+    </p:spTree>
+    <p:extLst>
+      <p:ext uri="{BB962C8B-B14F-4D97-AF65-F5344CB8AC3E}">
+        <p14:creationId xmlns:p14="http://schemas.microsoft.com/office/powerpoint/2010/main" val="942861192"/>
       </p:ext>
     </p:extLst>
   </p:cSld>
@@ -8752,7 +9194,7 @@
           <p:nvPr>
             <p:extLst>
               <p:ext uri="{D42A27DB-BD31-4B8C-83A1-F6EECF244321}">
-                <p14:modId xmlns:p14="http://schemas.microsoft.com/office/powerpoint/2010/main" val="4028718500"/>
+                <p14:modId xmlns:p14="http://schemas.microsoft.com/office/powerpoint/2010/main" val="3684079499"/>
               </p:ext>
             </p:extLst>
           </p:nvPr>
@@ -9110,7 +9552,7 @@
                     <a:p>
                       <a:r>
                         <a:rPr lang="en-IN" sz="1400" b="0" dirty="0"/>
-                        <a:t>11</a:t>
+                        <a:t>10</a:t>
                       </a:r>
                     </a:p>
                   </a:txBody>
@@ -9156,7 +9598,7 @@
                     <a:p>
                       <a:r>
                         <a:rPr lang="en-IN" sz="1400" b="0" dirty="0"/>
-                        <a:t>12</a:t>
+                        <a:t>11</a:t>
                       </a:r>
                     </a:p>
                   </a:txBody>
@@ -9202,7 +9644,7 @@
                     <a:p>
                       <a:r>
                         <a:rPr lang="en-IN" sz="1400" b="0" dirty="0"/>
-                        <a:t>13</a:t>
+                        <a:t>12</a:t>
                       </a:r>
                     </a:p>
                   </a:txBody>
@@ -9248,7 +9690,7 @@
                     <a:p>
                       <a:r>
                         <a:rPr lang="en-IN" sz="1400" b="0" dirty="0"/>
-                        <a:t>14</a:t>
+                        <a:t>13</a:t>
                       </a:r>
                     </a:p>
                   </a:txBody>
@@ -9294,7 +9736,7 @@
                     <a:p>
                       <a:r>
                         <a:rPr lang="en-IN" sz="1400" b="0" dirty="0"/>
-                        <a:t>15</a:t>
+                        <a:t>14</a:t>
                       </a:r>
                     </a:p>
                   </a:txBody>
@@ -9340,7 +9782,7 @@
                     <a:p>
                       <a:r>
                         <a:rPr lang="en-IN" sz="1400" b="0" dirty="0"/>
-                        <a:t>16</a:t>
+                        <a:t>15</a:t>
                       </a:r>
                     </a:p>
                   </a:txBody>
@@ -10144,11 +10586,13 @@
         <p:spPr>
           <a:xfrm>
             <a:off x="677334" y="1470764"/>
-            <a:ext cx="8596668" cy="3916471"/>
+            <a:ext cx="8596668" cy="4935723"/>
           </a:xfrm>
         </p:spPr>
         <p:txBody>
-          <a:bodyPr/>
+          <a:bodyPr>
+            <a:normAutofit fontScale="92500" lnSpcReduction="20000"/>
+          </a:bodyPr>
           <a:lstStyle/>
           <a:p>
             <a:r>
@@ -10185,45 +10629,67 @@
           <a:p>
             <a:pPr lvl="1"/>
             <a:r>
-              <a:rPr lang="en-IN" dirty="0"/>
-              <a:t>Long Method - </a:t>
+              <a:rPr lang="en-US" dirty="0"/>
+              <a:t>God Class – </a:t>
             </a:r>
             <a:r>
               <a:rPr lang="en-US" i="1" dirty="0"/>
-              <a:t>A method that is too lengthy and tries to do too much.</a:t>
+              <a:t>A class that takes on too many responsibilities, becoming overly complex and centralizing too much behavior.</a:t>
             </a:r>
           </a:p>
           <a:p>
             <a:pPr lvl="1"/>
             <a:r>
-              <a:rPr lang="en-IN" dirty="0"/>
-              <a:t>Large Class - </a:t>
+              <a:rPr lang="en-US" dirty="0"/>
+              <a:t>Refused Bequest – </a:t>
             </a:r>
             <a:r>
               <a:rPr lang="en-US" i="1" dirty="0"/>
-              <a:t>A class with too many responsibilities.</a:t>
+              <a:t>A subclass that inherits from a superclass but does not use or override the inherited features effectively.</a:t>
             </a:r>
           </a:p>
           <a:p>
             <a:pPr lvl="1"/>
             <a:r>
-              <a:rPr lang="en-IN" dirty="0"/>
-              <a:t>Duplicate Code - </a:t>
+              <a:rPr lang="en-US" dirty="0"/>
+              <a:t>Shotgun Surgery – </a:t>
             </a:r>
             <a:r>
               <a:rPr lang="en-US" i="1" dirty="0"/>
-              <a:t>Identical or very similar code appears in multiple places.</a:t>
+              <a:t>A change in one part of the system requires coordinated changes across many different classes.</a:t>
             </a:r>
           </a:p>
           <a:p>
             <a:pPr lvl="1"/>
             <a:r>
-              <a:rPr lang="en-IN" dirty="0"/>
-              <a:t>Data Class</a:t>
+              <a:rPr lang="en-US" dirty="0"/>
+              <a:t>Feature Envy – </a:t>
             </a:r>
             <a:r>
               <a:rPr lang="en-US" i="1" dirty="0"/>
-              <a:t> – A class that primarily contains fields (data).</a:t>
+              <a:t>A method that accesses the data of other classes more than its own, suggesting misplaced functionality.</a:t>
+            </a:r>
+          </a:p>
+          <a:p>
+            <a:pPr lvl="1"/>
+            <a:r>
+              <a:rPr lang="en-US" dirty="0"/>
+              <a:t>Long Method – </a:t>
+            </a:r>
+            <a:r>
+              <a:rPr lang="en-US" i="1" dirty="0"/>
+              <a:t>A method that is excessively long, trying to do too much and becoming hard to read or maintain.</a:t>
+            </a:r>
+          </a:p>
+          <a:p>
+            <a:pPr lvl="1"/>
+            <a:r>
+              <a:rPr lang="en-US" dirty="0"/>
+              <a:t>Long Parameter List – </a:t>
+            </a:r>
+            <a:r>
+              <a:rPr lang="en-US" i="1" dirty="0"/>
+              <a:t>A method that requires too many parameters, making it difficult to understand and prone to misuse.</a:t>
             </a:r>
           </a:p>
           <a:p>
@@ -12174,7 +12640,13 @@
   <p:cSld>
     <p:spTree>
       <p:nvGrpSpPr>
-        <p:cNvPr id="1" name=""/>
+        <p:cNvPr id="1" name="">
+          <a:extLst>
+            <a:ext uri="{FF2B5EF4-FFF2-40B4-BE49-F238E27FC236}">
+              <a16:creationId xmlns:a16="http://schemas.microsoft.com/office/drawing/2014/main" id="{210B94F8-BF55-5CA6-32BE-94BD832DA418}"/>
+            </a:ext>
+          </a:extLst>
+        </p:cNvPr>
         <p:cNvGrpSpPr/>
         <p:nvPr/>
       </p:nvGrpSpPr>
@@ -12188,7 +12660,13 @@
       </p:grpSpPr>
       <p:sp>
         <p:nvSpPr>
-          <p:cNvPr id="2" name="Title 1"/>
+          <p:cNvPr id="2" name="Title 1">
+            <a:extLst>
+              <a:ext uri="{FF2B5EF4-FFF2-40B4-BE49-F238E27FC236}">
+                <a16:creationId xmlns:a16="http://schemas.microsoft.com/office/drawing/2014/main" id="{42672787-B530-95A5-FC5D-F557C0462F50}"/>
+              </a:ext>
+            </a:extLst>
+          </p:cNvPr>
           <p:cNvSpPr>
             <a:spLocks noGrp="1"/>
           </p:cNvSpPr>
@@ -12218,7 +12696,13 @@
       </p:sp>
       <p:sp>
         <p:nvSpPr>
-          <p:cNvPr id="3" name="Content Placeholder 2"/>
+          <p:cNvPr id="3" name="Content Placeholder 2">
+            <a:extLst>
+              <a:ext uri="{FF2B5EF4-FFF2-40B4-BE49-F238E27FC236}">
+                <a16:creationId xmlns:a16="http://schemas.microsoft.com/office/drawing/2014/main" id="{87BC5DBE-EB6D-8304-529B-38B03D5D8FBA}"/>
+              </a:ext>
+            </a:extLst>
+          </p:cNvPr>
           <p:cNvSpPr>
             <a:spLocks noGrp="1"/>
           </p:cNvSpPr>
@@ -12309,19 +12793,29 @@
             </a:r>
             <a:r>
               <a:rPr lang="en-US" dirty="0"/>
-              <a:t> Corpus’ (http://qualitascorpus.com/download/).</a:t>
-            </a:r>
-          </a:p>
-          <a:p>
-            <a:r>
-              <a:rPr lang="en-US" dirty="0"/>
-              <a:t>State-of-the-art Fisher’s Score and Sequential Forward feature selection techniques are sequentially ensemble in order to perform optimal dimensionality reduction. </a:t>
-            </a:r>
-          </a:p>
-          <a:p>
-            <a:r>
-              <a:rPr lang="en-US" dirty="0"/>
-              <a:t>Detect a total of six code smells from the dataset namely God Class (GC), Refused Bequest (RB), Shotgun Surgery (SS), Feature Envy (FE), Long Method (LM) and Long Parameter List (LPL). </a:t>
+              <a:t> Corpus’ (</a:t>
+            </a:r>
+            <a:r>
+              <a:rPr lang="en-US" dirty="0">
+                <a:hlinkClick r:id="rId3"/>
+              </a:rPr>
+              <a:t>http://qualitascorpus.com/download/</a:t>
+            </a:r>
+            <a:r>
+              <a:rPr lang="en-US" dirty="0"/>
+              <a:t>).</a:t>
+            </a:r>
+          </a:p>
+          <a:p>
+            <a:r>
+              <a:rPr lang="en-US" dirty="0"/>
+              <a:t>State-of-the-art Fisher’s Score and Sequential Forward feature selection techniques are sequentially ensembled in order to perform optimal dimensionality reduction. </a:t>
+            </a:r>
+          </a:p>
+          <a:p>
+            <a:r>
+              <a:rPr lang="en-US" dirty="0"/>
+              <a:t>Detected a total of six code smells from the dataset namely God Class (GC), Refused Bequest (RB), Shotgun Surgery (SS), Feature Envy (FE), Long Method (LM) and Long Parameter List (LPL). </a:t>
             </a:r>
           </a:p>
           <a:p>
@@ -12344,7 +12838,7 @@
           <p:cNvPr id="4" name="Slide Number Placeholder 3">
             <a:extLst>
               <a:ext uri="{FF2B5EF4-FFF2-40B4-BE49-F238E27FC236}">
-                <a16:creationId xmlns:a16="http://schemas.microsoft.com/office/drawing/2014/main" id="{E316377E-6CA0-7948-553D-07A825B6F9B0}"/>
+                <a16:creationId xmlns:a16="http://schemas.microsoft.com/office/drawing/2014/main" id="{0670B763-EEE6-C4E0-6235-EA8E51F679A6}"/>
               </a:ext>
             </a:extLst>
           </p:cNvPr>
@@ -12372,7 +12866,7 @@
     </p:spTree>
     <p:extLst>
       <p:ext uri="{BB962C8B-B14F-4D97-AF65-F5344CB8AC3E}">
-        <p14:creationId xmlns:p14="http://schemas.microsoft.com/office/powerpoint/2010/main" val="3409852229"/>
+        <p14:creationId xmlns:p14="http://schemas.microsoft.com/office/powerpoint/2010/main" val="2382418076"/>
       </p:ext>
     </p:extLst>
   </p:cSld>

</xml_diff>

<commit_message>
Update: Add changes to ppt
</commit_message>
<xml_diff>
--- a/CodeSmell.pptx
+++ b/CodeSmell.pptx
@@ -218,7 +218,7 @@
           <a:p>
             <a:fld id="{3477A0F4-F4B0-47AB-8AD3-20B19DF9E985}" type="datetimeFigureOut">
               <a:rPr lang="en-IN" smtClean="0"/>
-              <a:t>05-04-2025</a:t>
+              <a:t>17-04-2025</a:t>
             </a:fld>
             <a:endParaRPr lang="en-IN"/>
           </a:p>
@@ -1208,7 +1208,7 @@
           <a:p>
             <a:fld id="{F5216777-8CF8-44EF-918D-95D52E42AA54}" type="datetime1">
               <a:rPr lang="en-US" smtClean="0"/>
-              <a:t>4/5/2025</a:t>
+              <a:t>4/17/2025</a:t>
             </a:fld>
             <a:endParaRPr lang="en-US" dirty="0"/>
           </a:p>
@@ -1455,7 +1455,7 @@
           <a:p>
             <a:fld id="{C9D32BD1-F3ED-4813-85AF-BECC294657EF}" type="datetime1">
               <a:rPr lang="en-US" smtClean="0"/>
-              <a:t>4/5/2025</a:t>
+              <a:t>4/17/2025</a:t>
             </a:fld>
             <a:endParaRPr lang="en-US" dirty="0"/>
           </a:p>
@@ -1765,7 +1765,7 @@
           <a:p>
             <a:fld id="{9FAB4F2F-5C14-4288-BED3-014E7FC07CA5}" type="datetime1">
               <a:rPr lang="en-US" smtClean="0"/>
-              <a:t>4/5/2025</a:t>
+              <a:t>4/17/2025</a:t>
             </a:fld>
             <a:endParaRPr lang="en-US" dirty="0"/>
           </a:p>
@@ -2102,7 +2102,7 @@
           <a:p>
             <a:fld id="{AFE3FA00-20E5-4A4C-BAA8-07B798C3E2BD}" type="datetime1">
               <a:rPr lang="en-US" smtClean="0"/>
-              <a:t>4/5/2025</a:t>
+              <a:t>4/17/2025</a:t>
             </a:fld>
             <a:endParaRPr lang="en-US" dirty="0"/>
           </a:p>
@@ -2412,7 +2412,7 @@
           <a:p>
             <a:fld id="{6F4CE6E6-2F32-4A83-9A37-70D1242ECAB6}" type="datetime1">
               <a:rPr lang="en-US" smtClean="0"/>
-              <a:t>4/5/2025</a:t>
+              <a:t>4/17/2025</a:t>
             </a:fld>
             <a:endParaRPr lang="en-US" dirty="0"/>
           </a:p>
@@ -2801,7 +2801,7 @@
           <a:p>
             <a:fld id="{6715C4D8-B5D6-4776-97F7-E88E156E5654}" type="datetime1">
               <a:rPr lang="en-US" smtClean="0"/>
-              <a:t>4/5/2025</a:t>
+              <a:t>4/17/2025</a:t>
             </a:fld>
             <a:endParaRPr lang="en-US" dirty="0"/>
           </a:p>
@@ -2967,7 +2967,7 @@
           <a:p>
             <a:fld id="{F41EEF30-2CB4-4570-B5B0-E499B56D6D14}" type="datetime1">
               <a:rPr lang="en-US" smtClean="0"/>
-              <a:t>4/5/2025</a:t>
+              <a:t>4/17/2025</a:t>
             </a:fld>
             <a:endParaRPr lang="en-US" dirty="0"/>
           </a:p>
@@ -3142,7 +3142,7 @@
           <a:p>
             <a:fld id="{AA065F5D-77F6-475F-B01F-10D1CD8DB549}" type="datetime1">
               <a:rPr lang="en-US" smtClean="0"/>
-              <a:t>4/5/2025</a:t>
+              <a:t>4/17/2025</a:t>
             </a:fld>
             <a:endParaRPr lang="en-US" dirty="0"/>
           </a:p>
@@ -3314,7 +3314,7 @@
           <a:p>
             <a:fld id="{1F33A9EA-982D-4C95-BE30-80266B31B5C1}" type="datetime1">
               <a:rPr lang="en-US" smtClean="0"/>
-              <a:t>4/5/2025</a:t>
+              <a:t>4/17/2025</a:t>
             </a:fld>
             <a:endParaRPr lang="en-US" dirty="0"/>
           </a:p>
@@ -3557,7 +3557,7 @@
           <a:p>
             <a:fld id="{A0A73C04-3D1F-411B-A909-DDCC763A5C00}" type="datetime1">
               <a:rPr lang="en-US" smtClean="0"/>
-              <a:t>4/5/2025</a:t>
+              <a:t>4/17/2025</a:t>
             </a:fld>
             <a:endParaRPr lang="en-US" dirty="0"/>
           </a:p>
@@ -3785,7 +3785,7 @@
           <a:p>
             <a:fld id="{8928AD85-DA1C-41FB-B7AD-144E0E16F6B6}" type="datetime1">
               <a:rPr lang="en-US" smtClean="0"/>
-              <a:t>4/5/2025</a:t>
+              <a:t>4/17/2025</a:t>
             </a:fld>
             <a:endParaRPr lang="en-US" dirty="0"/>
           </a:p>
@@ -4154,7 +4154,7 @@
           <a:p>
             <a:fld id="{0B3D44CA-F9BF-49FB-8D37-754D687697D5}" type="datetime1">
               <a:rPr lang="en-US" smtClean="0"/>
-              <a:t>4/5/2025</a:t>
+              <a:t>4/17/2025</a:t>
             </a:fld>
             <a:endParaRPr lang="en-US" dirty="0"/>
           </a:p>
@@ -4273,7 +4273,7 @@
           <a:p>
             <a:fld id="{1C523E35-C864-4A29-ACE9-100F432E4952}" type="datetime1">
               <a:rPr lang="en-US" smtClean="0"/>
-              <a:t>4/5/2025</a:t>
+              <a:t>4/17/2025</a:t>
             </a:fld>
             <a:endParaRPr lang="en-US" dirty="0"/>
           </a:p>
@@ -4364,7 +4364,7 @@
           <a:p>
             <a:fld id="{D7DFBF09-6E3C-4688-9606-0E9C6F3613BA}" type="datetime1">
               <a:rPr lang="en-US" smtClean="0"/>
-              <a:t>4/5/2025</a:t>
+              <a:t>4/17/2025</a:t>
             </a:fld>
             <a:endParaRPr lang="en-US" dirty="0"/>
           </a:p>
@@ -4615,7 +4615,7 @@
           <a:p>
             <a:fld id="{7C045EC9-A980-4184-A543-9D019DCCC163}" type="datetime1">
               <a:rPr lang="en-US" smtClean="0"/>
-              <a:t>4/5/2025</a:t>
+              <a:t>4/17/2025</a:t>
             </a:fld>
             <a:endParaRPr lang="en-US" dirty="0"/>
           </a:p>
@@ -4873,7 +4873,7 @@
           <a:p>
             <a:fld id="{901550FA-0534-4AA0-BC1C-F5B34A59CB62}" type="datetime1">
               <a:rPr lang="en-US" smtClean="0"/>
-              <a:t>4/5/2025</a:t>
+              <a:t>4/17/2025</a:t>
             </a:fld>
             <a:endParaRPr lang="en-US" dirty="0"/>
           </a:p>
@@ -5612,7 +5612,7 @@
           <a:p>
             <a:fld id="{3034F704-DBC3-4027-A48D-1AF54B5EC8CB}" type="datetime1">
               <a:rPr lang="en-US" smtClean="0"/>
-              <a:t>4/5/2025</a:t>
+              <a:t>4/17/2025</a:t>
             </a:fld>
             <a:endParaRPr lang="en-US" dirty="0"/>
           </a:p>
@@ -6196,7 +6196,7 @@
           <p:cNvPr id="4" name="Slide Number Placeholder 3">
             <a:extLst>
               <a:ext uri="{FF2B5EF4-FFF2-40B4-BE49-F238E27FC236}">
-                <a16:creationId xmlns:a16="http://schemas.microsoft.com/office/drawing/2014/main" id="{5424A006-3C54-D088-0B29-55DA11CF879C}"/>
+                <a16:creationId xmlns:a16="http://schemas.microsoft.com/office/drawing/2014/main" xmlns="" id="{5424A006-3C54-D088-0B29-55DA11CF879C}"/>
               </a:ext>
             </a:extLst>
           </p:cNvPr>
@@ -6351,7 +6351,7 @@
           <p:cNvPr id="5" name="Slide Number Placeholder 4">
             <a:extLst>
               <a:ext uri="{FF2B5EF4-FFF2-40B4-BE49-F238E27FC236}">
-                <a16:creationId xmlns:a16="http://schemas.microsoft.com/office/drawing/2014/main" id="{86DF5BAE-D583-8BBF-24CE-B4EFFF43AC8E}"/>
+                <a16:creationId xmlns:a16="http://schemas.microsoft.com/office/drawing/2014/main" xmlns="" id="{86DF5BAE-D583-8BBF-24CE-B4EFFF43AC8E}"/>
               </a:ext>
             </a:extLst>
           </p:cNvPr>
@@ -6496,7 +6496,7 @@
           <p:cNvPr id="4" name="Slide Number Placeholder 3">
             <a:extLst>
               <a:ext uri="{FF2B5EF4-FFF2-40B4-BE49-F238E27FC236}">
-                <a16:creationId xmlns:a16="http://schemas.microsoft.com/office/drawing/2014/main" id="{F2EA3AF7-FE6D-3982-9846-DC957C8B1D7F}"/>
+                <a16:creationId xmlns:a16="http://schemas.microsoft.com/office/drawing/2014/main" xmlns="" id="{F2EA3AF7-FE6D-3982-9846-DC957C8B1D7F}"/>
               </a:ext>
             </a:extLst>
           </p:cNvPr>
@@ -6577,6 +6577,10 @@
               <a:rPr lang="en-US" dirty="0"/>
               <a:t>Base Paper Ensemble Feature Selection</a:t>
             </a:r>
+            <a:r>
+              <a:rPr lang="en-US" b="1" dirty="0"/>
+              <a:t/>
+            </a:r>
             <a:br>
               <a:rPr lang="en-US" b="1" dirty="0"/>
             </a:br>
@@ -6730,7 +6734,7 @@
           <p:cNvPr id="4" name="Picture 3">
             <a:extLst>
               <a:ext uri="{FF2B5EF4-FFF2-40B4-BE49-F238E27FC236}">
-                <a16:creationId xmlns:a16="http://schemas.microsoft.com/office/drawing/2014/main" id="{D15AF1AD-C039-34BD-0B3F-D9D62EBCA068}"/>
+                <a16:creationId xmlns:a16="http://schemas.microsoft.com/office/drawing/2014/main" xmlns="" id="{D15AF1AD-C039-34BD-0B3F-D9D62EBCA068}"/>
               </a:ext>
             </a:extLst>
           </p:cNvPr>
@@ -6760,7 +6764,7 @@
           <p:cNvPr id="5" name="Slide Number Placeholder 4">
             <a:extLst>
               <a:ext uri="{FF2B5EF4-FFF2-40B4-BE49-F238E27FC236}">
-                <a16:creationId xmlns:a16="http://schemas.microsoft.com/office/drawing/2014/main" id="{5E380720-D079-A5A7-E807-8B0CD168767D}"/>
+                <a16:creationId xmlns:a16="http://schemas.microsoft.com/office/drawing/2014/main" xmlns="" id="{5E380720-D079-A5A7-E807-8B0CD168767D}"/>
               </a:ext>
             </a:extLst>
           </p:cNvPr>
@@ -6841,6 +6845,10 @@
               <a:rPr lang="en-US" dirty="0"/>
               <a:t>Base Paper Classification &amp; Evaluation</a:t>
             </a:r>
+            <a:r>
+              <a:rPr lang="en-IN" b="1" dirty="0"/>
+              <a:t/>
+            </a:r>
             <a:br>
               <a:rPr lang="en-IN" b="1" dirty="0"/>
             </a:br>
@@ -6887,7 +6895,7 @@
           <p:cNvPr id="4" name="Picture 3">
             <a:extLst>
               <a:ext uri="{FF2B5EF4-FFF2-40B4-BE49-F238E27FC236}">
-                <a16:creationId xmlns:a16="http://schemas.microsoft.com/office/drawing/2014/main" id="{878BAA3E-3A3C-34AE-AC38-E54F5964C4D2}"/>
+                <a16:creationId xmlns:a16="http://schemas.microsoft.com/office/drawing/2014/main" xmlns="" id="{878BAA3E-3A3C-34AE-AC38-E54F5964C4D2}"/>
               </a:ext>
             </a:extLst>
           </p:cNvPr>
@@ -6917,7 +6925,7 @@
           <p:cNvPr id="5" name="Slide Number Placeholder 4">
             <a:extLst>
               <a:ext uri="{FF2B5EF4-FFF2-40B4-BE49-F238E27FC236}">
-                <a16:creationId xmlns:a16="http://schemas.microsoft.com/office/drawing/2014/main" id="{4BFC5433-67A0-1097-FA71-445237C24331}"/>
+                <a16:creationId xmlns:a16="http://schemas.microsoft.com/office/drawing/2014/main" xmlns="" id="{4BFC5433-67A0-1097-FA71-445237C24331}"/>
               </a:ext>
             </a:extLst>
           </p:cNvPr>
@@ -6963,7 +6971,7 @@
         <p:cNvPr id="1" name="">
           <a:extLst>
             <a:ext uri="{FF2B5EF4-FFF2-40B4-BE49-F238E27FC236}">
-              <a16:creationId xmlns:a16="http://schemas.microsoft.com/office/drawing/2014/main" id="{FFCAD31C-4A52-61CB-9066-A325F52D3FB9}"/>
+              <a16:creationId xmlns:a16="http://schemas.microsoft.com/office/drawing/2014/main" xmlns="" id="{FFCAD31C-4A52-61CB-9066-A325F52D3FB9}"/>
             </a:ext>
           </a:extLst>
         </p:cNvPr>
@@ -6983,7 +6991,7 @@
           <p:cNvPr id="2" name="Title 1">
             <a:extLst>
               <a:ext uri="{FF2B5EF4-FFF2-40B4-BE49-F238E27FC236}">
-                <a16:creationId xmlns:a16="http://schemas.microsoft.com/office/drawing/2014/main" id="{88B1566E-CBB6-09C4-7D7D-AE361F37E17D}"/>
+                <a16:creationId xmlns:a16="http://schemas.microsoft.com/office/drawing/2014/main" xmlns="" id="{88B1566E-CBB6-09C4-7D7D-AE361F37E17D}"/>
               </a:ext>
             </a:extLst>
           </p:cNvPr>
@@ -7018,7 +7026,7 @@
           <p:cNvPr id="3" name="Content Placeholder 2">
             <a:extLst>
               <a:ext uri="{FF2B5EF4-FFF2-40B4-BE49-F238E27FC236}">
-                <a16:creationId xmlns:a16="http://schemas.microsoft.com/office/drawing/2014/main" id="{5F551514-38DE-6114-D94D-D898654DE9CE}"/>
+                <a16:creationId xmlns:a16="http://schemas.microsoft.com/office/drawing/2014/main" xmlns="" id="{5F551514-38DE-6114-D94D-D898654DE9CE}"/>
               </a:ext>
             </a:extLst>
           </p:cNvPr>
@@ -7096,7 +7104,7 @@
           <p:cNvPr id="4" name="Slide Number Placeholder 3">
             <a:extLst>
               <a:ext uri="{FF2B5EF4-FFF2-40B4-BE49-F238E27FC236}">
-                <a16:creationId xmlns:a16="http://schemas.microsoft.com/office/drawing/2014/main" id="{64C9A553-CA73-E8D8-C2F2-898507189E32}"/>
+                <a16:creationId xmlns:a16="http://schemas.microsoft.com/office/drawing/2014/main" xmlns="" id="{64C9A553-CA73-E8D8-C2F2-898507189E32}"/>
               </a:ext>
             </a:extLst>
           </p:cNvPr>
@@ -7142,7 +7150,7 @@
         <p:cNvPr id="1" name="">
           <a:extLst>
             <a:ext uri="{FF2B5EF4-FFF2-40B4-BE49-F238E27FC236}">
-              <a16:creationId xmlns:a16="http://schemas.microsoft.com/office/drawing/2014/main" id="{47083271-4F12-5F65-3023-57341899FAD0}"/>
+              <a16:creationId xmlns:a16="http://schemas.microsoft.com/office/drawing/2014/main" xmlns="" id="{47083271-4F12-5F65-3023-57341899FAD0}"/>
             </a:ext>
           </a:extLst>
         </p:cNvPr>
@@ -7162,7 +7170,7 @@
           <p:cNvPr id="2" name="Title 1">
             <a:extLst>
               <a:ext uri="{FF2B5EF4-FFF2-40B4-BE49-F238E27FC236}">
-                <a16:creationId xmlns:a16="http://schemas.microsoft.com/office/drawing/2014/main" id="{7E3349D9-FB67-5E3F-D476-6AF28D50C284}"/>
+                <a16:creationId xmlns:a16="http://schemas.microsoft.com/office/drawing/2014/main" xmlns="" id="{7E3349D9-FB67-5E3F-D476-6AF28D50C284}"/>
               </a:ext>
             </a:extLst>
           </p:cNvPr>
@@ -7196,7 +7204,7 @@
           <p:cNvPr id="3" name="Content Placeholder 2">
             <a:extLst>
               <a:ext uri="{FF2B5EF4-FFF2-40B4-BE49-F238E27FC236}">
-                <a16:creationId xmlns:a16="http://schemas.microsoft.com/office/drawing/2014/main" id="{F3E5417D-F6C6-C23B-82AF-A1204513D848}"/>
+                <a16:creationId xmlns:a16="http://schemas.microsoft.com/office/drawing/2014/main" xmlns="" id="{F3E5417D-F6C6-C23B-82AF-A1204513D848}"/>
               </a:ext>
             </a:extLst>
           </p:cNvPr>
@@ -7337,7 +7345,7 @@
           <p:cNvPr id="4" name="Slide Number Placeholder 3">
             <a:extLst>
               <a:ext uri="{FF2B5EF4-FFF2-40B4-BE49-F238E27FC236}">
-                <a16:creationId xmlns:a16="http://schemas.microsoft.com/office/drawing/2014/main" id="{D6ACF151-BBCB-61AD-9C30-3CC5397150D7}"/>
+                <a16:creationId xmlns:a16="http://schemas.microsoft.com/office/drawing/2014/main" xmlns="" id="{D6ACF151-BBCB-61AD-9C30-3CC5397150D7}"/>
               </a:ext>
             </a:extLst>
           </p:cNvPr>
@@ -7383,7 +7391,7 @@
         <p:cNvPr id="1" name="">
           <a:extLst>
             <a:ext uri="{FF2B5EF4-FFF2-40B4-BE49-F238E27FC236}">
-              <a16:creationId xmlns:a16="http://schemas.microsoft.com/office/drawing/2014/main" id="{C34B3ACD-3AAB-09E3-E3BD-E9BDFC67CBE7}"/>
+              <a16:creationId xmlns:a16="http://schemas.microsoft.com/office/drawing/2014/main" xmlns="" id="{C34B3ACD-3AAB-09E3-E3BD-E9BDFC67CBE7}"/>
             </a:ext>
           </a:extLst>
         </p:cNvPr>
@@ -7403,7 +7411,7 @@
           <p:cNvPr id="2" name="Title 1">
             <a:extLst>
               <a:ext uri="{FF2B5EF4-FFF2-40B4-BE49-F238E27FC236}">
-                <a16:creationId xmlns:a16="http://schemas.microsoft.com/office/drawing/2014/main" id="{C67A737D-C9B3-5271-0F1D-49CF2CF4BF60}"/>
+                <a16:creationId xmlns:a16="http://schemas.microsoft.com/office/drawing/2014/main" xmlns="" id="{C67A737D-C9B3-5271-0F1D-49CF2CF4BF60}"/>
               </a:ext>
             </a:extLst>
           </p:cNvPr>
@@ -7437,7 +7445,7 @@
           <p:cNvPr id="3" name="Content Placeholder 2">
             <a:extLst>
               <a:ext uri="{FF2B5EF4-FFF2-40B4-BE49-F238E27FC236}">
-                <a16:creationId xmlns:a16="http://schemas.microsoft.com/office/drawing/2014/main" id="{CDFCB15B-6FF5-9CFE-B9B6-B34CE437D2DC}"/>
+                <a16:creationId xmlns:a16="http://schemas.microsoft.com/office/drawing/2014/main" xmlns="" id="{CDFCB15B-6FF5-9CFE-B9B6-B34CE437D2DC}"/>
               </a:ext>
             </a:extLst>
           </p:cNvPr>
@@ -7571,7 +7579,7 @@
           <p:cNvPr id="4" name="Slide Number Placeholder 3">
             <a:extLst>
               <a:ext uri="{FF2B5EF4-FFF2-40B4-BE49-F238E27FC236}">
-                <a16:creationId xmlns:a16="http://schemas.microsoft.com/office/drawing/2014/main" id="{8498B10D-6952-B8D5-F929-B5555ED66D78}"/>
+                <a16:creationId xmlns:a16="http://schemas.microsoft.com/office/drawing/2014/main" xmlns="" id="{8498B10D-6952-B8D5-F929-B5555ED66D78}"/>
               </a:ext>
             </a:extLst>
           </p:cNvPr>
@@ -7617,7 +7625,7 @@
         <p:cNvPr id="1" name="">
           <a:extLst>
             <a:ext uri="{FF2B5EF4-FFF2-40B4-BE49-F238E27FC236}">
-              <a16:creationId xmlns:a16="http://schemas.microsoft.com/office/drawing/2014/main" id="{DDC70A7A-25AD-FA8B-8BD2-703B049C11C4}"/>
+              <a16:creationId xmlns:a16="http://schemas.microsoft.com/office/drawing/2014/main" xmlns="" id="{DDC70A7A-25AD-FA8B-8BD2-703B049C11C4}"/>
             </a:ext>
           </a:extLst>
         </p:cNvPr>
@@ -7637,7 +7645,7 @@
           <p:cNvPr id="2" name="Title 1">
             <a:extLst>
               <a:ext uri="{FF2B5EF4-FFF2-40B4-BE49-F238E27FC236}">
-                <a16:creationId xmlns:a16="http://schemas.microsoft.com/office/drawing/2014/main" id="{6562A318-8D3A-A044-52CE-417BB2A82EDE}"/>
+                <a16:creationId xmlns:a16="http://schemas.microsoft.com/office/drawing/2014/main" xmlns="" id="{6562A318-8D3A-A044-52CE-417BB2A82EDE}"/>
               </a:ext>
             </a:extLst>
           </p:cNvPr>
@@ -7671,7 +7679,7 @@
           <p:cNvPr id="3" name="Content Placeholder 2">
             <a:extLst>
               <a:ext uri="{FF2B5EF4-FFF2-40B4-BE49-F238E27FC236}">
-                <a16:creationId xmlns:a16="http://schemas.microsoft.com/office/drawing/2014/main" id="{5EF3F644-EE4E-7E2F-7863-DBB1AAF700BB}"/>
+                <a16:creationId xmlns:a16="http://schemas.microsoft.com/office/drawing/2014/main" xmlns="" id="{5EF3F644-EE4E-7E2F-7863-DBB1AAF700BB}"/>
               </a:ext>
             </a:extLst>
           </p:cNvPr>
@@ -7748,7 +7756,7 @@
           <p:cNvPr id="4" name="Slide Number Placeholder 3">
             <a:extLst>
               <a:ext uri="{FF2B5EF4-FFF2-40B4-BE49-F238E27FC236}">
-                <a16:creationId xmlns:a16="http://schemas.microsoft.com/office/drawing/2014/main" id="{41DAEF17-F7E7-BE4B-96B1-C740115A817D}"/>
+                <a16:creationId xmlns:a16="http://schemas.microsoft.com/office/drawing/2014/main" xmlns="" id="{41DAEF17-F7E7-BE4B-96B1-C740115A817D}"/>
               </a:ext>
             </a:extLst>
           </p:cNvPr>
@@ -7778,7 +7786,7 @@
           <p:cNvPr id="5" name="Picture 4">
             <a:extLst>
               <a:ext uri="{FF2B5EF4-FFF2-40B4-BE49-F238E27FC236}">
-                <a16:creationId xmlns:a16="http://schemas.microsoft.com/office/drawing/2014/main" id="{1C51B4F1-012C-D676-3C8B-5BFD0283F2B8}"/>
+                <a16:creationId xmlns:a16="http://schemas.microsoft.com/office/drawing/2014/main" xmlns="" id="{1C51B4F1-012C-D676-3C8B-5BFD0283F2B8}"/>
               </a:ext>
             </a:extLst>
           </p:cNvPr>
@@ -7808,7 +7816,7 @@
           <p:cNvPr id="6" name="Table 5">
             <a:extLst>
               <a:ext uri="{FF2B5EF4-FFF2-40B4-BE49-F238E27FC236}">
-                <a16:creationId xmlns:a16="http://schemas.microsoft.com/office/drawing/2014/main" id="{FA6BD519-3C63-B9F8-647E-063D18F6D07B}"/>
+                <a16:creationId xmlns:a16="http://schemas.microsoft.com/office/drawing/2014/main" xmlns="" id="{FA6BD519-3C63-B9F8-647E-063D18F6D07B}"/>
               </a:ext>
             </a:extLst>
           </p:cNvPr>
@@ -7818,14 +7826,14 @@
           <p:nvPr>
             <p:extLst>
               <p:ext uri="{D42A27DB-BD31-4B8C-83A1-F6EECF244321}">
-                <p14:modId xmlns:p14="http://schemas.microsoft.com/office/powerpoint/2010/main" val="2466273918"/>
+                <p14:modId xmlns:p14="http://schemas.microsoft.com/office/powerpoint/2010/main" val="737047228"/>
               </p:ext>
             </p:extLst>
           </p:nvPr>
         </p:nvGraphicFramePr>
         <p:xfrm>
           <a:off x="1026823" y="4184778"/>
-          <a:ext cx="8661291" cy="1168072"/>
+          <a:ext cx="8661291" cy="1586102"/>
         </p:xfrm>
         <a:graphic>
           <a:graphicData uri="http://schemas.openxmlformats.org/drawingml/2006/table">
@@ -7837,126 +7845,126 @@
                 <a:gridCol w="516255">
                   <a:extLst>
                     <a:ext uri="{9D8B030D-6E8A-4147-A177-3AD203B41FA5}">
-                      <a16:colId xmlns:a16="http://schemas.microsoft.com/office/drawing/2014/main" val="2824826579"/>
+                      <a16:colId xmlns:a16="http://schemas.microsoft.com/office/drawing/2014/main" xmlns="" val="2824826579"/>
                     </a:ext>
                   </a:extLst>
                 </a:gridCol>
                 <a:gridCol w="456979">
                   <a:extLst>
                     <a:ext uri="{9D8B030D-6E8A-4147-A177-3AD203B41FA5}">
-                      <a16:colId xmlns:a16="http://schemas.microsoft.com/office/drawing/2014/main" val="3619868740"/>
+                      <a16:colId xmlns:a16="http://schemas.microsoft.com/office/drawing/2014/main" xmlns="" val="3619868740"/>
                     </a:ext>
                   </a:extLst>
                 </a:gridCol>
                 <a:gridCol w="373492">
                   <a:extLst>
                     <a:ext uri="{9D8B030D-6E8A-4147-A177-3AD203B41FA5}">
-                      <a16:colId xmlns:a16="http://schemas.microsoft.com/office/drawing/2014/main" val="1529899458"/>
+                      <a16:colId xmlns:a16="http://schemas.microsoft.com/office/drawing/2014/main" xmlns="" val="1529899458"/>
                     </a:ext>
                   </a:extLst>
                 </a:gridCol>
                 <a:gridCol w="476340">
                   <a:extLst>
                     <a:ext uri="{9D8B030D-6E8A-4147-A177-3AD203B41FA5}">
-                      <a16:colId xmlns:a16="http://schemas.microsoft.com/office/drawing/2014/main" val="520572402"/>
+                      <a16:colId xmlns:a16="http://schemas.microsoft.com/office/drawing/2014/main" xmlns="" val="520572402"/>
                     </a:ext>
                   </a:extLst>
                 </a:gridCol>
-                <a:gridCol w="644012">
+                <a:gridCol w="476785">
                   <a:extLst>
                     <a:ext uri="{9D8B030D-6E8A-4147-A177-3AD203B41FA5}">
-                      <a16:colId xmlns:a16="http://schemas.microsoft.com/office/drawing/2014/main" val="2060422182"/>
+                      <a16:colId xmlns:a16="http://schemas.microsoft.com/office/drawing/2014/main" xmlns="" val="2060422182"/>
                     </a:ext>
                   </a:extLst>
                 </a:gridCol>
-                <a:gridCol w="392853">
+                <a:gridCol w="560080">
                   <a:extLst>
                     <a:ext uri="{9D8B030D-6E8A-4147-A177-3AD203B41FA5}">
-                      <a16:colId xmlns:a16="http://schemas.microsoft.com/office/drawing/2014/main" val="1179312162"/>
+                      <a16:colId xmlns:a16="http://schemas.microsoft.com/office/drawing/2014/main" xmlns="" val="1179312162"/>
                     </a:ext>
                   </a:extLst>
                 </a:gridCol>
                 <a:gridCol w="440267">
                   <a:extLst>
                     <a:ext uri="{9D8B030D-6E8A-4147-A177-3AD203B41FA5}">
-                      <a16:colId xmlns:a16="http://schemas.microsoft.com/office/drawing/2014/main" val="1387385755"/>
+                      <a16:colId xmlns:a16="http://schemas.microsoft.com/office/drawing/2014/main" xmlns="" val="1387385755"/>
                     </a:ext>
                   </a:extLst>
                 </a:gridCol>
                 <a:gridCol w="440266">
                   <a:extLst>
                     <a:ext uri="{9D8B030D-6E8A-4147-A177-3AD203B41FA5}">
-                      <a16:colId xmlns:a16="http://schemas.microsoft.com/office/drawing/2014/main" val="3843598340"/>
+                      <a16:colId xmlns:a16="http://schemas.microsoft.com/office/drawing/2014/main" xmlns="" val="3843598340"/>
                     </a:ext>
                   </a:extLst>
                 </a:gridCol>
                 <a:gridCol w="440267">
                   <a:extLst>
                     <a:ext uri="{9D8B030D-6E8A-4147-A177-3AD203B41FA5}">
-                      <a16:colId xmlns:a16="http://schemas.microsoft.com/office/drawing/2014/main" val="1049901212"/>
+                      <a16:colId xmlns:a16="http://schemas.microsoft.com/office/drawing/2014/main" xmlns="" val="1049901212"/>
                     </a:ext>
                   </a:extLst>
                 </a:gridCol>
                 <a:gridCol w="470747">
                   <a:extLst>
                     <a:ext uri="{9D8B030D-6E8A-4147-A177-3AD203B41FA5}">
-                      <a16:colId xmlns:a16="http://schemas.microsoft.com/office/drawing/2014/main" val="709897545"/>
+                      <a16:colId xmlns:a16="http://schemas.microsoft.com/office/drawing/2014/main" xmlns="" val="709897545"/>
                     </a:ext>
                   </a:extLst>
                 </a:gridCol>
                 <a:gridCol w="470746">
                   <a:extLst>
                     <a:ext uri="{9D8B030D-6E8A-4147-A177-3AD203B41FA5}">
-                      <a16:colId xmlns:a16="http://schemas.microsoft.com/office/drawing/2014/main" val="827671735"/>
+                      <a16:colId xmlns:a16="http://schemas.microsoft.com/office/drawing/2014/main" xmlns="" val="827671735"/>
                     </a:ext>
                   </a:extLst>
                 </a:gridCol>
                 <a:gridCol w="470747">
                   <a:extLst>
                     <a:ext uri="{9D8B030D-6E8A-4147-A177-3AD203B41FA5}">
-                      <a16:colId xmlns:a16="http://schemas.microsoft.com/office/drawing/2014/main" val="1122498397"/>
+                      <a16:colId xmlns:a16="http://schemas.microsoft.com/office/drawing/2014/main" xmlns="" val="1122498397"/>
                     </a:ext>
                   </a:extLst>
                 </a:gridCol>
                 <a:gridCol w="501227">
                   <a:extLst>
                     <a:ext uri="{9D8B030D-6E8A-4147-A177-3AD203B41FA5}">
-                      <a16:colId xmlns:a16="http://schemas.microsoft.com/office/drawing/2014/main" val="2630067876"/>
+                      <a16:colId xmlns:a16="http://schemas.microsoft.com/office/drawing/2014/main" xmlns="" val="2630067876"/>
                     </a:ext>
                   </a:extLst>
                 </a:gridCol>
                 <a:gridCol w="501226">
                   <a:extLst>
                     <a:ext uri="{9D8B030D-6E8A-4147-A177-3AD203B41FA5}">
-                      <a16:colId xmlns:a16="http://schemas.microsoft.com/office/drawing/2014/main" val="3579073359"/>
+                      <a16:colId xmlns:a16="http://schemas.microsoft.com/office/drawing/2014/main" xmlns="" val="3579073359"/>
                     </a:ext>
                   </a:extLst>
                 </a:gridCol>
                 <a:gridCol w="501227">
                   <a:extLst>
                     <a:ext uri="{9D8B030D-6E8A-4147-A177-3AD203B41FA5}">
-                      <a16:colId xmlns:a16="http://schemas.microsoft.com/office/drawing/2014/main" val="4050411392"/>
+                      <a16:colId xmlns:a16="http://schemas.microsoft.com/office/drawing/2014/main" xmlns="" val="4050411392"/>
                     </a:ext>
                   </a:extLst>
                 </a:gridCol>
                 <a:gridCol w="521547">
                   <a:extLst>
                     <a:ext uri="{9D8B030D-6E8A-4147-A177-3AD203B41FA5}">
-                      <a16:colId xmlns:a16="http://schemas.microsoft.com/office/drawing/2014/main" val="271538343"/>
+                      <a16:colId xmlns:a16="http://schemas.microsoft.com/office/drawing/2014/main" xmlns="" val="271538343"/>
                     </a:ext>
                   </a:extLst>
                 </a:gridCol>
                 <a:gridCol w="521546">
                   <a:extLst>
                     <a:ext uri="{9D8B030D-6E8A-4147-A177-3AD203B41FA5}">
-                      <a16:colId xmlns:a16="http://schemas.microsoft.com/office/drawing/2014/main" val="863609600"/>
+                      <a16:colId xmlns:a16="http://schemas.microsoft.com/office/drawing/2014/main" xmlns="" val="863609600"/>
                     </a:ext>
                   </a:extLst>
                 </a:gridCol>
                 <a:gridCol w="521547">
                   <a:extLst>
                     <a:ext uri="{9D8B030D-6E8A-4147-A177-3AD203B41FA5}">
-                      <a16:colId xmlns:a16="http://schemas.microsoft.com/office/drawing/2014/main" val="458629820"/>
+                      <a16:colId xmlns:a16="http://schemas.microsoft.com/office/drawing/2014/main" xmlns="" val="458629820"/>
                     </a:ext>
                   </a:extLst>
                 </a:gridCol>
@@ -8162,7 +8170,7 @@
                 </a:tc>
                 <a:extLst>
                   <a:ext uri="{0D108BD9-81ED-4DB2-BD59-A6C34878D82A}">
-                    <a16:rowId xmlns:a16="http://schemas.microsoft.com/office/drawing/2014/main" val="476490804"/>
+                    <a16:rowId xmlns:a16="http://schemas.microsoft.com/office/drawing/2014/main" xmlns="" val="476490804"/>
                   </a:ext>
                 </a:extLst>
               </a:tr>
@@ -8409,7 +8417,7 @@
                 </a:tc>
                 <a:extLst>
                   <a:ext uri="{0D108BD9-81ED-4DB2-BD59-A6C34878D82A}">
-                    <a16:rowId xmlns:a16="http://schemas.microsoft.com/office/drawing/2014/main" val="2369134195"/>
+                    <a16:rowId xmlns:a16="http://schemas.microsoft.com/office/drawing/2014/main" xmlns="" val="2369134195"/>
                   </a:ext>
                 </a:extLst>
               </a:tr>
@@ -8419,6 +8427,10 @@
                     <a:bodyPr/>
                     <a:lstStyle/>
                     <a:p>
+                      <a:r>
+                        <a:rPr lang="en-US" sz="1400" b="0" dirty="0" smtClean="0"/>
+                        <a:t>96.13</a:t>
+                      </a:r>
                       <a:endParaRPr lang="en-IN" sz="1400" b="0" dirty="0"/>
                     </a:p>
                   </a:txBody>
@@ -8429,6 +8441,10 @@
                     <a:bodyPr/>
                     <a:lstStyle/>
                     <a:p>
+                      <a:r>
+                        <a:rPr lang="en-US" sz="1400" b="0" dirty="0" smtClean="0"/>
+                        <a:t>96.44</a:t>
+                      </a:r>
                       <a:endParaRPr lang="en-IN" sz="1400" b="0" dirty="0"/>
                     </a:p>
                   </a:txBody>
@@ -8439,6 +8455,10 @@
                     <a:bodyPr/>
                     <a:lstStyle/>
                     <a:p>
+                      <a:r>
+                        <a:rPr lang="en-US" sz="1400" b="0" dirty="0" smtClean="0"/>
+                        <a:t>96.53</a:t>
+                      </a:r>
                       <a:endParaRPr lang="en-IN" sz="1400" b="0" dirty="0"/>
                     </a:p>
                   </a:txBody>
@@ -8449,6 +8469,10 @@
                     <a:bodyPr/>
                     <a:lstStyle/>
                     <a:p>
+                      <a:r>
+                        <a:rPr lang="en-US" sz="1400" b="0" dirty="0" smtClean="0"/>
+                        <a:t>98.53</a:t>
+                      </a:r>
                       <a:endParaRPr lang="en-IN" sz="1400" b="0" dirty="0"/>
                     </a:p>
                   </a:txBody>
@@ -8459,6 +8483,10 @@
                     <a:bodyPr/>
                     <a:lstStyle/>
                     <a:p>
+                      <a:r>
+                        <a:rPr lang="en-US" sz="1400" b="0" dirty="0" smtClean="0"/>
+                        <a:t>98.54</a:t>
+                      </a:r>
                       <a:endParaRPr lang="en-IN" sz="1400" b="0" dirty="0"/>
                     </a:p>
                   </a:txBody>
@@ -8469,6 +8497,10 @@
                     <a:bodyPr/>
                     <a:lstStyle/>
                     <a:p>
+                      <a:r>
+                        <a:rPr lang="en-US" sz="1400" b="0" dirty="0" smtClean="0"/>
+                        <a:t>98.52</a:t>
+                      </a:r>
                       <a:endParaRPr lang="en-IN" sz="1400" b="0" dirty="0"/>
                     </a:p>
                   </a:txBody>
@@ -8479,6 +8511,10 @@
                     <a:bodyPr/>
                     <a:lstStyle/>
                     <a:p>
+                      <a:r>
+                        <a:rPr lang="en-US" sz="1400" b="0" dirty="0" smtClean="0"/>
+                        <a:t>98.66</a:t>
+                      </a:r>
                       <a:endParaRPr lang="en-IN" sz="1400" b="0" dirty="0"/>
                     </a:p>
                   </a:txBody>
@@ -8489,6 +8525,10 @@
                     <a:bodyPr/>
                     <a:lstStyle/>
                     <a:p>
+                      <a:r>
+                        <a:rPr lang="en-US" sz="1400" b="0" dirty="0" smtClean="0"/>
+                        <a:t>98.62</a:t>
+                      </a:r>
                       <a:endParaRPr lang="en-IN" sz="1400" b="0" dirty="0"/>
                     </a:p>
                   </a:txBody>
@@ -8499,6 +8539,10 @@
                     <a:bodyPr/>
                     <a:lstStyle/>
                     <a:p>
+                      <a:r>
+                        <a:rPr lang="en-US" sz="1400" b="0" dirty="0" smtClean="0"/>
+                        <a:t>98.59</a:t>
+                      </a:r>
                       <a:endParaRPr lang="en-IN" sz="1400" b="0" dirty="0"/>
                     </a:p>
                   </a:txBody>
@@ -8509,6 +8553,10 @@
                     <a:bodyPr/>
                     <a:lstStyle/>
                     <a:p>
+                      <a:r>
+                        <a:rPr lang="en-US" sz="1400" b="0" dirty="0" smtClean="0"/>
+                        <a:t>99.96</a:t>
+                      </a:r>
                       <a:endParaRPr lang="en-IN" sz="1400" b="0" dirty="0"/>
                     </a:p>
                   </a:txBody>
@@ -8519,6 +8567,10 @@
                     <a:bodyPr/>
                     <a:lstStyle/>
                     <a:p>
+                      <a:r>
+                        <a:rPr lang="en-US" sz="1400" b="0" dirty="0" smtClean="0"/>
+                        <a:t>99.95</a:t>
+                      </a:r>
                       <a:endParaRPr lang="en-IN" sz="1400" b="0" dirty="0"/>
                     </a:p>
                   </a:txBody>
@@ -8529,6 +8581,10 @@
                     <a:bodyPr/>
                     <a:lstStyle/>
                     <a:p>
+                      <a:r>
+                        <a:rPr lang="en-US" sz="1400" b="0" dirty="0" smtClean="0"/>
+                        <a:t>99.96</a:t>
+                      </a:r>
                       <a:endParaRPr lang="en-IN" sz="1400" b="0" dirty="0"/>
                     </a:p>
                   </a:txBody>
@@ -8539,6 +8595,10 @@
                     <a:bodyPr/>
                     <a:lstStyle/>
                     <a:p>
+                      <a:r>
+                        <a:rPr lang="en-US" sz="1400" b="0" dirty="0" smtClean="0"/>
+                        <a:t>99.87</a:t>
+                      </a:r>
                       <a:endParaRPr lang="en-IN" sz="1400" b="0" dirty="0"/>
                     </a:p>
                   </a:txBody>
@@ -8549,6 +8609,10 @@
                     <a:bodyPr/>
                     <a:lstStyle/>
                     <a:p>
+                      <a:r>
+                        <a:rPr lang="en-US" sz="1400" b="0" dirty="0" smtClean="0"/>
+                        <a:t>99.87</a:t>
+                      </a:r>
                       <a:endParaRPr lang="en-IN" sz="1400" b="0" dirty="0"/>
                     </a:p>
                   </a:txBody>
@@ -8559,6 +8623,10 @@
                     <a:bodyPr/>
                     <a:lstStyle/>
                     <a:p>
+                      <a:r>
+                        <a:rPr lang="en-US" sz="1400" b="0" dirty="0" smtClean="0"/>
+                        <a:t>99.87</a:t>
+                      </a:r>
                       <a:endParaRPr lang="en-IN" sz="1400" b="0" dirty="0"/>
                     </a:p>
                   </a:txBody>
@@ -8569,6 +8637,10 @@
                     <a:bodyPr/>
                     <a:lstStyle/>
                     <a:p>
+                      <a:r>
+                        <a:rPr lang="en-US" sz="1400" b="0" dirty="0" smtClean="0"/>
+                        <a:t>98.98</a:t>
+                      </a:r>
                       <a:endParaRPr lang="en-IN" sz="1400" b="0" dirty="0"/>
                     </a:p>
                   </a:txBody>
@@ -8579,6 +8651,10 @@
                     <a:bodyPr/>
                     <a:lstStyle/>
                     <a:p>
+                      <a:r>
+                        <a:rPr lang="en-US" sz="1400" b="0" dirty="0" smtClean="0"/>
+                        <a:t>98.80</a:t>
+                      </a:r>
                       <a:endParaRPr lang="en-IN" sz="1400" b="0" dirty="0"/>
                     </a:p>
                   </a:txBody>
@@ -8589,6 +8665,10 @@
                     <a:bodyPr/>
                     <a:lstStyle/>
                     <a:p>
+                      <a:r>
+                        <a:rPr lang="en-US" sz="1400" b="0" dirty="0" smtClean="0"/>
+                        <a:t>98.70</a:t>
+                      </a:r>
                       <a:endParaRPr lang="en-IN" sz="1400" b="0" dirty="0"/>
                     </a:p>
                   </a:txBody>
@@ -8596,7 +8676,7 @@
                 </a:tc>
                 <a:extLst>
                   <a:ext uri="{0D108BD9-81ED-4DB2-BD59-A6C34878D82A}">
-                    <a16:rowId xmlns:a16="http://schemas.microsoft.com/office/drawing/2014/main" val="1811007431"/>
+                    <a16:rowId xmlns:a16="http://schemas.microsoft.com/office/drawing/2014/main" xmlns="" val="1811007431"/>
                   </a:ext>
                 </a:extLst>
               </a:tr>
@@ -8625,7 +8705,7 @@
         <p:cNvPr id="1" name="">
           <a:extLst>
             <a:ext uri="{FF2B5EF4-FFF2-40B4-BE49-F238E27FC236}">
-              <a16:creationId xmlns:a16="http://schemas.microsoft.com/office/drawing/2014/main" id="{11A536EC-4FC0-5EC1-5B8F-6D06C908012F}"/>
+              <a16:creationId xmlns:a16="http://schemas.microsoft.com/office/drawing/2014/main" xmlns="" id="{11A536EC-4FC0-5EC1-5B8F-6D06C908012F}"/>
             </a:ext>
           </a:extLst>
         </p:cNvPr>
@@ -8645,7 +8725,7 @@
           <p:cNvPr id="2" name="Title 1">
             <a:extLst>
               <a:ext uri="{FF2B5EF4-FFF2-40B4-BE49-F238E27FC236}">
-                <a16:creationId xmlns:a16="http://schemas.microsoft.com/office/drawing/2014/main" id="{633A3AEC-D47C-C591-707F-9D42051BD4F2}"/>
+                <a16:creationId xmlns:a16="http://schemas.microsoft.com/office/drawing/2014/main" xmlns="" id="{633A3AEC-D47C-C591-707F-9D42051BD4F2}"/>
               </a:ext>
             </a:extLst>
           </p:cNvPr>
@@ -8679,7 +8759,7 @@
           <p:cNvPr id="3" name="Content Placeholder 2">
             <a:extLst>
               <a:ext uri="{FF2B5EF4-FFF2-40B4-BE49-F238E27FC236}">
-                <a16:creationId xmlns:a16="http://schemas.microsoft.com/office/drawing/2014/main" id="{C093D939-E622-F922-848C-FA3F2D627FF0}"/>
+                <a16:creationId xmlns:a16="http://schemas.microsoft.com/office/drawing/2014/main" xmlns="" id="{C093D939-E622-F922-848C-FA3F2D627FF0}"/>
               </a:ext>
             </a:extLst>
           </p:cNvPr>
@@ -8789,7 +8869,7 @@
           <p:cNvPr id="5" name="Picture 4">
             <a:extLst>
               <a:ext uri="{FF2B5EF4-FFF2-40B4-BE49-F238E27FC236}">
-                <a16:creationId xmlns:a16="http://schemas.microsoft.com/office/drawing/2014/main" id="{82173AB9-42BC-E5BE-6CC5-42C5B3C9BBFB}"/>
+                <a16:creationId xmlns:a16="http://schemas.microsoft.com/office/drawing/2014/main" xmlns="" id="{82173AB9-42BC-E5BE-6CC5-42C5B3C9BBFB}"/>
               </a:ext>
             </a:extLst>
           </p:cNvPr>
@@ -8819,7 +8899,7 @@
           <p:cNvPr id="7" name="Picture 6">
             <a:extLst>
               <a:ext uri="{FF2B5EF4-FFF2-40B4-BE49-F238E27FC236}">
-                <a16:creationId xmlns:a16="http://schemas.microsoft.com/office/drawing/2014/main" id="{3C447223-801C-67C3-0FBA-F9D223AE356E}"/>
+                <a16:creationId xmlns:a16="http://schemas.microsoft.com/office/drawing/2014/main" xmlns="" id="{3C447223-801C-67C3-0FBA-F9D223AE356E}"/>
               </a:ext>
             </a:extLst>
           </p:cNvPr>
@@ -8849,7 +8929,7 @@
           <p:cNvPr id="9" name="Picture 8">
             <a:extLst>
               <a:ext uri="{FF2B5EF4-FFF2-40B4-BE49-F238E27FC236}">
-                <a16:creationId xmlns:a16="http://schemas.microsoft.com/office/drawing/2014/main" id="{B2E523EF-5791-DF66-43EA-FA460F4ED6CB}"/>
+                <a16:creationId xmlns:a16="http://schemas.microsoft.com/office/drawing/2014/main" xmlns="" id="{B2E523EF-5791-DF66-43EA-FA460F4ED6CB}"/>
               </a:ext>
             </a:extLst>
           </p:cNvPr>
@@ -8879,7 +8959,7 @@
           <p:cNvPr id="4" name="Slide Number Placeholder 3">
             <a:extLst>
               <a:ext uri="{FF2B5EF4-FFF2-40B4-BE49-F238E27FC236}">
-                <a16:creationId xmlns:a16="http://schemas.microsoft.com/office/drawing/2014/main" id="{DF993C56-535A-6064-D59C-A232DB281587}"/>
+                <a16:creationId xmlns:a16="http://schemas.microsoft.com/office/drawing/2014/main" xmlns="" id="{DF993C56-535A-6064-D59C-A232DB281587}"/>
               </a:ext>
             </a:extLst>
           </p:cNvPr>
@@ -8925,7 +9005,7 @@
         <p:cNvPr id="1" name="">
           <a:extLst>
             <a:ext uri="{FF2B5EF4-FFF2-40B4-BE49-F238E27FC236}">
-              <a16:creationId xmlns:a16="http://schemas.microsoft.com/office/drawing/2014/main" id="{8402470F-D492-4FE6-2AA2-34A81F9192D8}"/>
+              <a16:creationId xmlns:a16="http://schemas.microsoft.com/office/drawing/2014/main" xmlns="" id="{8402470F-D492-4FE6-2AA2-34A81F9192D8}"/>
             </a:ext>
           </a:extLst>
         </p:cNvPr>
@@ -8945,7 +9025,7 @@
           <p:cNvPr id="2" name="Title 1">
             <a:extLst>
               <a:ext uri="{FF2B5EF4-FFF2-40B4-BE49-F238E27FC236}">
-                <a16:creationId xmlns:a16="http://schemas.microsoft.com/office/drawing/2014/main" id="{1BE7E64F-45ED-4F7C-E583-80E267C5992C}"/>
+                <a16:creationId xmlns:a16="http://schemas.microsoft.com/office/drawing/2014/main" xmlns="" id="{1BE7E64F-45ED-4F7C-E583-80E267C5992C}"/>
               </a:ext>
             </a:extLst>
           </p:cNvPr>
@@ -8979,7 +9059,7 @@
           <p:cNvPr id="3" name="Content Placeholder 2">
             <a:extLst>
               <a:ext uri="{FF2B5EF4-FFF2-40B4-BE49-F238E27FC236}">
-                <a16:creationId xmlns:a16="http://schemas.microsoft.com/office/drawing/2014/main" id="{F6C0065B-ABB2-D9BF-1A94-59B91119070E}"/>
+                <a16:creationId xmlns:a16="http://schemas.microsoft.com/office/drawing/2014/main" xmlns="" id="{F6C0065B-ABB2-D9BF-1A94-59B91119070E}"/>
               </a:ext>
             </a:extLst>
           </p:cNvPr>
@@ -9052,7 +9132,7 @@
           <p:cNvPr id="6" name="Picture 5">
             <a:extLst>
               <a:ext uri="{FF2B5EF4-FFF2-40B4-BE49-F238E27FC236}">
-                <a16:creationId xmlns:a16="http://schemas.microsoft.com/office/drawing/2014/main" id="{1CB10E81-96F9-CEEA-A502-670F43FBD974}"/>
+                <a16:creationId xmlns:a16="http://schemas.microsoft.com/office/drawing/2014/main" xmlns="" id="{1CB10E81-96F9-CEEA-A502-670F43FBD974}"/>
               </a:ext>
             </a:extLst>
           </p:cNvPr>
@@ -9082,7 +9162,7 @@
           <p:cNvPr id="4" name="Slide Number Placeholder 3">
             <a:extLst>
               <a:ext uri="{FF2B5EF4-FFF2-40B4-BE49-F238E27FC236}">
-                <a16:creationId xmlns:a16="http://schemas.microsoft.com/office/drawing/2014/main" id="{95413048-0C58-5CB3-197D-C5BAD7300087}"/>
+                <a16:creationId xmlns:a16="http://schemas.microsoft.com/office/drawing/2014/main" xmlns="" id="{95413048-0C58-5CB3-197D-C5BAD7300087}"/>
               </a:ext>
             </a:extLst>
           </p:cNvPr>
@@ -9128,7 +9208,7 @@
         <p:cNvPr id="1" name="">
           <a:extLst>
             <a:ext uri="{FF2B5EF4-FFF2-40B4-BE49-F238E27FC236}">
-              <a16:creationId xmlns:a16="http://schemas.microsoft.com/office/drawing/2014/main" id="{0B7D26F7-9470-21EE-B505-AC83688B6FDB}"/>
+              <a16:creationId xmlns:a16="http://schemas.microsoft.com/office/drawing/2014/main" xmlns="" id="{0B7D26F7-9470-21EE-B505-AC83688B6FDB}"/>
             </a:ext>
           </a:extLst>
         </p:cNvPr>
@@ -9148,7 +9228,7 @@
           <p:cNvPr id="2" name="Title 1">
             <a:extLst>
               <a:ext uri="{FF2B5EF4-FFF2-40B4-BE49-F238E27FC236}">
-                <a16:creationId xmlns:a16="http://schemas.microsoft.com/office/drawing/2014/main" id="{80C8C6DA-8BCA-99C9-268E-4BC6089CF838}"/>
+                <a16:creationId xmlns:a16="http://schemas.microsoft.com/office/drawing/2014/main" xmlns="" id="{80C8C6DA-8BCA-99C9-268E-4BC6089CF838}"/>
               </a:ext>
             </a:extLst>
           </p:cNvPr>
@@ -9184,7 +9264,7 @@
           <p:cNvPr id="8" name="Table 7">
             <a:extLst>
               <a:ext uri="{FF2B5EF4-FFF2-40B4-BE49-F238E27FC236}">
-                <a16:creationId xmlns:a16="http://schemas.microsoft.com/office/drawing/2014/main" id="{37414ACF-234C-4687-846C-26A5321214AE}"/>
+                <a16:creationId xmlns:a16="http://schemas.microsoft.com/office/drawing/2014/main" xmlns="" id="{37414ACF-234C-4687-846C-26A5321214AE}"/>
               </a:ext>
             </a:extLst>
           </p:cNvPr>
@@ -9213,21 +9293,21 @@
                 <a:gridCol w="1414113">
                   <a:extLst>
                     <a:ext uri="{9D8B030D-6E8A-4147-A177-3AD203B41FA5}">
-                      <a16:colId xmlns:a16="http://schemas.microsoft.com/office/drawing/2014/main" val="2824826579"/>
+                      <a16:colId xmlns:a16="http://schemas.microsoft.com/office/drawing/2014/main" xmlns="" val="2824826579"/>
                     </a:ext>
                   </a:extLst>
                 </a:gridCol>
                 <a:gridCol w="4343604">
                   <a:extLst>
                     <a:ext uri="{9D8B030D-6E8A-4147-A177-3AD203B41FA5}">
-                      <a16:colId xmlns:a16="http://schemas.microsoft.com/office/drawing/2014/main" val="520572402"/>
+                      <a16:colId xmlns:a16="http://schemas.microsoft.com/office/drawing/2014/main" xmlns="" val="520572402"/>
                     </a:ext>
                   </a:extLst>
                 </a:gridCol>
                 <a:gridCol w="1969647">
                   <a:extLst>
                     <a:ext uri="{9D8B030D-6E8A-4147-A177-3AD203B41FA5}">
-                      <a16:colId xmlns:a16="http://schemas.microsoft.com/office/drawing/2014/main" val="1387385755"/>
+                      <a16:colId xmlns:a16="http://schemas.microsoft.com/office/drawing/2014/main" xmlns="" val="1387385755"/>
                     </a:ext>
                   </a:extLst>
                 </a:gridCol>
@@ -9274,7 +9354,7 @@
                 </a:tc>
                 <a:extLst>
                   <a:ext uri="{0D108BD9-81ED-4DB2-BD59-A6C34878D82A}">
-                    <a16:rowId xmlns:a16="http://schemas.microsoft.com/office/drawing/2014/main" val="476490804"/>
+                    <a16:rowId xmlns:a16="http://schemas.microsoft.com/office/drawing/2014/main" xmlns="" val="476490804"/>
                   </a:ext>
                 </a:extLst>
               </a:tr>
@@ -9329,7 +9409,7 @@
                 </a:tc>
                 <a:extLst>
                   <a:ext uri="{0D108BD9-81ED-4DB2-BD59-A6C34878D82A}">
-                    <a16:rowId xmlns:a16="http://schemas.microsoft.com/office/drawing/2014/main" val="2369134195"/>
+                    <a16:rowId xmlns:a16="http://schemas.microsoft.com/office/drawing/2014/main" xmlns="" val="2369134195"/>
                   </a:ext>
                 </a:extLst>
               </a:tr>
@@ -9376,7 +9456,7 @@
                 </a:tc>
                 <a:extLst>
                   <a:ext uri="{0D108BD9-81ED-4DB2-BD59-A6C34878D82A}">
-                    <a16:rowId xmlns:a16="http://schemas.microsoft.com/office/drawing/2014/main" val="1311166528"/>
+                    <a16:rowId xmlns:a16="http://schemas.microsoft.com/office/drawing/2014/main" xmlns="" val="1311166528"/>
                   </a:ext>
                 </a:extLst>
               </a:tr>
@@ -9422,7 +9502,7 @@
                 </a:tc>
                 <a:extLst>
                   <a:ext uri="{0D108BD9-81ED-4DB2-BD59-A6C34878D82A}">
-                    <a16:rowId xmlns:a16="http://schemas.microsoft.com/office/drawing/2014/main" val="3750429733"/>
+                    <a16:rowId xmlns:a16="http://schemas.microsoft.com/office/drawing/2014/main" xmlns="" val="3750429733"/>
                   </a:ext>
                 </a:extLst>
               </a:tr>
@@ -9468,7 +9548,7 @@
                 </a:tc>
                 <a:extLst>
                   <a:ext uri="{0D108BD9-81ED-4DB2-BD59-A6C34878D82A}">
-                    <a16:rowId xmlns:a16="http://schemas.microsoft.com/office/drawing/2014/main" val="3852845993"/>
+                    <a16:rowId xmlns:a16="http://schemas.microsoft.com/office/drawing/2014/main" xmlns="" val="3852845993"/>
                   </a:ext>
                 </a:extLst>
               </a:tr>
@@ -9514,7 +9594,7 @@
                 </a:tc>
                 <a:extLst>
                   <a:ext uri="{0D108BD9-81ED-4DB2-BD59-A6C34878D82A}">
-                    <a16:rowId xmlns:a16="http://schemas.microsoft.com/office/drawing/2014/main" val="2658021608"/>
+                    <a16:rowId xmlns:a16="http://schemas.microsoft.com/office/drawing/2014/main" xmlns="" val="2658021608"/>
                   </a:ext>
                 </a:extLst>
               </a:tr>
@@ -9560,7 +9640,7 @@
                 </a:tc>
                 <a:extLst>
                   <a:ext uri="{0D108BD9-81ED-4DB2-BD59-A6C34878D82A}">
-                    <a16:rowId xmlns:a16="http://schemas.microsoft.com/office/drawing/2014/main" val="3506558147"/>
+                    <a16:rowId xmlns:a16="http://schemas.microsoft.com/office/drawing/2014/main" xmlns="" val="3506558147"/>
                   </a:ext>
                 </a:extLst>
               </a:tr>
@@ -9606,7 +9686,7 @@
                 </a:tc>
                 <a:extLst>
                   <a:ext uri="{0D108BD9-81ED-4DB2-BD59-A6C34878D82A}">
-                    <a16:rowId xmlns:a16="http://schemas.microsoft.com/office/drawing/2014/main" val="1675974392"/>
+                    <a16:rowId xmlns:a16="http://schemas.microsoft.com/office/drawing/2014/main" xmlns="" val="1675974392"/>
                   </a:ext>
                 </a:extLst>
               </a:tr>
@@ -9652,7 +9732,7 @@
                 </a:tc>
                 <a:extLst>
                   <a:ext uri="{0D108BD9-81ED-4DB2-BD59-A6C34878D82A}">
-                    <a16:rowId xmlns:a16="http://schemas.microsoft.com/office/drawing/2014/main" val="3703784324"/>
+                    <a16:rowId xmlns:a16="http://schemas.microsoft.com/office/drawing/2014/main" xmlns="" val="3703784324"/>
                   </a:ext>
                 </a:extLst>
               </a:tr>
@@ -9698,7 +9778,7 @@
                 </a:tc>
                 <a:extLst>
                   <a:ext uri="{0D108BD9-81ED-4DB2-BD59-A6C34878D82A}">
-                    <a16:rowId xmlns:a16="http://schemas.microsoft.com/office/drawing/2014/main" val="3994175541"/>
+                    <a16:rowId xmlns:a16="http://schemas.microsoft.com/office/drawing/2014/main" xmlns="" val="3994175541"/>
                   </a:ext>
                 </a:extLst>
               </a:tr>
@@ -9744,7 +9824,7 @@
                 </a:tc>
                 <a:extLst>
                   <a:ext uri="{0D108BD9-81ED-4DB2-BD59-A6C34878D82A}">
-                    <a16:rowId xmlns:a16="http://schemas.microsoft.com/office/drawing/2014/main" val="74374052"/>
+                    <a16:rowId xmlns:a16="http://schemas.microsoft.com/office/drawing/2014/main" xmlns="" val="74374052"/>
                   </a:ext>
                 </a:extLst>
               </a:tr>
@@ -9790,7 +9870,7 @@
                 </a:tc>
                 <a:extLst>
                   <a:ext uri="{0D108BD9-81ED-4DB2-BD59-A6C34878D82A}">
-                    <a16:rowId xmlns:a16="http://schemas.microsoft.com/office/drawing/2014/main" val="3917241332"/>
+                    <a16:rowId xmlns:a16="http://schemas.microsoft.com/office/drawing/2014/main" xmlns="" val="3917241332"/>
                   </a:ext>
                 </a:extLst>
               </a:tr>
@@ -9836,7 +9916,7 @@
                 </a:tc>
                 <a:extLst>
                   <a:ext uri="{0D108BD9-81ED-4DB2-BD59-A6C34878D82A}">
-                    <a16:rowId xmlns:a16="http://schemas.microsoft.com/office/drawing/2014/main" val="1515861170"/>
+                    <a16:rowId xmlns:a16="http://schemas.microsoft.com/office/drawing/2014/main" xmlns="" val="1515861170"/>
                   </a:ext>
                 </a:extLst>
               </a:tr>
@@ -9882,7 +9962,7 @@
                 </a:tc>
                 <a:extLst>
                   <a:ext uri="{0D108BD9-81ED-4DB2-BD59-A6C34878D82A}">
-                    <a16:rowId xmlns:a16="http://schemas.microsoft.com/office/drawing/2014/main" val="2551049372"/>
+                    <a16:rowId xmlns:a16="http://schemas.microsoft.com/office/drawing/2014/main" xmlns="" val="2551049372"/>
                   </a:ext>
                 </a:extLst>
               </a:tr>
@@ -9895,7 +9975,7 @@
           <p:cNvPr id="4" name="Slide Number Placeholder 3">
             <a:extLst>
               <a:ext uri="{FF2B5EF4-FFF2-40B4-BE49-F238E27FC236}">
-                <a16:creationId xmlns:a16="http://schemas.microsoft.com/office/drawing/2014/main" id="{138DE578-2980-CDAA-E876-1DE5FF5C8E17}"/>
+                <a16:creationId xmlns:a16="http://schemas.microsoft.com/office/drawing/2014/main" xmlns="" id="{138DE578-2980-CDAA-E876-1DE5FF5C8E17}"/>
               </a:ext>
             </a:extLst>
           </p:cNvPr>
@@ -9941,7 +10021,7 @@
         <p:cNvPr id="1" name="">
           <a:extLst>
             <a:ext uri="{FF2B5EF4-FFF2-40B4-BE49-F238E27FC236}">
-              <a16:creationId xmlns:a16="http://schemas.microsoft.com/office/drawing/2014/main" id="{2093D4E5-1EA3-F967-484A-5B3F126B41BB}"/>
+              <a16:creationId xmlns:a16="http://schemas.microsoft.com/office/drawing/2014/main" xmlns="" id="{2093D4E5-1EA3-F967-484A-5B3F126B41BB}"/>
             </a:ext>
           </a:extLst>
         </p:cNvPr>
@@ -9961,7 +10041,7 @@
           <p:cNvPr id="2" name="Title 1">
             <a:extLst>
               <a:ext uri="{FF2B5EF4-FFF2-40B4-BE49-F238E27FC236}">
-                <a16:creationId xmlns:a16="http://schemas.microsoft.com/office/drawing/2014/main" id="{7C58FCB9-D545-BBF3-1964-450A91AD4D5A}"/>
+                <a16:creationId xmlns:a16="http://schemas.microsoft.com/office/drawing/2014/main" xmlns="" id="{7C58FCB9-D545-BBF3-1964-450A91AD4D5A}"/>
               </a:ext>
             </a:extLst>
           </p:cNvPr>
@@ -9995,7 +10075,7 @@
           <p:cNvPr id="3" name="Content Placeholder 2">
             <a:extLst>
               <a:ext uri="{FF2B5EF4-FFF2-40B4-BE49-F238E27FC236}">
-                <a16:creationId xmlns:a16="http://schemas.microsoft.com/office/drawing/2014/main" id="{04F557F2-8723-FD77-7D65-456219ACA125}"/>
+                <a16:creationId xmlns:a16="http://schemas.microsoft.com/office/drawing/2014/main" xmlns="" id="{04F557F2-8723-FD77-7D65-456219ACA125}"/>
               </a:ext>
             </a:extLst>
           </p:cNvPr>
@@ -10105,7 +10185,7 @@
           <p:cNvPr id="4" name="Slide Number Placeholder 3">
             <a:extLst>
               <a:ext uri="{FF2B5EF4-FFF2-40B4-BE49-F238E27FC236}">
-                <a16:creationId xmlns:a16="http://schemas.microsoft.com/office/drawing/2014/main" id="{14534024-3FD6-9C57-E285-43F50E911E09}"/>
+                <a16:creationId xmlns:a16="http://schemas.microsoft.com/office/drawing/2014/main" xmlns="" id="{14534024-3FD6-9C57-E285-43F50E911E09}"/>
               </a:ext>
             </a:extLst>
           </p:cNvPr>
@@ -10151,7 +10231,7 @@
         <p:cNvPr id="1" name="">
           <a:extLst>
             <a:ext uri="{FF2B5EF4-FFF2-40B4-BE49-F238E27FC236}">
-              <a16:creationId xmlns:a16="http://schemas.microsoft.com/office/drawing/2014/main" id="{6EA3DA57-48DE-F7A6-37AE-375FEBB3A663}"/>
+              <a16:creationId xmlns:a16="http://schemas.microsoft.com/office/drawing/2014/main" xmlns="" id="{6EA3DA57-48DE-F7A6-37AE-375FEBB3A663}"/>
             </a:ext>
           </a:extLst>
         </p:cNvPr>
@@ -10171,7 +10251,7 @@
           <p:cNvPr id="2" name="Title 1">
             <a:extLst>
               <a:ext uri="{FF2B5EF4-FFF2-40B4-BE49-F238E27FC236}">
-                <a16:creationId xmlns:a16="http://schemas.microsoft.com/office/drawing/2014/main" id="{BDE68A12-2B8D-86E8-368E-61A41884B43A}"/>
+                <a16:creationId xmlns:a16="http://schemas.microsoft.com/office/drawing/2014/main" xmlns="" id="{BDE68A12-2B8D-86E8-368E-61A41884B43A}"/>
               </a:ext>
             </a:extLst>
           </p:cNvPr>
@@ -10205,7 +10285,7 @@
           <p:cNvPr id="3" name="Content Placeholder 2">
             <a:extLst>
               <a:ext uri="{FF2B5EF4-FFF2-40B4-BE49-F238E27FC236}">
-                <a16:creationId xmlns:a16="http://schemas.microsoft.com/office/drawing/2014/main" id="{598A6F27-8A0D-9FC2-E63B-7B9111663B30}"/>
+                <a16:creationId xmlns:a16="http://schemas.microsoft.com/office/drawing/2014/main" xmlns="" id="{598A6F27-8A0D-9FC2-E63B-7B9111663B30}"/>
               </a:ext>
             </a:extLst>
           </p:cNvPr>
@@ -10384,7 +10464,7 @@
           <p:cNvPr id="4" name="Slide Number Placeholder 3">
             <a:extLst>
               <a:ext uri="{FF2B5EF4-FFF2-40B4-BE49-F238E27FC236}">
-                <a16:creationId xmlns:a16="http://schemas.microsoft.com/office/drawing/2014/main" id="{EFA53EE6-6B9B-7616-7795-8DC3012F8D16}"/>
+                <a16:creationId xmlns:a16="http://schemas.microsoft.com/office/drawing/2014/main" xmlns="" id="{EFA53EE6-6B9B-7616-7795-8DC3012F8D16}"/>
               </a:ext>
             </a:extLst>
           </p:cNvPr>
@@ -10430,7 +10510,7 @@
         <p:cNvPr id="1" name="">
           <a:extLst>
             <a:ext uri="{FF2B5EF4-FFF2-40B4-BE49-F238E27FC236}">
-              <a16:creationId xmlns:a16="http://schemas.microsoft.com/office/drawing/2014/main" id="{3A0DB191-2DF8-4E4B-93F2-3928E8195253}"/>
+              <a16:creationId xmlns:a16="http://schemas.microsoft.com/office/drawing/2014/main" xmlns="" id="{3A0DB191-2DF8-4E4B-93F2-3928E8195253}"/>
             </a:ext>
           </a:extLst>
         </p:cNvPr>
@@ -10450,7 +10530,7 @@
           <p:cNvPr id="3" name="Content Placeholder 2">
             <a:extLst>
               <a:ext uri="{FF2B5EF4-FFF2-40B4-BE49-F238E27FC236}">
-                <a16:creationId xmlns:a16="http://schemas.microsoft.com/office/drawing/2014/main" id="{DD0C01BF-5FDD-195B-AAE4-C8A839962FCD}"/>
+                <a16:creationId xmlns:a16="http://schemas.microsoft.com/office/drawing/2014/main" xmlns="" id="{DD0C01BF-5FDD-195B-AAE4-C8A839962FCD}"/>
               </a:ext>
             </a:extLst>
           </p:cNvPr>
@@ -10488,7 +10568,7 @@
           <p:cNvPr id="2" name="Slide Number Placeholder 1">
             <a:extLst>
               <a:ext uri="{FF2B5EF4-FFF2-40B4-BE49-F238E27FC236}">
-                <a16:creationId xmlns:a16="http://schemas.microsoft.com/office/drawing/2014/main" id="{6A549DAD-1672-0716-C923-6FD6F4CDE9AB}"/>
+                <a16:creationId xmlns:a16="http://schemas.microsoft.com/office/drawing/2014/main" xmlns="" id="{6A549DAD-1672-0716-C923-6FD6F4CDE9AB}"/>
               </a:ext>
             </a:extLst>
           </p:cNvPr>
@@ -10714,7 +10794,7 @@
           <p:cNvPr id="4" name="Slide Number Placeholder 3">
             <a:extLst>
               <a:ext uri="{FF2B5EF4-FFF2-40B4-BE49-F238E27FC236}">
-                <a16:creationId xmlns:a16="http://schemas.microsoft.com/office/drawing/2014/main" id="{0ADE1130-C867-B094-7288-45615ABF7071}"/>
+                <a16:creationId xmlns:a16="http://schemas.microsoft.com/office/drawing/2014/main" xmlns="" id="{0ADE1130-C867-B094-7288-45615ABF7071}"/>
               </a:ext>
             </a:extLst>
           </p:cNvPr>
@@ -10760,7 +10840,7 @@
         <p:cNvPr id="1" name="">
           <a:extLst>
             <a:ext uri="{FF2B5EF4-FFF2-40B4-BE49-F238E27FC236}">
-              <a16:creationId xmlns:a16="http://schemas.microsoft.com/office/drawing/2014/main" id="{DAA3B00F-A3D8-BDBF-B658-13759A4780AB}"/>
+              <a16:creationId xmlns:a16="http://schemas.microsoft.com/office/drawing/2014/main" xmlns="" id="{DAA3B00F-A3D8-BDBF-B658-13759A4780AB}"/>
             </a:ext>
           </a:extLst>
         </p:cNvPr>
@@ -10780,7 +10860,7 @@
           <p:cNvPr id="2" name="Title 1">
             <a:extLst>
               <a:ext uri="{FF2B5EF4-FFF2-40B4-BE49-F238E27FC236}">
-                <a16:creationId xmlns:a16="http://schemas.microsoft.com/office/drawing/2014/main" id="{AC60A686-865D-A420-59EC-4A312E5CB0DA}"/>
+                <a16:creationId xmlns:a16="http://schemas.microsoft.com/office/drawing/2014/main" xmlns="" id="{AC60A686-865D-A420-59EC-4A312E5CB0DA}"/>
               </a:ext>
             </a:extLst>
           </p:cNvPr>
@@ -10816,7 +10896,7 @@
           <p:cNvPr id="3" name="Content Placeholder 2">
             <a:extLst>
               <a:ext uri="{FF2B5EF4-FFF2-40B4-BE49-F238E27FC236}">
-                <a16:creationId xmlns:a16="http://schemas.microsoft.com/office/drawing/2014/main" id="{3ECFB9F9-DD75-2F2B-B6C2-D586861CBDC1}"/>
+                <a16:creationId xmlns:a16="http://schemas.microsoft.com/office/drawing/2014/main" xmlns="" id="{3ECFB9F9-DD75-2F2B-B6C2-D586861CBDC1}"/>
               </a:ext>
             </a:extLst>
           </p:cNvPr>
@@ -10863,7 +10943,7 @@
           <p:cNvPr id="8" name="Table 7">
             <a:extLst>
               <a:ext uri="{FF2B5EF4-FFF2-40B4-BE49-F238E27FC236}">
-                <a16:creationId xmlns:a16="http://schemas.microsoft.com/office/drawing/2014/main" id="{4B084F21-59DF-9BD4-7E3E-691504BC0F42}"/>
+                <a16:creationId xmlns:a16="http://schemas.microsoft.com/office/drawing/2014/main" xmlns="" id="{4B084F21-59DF-9BD4-7E3E-691504BC0F42}"/>
               </a:ext>
             </a:extLst>
           </p:cNvPr>
@@ -10886,42 +10966,42 @@
                 <a:gridCol w="1602073">
                   <a:extLst>
                     <a:ext uri="{9D8B030D-6E8A-4147-A177-3AD203B41FA5}">
-                      <a16:colId xmlns:a16="http://schemas.microsoft.com/office/drawing/2014/main" val="2824826579"/>
+                      <a16:colId xmlns:a16="http://schemas.microsoft.com/office/drawing/2014/main" xmlns="" val="2824826579"/>
                     </a:ext>
                   </a:extLst>
                 </a:gridCol>
                 <a:gridCol w="1078441">
                   <a:extLst>
                     <a:ext uri="{9D8B030D-6E8A-4147-A177-3AD203B41FA5}">
-                      <a16:colId xmlns:a16="http://schemas.microsoft.com/office/drawing/2014/main" val="520572402"/>
+                      <a16:colId xmlns:a16="http://schemas.microsoft.com/office/drawing/2014/main" xmlns="" val="520572402"/>
                     </a:ext>
                   </a:extLst>
                 </a:gridCol>
                 <a:gridCol w="916972">
                   <a:extLst>
                     <a:ext uri="{9D8B030D-6E8A-4147-A177-3AD203B41FA5}">
-                      <a16:colId xmlns:a16="http://schemas.microsoft.com/office/drawing/2014/main" val="1387385755"/>
+                      <a16:colId xmlns:a16="http://schemas.microsoft.com/office/drawing/2014/main" xmlns="" val="1387385755"/>
                     </a:ext>
                   </a:extLst>
                 </a:gridCol>
                 <a:gridCol w="1017798">
                   <a:extLst>
                     <a:ext uri="{9D8B030D-6E8A-4147-A177-3AD203B41FA5}">
-                      <a16:colId xmlns:a16="http://schemas.microsoft.com/office/drawing/2014/main" val="1640856683"/>
+                      <a16:colId xmlns:a16="http://schemas.microsoft.com/office/drawing/2014/main" xmlns="" val="1640856683"/>
                     </a:ext>
                   </a:extLst>
                 </a:gridCol>
                 <a:gridCol w="1950437">
                   <a:extLst>
                     <a:ext uri="{9D8B030D-6E8A-4147-A177-3AD203B41FA5}">
-                      <a16:colId xmlns:a16="http://schemas.microsoft.com/office/drawing/2014/main" val="2450729697"/>
+                      <a16:colId xmlns:a16="http://schemas.microsoft.com/office/drawing/2014/main" xmlns="" val="2450729697"/>
                     </a:ext>
                   </a:extLst>
                 </a:gridCol>
                 <a:gridCol w="1950437">
                   <a:extLst>
                     <a:ext uri="{9D8B030D-6E8A-4147-A177-3AD203B41FA5}">
-                      <a16:colId xmlns:a16="http://schemas.microsoft.com/office/drawing/2014/main" val="20005"/>
+                      <a16:colId xmlns:a16="http://schemas.microsoft.com/office/drawing/2014/main" xmlns="" val="20005"/>
                     </a:ext>
                   </a:extLst>
                 </a:gridCol>
@@ -11008,7 +11088,7 @@
                 </a:tc>
                 <a:extLst>
                   <a:ext uri="{0D108BD9-81ED-4DB2-BD59-A6C34878D82A}">
-                    <a16:rowId xmlns:a16="http://schemas.microsoft.com/office/drawing/2014/main" val="476490804"/>
+                    <a16:rowId xmlns:a16="http://schemas.microsoft.com/office/drawing/2014/main" xmlns="" val="476490804"/>
                   </a:ext>
                 </a:extLst>
               </a:tr>
@@ -11112,7 +11192,7 @@
                 </a:tc>
                 <a:extLst>
                   <a:ext uri="{0D108BD9-81ED-4DB2-BD59-A6C34878D82A}">
-                    <a16:rowId xmlns:a16="http://schemas.microsoft.com/office/drawing/2014/main" val="2369134195"/>
+                    <a16:rowId xmlns:a16="http://schemas.microsoft.com/office/drawing/2014/main" xmlns="" val="2369134195"/>
                   </a:ext>
                 </a:extLst>
               </a:tr>
@@ -11216,7 +11296,7 @@
                 </a:tc>
                 <a:extLst>
                   <a:ext uri="{0D108BD9-81ED-4DB2-BD59-A6C34878D82A}">
-                    <a16:rowId xmlns:a16="http://schemas.microsoft.com/office/drawing/2014/main" val="1311166528"/>
+                    <a16:rowId xmlns:a16="http://schemas.microsoft.com/office/drawing/2014/main" xmlns="" val="1311166528"/>
                   </a:ext>
                 </a:extLst>
               </a:tr>
@@ -11229,7 +11309,7 @@
           <p:cNvPr id="4" name="Slide Number Placeholder 3">
             <a:extLst>
               <a:ext uri="{FF2B5EF4-FFF2-40B4-BE49-F238E27FC236}">
-                <a16:creationId xmlns:a16="http://schemas.microsoft.com/office/drawing/2014/main" id="{31F1810A-F17B-789F-C6E3-3F2326748FA7}"/>
+                <a16:creationId xmlns:a16="http://schemas.microsoft.com/office/drawing/2014/main" xmlns="" id="{31F1810A-F17B-789F-C6E3-3F2326748FA7}"/>
               </a:ext>
             </a:extLst>
           </p:cNvPr>
@@ -11275,7 +11355,7 @@
         <p:cNvPr id="1" name="">
           <a:extLst>
             <a:ext uri="{FF2B5EF4-FFF2-40B4-BE49-F238E27FC236}">
-              <a16:creationId xmlns:a16="http://schemas.microsoft.com/office/drawing/2014/main" id="{E9C82B65-FE07-9E02-773B-29BDE3EFCB19}"/>
+              <a16:creationId xmlns:a16="http://schemas.microsoft.com/office/drawing/2014/main" xmlns="" id="{E9C82B65-FE07-9E02-773B-29BDE3EFCB19}"/>
             </a:ext>
           </a:extLst>
         </p:cNvPr>
@@ -11295,7 +11375,7 @@
           <p:cNvPr id="2" name="Title 1">
             <a:extLst>
               <a:ext uri="{FF2B5EF4-FFF2-40B4-BE49-F238E27FC236}">
-                <a16:creationId xmlns:a16="http://schemas.microsoft.com/office/drawing/2014/main" id="{659F3FDD-DBAA-2959-6A88-62E57DE88F67}"/>
+                <a16:creationId xmlns:a16="http://schemas.microsoft.com/office/drawing/2014/main" xmlns="" id="{659F3FDD-DBAA-2959-6A88-62E57DE88F67}"/>
               </a:ext>
             </a:extLst>
           </p:cNvPr>
@@ -11331,7 +11411,7 @@
           <p:cNvPr id="7" name="Table 6">
             <a:extLst>
               <a:ext uri="{FF2B5EF4-FFF2-40B4-BE49-F238E27FC236}">
-                <a16:creationId xmlns:a16="http://schemas.microsoft.com/office/drawing/2014/main" id="{353DE374-318E-88EE-153C-1DF3C4F71A2E}"/>
+                <a16:creationId xmlns:a16="http://schemas.microsoft.com/office/drawing/2014/main" xmlns="" id="{353DE374-318E-88EE-153C-1DF3C4F71A2E}"/>
               </a:ext>
             </a:extLst>
           </p:cNvPr>
@@ -11360,42 +11440,42 @@
                 <a:gridCol w="1375204">
                   <a:extLst>
                     <a:ext uri="{9D8B030D-6E8A-4147-A177-3AD203B41FA5}">
-                      <a16:colId xmlns:a16="http://schemas.microsoft.com/office/drawing/2014/main" val="2824826579"/>
+                      <a16:colId xmlns:a16="http://schemas.microsoft.com/office/drawing/2014/main" xmlns="" val="2824826579"/>
                     </a:ext>
                   </a:extLst>
                 </a:gridCol>
                 <a:gridCol w="1101849">
                   <a:extLst>
                     <a:ext uri="{9D8B030D-6E8A-4147-A177-3AD203B41FA5}">
-                      <a16:colId xmlns:a16="http://schemas.microsoft.com/office/drawing/2014/main" val="520572402"/>
+                      <a16:colId xmlns:a16="http://schemas.microsoft.com/office/drawing/2014/main" xmlns="" val="520572402"/>
                     </a:ext>
                   </a:extLst>
                 </a:gridCol>
                 <a:gridCol w="734709">
                   <a:extLst>
                     <a:ext uri="{9D8B030D-6E8A-4147-A177-3AD203B41FA5}">
-                      <a16:colId xmlns:a16="http://schemas.microsoft.com/office/drawing/2014/main" val="1387385755"/>
+                      <a16:colId xmlns:a16="http://schemas.microsoft.com/office/drawing/2014/main" xmlns="" val="1387385755"/>
                     </a:ext>
                   </a:extLst>
                 </a:gridCol>
                 <a:gridCol w="1083817">
                   <a:extLst>
                     <a:ext uri="{9D8B030D-6E8A-4147-A177-3AD203B41FA5}">
-                      <a16:colId xmlns:a16="http://schemas.microsoft.com/office/drawing/2014/main" val="1640856683"/>
+                      <a16:colId xmlns:a16="http://schemas.microsoft.com/office/drawing/2014/main" xmlns="" val="1640856683"/>
                     </a:ext>
                   </a:extLst>
                 </a:gridCol>
                 <a:gridCol w="2089196">
                   <a:extLst>
                     <a:ext uri="{9D8B030D-6E8A-4147-A177-3AD203B41FA5}">
-                      <a16:colId xmlns:a16="http://schemas.microsoft.com/office/drawing/2014/main" val="2450729697"/>
+                      <a16:colId xmlns:a16="http://schemas.microsoft.com/office/drawing/2014/main" xmlns="" val="2450729697"/>
                     </a:ext>
                   </a:extLst>
                 </a:gridCol>
                 <a:gridCol w="2468754">
                   <a:extLst>
                     <a:ext uri="{9D8B030D-6E8A-4147-A177-3AD203B41FA5}">
-                      <a16:colId xmlns:a16="http://schemas.microsoft.com/office/drawing/2014/main" val="20005"/>
+                      <a16:colId xmlns:a16="http://schemas.microsoft.com/office/drawing/2014/main" xmlns="" val="20005"/>
                     </a:ext>
                   </a:extLst>
                 </a:gridCol>
@@ -11482,7 +11562,7 @@
                 </a:tc>
                 <a:extLst>
                   <a:ext uri="{0D108BD9-81ED-4DB2-BD59-A6C34878D82A}">
-                    <a16:rowId xmlns:a16="http://schemas.microsoft.com/office/drawing/2014/main" val="476490804"/>
+                    <a16:rowId xmlns:a16="http://schemas.microsoft.com/office/drawing/2014/main" xmlns="" val="476490804"/>
                   </a:ext>
                 </a:extLst>
               </a:tr>
@@ -11636,7 +11716,7 @@
                 </a:tc>
                 <a:extLst>
                   <a:ext uri="{0D108BD9-81ED-4DB2-BD59-A6C34878D82A}">
-                    <a16:rowId xmlns:a16="http://schemas.microsoft.com/office/drawing/2014/main" val="10001"/>
+                    <a16:rowId xmlns:a16="http://schemas.microsoft.com/office/drawing/2014/main" xmlns="" val="10001"/>
                   </a:ext>
                 </a:extLst>
               </a:tr>
@@ -11759,7 +11839,7 @@
                 </a:tc>
                 <a:extLst>
                   <a:ext uri="{0D108BD9-81ED-4DB2-BD59-A6C34878D82A}">
-                    <a16:rowId xmlns:a16="http://schemas.microsoft.com/office/drawing/2014/main" val="10002"/>
+                    <a16:rowId xmlns:a16="http://schemas.microsoft.com/office/drawing/2014/main" xmlns="" val="10002"/>
                   </a:ext>
                 </a:extLst>
               </a:tr>
@@ -11894,7 +11974,7 @@
                 </a:tc>
                 <a:extLst>
                   <a:ext uri="{0D108BD9-81ED-4DB2-BD59-A6C34878D82A}">
-                    <a16:rowId xmlns:a16="http://schemas.microsoft.com/office/drawing/2014/main" val="10003"/>
+                    <a16:rowId xmlns:a16="http://schemas.microsoft.com/office/drawing/2014/main" xmlns="" val="10003"/>
                   </a:ext>
                 </a:extLst>
               </a:tr>
@@ -12032,7 +12112,7 @@
                 </a:tc>
                 <a:extLst>
                   <a:ext uri="{0D108BD9-81ED-4DB2-BD59-A6C34878D82A}">
-                    <a16:rowId xmlns:a16="http://schemas.microsoft.com/office/drawing/2014/main" val="10004"/>
+                    <a16:rowId xmlns:a16="http://schemas.microsoft.com/office/drawing/2014/main" xmlns="" val="10004"/>
                   </a:ext>
                 </a:extLst>
               </a:tr>
@@ -12045,7 +12125,7 @@
           <p:cNvPr id="3" name="Slide Number Placeholder 2">
             <a:extLst>
               <a:ext uri="{FF2B5EF4-FFF2-40B4-BE49-F238E27FC236}">
-                <a16:creationId xmlns:a16="http://schemas.microsoft.com/office/drawing/2014/main" id="{7BC9E07A-B7E1-47C8-660D-4363F7E8BFCE}"/>
+                <a16:creationId xmlns:a16="http://schemas.microsoft.com/office/drawing/2014/main" xmlns="" id="{7BC9E07A-B7E1-47C8-660D-4363F7E8BFCE}"/>
               </a:ext>
             </a:extLst>
           </p:cNvPr>
@@ -12091,7 +12171,7 @@
         <p:cNvPr id="1" name="">
           <a:extLst>
             <a:ext uri="{FF2B5EF4-FFF2-40B4-BE49-F238E27FC236}">
-              <a16:creationId xmlns:a16="http://schemas.microsoft.com/office/drawing/2014/main" id="{C7D80A15-1CF9-9728-45DA-E60EA075E094}"/>
+              <a16:creationId xmlns:a16="http://schemas.microsoft.com/office/drawing/2014/main" xmlns="" id="{C7D80A15-1CF9-9728-45DA-E60EA075E094}"/>
             </a:ext>
           </a:extLst>
         </p:cNvPr>
@@ -12111,7 +12191,7 @@
           <p:cNvPr id="2" name="Title 1">
             <a:extLst>
               <a:ext uri="{FF2B5EF4-FFF2-40B4-BE49-F238E27FC236}">
-                <a16:creationId xmlns:a16="http://schemas.microsoft.com/office/drawing/2014/main" id="{FB0EE3C3-E9F5-EAED-212B-4FAA98338E72}"/>
+                <a16:creationId xmlns:a16="http://schemas.microsoft.com/office/drawing/2014/main" xmlns="" id="{FB0EE3C3-E9F5-EAED-212B-4FAA98338E72}"/>
               </a:ext>
             </a:extLst>
           </p:cNvPr>
@@ -12147,7 +12227,7 @@
           <p:cNvPr id="3" name="Content Placeholder 2">
             <a:extLst>
               <a:ext uri="{FF2B5EF4-FFF2-40B4-BE49-F238E27FC236}">
-                <a16:creationId xmlns:a16="http://schemas.microsoft.com/office/drawing/2014/main" id="{E0937787-6C8F-8B98-7CF1-A73E6C29202B}"/>
+                <a16:creationId xmlns:a16="http://schemas.microsoft.com/office/drawing/2014/main" xmlns="" id="{E0937787-6C8F-8B98-7CF1-A73E6C29202B}"/>
               </a:ext>
             </a:extLst>
           </p:cNvPr>
@@ -12248,7 +12328,7 @@
           <p:cNvPr id="4" name="Slide Number Placeholder 3">
             <a:extLst>
               <a:ext uri="{FF2B5EF4-FFF2-40B4-BE49-F238E27FC236}">
-                <a16:creationId xmlns:a16="http://schemas.microsoft.com/office/drawing/2014/main" id="{39B13807-B88F-861E-D990-57519CE5E888}"/>
+                <a16:creationId xmlns:a16="http://schemas.microsoft.com/office/drawing/2014/main" xmlns="" id="{39B13807-B88F-861E-D990-57519CE5E888}"/>
               </a:ext>
             </a:extLst>
           </p:cNvPr>
@@ -12294,7 +12374,7 @@
         <p:cNvPr id="1" name="">
           <a:extLst>
             <a:ext uri="{FF2B5EF4-FFF2-40B4-BE49-F238E27FC236}">
-              <a16:creationId xmlns:a16="http://schemas.microsoft.com/office/drawing/2014/main" id="{69F187B2-8DF3-0E31-DBAB-D68A17679ABC}"/>
+              <a16:creationId xmlns:a16="http://schemas.microsoft.com/office/drawing/2014/main" xmlns="" id="{69F187B2-8DF3-0E31-DBAB-D68A17679ABC}"/>
             </a:ext>
           </a:extLst>
         </p:cNvPr>
@@ -12314,7 +12394,7 @@
           <p:cNvPr id="2" name="Title 1">
             <a:extLst>
               <a:ext uri="{FF2B5EF4-FFF2-40B4-BE49-F238E27FC236}">
-                <a16:creationId xmlns:a16="http://schemas.microsoft.com/office/drawing/2014/main" id="{F6E006B1-F391-882D-85E1-644BCDD00809}"/>
+                <a16:creationId xmlns:a16="http://schemas.microsoft.com/office/drawing/2014/main" xmlns="" id="{F6E006B1-F391-882D-85E1-644BCDD00809}"/>
               </a:ext>
             </a:extLst>
           </p:cNvPr>
@@ -12350,7 +12430,7 @@
           <p:cNvPr id="3" name="Content Placeholder 2">
             <a:extLst>
               <a:ext uri="{FF2B5EF4-FFF2-40B4-BE49-F238E27FC236}">
-                <a16:creationId xmlns:a16="http://schemas.microsoft.com/office/drawing/2014/main" id="{5AD44A04-D600-260A-F53A-668F7EE2D73C}"/>
+                <a16:creationId xmlns:a16="http://schemas.microsoft.com/office/drawing/2014/main" xmlns="" id="{5AD44A04-D600-260A-F53A-668F7EE2D73C}"/>
               </a:ext>
             </a:extLst>
           </p:cNvPr>
@@ -12426,7 +12506,7 @@
           <p:cNvPr id="4" name="Slide Number Placeholder 3">
             <a:extLst>
               <a:ext uri="{FF2B5EF4-FFF2-40B4-BE49-F238E27FC236}">
-                <a16:creationId xmlns:a16="http://schemas.microsoft.com/office/drawing/2014/main" id="{42D35B33-F8F1-B839-61AD-6D6A33D7066B}"/>
+                <a16:creationId xmlns:a16="http://schemas.microsoft.com/office/drawing/2014/main" xmlns="" id="{42D35B33-F8F1-B839-61AD-6D6A33D7066B}"/>
               </a:ext>
             </a:extLst>
           </p:cNvPr>
@@ -12472,7 +12552,7 @@
         <p:cNvPr id="1" name="">
           <a:extLst>
             <a:ext uri="{FF2B5EF4-FFF2-40B4-BE49-F238E27FC236}">
-              <a16:creationId xmlns:a16="http://schemas.microsoft.com/office/drawing/2014/main" id="{E1FB562B-B70F-919C-124C-1B67C1B6749B}"/>
+              <a16:creationId xmlns:a16="http://schemas.microsoft.com/office/drawing/2014/main" xmlns="" id="{E1FB562B-B70F-919C-124C-1B67C1B6749B}"/>
             </a:ext>
           </a:extLst>
         </p:cNvPr>
@@ -12492,7 +12572,7 @@
           <p:cNvPr id="2" name="Title 1">
             <a:extLst>
               <a:ext uri="{FF2B5EF4-FFF2-40B4-BE49-F238E27FC236}">
-                <a16:creationId xmlns:a16="http://schemas.microsoft.com/office/drawing/2014/main" id="{230FBA4C-7F2E-6671-E17E-55087C825DD3}"/>
+                <a16:creationId xmlns:a16="http://schemas.microsoft.com/office/drawing/2014/main" xmlns="" id="{230FBA4C-7F2E-6671-E17E-55087C825DD3}"/>
               </a:ext>
             </a:extLst>
           </p:cNvPr>
@@ -12528,7 +12608,7 @@
           <p:cNvPr id="3" name="Content Placeholder 2">
             <a:extLst>
               <a:ext uri="{FF2B5EF4-FFF2-40B4-BE49-F238E27FC236}">
-                <a16:creationId xmlns:a16="http://schemas.microsoft.com/office/drawing/2014/main" id="{62AB9CAF-7EF5-7504-920F-0F368C727D1C}"/>
+                <a16:creationId xmlns:a16="http://schemas.microsoft.com/office/drawing/2014/main" xmlns="" id="{62AB9CAF-7EF5-7504-920F-0F368C727D1C}"/>
               </a:ext>
             </a:extLst>
           </p:cNvPr>
@@ -12597,7 +12677,7 @@
           <p:cNvPr id="4" name="Slide Number Placeholder 3">
             <a:extLst>
               <a:ext uri="{FF2B5EF4-FFF2-40B4-BE49-F238E27FC236}">
-                <a16:creationId xmlns:a16="http://schemas.microsoft.com/office/drawing/2014/main" id="{75B26837-2BFC-DF5D-4A62-5E0B39337F6C}"/>
+                <a16:creationId xmlns:a16="http://schemas.microsoft.com/office/drawing/2014/main" xmlns="" id="{75B26837-2BFC-DF5D-4A62-5E0B39337F6C}"/>
               </a:ext>
             </a:extLst>
           </p:cNvPr>
@@ -12643,7 +12723,7 @@
         <p:cNvPr id="1" name="">
           <a:extLst>
             <a:ext uri="{FF2B5EF4-FFF2-40B4-BE49-F238E27FC236}">
-              <a16:creationId xmlns:a16="http://schemas.microsoft.com/office/drawing/2014/main" id="{210B94F8-BF55-5CA6-32BE-94BD832DA418}"/>
+              <a16:creationId xmlns:a16="http://schemas.microsoft.com/office/drawing/2014/main" xmlns="" id="{210B94F8-BF55-5CA6-32BE-94BD832DA418}"/>
             </a:ext>
           </a:extLst>
         </p:cNvPr>
@@ -12663,7 +12743,7 @@
           <p:cNvPr id="2" name="Title 1">
             <a:extLst>
               <a:ext uri="{FF2B5EF4-FFF2-40B4-BE49-F238E27FC236}">
-                <a16:creationId xmlns:a16="http://schemas.microsoft.com/office/drawing/2014/main" id="{42672787-B530-95A5-FC5D-F557C0462F50}"/>
+                <a16:creationId xmlns:a16="http://schemas.microsoft.com/office/drawing/2014/main" xmlns="" id="{42672787-B530-95A5-FC5D-F557C0462F50}"/>
               </a:ext>
             </a:extLst>
           </p:cNvPr>
@@ -12699,7 +12779,7 @@
           <p:cNvPr id="3" name="Content Placeholder 2">
             <a:extLst>
               <a:ext uri="{FF2B5EF4-FFF2-40B4-BE49-F238E27FC236}">
-                <a16:creationId xmlns:a16="http://schemas.microsoft.com/office/drawing/2014/main" id="{87BC5DBE-EB6D-8304-529B-38B03D5D8FBA}"/>
+                <a16:creationId xmlns:a16="http://schemas.microsoft.com/office/drawing/2014/main" xmlns="" id="{87BC5DBE-EB6D-8304-529B-38B03D5D8FBA}"/>
               </a:ext>
             </a:extLst>
           </p:cNvPr>
@@ -12838,7 +12918,7 @@
           <p:cNvPr id="4" name="Slide Number Placeholder 3">
             <a:extLst>
               <a:ext uri="{FF2B5EF4-FFF2-40B4-BE49-F238E27FC236}">
-                <a16:creationId xmlns:a16="http://schemas.microsoft.com/office/drawing/2014/main" id="{0670B763-EEE6-C4E0-6235-EA8E51F679A6}"/>
+                <a16:creationId xmlns:a16="http://schemas.microsoft.com/office/drawing/2014/main" xmlns="" id="{0670B763-EEE6-C4E0-6235-EA8E51F679A6}"/>
               </a:ext>
             </a:extLst>
           </p:cNvPr>

</xml_diff>

<commit_message>
Update: Added better images
</commit_message>
<xml_diff>
--- a/CodeSmell.pptx
+++ b/CodeSmell.pptx
@@ -218,7 +218,7 @@
           <a:p>
             <a:fld id="{3477A0F4-F4B0-47AB-8AD3-20B19DF9E985}" type="datetimeFigureOut">
               <a:rPr lang="en-IN" smtClean="0"/>
-              <a:t>17-04-2025</a:t>
+              <a:t>05-05-2025</a:t>
             </a:fld>
             <a:endParaRPr lang="en-IN"/>
           </a:p>
@@ -1208,7 +1208,7 @@
           <a:p>
             <a:fld id="{F5216777-8CF8-44EF-918D-95D52E42AA54}" type="datetime1">
               <a:rPr lang="en-US" smtClean="0"/>
-              <a:t>4/17/2025</a:t>
+              <a:t>5/5/2025</a:t>
             </a:fld>
             <a:endParaRPr lang="en-US" dirty="0"/>
           </a:p>
@@ -1455,7 +1455,7 @@
           <a:p>
             <a:fld id="{C9D32BD1-F3ED-4813-85AF-BECC294657EF}" type="datetime1">
               <a:rPr lang="en-US" smtClean="0"/>
-              <a:t>4/17/2025</a:t>
+              <a:t>5/5/2025</a:t>
             </a:fld>
             <a:endParaRPr lang="en-US" dirty="0"/>
           </a:p>
@@ -1765,7 +1765,7 @@
           <a:p>
             <a:fld id="{9FAB4F2F-5C14-4288-BED3-014E7FC07CA5}" type="datetime1">
               <a:rPr lang="en-US" smtClean="0"/>
-              <a:t>4/17/2025</a:t>
+              <a:t>5/5/2025</a:t>
             </a:fld>
             <a:endParaRPr lang="en-US" dirty="0"/>
           </a:p>
@@ -2102,7 +2102,7 @@
           <a:p>
             <a:fld id="{AFE3FA00-20E5-4A4C-BAA8-07B798C3E2BD}" type="datetime1">
               <a:rPr lang="en-US" smtClean="0"/>
-              <a:t>4/17/2025</a:t>
+              <a:t>5/5/2025</a:t>
             </a:fld>
             <a:endParaRPr lang="en-US" dirty="0"/>
           </a:p>
@@ -2412,7 +2412,7 @@
           <a:p>
             <a:fld id="{6F4CE6E6-2F32-4A83-9A37-70D1242ECAB6}" type="datetime1">
               <a:rPr lang="en-US" smtClean="0"/>
-              <a:t>4/17/2025</a:t>
+              <a:t>5/5/2025</a:t>
             </a:fld>
             <a:endParaRPr lang="en-US" dirty="0"/>
           </a:p>
@@ -2801,7 +2801,7 @@
           <a:p>
             <a:fld id="{6715C4D8-B5D6-4776-97F7-E88E156E5654}" type="datetime1">
               <a:rPr lang="en-US" smtClean="0"/>
-              <a:t>4/17/2025</a:t>
+              <a:t>5/5/2025</a:t>
             </a:fld>
             <a:endParaRPr lang="en-US" dirty="0"/>
           </a:p>
@@ -2967,7 +2967,7 @@
           <a:p>
             <a:fld id="{F41EEF30-2CB4-4570-B5B0-E499B56D6D14}" type="datetime1">
               <a:rPr lang="en-US" smtClean="0"/>
-              <a:t>4/17/2025</a:t>
+              <a:t>5/5/2025</a:t>
             </a:fld>
             <a:endParaRPr lang="en-US" dirty="0"/>
           </a:p>
@@ -3142,7 +3142,7 @@
           <a:p>
             <a:fld id="{AA065F5D-77F6-475F-B01F-10D1CD8DB549}" type="datetime1">
               <a:rPr lang="en-US" smtClean="0"/>
-              <a:t>4/17/2025</a:t>
+              <a:t>5/5/2025</a:t>
             </a:fld>
             <a:endParaRPr lang="en-US" dirty="0"/>
           </a:p>
@@ -3314,7 +3314,7 @@
           <a:p>
             <a:fld id="{1F33A9EA-982D-4C95-BE30-80266B31B5C1}" type="datetime1">
               <a:rPr lang="en-US" smtClean="0"/>
-              <a:t>4/17/2025</a:t>
+              <a:t>5/5/2025</a:t>
             </a:fld>
             <a:endParaRPr lang="en-US" dirty="0"/>
           </a:p>
@@ -3557,7 +3557,7 @@
           <a:p>
             <a:fld id="{A0A73C04-3D1F-411B-A909-DDCC763A5C00}" type="datetime1">
               <a:rPr lang="en-US" smtClean="0"/>
-              <a:t>4/17/2025</a:t>
+              <a:t>5/5/2025</a:t>
             </a:fld>
             <a:endParaRPr lang="en-US" dirty="0"/>
           </a:p>
@@ -3785,7 +3785,7 @@
           <a:p>
             <a:fld id="{8928AD85-DA1C-41FB-B7AD-144E0E16F6B6}" type="datetime1">
               <a:rPr lang="en-US" smtClean="0"/>
-              <a:t>4/17/2025</a:t>
+              <a:t>5/5/2025</a:t>
             </a:fld>
             <a:endParaRPr lang="en-US" dirty="0"/>
           </a:p>
@@ -4154,7 +4154,7 @@
           <a:p>
             <a:fld id="{0B3D44CA-F9BF-49FB-8D37-754D687697D5}" type="datetime1">
               <a:rPr lang="en-US" smtClean="0"/>
-              <a:t>4/17/2025</a:t>
+              <a:t>5/5/2025</a:t>
             </a:fld>
             <a:endParaRPr lang="en-US" dirty="0"/>
           </a:p>
@@ -4273,7 +4273,7 @@
           <a:p>
             <a:fld id="{1C523E35-C864-4A29-ACE9-100F432E4952}" type="datetime1">
               <a:rPr lang="en-US" smtClean="0"/>
-              <a:t>4/17/2025</a:t>
+              <a:t>5/5/2025</a:t>
             </a:fld>
             <a:endParaRPr lang="en-US" dirty="0"/>
           </a:p>
@@ -4364,7 +4364,7 @@
           <a:p>
             <a:fld id="{D7DFBF09-6E3C-4688-9606-0E9C6F3613BA}" type="datetime1">
               <a:rPr lang="en-US" smtClean="0"/>
-              <a:t>4/17/2025</a:t>
+              <a:t>5/5/2025</a:t>
             </a:fld>
             <a:endParaRPr lang="en-US" dirty="0"/>
           </a:p>
@@ -4615,7 +4615,7 @@
           <a:p>
             <a:fld id="{7C045EC9-A980-4184-A543-9D019DCCC163}" type="datetime1">
               <a:rPr lang="en-US" smtClean="0"/>
-              <a:t>4/17/2025</a:t>
+              <a:t>5/5/2025</a:t>
             </a:fld>
             <a:endParaRPr lang="en-US" dirty="0"/>
           </a:p>
@@ -4873,7 +4873,7 @@
           <a:p>
             <a:fld id="{901550FA-0534-4AA0-BC1C-F5B34A59CB62}" type="datetime1">
               <a:rPr lang="en-US" smtClean="0"/>
-              <a:t>4/17/2025</a:t>
+              <a:t>5/5/2025</a:t>
             </a:fld>
             <a:endParaRPr lang="en-US" dirty="0"/>
           </a:p>
@@ -5612,7 +5612,7 @@
           <a:p>
             <a:fld id="{3034F704-DBC3-4027-A48D-1AF54B5EC8CB}" type="datetime1">
               <a:rPr lang="en-US" smtClean="0"/>
-              <a:t>4/17/2025</a:t>
+              <a:t>5/5/2025</a:t>
             </a:fld>
             <a:endParaRPr lang="en-US" dirty="0"/>
           </a:p>
@@ -6196,7 +6196,7 @@
           <p:cNvPr id="4" name="Slide Number Placeholder 3">
             <a:extLst>
               <a:ext uri="{FF2B5EF4-FFF2-40B4-BE49-F238E27FC236}">
-                <a16:creationId xmlns:a16="http://schemas.microsoft.com/office/drawing/2014/main" xmlns="" id="{5424A006-3C54-D088-0B29-55DA11CF879C}"/>
+                <a16:creationId xmlns:a16="http://schemas.microsoft.com/office/drawing/2014/main" id="{5424A006-3C54-D088-0B29-55DA11CF879C}"/>
               </a:ext>
             </a:extLst>
           </p:cNvPr>
@@ -6351,7 +6351,7 @@
           <p:cNvPr id="5" name="Slide Number Placeholder 4">
             <a:extLst>
               <a:ext uri="{FF2B5EF4-FFF2-40B4-BE49-F238E27FC236}">
-                <a16:creationId xmlns:a16="http://schemas.microsoft.com/office/drawing/2014/main" xmlns="" id="{86DF5BAE-D583-8BBF-24CE-B4EFFF43AC8E}"/>
+                <a16:creationId xmlns:a16="http://schemas.microsoft.com/office/drawing/2014/main" id="{86DF5BAE-D583-8BBF-24CE-B4EFFF43AC8E}"/>
               </a:ext>
             </a:extLst>
           </p:cNvPr>
@@ -6496,7 +6496,7 @@
           <p:cNvPr id="4" name="Slide Number Placeholder 3">
             <a:extLst>
               <a:ext uri="{FF2B5EF4-FFF2-40B4-BE49-F238E27FC236}">
-                <a16:creationId xmlns:a16="http://schemas.microsoft.com/office/drawing/2014/main" xmlns="" id="{F2EA3AF7-FE6D-3982-9846-DC957C8B1D7F}"/>
+                <a16:creationId xmlns:a16="http://schemas.microsoft.com/office/drawing/2014/main" id="{F2EA3AF7-FE6D-3982-9846-DC957C8B1D7F}"/>
               </a:ext>
             </a:extLst>
           </p:cNvPr>
@@ -6577,10 +6577,6 @@
               <a:rPr lang="en-US" dirty="0"/>
               <a:t>Base Paper Ensemble Feature Selection</a:t>
             </a:r>
-            <a:r>
-              <a:rPr lang="en-US" b="1" dirty="0"/>
-              <a:t/>
-            </a:r>
             <a:br>
               <a:rPr lang="en-US" b="1" dirty="0"/>
             </a:br>
@@ -6734,7 +6730,7 @@
           <p:cNvPr id="4" name="Picture 3">
             <a:extLst>
               <a:ext uri="{FF2B5EF4-FFF2-40B4-BE49-F238E27FC236}">
-                <a16:creationId xmlns:a16="http://schemas.microsoft.com/office/drawing/2014/main" xmlns="" id="{D15AF1AD-C039-34BD-0B3F-D9D62EBCA068}"/>
+                <a16:creationId xmlns:a16="http://schemas.microsoft.com/office/drawing/2014/main" id="{D15AF1AD-C039-34BD-0B3F-D9D62EBCA068}"/>
               </a:ext>
             </a:extLst>
           </p:cNvPr>
@@ -6764,7 +6760,7 @@
           <p:cNvPr id="5" name="Slide Number Placeholder 4">
             <a:extLst>
               <a:ext uri="{FF2B5EF4-FFF2-40B4-BE49-F238E27FC236}">
-                <a16:creationId xmlns:a16="http://schemas.microsoft.com/office/drawing/2014/main" xmlns="" id="{5E380720-D079-A5A7-E807-8B0CD168767D}"/>
+                <a16:creationId xmlns:a16="http://schemas.microsoft.com/office/drawing/2014/main" id="{5E380720-D079-A5A7-E807-8B0CD168767D}"/>
               </a:ext>
             </a:extLst>
           </p:cNvPr>
@@ -6845,10 +6841,6 @@
               <a:rPr lang="en-US" dirty="0"/>
               <a:t>Base Paper Classification &amp; Evaluation</a:t>
             </a:r>
-            <a:r>
-              <a:rPr lang="en-IN" b="1" dirty="0"/>
-              <a:t/>
-            </a:r>
             <a:br>
               <a:rPr lang="en-IN" b="1" dirty="0"/>
             </a:br>
@@ -6895,7 +6887,7 @@
           <p:cNvPr id="4" name="Picture 3">
             <a:extLst>
               <a:ext uri="{FF2B5EF4-FFF2-40B4-BE49-F238E27FC236}">
-                <a16:creationId xmlns:a16="http://schemas.microsoft.com/office/drawing/2014/main" xmlns="" id="{878BAA3E-3A3C-34AE-AC38-E54F5964C4D2}"/>
+                <a16:creationId xmlns:a16="http://schemas.microsoft.com/office/drawing/2014/main" id="{878BAA3E-3A3C-34AE-AC38-E54F5964C4D2}"/>
               </a:ext>
             </a:extLst>
           </p:cNvPr>
@@ -6925,7 +6917,7 @@
           <p:cNvPr id="5" name="Slide Number Placeholder 4">
             <a:extLst>
               <a:ext uri="{FF2B5EF4-FFF2-40B4-BE49-F238E27FC236}">
-                <a16:creationId xmlns:a16="http://schemas.microsoft.com/office/drawing/2014/main" xmlns="" id="{4BFC5433-67A0-1097-FA71-445237C24331}"/>
+                <a16:creationId xmlns:a16="http://schemas.microsoft.com/office/drawing/2014/main" id="{4BFC5433-67A0-1097-FA71-445237C24331}"/>
               </a:ext>
             </a:extLst>
           </p:cNvPr>
@@ -6971,7 +6963,7 @@
         <p:cNvPr id="1" name="">
           <a:extLst>
             <a:ext uri="{FF2B5EF4-FFF2-40B4-BE49-F238E27FC236}">
-              <a16:creationId xmlns:a16="http://schemas.microsoft.com/office/drawing/2014/main" xmlns="" id="{FFCAD31C-4A52-61CB-9066-A325F52D3FB9}"/>
+              <a16:creationId xmlns:a16="http://schemas.microsoft.com/office/drawing/2014/main" id="{FFCAD31C-4A52-61CB-9066-A325F52D3FB9}"/>
             </a:ext>
           </a:extLst>
         </p:cNvPr>
@@ -6991,7 +6983,7 @@
           <p:cNvPr id="2" name="Title 1">
             <a:extLst>
               <a:ext uri="{FF2B5EF4-FFF2-40B4-BE49-F238E27FC236}">
-                <a16:creationId xmlns:a16="http://schemas.microsoft.com/office/drawing/2014/main" xmlns="" id="{88B1566E-CBB6-09C4-7D7D-AE361F37E17D}"/>
+                <a16:creationId xmlns:a16="http://schemas.microsoft.com/office/drawing/2014/main" id="{88B1566E-CBB6-09C4-7D7D-AE361F37E17D}"/>
               </a:ext>
             </a:extLst>
           </p:cNvPr>
@@ -7026,7 +7018,7 @@
           <p:cNvPr id="3" name="Content Placeholder 2">
             <a:extLst>
               <a:ext uri="{FF2B5EF4-FFF2-40B4-BE49-F238E27FC236}">
-                <a16:creationId xmlns:a16="http://schemas.microsoft.com/office/drawing/2014/main" xmlns="" id="{5F551514-38DE-6114-D94D-D898654DE9CE}"/>
+                <a16:creationId xmlns:a16="http://schemas.microsoft.com/office/drawing/2014/main" id="{5F551514-38DE-6114-D94D-D898654DE9CE}"/>
               </a:ext>
             </a:extLst>
           </p:cNvPr>
@@ -7104,7 +7096,7 @@
           <p:cNvPr id="4" name="Slide Number Placeholder 3">
             <a:extLst>
               <a:ext uri="{FF2B5EF4-FFF2-40B4-BE49-F238E27FC236}">
-                <a16:creationId xmlns:a16="http://schemas.microsoft.com/office/drawing/2014/main" xmlns="" id="{64C9A553-CA73-E8D8-C2F2-898507189E32}"/>
+                <a16:creationId xmlns:a16="http://schemas.microsoft.com/office/drawing/2014/main" id="{64C9A553-CA73-E8D8-C2F2-898507189E32}"/>
               </a:ext>
             </a:extLst>
           </p:cNvPr>
@@ -7150,7 +7142,7 @@
         <p:cNvPr id="1" name="">
           <a:extLst>
             <a:ext uri="{FF2B5EF4-FFF2-40B4-BE49-F238E27FC236}">
-              <a16:creationId xmlns:a16="http://schemas.microsoft.com/office/drawing/2014/main" xmlns="" id="{47083271-4F12-5F65-3023-57341899FAD0}"/>
+              <a16:creationId xmlns:a16="http://schemas.microsoft.com/office/drawing/2014/main" id="{47083271-4F12-5F65-3023-57341899FAD0}"/>
             </a:ext>
           </a:extLst>
         </p:cNvPr>
@@ -7170,7 +7162,7 @@
           <p:cNvPr id="2" name="Title 1">
             <a:extLst>
               <a:ext uri="{FF2B5EF4-FFF2-40B4-BE49-F238E27FC236}">
-                <a16:creationId xmlns:a16="http://schemas.microsoft.com/office/drawing/2014/main" xmlns="" id="{7E3349D9-FB67-5E3F-D476-6AF28D50C284}"/>
+                <a16:creationId xmlns:a16="http://schemas.microsoft.com/office/drawing/2014/main" id="{7E3349D9-FB67-5E3F-D476-6AF28D50C284}"/>
               </a:ext>
             </a:extLst>
           </p:cNvPr>
@@ -7204,7 +7196,7 @@
           <p:cNvPr id="3" name="Content Placeholder 2">
             <a:extLst>
               <a:ext uri="{FF2B5EF4-FFF2-40B4-BE49-F238E27FC236}">
-                <a16:creationId xmlns:a16="http://schemas.microsoft.com/office/drawing/2014/main" xmlns="" id="{F3E5417D-F6C6-C23B-82AF-A1204513D848}"/>
+                <a16:creationId xmlns:a16="http://schemas.microsoft.com/office/drawing/2014/main" id="{F3E5417D-F6C6-C23B-82AF-A1204513D848}"/>
               </a:ext>
             </a:extLst>
           </p:cNvPr>
@@ -7345,7 +7337,7 @@
           <p:cNvPr id="4" name="Slide Number Placeholder 3">
             <a:extLst>
               <a:ext uri="{FF2B5EF4-FFF2-40B4-BE49-F238E27FC236}">
-                <a16:creationId xmlns:a16="http://schemas.microsoft.com/office/drawing/2014/main" xmlns="" id="{D6ACF151-BBCB-61AD-9C30-3CC5397150D7}"/>
+                <a16:creationId xmlns:a16="http://schemas.microsoft.com/office/drawing/2014/main" id="{D6ACF151-BBCB-61AD-9C30-3CC5397150D7}"/>
               </a:ext>
             </a:extLst>
           </p:cNvPr>
@@ -7391,7 +7383,7 @@
         <p:cNvPr id="1" name="">
           <a:extLst>
             <a:ext uri="{FF2B5EF4-FFF2-40B4-BE49-F238E27FC236}">
-              <a16:creationId xmlns:a16="http://schemas.microsoft.com/office/drawing/2014/main" xmlns="" id="{C34B3ACD-3AAB-09E3-E3BD-E9BDFC67CBE7}"/>
+              <a16:creationId xmlns:a16="http://schemas.microsoft.com/office/drawing/2014/main" id="{C34B3ACD-3AAB-09E3-E3BD-E9BDFC67CBE7}"/>
             </a:ext>
           </a:extLst>
         </p:cNvPr>
@@ -7411,7 +7403,7 @@
           <p:cNvPr id="2" name="Title 1">
             <a:extLst>
               <a:ext uri="{FF2B5EF4-FFF2-40B4-BE49-F238E27FC236}">
-                <a16:creationId xmlns:a16="http://schemas.microsoft.com/office/drawing/2014/main" xmlns="" id="{C67A737D-C9B3-5271-0F1D-49CF2CF4BF60}"/>
+                <a16:creationId xmlns:a16="http://schemas.microsoft.com/office/drawing/2014/main" id="{C67A737D-C9B3-5271-0F1D-49CF2CF4BF60}"/>
               </a:ext>
             </a:extLst>
           </p:cNvPr>
@@ -7445,7 +7437,7 @@
           <p:cNvPr id="3" name="Content Placeholder 2">
             <a:extLst>
               <a:ext uri="{FF2B5EF4-FFF2-40B4-BE49-F238E27FC236}">
-                <a16:creationId xmlns:a16="http://schemas.microsoft.com/office/drawing/2014/main" xmlns="" id="{CDFCB15B-6FF5-9CFE-B9B6-B34CE437D2DC}"/>
+                <a16:creationId xmlns:a16="http://schemas.microsoft.com/office/drawing/2014/main" id="{CDFCB15B-6FF5-9CFE-B9B6-B34CE437D2DC}"/>
               </a:ext>
             </a:extLst>
           </p:cNvPr>
@@ -7579,7 +7571,7 @@
           <p:cNvPr id="4" name="Slide Number Placeholder 3">
             <a:extLst>
               <a:ext uri="{FF2B5EF4-FFF2-40B4-BE49-F238E27FC236}">
-                <a16:creationId xmlns:a16="http://schemas.microsoft.com/office/drawing/2014/main" xmlns="" id="{8498B10D-6952-B8D5-F929-B5555ED66D78}"/>
+                <a16:creationId xmlns:a16="http://schemas.microsoft.com/office/drawing/2014/main" id="{8498B10D-6952-B8D5-F929-B5555ED66D78}"/>
               </a:ext>
             </a:extLst>
           </p:cNvPr>
@@ -7625,7 +7617,7 @@
         <p:cNvPr id="1" name="">
           <a:extLst>
             <a:ext uri="{FF2B5EF4-FFF2-40B4-BE49-F238E27FC236}">
-              <a16:creationId xmlns:a16="http://schemas.microsoft.com/office/drawing/2014/main" xmlns="" id="{DDC70A7A-25AD-FA8B-8BD2-703B049C11C4}"/>
+              <a16:creationId xmlns:a16="http://schemas.microsoft.com/office/drawing/2014/main" id="{DDC70A7A-25AD-FA8B-8BD2-703B049C11C4}"/>
             </a:ext>
           </a:extLst>
         </p:cNvPr>
@@ -7645,7 +7637,7 @@
           <p:cNvPr id="2" name="Title 1">
             <a:extLst>
               <a:ext uri="{FF2B5EF4-FFF2-40B4-BE49-F238E27FC236}">
-                <a16:creationId xmlns:a16="http://schemas.microsoft.com/office/drawing/2014/main" xmlns="" id="{6562A318-8D3A-A044-52CE-417BB2A82EDE}"/>
+                <a16:creationId xmlns:a16="http://schemas.microsoft.com/office/drawing/2014/main" id="{6562A318-8D3A-A044-52CE-417BB2A82EDE}"/>
               </a:ext>
             </a:extLst>
           </p:cNvPr>
@@ -7679,7 +7671,7 @@
           <p:cNvPr id="3" name="Content Placeholder 2">
             <a:extLst>
               <a:ext uri="{FF2B5EF4-FFF2-40B4-BE49-F238E27FC236}">
-                <a16:creationId xmlns:a16="http://schemas.microsoft.com/office/drawing/2014/main" xmlns="" id="{5EF3F644-EE4E-7E2F-7863-DBB1AAF700BB}"/>
+                <a16:creationId xmlns:a16="http://schemas.microsoft.com/office/drawing/2014/main" id="{5EF3F644-EE4E-7E2F-7863-DBB1AAF700BB}"/>
               </a:ext>
             </a:extLst>
           </p:cNvPr>
@@ -7756,7 +7748,7 @@
           <p:cNvPr id="4" name="Slide Number Placeholder 3">
             <a:extLst>
               <a:ext uri="{FF2B5EF4-FFF2-40B4-BE49-F238E27FC236}">
-                <a16:creationId xmlns:a16="http://schemas.microsoft.com/office/drawing/2014/main" xmlns="" id="{41DAEF17-F7E7-BE4B-96B1-C740115A817D}"/>
+                <a16:creationId xmlns:a16="http://schemas.microsoft.com/office/drawing/2014/main" id="{41DAEF17-F7E7-BE4B-96B1-C740115A817D}"/>
               </a:ext>
             </a:extLst>
           </p:cNvPr>
@@ -7786,7 +7778,7 @@
           <p:cNvPr id="5" name="Picture 4">
             <a:extLst>
               <a:ext uri="{FF2B5EF4-FFF2-40B4-BE49-F238E27FC236}">
-                <a16:creationId xmlns:a16="http://schemas.microsoft.com/office/drawing/2014/main" xmlns="" id="{1C51B4F1-012C-D676-3C8B-5BFD0283F2B8}"/>
+                <a16:creationId xmlns:a16="http://schemas.microsoft.com/office/drawing/2014/main" id="{1C51B4F1-012C-D676-3C8B-5BFD0283F2B8}"/>
               </a:ext>
             </a:extLst>
           </p:cNvPr>
@@ -7816,7 +7808,7 @@
           <p:cNvPr id="6" name="Table 5">
             <a:extLst>
               <a:ext uri="{FF2B5EF4-FFF2-40B4-BE49-F238E27FC236}">
-                <a16:creationId xmlns:a16="http://schemas.microsoft.com/office/drawing/2014/main" xmlns="" id="{FA6BD519-3C63-B9F8-647E-063D18F6D07B}"/>
+                <a16:creationId xmlns:a16="http://schemas.microsoft.com/office/drawing/2014/main" id="{FA6BD519-3C63-B9F8-647E-063D18F6D07B}"/>
               </a:ext>
             </a:extLst>
           </p:cNvPr>
@@ -7845,126 +7837,126 @@
                 <a:gridCol w="516255">
                   <a:extLst>
                     <a:ext uri="{9D8B030D-6E8A-4147-A177-3AD203B41FA5}">
-                      <a16:colId xmlns:a16="http://schemas.microsoft.com/office/drawing/2014/main" xmlns="" val="2824826579"/>
+                      <a16:colId xmlns:a16="http://schemas.microsoft.com/office/drawing/2014/main" val="2824826579"/>
                     </a:ext>
                   </a:extLst>
                 </a:gridCol>
                 <a:gridCol w="456979">
                   <a:extLst>
                     <a:ext uri="{9D8B030D-6E8A-4147-A177-3AD203B41FA5}">
-                      <a16:colId xmlns:a16="http://schemas.microsoft.com/office/drawing/2014/main" xmlns="" val="3619868740"/>
+                      <a16:colId xmlns:a16="http://schemas.microsoft.com/office/drawing/2014/main" val="3619868740"/>
                     </a:ext>
                   </a:extLst>
                 </a:gridCol>
                 <a:gridCol w="373492">
                   <a:extLst>
                     <a:ext uri="{9D8B030D-6E8A-4147-A177-3AD203B41FA5}">
-                      <a16:colId xmlns:a16="http://schemas.microsoft.com/office/drawing/2014/main" xmlns="" val="1529899458"/>
+                      <a16:colId xmlns:a16="http://schemas.microsoft.com/office/drawing/2014/main" val="1529899458"/>
                     </a:ext>
                   </a:extLst>
                 </a:gridCol>
                 <a:gridCol w="476340">
                   <a:extLst>
                     <a:ext uri="{9D8B030D-6E8A-4147-A177-3AD203B41FA5}">
-                      <a16:colId xmlns:a16="http://schemas.microsoft.com/office/drawing/2014/main" xmlns="" val="520572402"/>
+                      <a16:colId xmlns:a16="http://schemas.microsoft.com/office/drawing/2014/main" val="520572402"/>
                     </a:ext>
                   </a:extLst>
                 </a:gridCol>
                 <a:gridCol w="476785">
                   <a:extLst>
                     <a:ext uri="{9D8B030D-6E8A-4147-A177-3AD203B41FA5}">
-                      <a16:colId xmlns:a16="http://schemas.microsoft.com/office/drawing/2014/main" xmlns="" val="2060422182"/>
+                      <a16:colId xmlns:a16="http://schemas.microsoft.com/office/drawing/2014/main" val="2060422182"/>
                     </a:ext>
                   </a:extLst>
                 </a:gridCol>
                 <a:gridCol w="560080">
                   <a:extLst>
                     <a:ext uri="{9D8B030D-6E8A-4147-A177-3AD203B41FA5}">
-                      <a16:colId xmlns:a16="http://schemas.microsoft.com/office/drawing/2014/main" xmlns="" val="1179312162"/>
+                      <a16:colId xmlns:a16="http://schemas.microsoft.com/office/drawing/2014/main" val="1179312162"/>
                     </a:ext>
                   </a:extLst>
                 </a:gridCol>
                 <a:gridCol w="440267">
                   <a:extLst>
                     <a:ext uri="{9D8B030D-6E8A-4147-A177-3AD203B41FA5}">
-                      <a16:colId xmlns:a16="http://schemas.microsoft.com/office/drawing/2014/main" xmlns="" val="1387385755"/>
+                      <a16:colId xmlns:a16="http://schemas.microsoft.com/office/drawing/2014/main" val="1387385755"/>
                     </a:ext>
                   </a:extLst>
                 </a:gridCol>
                 <a:gridCol w="440266">
                   <a:extLst>
                     <a:ext uri="{9D8B030D-6E8A-4147-A177-3AD203B41FA5}">
-                      <a16:colId xmlns:a16="http://schemas.microsoft.com/office/drawing/2014/main" xmlns="" val="3843598340"/>
+                      <a16:colId xmlns:a16="http://schemas.microsoft.com/office/drawing/2014/main" val="3843598340"/>
                     </a:ext>
                   </a:extLst>
                 </a:gridCol>
                 <a:gridCol w="440267">
                   <a:extLst>
                     <a:ext uri="{9D8B030D-6E8A-4147-A177-3AD203B41FA5}">
-                      <a16:colId xmlns:a16="http://schemas.microsoft.com/office/drawing/2014/main" xmlns="" val="1049901212"/>
+                      <a16:colId xmlns:a16="http://schemas.microsoft.com/office/drawing/2014/main" val="1049901212"/>
                     </a:ext>
                   </a:extLst>
                 </a:gridCol>
                 <a:gridCol w="470747">
                   <a:extLst>
                     <a:ext uri="{9D8B030D-6E8A-4147-A177-3AD203B41FA5}">
-                      <a16:colId xmlns:a16="http://schemas.microsoft.com/office/drawing/2014/main" xmlns="" val="709897545"/>
+                      <a16:colId xmlns:a16="http://schemas.microsoft.com/office/drawing/2014/main" val="709897545"/>
                     </a:ext>
                   </a:extLst>
                 </a:gridCol>
                 <a:gridCol w="470746">
                   <a:extLst>
                     <a:ext uri="{9D8B030D-6E8A-4147-A177-3AD203B41FA5}">
-                      <a16:colId xmlns:a16="http://schemas.microsoft.com/office/drawing/2014/main" xmlns="" val="827671735"/>
+                      <a16:colId xmlns:a16="http://schemas.microsoft.com/office/drawing/2014/main" val="827671735"/>
                     </a:ext>
                   </a:extLst>
                 </a:gridCol>
                 <a:gridCol w="470747">
                   <a:extLst>
                     <a:ext uri="{9D8B030D-6E8A-4147-A177-3AD203B41FA5}">
-                      <a16:colId xmlns:a16="http://schemas.microsoft.com/office/drawing/2014/main" xmlns="" val="1122498397"/>
+                      <a16:colId xmlns:a16="http://schemas.microsoft.com/office/drawing/2014/main" val="1122498397"/>
                     </a:ext>
                   </a:extLst>
                 </a:gridCol>
                 <a:gridCol w="501227">
                   <a:extLst>
                     <a:ext uri="{9D8B030D-6E8A-4147-A177-3AD203B41FA5}">
-                      <a16:colId xmlns:a16="http://schemas.microsoft.com/office/drawing/2014/main" xmlns="" val="2630067876"/>
+                      <a16:colId xmlns:a16="http://schemas.microsoft.com/office/drawing/2014/main" val="2630067876"/>
                     </a:ext>
                   </a:extLst>
                 </a:gridCol>
                 <a:gridCol w="501226">
                   <a:extLst>
                     <a:ext uri="{9D8B030D-6E8A-4147-A177-3AD203B41FA5}">
-                      <a16:colId xmlns:a16="http://schemas.microsoft.com/office/drawing/2014/main" xmlns="" val="3579073359"/>
+                      <a16:colId xmlns:a16="http://schemas.microsoft.com/office/drawing/2014/main" val="3579073359"/>
                     </a:ext>
                   </a:extLst>
                 </a:gridCol>
                 <a:gridCol w="501227">
                   <a:extLst>
                     <a:ext uri="{9D8B030D-6E8A-4147-A177-3AD203B41FA5}">
-                      <a16:colId xmlns:a16="http://schemas.microsoft.com/office/drawing/2014/main" xmlns="" val="4050411392"/>
+                      <a16:colId xmlns:a16="http://schemas.microsoft.com/office/drawing/2014/main" val="4050411392"/>
                     </a:ext>
                   </a:extLst>
                 </a:gridCol>
                 <a:gridCol w="521547">
                   <a:extLst>
                     <a:ext uri="{9D8B030D-6E8A-4147-A177-3AD203B41FA5}">
-                      <a16:colId xmlns:a16="http://schemas.microsoft.com/office/drawing/2014/main" xmlns="" val="271538343"/>
+                      <a16:colId xmlns:a16="http://schemas.microsoft.com/office/drawing/2014/main" val="271538343"/>
                     </a:ext>
                   </a:extLst>
                 </a:gridCol>
                 <a:gridCol w="521546">
                   <a:extLst>
                     <a:ext uri="{9D8B030D-6E8A-4147-A177-3AD203B41FA5}">
-                      <a16:colId xmlns:a16="http://schemas.microsoft.com/office/drawing/2014/main" xmlns="" val="863609600"/>
+                      <a16:colId xmlns:a16="http://schemas.microsoft.com/office/drawing/2014/main" val="863609600"/>
                     </a:ext>
                   </a:extLst>
                 </a:gridCol>
                 <a:gridCol w="521547">
                   <a:extLst>
                     <a:ext uri="{9D8B030D-6E8A-4147-A177-3AD203B41FA5}">
-                      <a16:colId xmlns:a16="http://schemas.microsoft.com/office/drawing/2014/main" xmlns="" val="458629820"/>
+                      <a16:colId xmlns:a16="http://schemas.microsoft.com/office/drawing/2014/main" val="458629820"/>
                     </a:ext>
                   </a:extLst>
                 </a:gridCol>
@@ -8170,7 +8162,7 @@
                 </a:tc>
                 <a:extLst>
                   <a:ext uri="{0D108BD9-81ED-4DB2-BD59-A6C34878D82A}">
-                    <a16:rowId xmlns:a16="http://schemas.microsoft.com/office/drawing/2014/main" xmlns="" val="476490804"/>
+                    <a16:rowId xmlns:a16="http://schemas.microsoft.com/office/drawing/2014/main" val="476490804"/>
                   </a:ext>
                 </a:extLst>
               </a:tr>
@@ -8417,7 +8409,7 @@
                 </a:tc>
                 <a:extLst>
                   <a:ext uri="{0D108BD9-81ED-4DB2-BD59-A6C34878D82A}">
-                    <a16:rowId xmlns:a16="http://schemas.microsoft.com/office/drawing/2014/main" xmlns="" val="2369134195"/>
+                    <a16:rowId xmlns:a16="http://schemas.microsoft.com/office/drawing/2014/main" val="2369134195"/>
                   </a:ext>
                 </a:extLst>
               </a:tr>
@@ -8428,7 +8420,7 @@
                     <a:lstStyle/>
                     <a:p>
                       <a:r>
-                        <a:rPr lang="en-US" sz="1400" b="0" dirty="0" smtClean="0"/>
+                        <a:rPr lang="en-US" sz="1400" b="0" dirty="0"/>
                         <a:t>96.13</a:t>
                       </a:r>
                       <a:endParaRPr lang="en-IN" sz="1400" b="0" dirty="0"/>
@@ -8442,7 +8434,7 @@
                     <a:lstStyle/>
                     <a:p>
                       <a:r>
-                        <a:rPr lang="en-US" sz="1400" b="0" dirty="0" smtClean="0"/>
+                        <a:rPr lang="en-US" sz="1400" b="0" dirty="0"/>
                         <a:t>96.44</a:t>
                       </a:r>
                       <a:endParaRPr lang="en-IN" sz="1400" b="0" dirty="0"/>
@@ -8456,7 +8448,7 @@
                     <a:lstStyle/>
                     <a:p>
                       <a:r>
-                        <a:rPr lang="en-US" sz="1400" b="0" dirty="0" smtClean="0"/>
+                        <a:rPr lang="en-US" sz="1400" b="0" dirty="0"/>
                         <a:t>96.53</a:t>
                       </a:r>
                       <a:endParaRPr lang="en-IN" sz="1400" b="0" dirty="0"/>
@@ -8470,7 +8462,7 @@
                     <a:lstStyle/>
                     <a:p>
                       <a:r>
-                        <a:rPr lang="en-US" sz="1400" b="0" dirty="0" smtClean="0"/>
+                        <a:rPr lang="en-US" sz="1400" b="0" dirty="0"/>
                         <a:t>98.53</a:t>
                       </a:r>
                       <a:endParaRPr lang="en-IN" sz="1400" b="0" dirty="0"/>
@@ -8484,7 +8476,7 @@
                     <a:lstStyle/>
                     <a:p>
                       <a:r>
-                        <a:rPr lang="en-US" sz="1400" b="0" dirty="0" smtClean="0"/>
+                        <a:rPr lang="en-US" sz="1400" b="0" dirty="0"/>
                         <a:t>98.54</a:t>
                       </a:r>
                       <a:endParaRPr lang="en-IN" sz="1400" b="0" dirty="0"/>
@@ -8498,7 +8490,7 @@
                     <a:lstStyle/>
                     <a:p>
                       <a:r>
-                        <a:rPr lang="en-US" sz="1400" b="0" dirty="0" smtClean="0"/>
+                        <a:rPr lang="en-US" sz="1400" b="0" dirty="0"/>
                         <a:t>98.52</a:t>
                       </a:r>
                       <a:endParaRPr lang="en-IN" sz="1400" b="0" dirty="0"/>
@@ -8512,7 +8504,7 @@
                     <a:lstStyle/>
                     <a:p>
                       <a:r>
-                        <a:rPr lang="en-US" sz="1400" b="0" dirty="0" smtClean="0"/>
+                        <a:rPr lang="en-US" sz="1400" b="0" dirty="0"/>
                         <a:t>98.66</a:t>
                       </a:r>
                       <a:endParaRPr lang="en-IN" sz="1400" b="0" dirty="0"/>
@@ -8526,7 +8518,7 @@
                     <a:lstStyle/>
                     <a:p>
                       <a:r>
-                        <a:rPr lang="en-US" sz="1400" b="0" dirty="0" smtClean="0"/>
+                        <a:rPr lang="en-US" sz="1400" b="0" dirty="0"/>
                         <a:t>98.62</a:t>
                       </a:r>
                       <a:endParaRPr lang="en-IN" sz="1400" b="0" dirty="0"/>
@@ -8540,7 +8532,7 @@
                     <a:lstStyle/>
                     <a:p>
                       <a:r>
-                        <a:rPr lang="en-US" sz="1400" b="0" dirty="0" smtClean="0"/>
+                        <a:rPr lang="en-US" sz="1400" b="0" dirty="0"/>
                         <a:t>98.59</a:t>
                       </a:r>
                       <a:endParaRPr lang="en-IN" sz="1400" b="0" dirty="0"/>
@@ -8554,7 +8546,7 @@
                     <a:lstStyle/>
                     <a:p>
                       <a:r>
-                        <a:rPr lang="en-US" sz="1400" b="0" dirty="0" smtClean="0"/>
+                        <a:rPr lang="en-US" sz="1400" b="0" dirty="0"/>
                         <a:t>99.96</a:t>
                       </a:r>
                       <a:endParaRPr lang="en-IN" sz="1400" b="0" dirty="0"/>
@@ -8568,7 +8560,7 @@
                     <a:lstStyle/>
                     <a:p>
                       <a:r>
-                        <a:rPr lang="en-US" sz="1400" b="0" dirty="0" smtClean="0"/>
+                        <a:rPr lang="en-US" sz="1400" b="0" dirty="0"/>
                         <a:t>99.95</a:t>
                       </a:r>
                       <a:endParaRPr lang="en-IN" sz="1400" b="0" dirty="0"/>
@@ -8582,7 +8574,7 @@
                     <a:lstStyle/>
                     <a:p>
                       <a:r>
-                        <a:rPr lang="en-US" sz="1400" b="0" dirty="0" smtClean="0"/>
+                        <a:rPr lang="en-US" sz="1400" b="0" dirty="0"/>
                         <a:t>99.96</a:t>
                       </a:r>
                       <a:endParaRPr lang="en-IN" sz="1400" b="0" dirty="0"/>
@@ -8596,7 +8588,7 @@
                     <a:lstStyle/>
                     <a:p>
                       <a:r>
-                        <a:rPr lang="en-US" sz="1400" b="0" dirty="0" smtClean="0"/>
+                        <a:rPr lang="en-US" sz="1400" b="0" dirty="0"/>
                         <a:t>99.87</a:t>
                       </a:r>
                       <a:endParaRPr lang="en-IN" sz="1400" b="0" dirty="0"/>
@@ -8610,7 +8602,7 @@
                     <a:lstStyle/>
                     <a:p>
                       <a:r>
-                        <a:rPr lang="en-US" sz="1400" b="0" dirty="0" smtClean="0"/>
+                        <a:rPr lang="en-US" sz="1400" b="0" dirty="0"/>
                         <a:t>99.87</a:t>
                       </a:r>
                       <a:endParaRPr lang="en-IN" sz="1400" b="0" dirty="0"/>
@@ -8624,7 +8616,7 @@
                     <a:lstStyle/>
                     <a:p>
                       <a:r>
-                        <a:rPr lang="en-US" sz="1400" b="0" dirty="0" smtClean="0"/>
+                        <a:rPr lang="en-US" sz="1400" b="0" dirty="0"/>
                         <a:t>99.87</a:t>
                       </a:r>
                       <a:endParaRPr lang="en-IN" sz="1400" b="0" dirty="0"/>
@@ -8638,7 +8630,7 @@
                     <a:lstStyle/>
                     <a:p>
                       <a:r>
-                        <a:rPr lang="en-US" sz="1400" b="0" dirty="0" smtClean="0"/>
+                        <a:rPr lang="en-US" sz="1400" b="0" dirty="0"/>
                         <a:t>98.98</a:t>
                       </a:r>
                       <a:endParaRPr lang="en-IN" sz="1400" b="0" dirty="0"/>
@@ -8652,7 +8644,7 @@
                     <a:lstStyle/>
                     <a:p>
                       <a:r>
-                        <a:rPr lang="en-US" sz="1400" b="0" dirty="0" smtClean="0"/>
+                        <a:rPr lang="en-US" sz="1400" b="0" dirty="0"/>
                         <a:t>98.80</a:t>
                       </a:r>
                       <a:endParaRPr lang="en-IN" sz="1400" b="0" dirty="0"/>
@@ -8666,7 +8658,7 @@
                     <a:lstStyle/>
                     <a:p>
                       <a:r>
-                        <a:rPr lang="en-US" sz="1400" b="0" dirty="0" smtClean="0"/>
+                        <a:rPr lang="en-US" sz="1400" b="0" dirty="0"/>
                         <a:t>98.70</a:t>
                       </a:r>
                       <a:endParaRPr lang="en-IN" sz="1400" b="0" dirty="0"/>
@@ -8676,7 +8668,7 @@
                 </a:tc>
                 <a:extLst>
                   <a:ext uri="{0D108BD9-81ED-4DB2-BD59-A6C34878D82A}">
-                    <a16:rowId xmlns:a16="http://schemas.microsoft.com/office/drawing/2014/main" xmlns="" val="1811007431"/>
+                    <a16:rowId xmlns:a16="http://schemas.microsoft.com/office/drawing/2014/main" val="1811007431"/>
                   </a:ext>
                 </a:extLst>
               </a:tr>
@@ -8705,7 +8697,7 @@
         <p:cNvPr id="1" name="">
           <a:extLst>
             <a:ext uri="{FF2B5EF4-FFF2-40B4-BE49-F238E27FC236}">
-              <a16:creationId xmlns:a16="http://schemas.microsoft.com/office/drawing/2014/main" xmlns="" id="{11A536EC-4FC0-5EC1-5B8F-6D06C908012F}"/>
+              <a16:creationId xmlns:a16="http://schemas.microsoft.com/office/drawing/2014/main" id="{11A536EC-4FC0-5EC1-5B8F-6D06C908012F}"/>
             </a:ext>
           </a:extLst>
         </p:cNvPr>
@@ -8725,7 +8717,7 @@
           <p:cNvPr id="2" name="Title 1">
             <a:extLst>
               <a:ext uri="{FF2B5EF4-FFF2-40B4-BE49-F238E27FC236}">
-                <a16:creationId xmlns:a16="http://schemas.microsoft.com/office/drawing/2014/main" xmlns="" id="{633A3AEC-D47C-C591-707F-9D42051BD4F2}"/>
+                <a16:creationId xmlns:a16="http://schemas.microsoft.com/office/drawing/2014/main" id="{633A3AEC-D47C-C591-707F-9D42051BD4F2}"/>
               </a:ext>
             </a:extLst>
           </p:cNvPr>
@@ -8759,7 +8751,7 @@
           <p:cNvPr id="3" name="Content Placeholder 2">
             <a:extLst>
               <a:ext uri="{FF2B5EF4-FFF2-40B4-BE49-F238E27FC236}">
-                <a16:creationId xmlns:a16="http://schemas.microsoft.com/office/drawing/2014/main" xmlns="" id="{C093D939-E622-F922-848C-FA3F2D627FF0}"/>
+                <a16:creationId xmlns:a16="http://schemas.microsoft.com/office/drawing/2014/main" id="{C093D939-E622-F922-848C-FA3F2D627FF0}"/>
               </a:ext>
             </a:extLst>
           </p:cNvPr>
@@ -8864,12 +8856,42 @@
           </a:p>
         </p:txBody>
       </p:sp>
+      <p:sp>
+        <p:nvSpPr>
+          <p:cNvPr id="4" name="Slide Number Placeholder 3">
+            <a:extLst>
+              <a:ext uri="{FF2B5EF4-FFF2-40B4-BE49-F238E27FC236}">
+                <a16:creationId xmlns:a16="http://schemas.microsoft.com/office/drawing/2014/main" id="{DF993C56-535A-6064-D59C-A232DB281587}"/>
+              </a:ext>
+            </a:extLst>
+          </p:cNvPr>
+          <p:cNvSpPr>
+            <a:spLocks noGrp="1"/>
+          </p:cNvSpPr>
+          <p:nvPr>
+            <p:ph type="sldNum" sz="quarter" idx="12"/>
+          </p:nvPr>
+        </p:nvSpPr>
+        <p:spPr/>
+        <p:txBody>
+          <a:bodyPr/>
+          <a:lstStyle/>
+          <a:p>
+            <a:fld id="{D57F1E4F-1CFF-5643-939E-217C01CDF565}" type="slidenum">
+              <a:rPr lang="en-US" smtClean="0"/>
+              <a:pPr/>
+              <a:t>18</a:t>
+            </a:fld>
+            <a:endParaRPr lang="en-US" dirty="0"/>
+          </a:p>
+        </p:txBody>
+      </p:sp>
       <p:pic>
         <p:nvPicPr>
-          <p:cNvPr id="5" name="Picture 4">
+          <p:cNvPr id="8" name="Picture 7">
             <a:extLst>
               <a:ext uri="{FF2B5EF4-FFF2-40B4-BE49-F238E27FC236}">
-                <a16:creationId xmlns:a16="http://schemas.microsoft.com/office/drawing/2014/main" xmlns="" id="{82173AB9-42BC-E5BE-6CC5-42C5B3C9BBFB}"/>
+                <a16:creationId xmlns:a16="http://schemas.microsoft.com/office/drawing/2014/main" id="{352F199B-7036-7255-6BEC-16073A741482}"/>
               </a:ext>
             </a:extLst>
           </p:cNvPr>
@@ -8886,8 +8908,8 @@
         </p:blipFill>
         <p:spPr>
           <a:xfrm>
-            <a:off x="1428290" y="5223754"/>
-            <a:ext cx="2173494" cy="1546698"/>
+            <a:off x="1274751" y="5507887"/>
+            <a:ext cx="5353797" cy="1066949"/>
           </a:xfrm>
           <a:prstGeom prst="rect">
             <a:avLst/>
@@ -8896,10 +8918,10 @@
       </p:pic>
       <p:pic>
         <p:nvPicPr>
-          <p:cNvPr id="7" name="Picture 6">
+          <p:cNvPr id="11" name="Picture 10">
             <a:extLst>
               <a:ext uri="{FF2B5EF4-FFF2-40B4-BE49-F238E27FC236}">
-                <a16:creationId xmlns:a16="http://schemas.microsoft.com/office/drawing/2014/main" xmlns="" id="{3C447223-801C-67C3-0FBA-F9D223AE356E}"/>
+                <a16:creationId xmlns:a16="http://schemas.microsoft.com/office/drawing/2014/main" id="{1BBBDCB0-4965-D2A2-15E5-E6A3177B39DA}"/>
               </a:ext>
             </a:extLst>
           </p:cNvPr>
@@ -8916,74 +8938,14 @@
         </p:blipFill>
         <p:spPr>
           <a:xfrm>
-            <a:off x="4119948" y="5312494"/>
-            <a:ext cx="4950346" cy="1200310"/>
+            <a:off x="9460369" y="3112851"/>
+            <a:ext cx="2469998" cy="3566010"/>
           </a:xfrm>
           <a:prstGeom prst="rect">
             <a:avLst/>
           </a:prstGeom>
         </p:spPr>
       </p:pic>
-      <p:pic>
-        <p:nvPicPr>
-          <p:cNvPr id="9" name="Picture 8">
-            <a:extLst>
-              <a:ext uri="{FF2B5EF4-FFF2-40B4-BE49-F238E27FC236}">
-                <a16:creationId xmlns:a16="http://schemas.microsoft.com/office/drawing/2014/main" xmlns="" id="{B2E523EF-5791-DF66-43EA-FA460F4ED6CB}"/>
-              </a:ext>
-            </a:extLst>
-          </p:cNvPr>
-          <p:cNvPicPr>
-            <a:picLocks noChangeAspect="1"/>
-          </p:cNvPicPr>
-          <p:nvPr/>
-        </p:nvPicPr>
-        <p:blipFill>
-          <a:blip r:embed="rId4"/>
-          <a:stretch>
-            <a:fillRect/>
-          </a:stretch>
-        </p:blipFill>
-        <p:spPr>
-          <a:xfrm>
-            <a:off x="9588458" y="3164240"/>
-            <a:ext cx="2350504" cy="3348564"/>
-          </a:xfrm>
-          <a:prstGeom prst="rect">
-            <a:avLst/>
-          </a:prstGeom>
-        </p:spPr>
-      </p:pic>
-      <p:sp>
-        <p:nvSpPr>
-          <p:cNvPr id="4" name="Slide Number Placeholder 3">
-            <a:extLst>
-              <a:ext uri="{FF2B5EF4-FFF2-40B4-BE49-F238E27FC236}">
-                <a16:creationId xmlns:a16="http://schemas.microsoft.com/office/drawing/2014/main" xmlns="" id="{DF993C56-535A-6064-D59C-A232DB281587}"/>
-              </a:ext>
-            </a:extLst>
-          </p:cNvPr>
-          <p:cNvSpPr>
-            <a:spLocks noGrp="1"/>
-          </p:cNvSpPr>
-          <p:nvPr>
-            <p:ph type="sldNum" sz="quarter" idx="12"/>
-          </p:nvPr>
-        </p:nvSpPr>
-        <p:spPr/>
-        <p:txBody>
-          <a:bodyPr/>
-          <a:lstStyle/>
-          <a:p>
-            <a:fld id="{D57F1E4F-1CFF-5643-939E-217C01CDF565}" type="slidenum">
-              <a:rPr lang="en-US" smtClean="0"/>
-              <a:pPr/>
-              <a:t>18</a:t>
-            </a:fld>
-            <a:endParaRPr lang="en-US" dirty="0"/>
-          </a:p>
-        </p:txBody>
-      </p:sp>
     </p:spTree>
     <p:extLst>
       <p:ext uri="{BB962C8B-B14F-4D97-AF65-F5344CB8AC3E}">
@@ -9005,7 +8967,7 @@
         <p:cNvPr id="1" name="">
           <a:extLst>
             <a:ext uri="{FF2B5EF4-FFF2-40B4-BE49-F238E27FC236}">
-              <a16:creationId xmlns:a16="http://schemas.microsoft.com/office/drawing/2014/main" xmlns="" id="{8402470F-D492-4FE6-2AA2-34A81F9192D8}"/>
+              <a16:creationId xmlns:a16="http://schemas.microsoft.com/office/drawing/2014/main" id="{8402470F-D492-4FE6-2AA2-34A81F9192D8}"/>
             </a:ext>
           </a:extLst>
         </p:cNvPr>
@@ -9025,7 +8987,7 @@
           <p:cNvPr id="2" name="Title 1">
             <a:extLst>
               <a:ext uri="{FF2B5EF4-FFF2-40B4-BE49-F238E27FC236}">
-                <a16:creationId xmlns:a16="http://schemas.microsoft.com/office/drawing/2014/main" xmlns="" id="{1BE7E64F-45ED-4F7C-E583-80E267C5992C}"/>
+                <a16:creationId xmlns:a16="http://schemas.microsoft.com/office/drawing/2014/main" id="{1BE7E64F-45ED-4F7C-E583-80E267C5992C}"/>
               </a:ext>
             </a:extLst>
           </p:cNvPr>
@@ -9059,7 +9021,7 @@
           <p:cNvPr id="3" name="Content Placeholder 2">
             <a:extLst>
               <a:ext uri="{FF2B5EF4-FFF2-40B4-BE49-F238E27FC236}">
-                <a16:creationId xmlns:a16="http://schemas.microsoft.com/office/drawing/2014/main" xmlns="" id="{F6C0065B-ABB2-D9BF-1A94-59B91119070E}"/>
+                <a16:creationId xmlns:a16="http://schemas.microsoft.com/office/drawing/2014/main" id="{F6C0065B-ABB2-D9BF-1A94-59B91119070E}"/>
               </a:ext>
             </a:extLst>
           </p:cNvPr>
@@ -9127,12 +9089,42 @@
           </a:p>
         </p:txBody>
       </p:sp>
+      <p:sp>
+        <p:nvSpPr>
+          <p:cNvPr id="4" name="Slide Number Placeholder 3">
+            <a:extLst>
+              <a:ext uri="{FF2B5EF4-FFF2-40B4-BE49-F238E27FC236}">
+                <a16:creationId xmlns:a16="http://schemas.microsoft.com/office/drawing/2014/main" id="{95413048-0C58-5CB3-197D-C5BAD7300087}"/>
+              </a:ext>
+            </a:extLst>
+          </p:cNvPr>
+          <p:cNvSpPr>
+            <a:spLocks noGrp="1"/>
+          </p:cNvSpPr>
+          <p:nvPr>
+            <p:ph type="sldNum" sz="quarter" idx="12"/>
+          </p:nvPr>
+        </p:nvSpPr>
+        <p:spPr/>
+        <p:txBody>
+          <a:bodyPr/>
+          <a:lstStyle/>
+          <a:p>
+            <a:fld id="{D57F1E4F-1CFF-5643-939E-217C01CDF565}" type="slidenum">
+              <a:rPr lang="en-US" smtClean="0"/>
+              <a:pPr/>
+              <a:t>19</a:t>
+            </a:fld>
+            <a:endParaRPr lang="en-US" dirty="0"/>
+          </a:p>
+        </p:txBody>
+      </p:sp>
       <p:pic>
         <p:nvPicPr>
-          <p:cNvPr id="6" name="Picture 5">
+          <p:cNvPr id="7" name="Picture 6">
             <a:extLst>
               <a:ext uri="{FF2B5EF4-FFF2-40B4-BE49-F238E27FC236}">
-                <a16:creationId xmlns:a16="http://schemas.microsoft.com/office/drawing/2014/main" xmlns="" id="{1CB10E81-96F9-CEEA-A502-670F43FBD974}"/>
+                <a16:creationId xmlns:a16="http://schemas.microsoft.com/office/drawing/2014/main" id="{D5A30916-8297-9179-DC23-629D103C829B}"/>
               </a:ext>
             </a:extLst>
           </p:cNvPr>
@@ -9149,44 +9141,44 @@
         </p:blipFill>
         <p:spPr>
           <a:xfrm>
-            <a:off x="1040860" y="3555318"/>
-            <a:ext cx="6557656" cy="3096455"/>
+            <a:off x="4890300" y="3429000"/>
+            <a:ext cx="5164842" cy="3290504"/>
           </a:xfrm>
           <a:prstGeom prst="rect">
             <a:avLst/>
           </a:prstGeom>
         </p:spPr>
       </p:pic>
-      <p:sp>
-        <p:nvSpPr>
-          <p:cNvPr id="4" name="Slide Number Placeholder 3">
+      <p:pic>
+        <p:nvPicPr>
+          <p:cNvPr id="9" name="Picture 8">
             <a:extLst>
               <a:ext uri="{FF2B5EF4-FFF2-40B4-BE49-F238E27FC236}">
-                <a16:creationId xmlns:a16="http://schemas.microsoft.com/office/drawing/2014/main" xmlns="" id="{95413048-0C58-5CB3-197D-C5BAD7300087}"/>
+                <a16:creationId xmlns:a16="http://schemas.microsoft.com/office/drawing/2014/main" id="{BA573B6E-1228-9472-33B7-07CD6A0DB89A}"/>
               </a:ext>
             </a:extLst>
           </p:cNvPr>
-          <p:cNvSpPr>
-            <a:spLocks noGrp="1"/>
-          </p:cNvSpPr>
-          <p:nvPr>
-            <p:ph type="sldNum" sz="quarter" idx="12"/>
-          </p:nvPr>
-        </p:nvSpPr>
-        <p:spPr/>
-        <p:txBody>
-          <a:bodyPr/>
-          <a:lstStyle/>
-          <a:p>
-            <a:fld id="{D57F1E4F-1CFF-5643-939E-217C01CDF565}" type="slidenum">
-              <a:rPr lang="en-US" smtClean="0"/>
-              <a:pPr/>
-              <a:t>19</a:t>
-            </a:fld>
-            <a:endParaRPr lang="en-US" dirty="0"/>
-          </a:p>
-        </p:txBody>
-      </p:sp>
+          <p:cNvPicPr>
+            <a:picLocks noChangeAspect="1"/>
+          </p:cNvPicPr>
+          <p:nvPr/>
+        </p:nvPicPr>
+        <p:blipFill>
+          <a:blip r:embed="rId4"/>
+          <a:stretch>
+            <a:fillRect/>
+          </a:stretch>
+        </p:blipFill>
+        <p:spPr>
+          <a:xfrm>
+            <a:off x="1214135" y="3429000"/>
+            <a:ext cx="2279169" cy="3290504"/>
+          </a:xfrm>
+          <a:prstGeom prst="rect">
+            <a:avLst/>
+          </a:prstGeom>
+        </p:spPr>
+      </p:pic>
     </p:spTree>
     <p:extLst>
       <p:ext uri="{BB962C8B-B14F-4D97-AF65-F5344CB8AC3E}">
@@ -9208,7 +9200,7 @@
         <p:cNvPr id="1" name="">
           <a:extLst>
             <a:ext uri="{FF2B5EF4-FFF2-40B4-BE49-F238E27FC236}">
-              <a16:creationId xmlns:a16="http://schemas.microsoft.com/office/drawing/2014/main" xmlns="" id="{0B7D26F7-9470-21EE-B505-AC83688B6FDB}"/>
+              <a16:creationId xmlns:a16="http://schemas.microsoft.com/office/drawing/2014/main" id="{0B7D26F7-9470-21EE-B505-AC83688B6FDB}"/>
             </a:ext>
           </a:extLst>
         </p:cNvPr>
@@ -9228,7 +9220,7 @@
           <p:cNvPr id="2" name="Title 1">
             <a:extLst>
               <a:ext uri="{FF2B5EF4-FFF2-40B4-BE49-F238E27FC236}">
-                <a16:creationId xmlns:a16="http://schemas.microsoft.com/office/drawing/2014/main" xmlns="" id="{80C8C6DA-8BCA-99C9-268E-4BC6089CF838}"/>
+                <a16:creationId xmlns:a16="http://schemas.microsoft.com/office/drawing/2014/main" id="{80C8C6DA-8BCA-99C9-268E-4BC6089CF838}"/>
               </a:ext>
             </a:extLst>
           </p:cNvPr>
@@ -9264,7 +9256,7 @@
           <p:cNvPr id="8" name="Table 7">
             <a:extLst>
               <a:ext uri="{FF2B5EF4-FFF2-40B4-BE49-F238E27FC236}">
-                <a16:creationId xmlns:a16="http://schemas.microsoft.com/office/drawing/2014/main" xmlns="" id="{37414ACF-234C-4687-846C-26A5321214AE}"/>
+                <a16:creationId xmlns:a16="http://schemas.microsoft.com/office/drawing/2014/main" id="{37414ACF-234C-4687-846C-26A5321214AE}"/>
               </a:ext>
             </a:extLst>
           </p:cNvPr>
@@ -9293,21 +9285,21 @@
                 <a:gridCol w="1414113">
                   <a:extLst>
                     <a:ext uri="{9D8B030D-6E8A-4147-A177-3AD203B41FA5}">
-                      <a16:colId xmlns:a16="http://schemas.microsoft.com/office/drawing/2014/main" xmlns="" val="2824826579"/>
+                      <a16:colId xmlns:a16="http://schemas.microsoft.com/office/drawing/2014/main" val="2824826579"/>
                     </a:ext>
                   </a:extLst>
                 </a:gridCol>
                 <a:gridCol w="4343604">
                   <a:extLst>
                     <a:ext uri="{9D8B030D-6E8A-4147-A177-3AD203B41FA5}">
-                      <a16:colId xmlns:a16="http://schemas.microsoft.com/office/drawing/2014/main" xmlns="" val="520572402"/>
+                      <a16:colId xmlns:a16="http://schemas.microsoft.com/office/drawing/2014/main" val="520572402"/>
                     </a:ext>
                   </a:extLst>
                 </a:gridCol>
                 <a:gridCol w="1969647">
                   <a:extLst>
                     <a:ext uri="{9D8B030D-6E8A-4147-A177-3AD203B41FA5}">
-                      <a16:colId xmlns:a16="http://schemas.microsoft.com/office/drawing/2014/main" xmlns="" val="1387385755"/>
+                      <a16:colId xmlns:a16="http://schemas.microsoft.com/office/drawing/2014/main" val="1387385755"/>
                     </a:ext>
                   </a:extLst>
                 </a:gridCol>
@@ -9354,7 +9346,7 @@
                 </a:tc>
                 <a:extLst>
                   <a:ext uri="{0D108BD9-81ED-4DB2-BD59-A6C34878D82A}">
-                    <a16:rowId xmlns:a16="http://schemas.microsoft.com/office/drawing/2014/main" xmlns="" val="476490804"/>
+                    <a16:rowId xmlns:a16="http://schemas.microsoft.com/office/drawing/2014/main" val="476490804"/>
                   </a:ext>
                 </a:extLst>
               </a:tr>
@@ -9409,7 +9401,7 @@
                 </a:tc>
                 <a:extLst>
                   <a:ext uri="{0D108BD9-81ED-4DB2-BD59-A6C34878D82A}">
-                    <a16:rowId xmlns:a16="http://schemas.microsoft.com/office/drawing/2014/main" xmlns="" val="2369134195"/>
+                    <a16:rowId xmlns:a16="http://schemas.microsoft.com/office/drawing/2014/main" val="2369134195"/>
                   </a:ext>
                 </a:extLst>
               </a:tr>
@@ -9456,7 +9448,7 @@
                 </a:tc>
                 <a:extLst>
                   <a:ext uri="{0D108BD9-81ED-4DB2-BD59-A6C34878D82A}">
-                    <a16:rowId xmlns:a16="http://schemas.microsoft.com/office/drawing/2014/main" xmlns="" val="1311166528"/>
+                    <a16:rowId xmlns:a16="http://schemas.microsoft.com/office/drawing/2014/main" val="1311166528"/>
                   </a:ext>
                 </a:extLst>
               </a:tr>
@@ -9502,7 +9494,7 @@
                 </a:tc>
                 <a:extLst>
                   <a:ext uri="{0D108BD9-81ED-4DB2-BD59-A6C34878D82A}">
-                    <a16:rowId xmlns:a16="http://schemas.microsoft.com/office/drawing/2014/main" xmlns="" val="3750429733"/>
+                    <a16:rowId xmlns:a16="http://schemas.microsoft.com/office/drawing/2014/main" val="3750429733"/>
                   </a:ext>
                 </a:extLst>
               </a:tr>
@@ -9548,7 +9540,7 @@
                 </a:tc>
                 <a:extLst>
                   <a:ext uri="{0D108BD9-81ED-4DB2-BD59-A6C34878D82A}">
-                    <a16:rowId xmlns:a16="http://schemas.microsoft.com/office/drawing/2014/main" xmlns="" val="3852845993"/>
+                    <a16:rowId xmlns:a16="http://schemas.microsoft.com/office/drawing/2014/main" val="3852845993"/>
                   </a:ext>
                 </a:extLst>
               </a:tr>
@@ -9594,7 +9586,7 @@
                 </a:tc>
                 <a:extLst>
                   <a:ext uri="{0D108BD9-81ED-4DB2-BD59-A6C34878D82A}">
-                    <a16:rowId xmlns:a16="http://schemas.microsoft.com/office/drawing/2014/main" xmlns="" val="2658021608"/>
+                    <a16:rowId xmlns:a16="http://schemas.microsoft.com/office/drawing/2014/main" val="2658021608"/>
                   </a:ext>
                 </a:extLst>
               </a:tr>
@@ -9640,7 +9632,7 @@
                 </a:tc>
                 <a:extLst>
                   <a:ext uri="{0D108BD9-81ED-4DB2-BD59-A6C34878D82A}">
-                    <a16:rowId xmlns:a16="http://schemas.microsoft.com/office/drawing/2014/main" xmlns="" val="3506558147"/>
+                    <a16:rowId xmlns:a16="http://schemas.microsoft.com/office/drawing/2014/main" val="3506558147"/>
                   </a:ext>
                 </a:extLst>
               </a:tr>
@@ -9686,7 +9678,7 @@
                 </a:tc>
                 <a:extLst>
                   <a:ext uri="{0D108BD9-81ED-4DB2-BD59-A6C34878D82A}">
-                    <a16:rowId xmlns:a16="http://schemas.microsoft.com/office/drawing/2014/main" xmlns="" val="1675974392"/>
+                    <a16:rowId xmlns:a16="http://schemas.microsoft.com/office/drawing/2014/main" val="1675974392"/>
                   </a:ext>
                 </a:extLst>
               </a:tr>
@@ -9732,7 +9724,7 @@
                 </a:tc>
                 <a:extLst>
                   <a:ext uri="{0D108BD9-81ED-4DB2-BD59-A6C34878D82A}">
-                    <a16:rowId xmlns:a16="http://schemas.microsoft.com/office/drawing/2014/main" xmlns="" val="3703784324"/>
+                    <a16:rowId xmlns:a16="http://schemas.microsoft.com/office/drawing/2014/main" val="3703784324"/>
                   </a:ext>
                 </a:extLst>
               </a:tr>
@@ -9778,7 +9770,7 @@
                 </a:tc>
                 <a:extLst>
                   <a:ext uri="{0D108BD9-81ED-4DB2-BD59-A6C34878D82A}">
-                    <a16:rowId xmlns:a16="http://schemas.microsoft.com/office/drawing/2014/main" xmlns="" val="3994175541"/>
+                    <a16:rowId xmlns:a16="http://schemas.microsoft.com/office/drawing/2014/main" val="3994175541"/>
                   </a:ext>
                 </a:extLst>
               </a:tr>
@@ -9824,7 +9816,7 @@
                 </a:tc>
                 <a:extLst>
                   <a:ext uri="{0D108BD9-81ED-4DB2-BD59-A6C34878D82A}">
-                    <a16:rowId xmlns:a16="http://schemas.microsoft.com/office/drawing/2014/main" xmlns="" val="74374052"/>
+                    <a16:rowId xmlns:a16="http://schemas.microsoft.com/office/drawing/2014/main" val="74374052"/>
                   </a:ext>
                 </a:extLst>
               </a:tr>
@@ -9870,7 +9862,7 @@
                 </a:tc>
                 <a:extLst>
                   <a:ext uri="{0D108BD9-81ED-4DB2-BD59-A6C34878D82A}">
-                    <a16:rowId xmlns:a16="http://schemas.microsoft.com/office/drawing/2014/main" xmlns="" val="3917241332"/>
+                    <a16:rowId xmlns:a16="http://schemas.microsoft.com/office/drawing/2014/main" val="3917241332"/>
                   </a:ext>
                 </a:extLst>
               </a:tr>
@@ -9916,7 +9908,7 @@
                 </a:tc>
                 <a:extLst>
                   <a:ext uri="{0D108BD9-81ED-4DB2-BD59-A6C34878D82A}">
-                    <a16:rowId xmlns:a16="http://schemas.microsoft.com/office/drawing/2014/main" xmlns="" val="1515861170"/>
+                    <a16:rowId xmlns:a16="http://schemas.microsoft.com/office/drawing/2014/main" val="1515861170"/>
                   </a:ext>
                 </a:extLst>
               </a:tr>
@@ -9962,7 +9954,7 @@
                 </a:tc>
                 <a:extLst>
                   <a:ext uri="{0D108BD9-81ED-4DB2-BD59-A6C34878D82A}">
-                    <a16:rowId xmlns:a16="http://schemas.microsoft.com/office/drawing/2014/main" xmlns="" val="2551049372"/>
+                    <a16:rowId xmlns:a16="http://schemas.microsoft.com/office/drawing/2014/main" val="2551049372"/>
                   </a:ext>
                 </a:extLst>
               </a:tr>
@@ -9975,7 +9967,7 @@
           <p:cNvPr id="4" name="Slide Number Placeholder 3">
             <a:extLst>
               <a:ext uri="{FF2B5EF4-FFF2-40B4-BE49-F238E27FC236}">
-                <a16:creationId xmlns:a16="http://schemas.microsoft.com/office/drawing/2014/main" xmlns="" id="{138DE578-2980-CDAA-E876-1DE5FF5C8E17}"/>
+                <a16:creationId xmlns:a16="http://schemas.microsoft.com/office/drawing/2014/main" id="{138DE578-2980-CDAA-E876-1DE5FF5C8E17}"/>
               </a:ext>
             </a:extLst>
           </p:cNvPr>
@@ -10021,7 +10013,7 @@
         <p:cNvPr id="1" name="">
           <a:extLst>
             <a:ext uri="{FF2B5EF4-FFF2-40B4-BE49-F238E27FC236}">
-              <a16:creationId xmlns:a16="http://schemas.microsoft.com/office/drawing/2014/main" xmlns="" id="{2093D4E5-1EA3-F967-484A-5B3F126B41BB}"/>
+              <a16:creationId xmlns:a16="http://schemas.microsoft.com/office/drawing/2014/main" id="{2093D4E5-1EA3-F967-484A-5B3F126B41BB}"/>
             </a:ext>
           </a:extLst>
         </p:cNvPr>
@@ -10041,7 +10033,7 @@
           <p:cNvPr id="2" name="Title 1">
             <a:extLst>
               <a:ext uri="{FF2B5EF4-FFF2-40B4-BE49-F238E27FC236}">
-                <a16:creationId xmlns:a16="http://schemas.microsoft.com/office/drawing/2014/main" xmlns="" id="{7C58FCB9-D545-BBF3-1964-450A91AD4D5A}"/>
+                <a16:creationId xmlns:a16="http://schemas.microsoft.com/office/drawing/2014/main" id="{7C58FCB9-D545-BBF3-1964-450A91AD4D5A}"/>
               </a:ext>
             </a:extLst>
           </p:cNvPr>
@@ -10075,7 +10067,7 @@
           <p:cNvPr id="3" name="Content Placeholder 2">
             <a:extLst>
               <a:ext uri="{FF2B5EF4-FFF2-40B4-BE49-F238E27FC236}">
-                <a16:creationId xmlns:a16="http://schemas.microsoft.com/office/drawing/2014/main" xmlns="" id="{04F557F2-8723-FD77-7D65-456219ACA125}"/>
+                <a16:creationId xmlns:a16="http://schemas.microsoft.com/office/drawing/2014/main" id="{04F557F2-8723-FD77-7D65-456219ACA125}"/>
               </a:ext>
             </a:extLst>
           </p:cNvPr>
@@ -10185,7 +10177,7 @@
           <p:cNvPr id="4" name="Slide Number Placeholder 3">
             <a:extLst>
               <a:ext uri="{FF2B5EF4-FFF2-40B4-BE49-F238E27FC236}">
-                <a16:creationId xmlns:a16="http://schemas.microsoft.com/office/drawing/2014/main" xmlns="" id="{14534024-3FD6-9C57-E285-43F50E911E09}"/>
+                <a16:creationId xmlns:a16="http://schemas.microsoft.com/office/drawing/2014/main" id="{14534024-3FD6-9C57-E285-43F50E911E09}"/>
               </a:ext>
             </a:extLst>
           </p:cNvPr>
@@ -10231,7 +10223,7 @@
         <p:cNvPr id="1" name="">
           <a:extLst>
             <a:ext uri="{FF2B5EF4-FFF2-40B4-BE49-F238E27FC236}">
-              <a16:creationId xmlns:a16="http://schemas.microsoft.com/office/drawing/2014/main" xmlns="" id="{6EA3DA57-48DE-F7A6-37AE-375FEBB3A663}"/>
+              <a16:creationId xmlns:a16="http://schemas.microsoft.com/office/drawing/2014/main" id="{6EA3DA57-48DE-F7A6-37AE-375FEBB3A663}"/>
             </a:ext>
           </a:extLst>
         </p:cNvPr>
@@ -10251,7 +10243,7 @@
           <p:cNvPr id="2" name="Title 1">
             <a:extLst>
               <a:ext uri="{FF2B5EF4-FFF2-40B4-BE49-F238E27FC236}">
-                <a16:creationId xmlns:a16="http://schemas.microsoft.com/office/drawing/2014/main" xmlns="" id="{BDE68A12-2B8D-86E8-368E-61A41884B43A}"/>
+                <a16:creationId xmlns:a16="http://schemas.microsoft.com/office/drawing/2014/main" id="{BDE68A12-2B8D-86E8-368E-61A41884B43A}"/>
               </a:ext>
             </a:extLst>
           </p:cNvPr>
@@ -10285,7 +10277,7 @@
           <p:cNvPr id="3" name="Content Placeholder 2">
             <a:extLst>
               <a:ext uri="{FF2B5EF4-FFF2-40B4-BE49-F238E27FC236}">
-                <a16:creationId xmlns:a16="http://schemas.microsoft.com/office/drawing/2014/main" xmlns="" id="{598A6F27-8A0D-9FC2-E63B-7B9111663B30}"/>
+                <a16:creationId xmlns:a16="http://schemas.microsoft.com/office/drawing/2014/main" id="{598A6F27-8A0D-9FC2-E63B-7B9111663B30}"/>
               </a:ext>
             </a:extLst>
           </p:cNvPr>
@@ -10464,7 +10456,7 @@
           <p:cNvPr id="4" name="Slide Number Placeholder 3">
             <a:extLst>
               <a:ext uri="{FF2B5EF4-FFF2-40B4-BE49-F238E27FC236}">
-                <a16:creationId xmlns:a16="http://schemas.microsoft.com/office/drawing/2014/main" xmlns="" id="{EFA53EE6-6B9B-7616-7795-8DC3012F8D16}"/>
+                <a16:creationId xmlns:a16="http://schemas.microsoft.com/office/drawing/2014/main" id="{EFA53EE6-6B9B-7616-7795-8DC3012F8D16}"/>
               </a:ext>
             </a:extLst>
           </p:cNvPr>
@@ -10510,7 +10502,7 @@
         <p:cNvPr id="1" name="">
           <a:extLst>
             <a:ext uri="{FF2B5EF4-FFF2-40B4-BE49-F238E27FC236}">
-              <a16:creationId xmlns:a16="http://schemas.microsoft.com/office/drawing/2014/main" xmlns="" id="{3A0DB191-2DF8-4E4B-93F2-3928E8195253}"/>
+              <a16:creationId xmlns:a16="http://schemas.microsoft.com/office/drawing/2014/main" id="{3A0DB191-2DF8-4E4B-93F2-3928E8195253}"/>
             </a:ext>
           </a:extLst>
         </p:cNvPr>
@@ -10530,7 +10522,7 @@
           <p:cNvPr id="3" name="Content Placeholder 2">
             <a:extLst>
               <a:ext uri="{FF2B5EF4-FFF2-40B4-BE49-F238E27FC236}">
-                <a16:creationId xmlns:a16="http://schemas.microsoft.com/office/drawing/2014/main" xmlns="" id="{DD0C01BF-5FDD-195B-AAE4-C8A839962FCD}"/>
+                <a16:creationId xmlns:a16="http://schemas.microsoft.com/office/drawing/2014/main" id="{DD0C01BF-5FDD-195B-AAE4-C8A839962FCD}"/>
               </a:ext>
             </a:extLst>
           </p:cNvPr>
@@ -10568,7 +10560,7 @@
           <p:cNvPr id="2" name="Slide Number Placeholder 1">
             <a:extLst>
               <a:ext uri="{FF2B5EF4-FFF2-40B4-BE49-F238E27FC236}">
-                <a16:creationId xmlns:a16="http://schemas.microsoft.com/office/drawing/2014/main" xmlns="" id="{6A549DAD-1672-0716-C923-6FD6F4CDE9AB}"/>
+                <a16:creationId xmlns:a16="http://schemas.microsoft.com/office/drawing/2014/main" id="{6A549DAD-1672-0716-C923-6FD6F4CDE9AB}"/>
               </a:ext>
             </a:extLst>
           </p:cNvPr>
@@ -10794,7 +10786,7 @@
           <p:cNvPr id="4" name="Slide Number Placeholder 3">
             <a:extLst>
               <a:ext uri="{FF2B5EF4-FFF2-40B4-BE49-F238E27FC236}">
-                <a16:creationId xmlns:a16="http://schemas.microsoft.com/office/drawing/2014/main" xmlns="" id="{0ADE1130-C867-B094-7288-45615ABF7071}"/>
+                <a16:creationId xmlns:a16="http://schemas.microsoft.com/office/drawing/2014/main" id="{0ADE1130-C867-B094-7288-45615ABF7071}"/>
               </a:ext>
             </a:extLst>
           </p:cNvPr>
@@ -10840,7 +10832,7 @@
         <p:cNvPr id="1" name="">
           <a:extLst>
             <a:ext uri="{FF2B5EF4-FFF2-40B4-BE49-F238E27FC236}">
-              <a16:creationId xmlns:a16="http://schemas.microsoft.com/office/drawing/2014/main" xmlns="" id="{DAA3B00F-A3D8-BDBF-B658-13759A4780AB}"/>
+              <a16:creationId xmlns:a16="http://schemas.microsoft.com/office/drawing/2014/main" id="{DAA3B00F-A3D8-BDBF-B658-13759A4780AB}"/>
             </a:ext>
           </a:extLst>
         </p:cNvPr>
@@ -10860,7 +10852,7 @@
           <p:cNvPr id="2" name="Title 1">
             <a:extLst>
               <a:ext uri="{FF2B5EF4-FFF2-40B4-BE49-F238E27FC236}">
-                <a16:creationId xmlns:a16="http://schemas.microsoft.com/office/drawing/2014/main" xmlns="" id="{AC60A686-865D-A420-59EC-4A312E5CB0DA}"/>
+                <a16:creationId xmlns:a16="http://schemas.microsoft.com/office/drawing/2014/main" id="{AC60A686-865D-A420-59EC-4A312E5CB0DA}"/>
               </a:ext>
             </a:extLst>
           </p:cNvPr>
@@ -10896,7 +10888,7 @@
           <p:cNvPr id="3" name="Content Placeholder 2">
             <a:extLst>
               <a:ext uri="{FF2B5EF4-FFF2-40B4-BE49-F238E27FC236}">
-                <a16:creationId xmlns:a16="http://schemas.microsoft.com/office/drawing/2014/main" xmlns="" id="{3ECFB9F9-DD75-2F2B-B6C2-D586861CBDC1}"/>
+                <a16:creationId xmlns:a16="http://schemas.microsoft.com/office/drawing/2014/main" id="{3ECFB9F9-DD75-2F2B-B6C2-D586861CBDC1}"/>
               </a:ext>
             </a:extLst>
           </p:cNvPr>
@@ -10943,7 +10935,7 @@
           <p:cNvPr id="8" name="Table 7">
             <a:extLst>
               <a:ext uri="{FF2B5EF4-FFF2-40B4-BE49-F238E27FC236}">
-                <a16:creationId xmlns:a16="http://schemas.microsoft.com/office/drawing/2014/main" xmlns="" id="{4B084F21-59DF-9BD4-7E3E-691504BC0F42}"/>
+                <a16:creationId xmlns:a16="http://schemas.microsoft.com/office/drawing/2014/main" id="{4B084F21-59DF-9BD4-7E3E-691504BC0F42}"/>
               </a:ext>
             </a:extLst>
           </p:cNvPr>
@@ -10966,42 +10958,42 @@
                 <a:gridCol w="1602073">
                   <a:extLst>
                     <a:ext uri="{9D8B030D-6E8A-4147-A177-3AD203B41FA5}">
-                      <a16:colId xmlns:a16="http://schemas.microsoft.com/office/drawing/2014/main" xmlns="" val="2824826579"/>
+                      <a16:colId xmlns:a16="http://schemas.microsoft.com/office/drawing/2014/main" val="2824826579"/>
                     </a:ext>
                   </a:extLst>
                 </a:gridCol>
                 <a:gridCol w="1078441">
                   <a:extLst>
                     <a:ext uri="{9D8B030D-6E8A-4147-A177-3AD203B41FA5}">
-                      <a16:colId xmlns:a16="http://schemas.microsoft.com/office/drawing/2014/main" xmlns="" val="520572402"/>
+                      <a16:colId xmlns:a16="http://schemas.microsoft.com/office/drawing/2014/main" val="520572402"/>
                     </a:ext>
                   </a:extLst>
                 </a:gridCol>
                 <a:gridCol w="916972">
                   <a:extLst>
                     <a:ext uri="{9D8B030D-6E8A-4147-A177-3AD203B41FA5}">
-                      <a16:colId xmlns:a16="http://schemas.microsoft.com/office/drawing/2014/main" xmlns="" val="1387385755"/>
+                      <a16:colId xmlns:a16="http://schemas.microsoft.com/office/drawing/2014/main" val="1387385755"/>
                     </a:ext>
                   </a:extLst>
                 </a:gridCol>
                 <a:gridCol w="1017798">
                   <a:extLst>
                     <a:ext uri="{9D8B030D-6E8A-4147-A177-3AD203B41FA5}">
-                      <a16:colId xmlns:a16="http://schemas.microsoft.com/office/drawing/2014/main" xmlns="" val="1640856683"/>
+                      <a16:colId xmlns:a16="http://schemas.microsoft.com/office/drawing/2014/main" val="1640856683"/>
                     </a:ext>
                   </a:extLst>
                 </a:gridCol>
                 <a:gridCol w="1950437">
                   <a:extLst>
                     <a:ext uri="{9D8B030D-6E8A-4147-A177-3AD203B41FA5}">
-                      <a16:colId xmlns:a16="http://schemas.microsoft.com/office/drawing/2014/main" xmlns="" val="2450729697"/>
+                      <a16:colId xmlns:a16="http://schemas.microsoft.com/office/drawing/2014/main" val="2450729697"/>
                     </a:ext>
                   </a:extLst>
                 </a:gridCol>
                 <a:gridCol w="1950437">
                   <a:extLst>
                     <a:ext uri="{9D8B030D-6E8A-4147-A177-3AD203B41FA5}">
-                      <a16:colId xmlns:a16="http://schemas.microsoft.com/office/drawing/2014/main" xmlns="" val="20005"/>
+                      <a16:colId xmlns:a16="http://schemas.microsoft.com/office/drawing/2014/main" val="20005"/>
                     </a:ext>
                   </a:extLst>
                 </a:gridCol>
@@ -11088,7 +11080,7 @@
                 </a:tc>
                 <a:extLst>
                   <a:ext uri="{0D108BD9-81ED-4DB2-BD59-A6C34878D82A}">
-                    <a16:rowId xmlns:a16="http://schemas.microsoft.com/office/drawing/2014/main" xmlns="" val="476490804"/>
+                    <a16:rowId xmlns:a16="http://schemas.microsoft.com/office/drawing/2014/main" val="476490804"/>
                   </a:ext>
                 </a:extLst>
               </a:tr>
@@ -11192,7 +11184,7 @@
                 </a:tc>
                 <a:extLst>
                   <a:ext uri="{0D108BD9-81ED-4DB2-BD59-A6C34878D82A}">
-                    <a16:rowId xmlns:a16="http://schemas.microsoft.com/office/drawing/2014/main" xmlns="" val="2369134195"/>
+                    <a16:rowId xmlns:a16="http://schemas.microsoft.com/office/drawing/2014/main" val="2369134195"/>
                   </a:ext>
                 </a:extLst>
               </a:tr>
@@ -11296,7 +11288,7 @@
                 </a:tc>
                 <a:extLst>
                   <a:ext uri="{0D108BD9-81ED-4DB2-BD59-A6C34878D82A}">
-                    <a16:rowId xmlns:a16="http://schemas.microsoft.com/office/drawing/2014/main" xmlns="" val="1311166528"/>
+                    <a16:rowId xmlns:a16="http://schemas.microsoft.com/office/drawing/2014/main" val="1311166528"/>
                   </a:ext>
                 </a:extLst>
               </a:tr>
@@ -11309,7 +11301,7 @@
           <p:cNvPr id="4" name="Slide Number Placeholder 3">
             <a:extLst>
               <a:ext uri="{FF2B5EF4-FFF2-40B4-BE49-F238E27FC236}">
-                <a16:creationId xmlns:a16="http://schemas.microsoft.com/office/drawing/2014/main" xmlns="" id="{31F1810A-F17B-789F-C6E3-3F2326748FA7}"/>
+                <a16:creationId xmlns:a16="http://schemas.microsoft.com/office/drawing/2014/main" id="{31F1810A-F17B-789F-C6E3-3F2326748FA7}"/>
               </a:ext>
             </a:extLst>
           </p:cNvPr>
@@ -11355,7 +11347,7 @@
         <p:cNvPr id="1" name="">
           <a:extLst>
             <a:ext uri="{FF2B5EF4-FFF2-40B4-BE49-F238E27FC236}">
-              <a16:creationId xmlns:a16="http://schemas.microsoft.com/office/drawing/2014/main" xmlns="" id="{E9C82B65-FE07-9E02-773B-29BDE3EFCB19}"/>
+              <a16:creationId xmlns:a16="http://schemas.microsoft.com/office/drawing/2014/main" id="{E9C82B65-FE07-9E02-773B-29BDE3EFCB19}"/>
             </a:ext>
           </a:extLst>
         </p:cNvPr>
@@ -11375,7 +11367,7 @@
           <p:cNvPr id="2" name="Title 1">
             <a:extLst>
               <a:ext uri="{FF2B5EF4-FFF2-40B4-BE49-F238E27FC236}">
-                <a16:creationId xmlns:a16="http://schemas.microsoft.com/office/drawing/2014/main" xmlns="" id="{659F3FDD-DBAA-2959-6A88-62E57DE88F67}"/>
+                <a16:creationId xmlns:a16="http://schemas.microsoft.com/office/drawing/2014/main" id="{659F3FDD-DBAA-2959-6A88-62E57DE88F67}"/>
               </a:ext>
             </a:extLst>
           </p:cNvPr>
@@ -11411,7 +11403,7 @@
           <p:cNvPr id="7" name="Table 6">
             <a:extLst>
               <a:ext uri="{FF2B5EF4-FFF2-40B4-BE49-F238E27FC236}">
-                <a16:creationId xmlns:a16="http://schemas.microsoft.com/office/drawing/2014/main" xmlns="" id="{353DE374-318E-88EE-153C-1DF3C4F71A2E}"/>
+                <a16:creationId xmlns:a16="http://schemas.microsoft.com/office/drawing/2014/main" id="{353DE374-318E-88EE-153C-1DF3C4F71A2E}"/>
               </a:ext>
             </a:extLst>
           </p:cNvPr>
@@ -11440,42 +11432,42 @@
                 <a:gridCol w="1375204">
                   <a:extLst>
                     <a:ext uri="{9D8B030D-6E8A-4147-A177-3AD203B41FA5}">
-                      <a16:colId xmlns:a16="http://schemas.microsoft.com/office/drawing/2014/main" xmlns="" val="2824826579"/>
+                      <a16:colId xmlns:a16="http://schemas.microsoft.com/office/drawing/2014/main" val="2824826579"/>
                     </a:ext>
                   </a:extLst>
                 </a:gridCol>
                 <a:gridCol w="1101849">
                   <a:extLst>
                     <a:ext uri="{9D8B030D-6E8A-4147-A177-3AD203B41FA5}">
-                      <a16:colId xmlns:a16="http://schemas.microsoft.com/office/drawing/2014/main" xmlns="" val="520572402"/>
+                      <a16:colId xmlns:a16="http://schemas.microsoft.com/office/drawing/2014/main" val="520572402"/>
                     </a:ext>
                   </a:extLst>
                 </a:gridCol>
                 <a:gridCol w="734709">
                   <a:extLst>
                     <a:ext uri="{9D8B030D-6E8A-4147-A177-3AD203B41FA5}">
-                      <a16:colId xmlns:a16="http://schemas.microsoft.com/office/drawing/2014/main" xmlns="" val="1387385755"/>
+                      <a16:colId xmlns:a16="http://schemas.microsoft.com/office/drawing/2014/main" val="1387385755"/>
                     </a:ext>
                   </a:extLst>
                 </a:gridCol>
                 <a:gridCol w="1083817">
                   <a:extLst>
                     <a:ext uri="{9D8B030D-6E8A-4147-A177-3AD203B41FA5}">
-                      <a16:colId xmlns:a16="http://schemas.microsoft.com/office/drawing/2014/main" xmlns="" val="1640856683"/>
+                      <a16:colId xmlns:a16="http://schemas.microsoft.com/office/drawing/2014/main" val="1640856683"/>
                     </a:ext>
                   </a:extLst>
                 </a:gridCol>
                 <a:gridCol w="2089196">
                   <a:extLst>
                     <a:ext uri="{9D8B030D-6E8A-4147-A177-3AD203B41FA5}">
-                      <a16:colId xmlns:a16="http://schemas.microsoft.com/office/drawing/2014/main" xmlns="" val="2450729697"/>
+                      <a16:colId xmlns:a16="http://schemas.microsoft.com/office/drawing/2014/main" val="2450729697"/>
                     </a:ext>
                   </a:extLst>
                 </a:gridCol>
                 <a:gridCol w="2468754">
                   <a:extLst>
                     <a:ext uri="{9D8B030D-6E8A-4147-A177-3AD203B41FA5}">
-                      <a16:colId xmlns:a16="http://schemas.microsoft.com/office/drawing/2014/main" xmlns="" val="20005"/>
+                      <a16:colId xmlns:a16="http://schemas.microsoft.com/office/drawing/2014/main" val="20005"/>
                     </a:ext>
                   </a:extLst>
                 </a:gridCol>
@@ -11562,7 +11554,7 @@
                 </a:tc>
                 <a:extLst>
                   <a:ext uri="{0D108BD9-81ED-4DB2-BD59-A6C34878D82A}">
-                    <a16:rowId xmlns:a16="http://schemas.microsoft.com/office/drawing/2014/main" xmlns="" val="476490804"/>
+                    <a16:rowId xmlns:a16="http://schemas.microsoft.com/office/drawing/2014/main" val="476490804"/>
                   </a:ext>
                 </a:extLst>
               </a:tr>
@@ -11716,7 +11708,7 @@
                 </a:tc>
                 <a:extLst>
                   <a:ext uri="{0D108BD9-81ED-4DB2-BD59-A6C34878D82A}">
-                    <a16:rowId xmlns:a16="http://schemas.microsoft.com/office/drawing/2014/main" xmlns="" val="10001"/>
+                    <a16:rowId xmlns:a16="http://schemas.microsoft.com/office/drawing/2014/main" val="10001"/>
                   </a:ext>
                 </a:extLst>
               </a:tr>
@@ -11839,7 +11831,7 @@
                 </a:tc>
                 <a:extLst>
                   <a:ext uri="{0D108BD9-81ED-4DB2-BD59-A6C34878D82A}">
-                    <a16:rowId xmlns:a16="http://schemas.microsoft.com/office/drawing/2014/main" xmlns="" val="10002"/>
+                    <a16:rowId xmlns:a16="http://schemas.microsoft.com/office/drawing/2014/main" val="10002"/>
                   </a:ext>
                 </a:extLst>
               </a:tr>
@@ -11974,7 +11966,7 @@
                 </a:tc>
                 <a:extLst>
                   <a:ext uri="{0D108BD9-81ED-4DB2-BD59-A6C34878D82A}">
-                    <a16:rowId xmlns:a16="http://schemas.microsoft.com/office/drawing/2014/main" xmlns="" val="10003"/>
+                    <a16:rowId xmlns:a16="http://schemas.microsoft.com/office/drawing/2014/main" val="10003"/>
                   </a:ext>
                 </a:extLst>
               </a:tr>
@@ -12112,7 +12104,7 @@
                 </a:tc>
                 <a:extLst>
                   <a:ext uri="{0D108BD9-81ED-4DB2-BD59-A6C34878D82A}">
-                    <a16:rowId xmlns:a16="http://schemas.microsoft.com/office/drawing/2014/main" xmlns="" val="10004"/>
+                    <a16:rowId xmlns:a16="http://schemas.microsoft.com/office/drawing/2014/main" val="10004"/>
                   </a:ext>
                 </a:extLst>
               </a:tr>
@@ -12125,7 +12117,7 @@
           <p:cNvPr id="3" name="Slide Number Placeholder 2">
             <a:extLst>
               <a:ext uri="{FF2B5EF4-FFF2-40B4-BE49-F238E27FC236}">
-                <a16:creationId xmlns:a16="http://schemas.microsoft.com/office/drawing/2014/main" xmlns="" id="{7BC9E07A-B7E1-47C8-660D-4363F7E8BFCE}"/>
+                <a16:creationId xmlns:a16="http://schemas.microsoft.com/office/drawing/2014/main" id="{7BC9E07A-B7E1-47C8-660D-4363F7E8BFCE}"/>
               </a:ext>
             </a:extLst>
           </p:cNvPr>
@@ -12171,7 +12163,7 @@
         <p:cNvPr id="1" name="">
           <a:extLst>
             <a:ext uri="{FF2B5EF4-FFF2-40B4-BE49-F238E27FC236}">
-              <a16:creationId xmlns:a16="http://schemas.microsoft.com/office/drawing/2014/main" xmlns="" id="{C7D80A15-1CF9-9728-45DA-E60EA075E094}"/>
+              <a16:creationId xmlns:a16="http://schemas.microsoft.com/office/drawing/2014/main" id="{C7D80A15-1CF9-9728-45DA-E60EA075E094}"/>
             </a:ext>
           </a:extLst>
         </p:cNvPr>
@@ -12191,7 +12183,7 @@
           <p:cNvPr id="2" name="Title 1">
             <a:extLst>
               <a:ext uri="{FF2B5EF4-FFF2-40B4-BE49-F238E27FC236}">
-                <a16:creationId xmlns:a16="http://schemas.microsoft.com/office/drawing/2014/main" xmlns="" id="{FB0EE3C3-E9F5-EAED-212B-4FAA98338E72}"/>
+                <a16:creationId xmlns:a16="http://schemas.microsoft.com/office/drawing/2014/main" id="{FB0EE3C3-E9F5-EAED-212B-4FAA98338E72}"/>
               </a:ext>
             </a:extLst>
           </p:cNvPr>
@@ -12227,7 +12219,7 @@
           <p:cNvPr id="3" name="Content Placeholder 2">
             <a:extLst>
               <a:ext uri="{FF2B5EF4-FFF2-40B4-BE49-F238E27FC236}">
-                <a16:creationId xmlns:a16="http://schemas.microsoft.com/office/drawing/2014/main" xmlns="" id="{E0937787-6C8F-8B98-7CF1-A73E6C29202B}"/>
+                <a16:creationId xmlns:a16="http://schemas.microsoft.com/office/drawing/2014/main" id="{E0937787-6C8F-8B98-7CF1-A73E6C29202B}"/>
               </a:ext>
             </a:extLst>
           </p:cNvPr>
@@ -12328,7 +12320,7 @@
           <p:cNvPr id="4" name="Slide Number Placeholder 3">
             <a:extLst>
               <a:ext uri="{FF2B5EF4-FFF2-40B4-BE49-F238E27FC236}">
-                <a16:creationId xmlns:a16="http://schemas.microsoft.com/office/drawing/2014/main" xmlns="" id="{39B13807-B88F-861E-D990-57519CE5E888}"/>
+                <a16:creationId xmlns:a16="http://schemas.microsoft.com/office/drawing/2014/main" id="{39B13807-B88F-861E-D990-57519CE5E888}"/>
               </a:ext>
             </a:extLst>
           </p:cNvPr>
@@ -12374,7 +12366,7 @@
         <p:cNvPr id="1" name="">
           <a:extLst>
             <a:ext uri="{FF2B5EF4-FFF2-40B4-BE49-F238E27FC236}">
-              <a16:creationId xmlns:a16="http://schemas.microsoft.com/office/drawing/2014/main" xmlns="" id="{69F187B2-8DF3-0E31-DBAB-D68A17679ABC}"/>
+              <a16:creationId xmlns:a16="http://schemas.microsoft.com/office/drawing/2014/main" id="{69F187B2-8DF3-0E31-DBAB-D68A17679ABC}"/>
             </a:ext>
           </a:extLst>
         </p:cNvPr>
@@ -12394,7 +12386,7 @@
           <p:cNvPr id="2" name="Title 1">
             <a:extLst>
               <a:ext uri="{FF2B5EF4-FFF2-40B4-BE49-F238E27FC236}">
-                <a16:creationId xmlns:a16="http://schemas.microsoft.com/office/drawing/2014/main" xmlns="" id="{F6E006B1-F391-882D-85E1-644BCDD00809}"/>
+                <a16:creationId xmlns:a16="http://schemas.microsoft.com/office/drawing/2014/main" id="{F6E006B1-F391-882D-85E1-644BCDD00809}"/>
               </a:ext>
             </a:extLst>
           </p:cNvPr>
@@ -12430,7 +12422,7 @@
           <p:cNvPr id="3" name="Content Placeholder 2">
             <a:extLst>
               <a:ext uri="{FF2B5EF4-FFF2-40B4-BE49-F238E27FC236}">
-                <a16:creationId xmlns:a16="http://schemas.microsoft.com/office/drawing/2014/main" xmlns="" id="{5AD44A04-D600-260A-F53A-668F7EE2D73C}"/>
+                <a16:creationId xmlns:a16="http://schemas.microsoft.com/office/drawing/2014/main" id="{5AD44A04-D600-260A-F53A-668F7EE2D73C}"/>
               </a:ext>
             </a:extLst>
           </p:cNvPr>
@@ -12506,7 +12498,7 @@
           <p:cNvPr id="4" name="Slide Number Placeholder 3">
             <a:extLst>
               <a:ext uri="{FF2B5EF4-FFF2-40B4-BE49-F238E27FC236}">
-                <a16:creationId xmlns:a16="http://schemas.microsoft.com/office/drawing/2014/main" xmlns="" id="{42D35B33-F8F1-B839-61AD-6D6A33D7066B}"/>
+                <a16:creationId xmlns:a16="http://schemas.microsoft.com/office/drawing/2014/main" id="{42D35B33-F8F1-B839-61AD-6D6A33D7066B}"/>
               </a:ext>
             </a:extLst>
           </p:cNvPr>
@@ -12552,7 +12544,7 @@
         <p:cNvPr id="1" name="">
           <a:extLst>
             <a:ext uri="{FF2B5EF4-FFF2-40B4-BE49-F238E27FC236}">
-              <a16:creationId xmlns:a16="http://schemas.microsoft.com/office/drawing/2014/main" xmlns="" id="{E1FB562B-B70F-919C-124C-1B67C1B6749B}"/>
+              <a16:creationId xmlns:a16="http://schemas.microsoft.com/office/drawing/2014/main" id="{E1FB562B-B70F-919C-124C-1B67C1B6749B}"/>
             </a:ext>
           </a:extLst>
         </p:cNvPr>
@@ -12572,7 +12564,7 @@
           <p:cNvPr id="2" name="Title 1">
             <a:extLst>
               <a:ext uri="{FF2B5EF4-FFF2-40B4-BE49-F238E27FC236}">
-                <a16:creationId xmlns:a16="http://schemas.microsoft.com/office/drawing/2014/main" xmlns="" id="{230FBA4C-7F2E-6671-E17E-55087C825DD3}"/>
+                <a16:creationId xmlns:a16="http://schemas.microsoft.com/office/drawing/2014/main" id="{230FBA4C-7F2E-6671-E17E-55087C825DD3}"/>
               </a:ext>
             </a:extLst>
           </p:cNvPr>
@@ -12608,7 +12600,7 @@
           <p:cNvPr id="3" name="Content Placeholder 2">
             <a:extLst>
               <a:ext uri="{FF2B5EF4-FFF2-40B4-BE49-F238E27FC236}">
-                <a16:creationId xmlns:a16="http://schemas.microsoft.com/office/drawing/2014/main" xmlns="" id="{62AB9CAF-7EF5-7504-920F-0F368C727D1C}"/>
+                <a16:creationId xmlns:a16="http://schemas.microsoft.com/office/drawing/2014/main" id="{62AB9CAF-7EF5-7504-920F-0F368C727D1C}"/>
               </a:ext>
             </a:extLst>
           </p:cNvPr>
@@ -12677,7 +12669,7 @@
           <p:cNvPr id="4" name="Slide Number Placeholder 3">
             <a:extLst>
               <a:ext uri="{FF2B5EF4-FFF2-40B4-BE49-F238E27FC236}">
-                <a16:creationId xmlns:a16="http://schemas.microsoft.com/office/drawing/2014/main" xmlns="" id="{75B26837-2BFC-DF5D-4A62-5E0B39337F6C}"/>
+                <a16:creationId xmlns:a16="http://schemas.microsoft.com/office/drawing/2014/main" id="{75B26837-2BFC-DF5D-4A62-5E0B39337F6C}"/>
               </a:ext>
             </a:extLst>
           </p:cNvPr>
@@ -12723,7 +12715,7 @@
         <p:cNvPr id="1" name="">
           <a:extLst>
             <a:ext uri="{FF2B5EF4-FFF2-40B4-BE49-F238E27FC236}">
-              <a16:creationId xmlns:a16="http://schemas.microsoft.com/office/drawing/2014/main" xmlns="" id="{210B94F8-BF55-5CA6-32BE-94BD832DA418}"/>
+              <a16:creationId xmlns:a16="http://schemas.microsoft.com/office/drawing/2014/main" id="{210B94F8-BF55-5CA6-32BE-94BD832DA418}"/>
             </a:ext>
           </a:extLst>
         </p:cNvPr>
@@ -12743,7 +12735,7 @@
           <p:cNvPr id="2" name="Title 1">
             <a:extLst>
               <a:ext uri="{FF2B5EF4-FFF2-40B4-BE49-F238E27FC236}">
-                <a16:creationId xmlns:a16="http://schemas.microsoft.com/office/drawing/2014/main" xmlns="" id="{42672787-B530-95A5-FC5D-F557C0462F50}"/>
+                <a16:creationId xmlns:a16="http://schemas.microsoft.com/office/drawing/2014/main" id="{42672787-B530-95A5-FC5D-F557C0462F50}"/>
               </a:ext>
             </a:extLst>
           </p:cNvPr>
@@ -12779,7 +12771,7 @@
           <p:cNvPr id="3" name="Content Placeholder 2">
             <a:extLst>
               <a:ext uri="{FF2B5EF4-FFF2-40B4-BE49-F238E27FC236}">
-                <a16:creationId xmlns:a16="http://schemas.microsoft.com/office/drawing/2014/main" xmlns="" id="{87BC5DBE-EB6D-8304-529B-38B03D5D8FBA}"/>
+                <a16:creationId xmlns:a16="http://schemas.microsoft.com/office/drawing/2014/main" id="{87BC5DBE-EB6D-8304-529B-38B03D5D8FBA}"/>
               </a:ext>
             </a:extLst>
           </p:cNvPr>
@@ -12918,7 +12910,7 @@
           <p:cNvPr id="4" name="Slide Number Placeholder 3">
             <a:extLst>
               <a:ext uri="{FF2B5EF4-FFF2-40B4-BE49-F238E27FC236}">
-                <a16:creationId xmlns:a16="http://schemas.microsoft.com/office/drawing/2014/main" xmlns="" id="{0670B763-EEE6-C4E0-6235-EA8E51F679A6}"/>
+                <a16:creationId xmlns:a16="http://schemas.microsoft.com/office/drawing/2014/main" id="{0670B763-EEE6-C4E0-6235-EA8E51F679A6}"/>
               </a:ext>
             </a:extLst>
           </p:cNvPr>

</xml_diff>